<commit_message>
Added chapter 2 updates for live editor
</commit_message>
<xml_diff>
--- a/InstructorMaterials/Best Practices for Software Development using MATLAB.pptx
+++ b/InstructorMaterials/Best Practices for Software Development using MATLAB.pptx
@@ -222,7 +222,7 @@
           <a:p>
             <a:fld id="{6C06565E-6C9B-4A06-A09A-D231B01EEF1C}" type="datetimeFigureOut">
               <a:rPr lang="en-GB" smtClean="0"/>
-              <a:t>23/05/2019</a:t>
+              <a:t>23/05/2022</a:t>
             </a:fld>
             <a:endParaRPr lang="en-GB"/>
           </a:p>
@@ -286,35 +286,35 @@
           <a:p>
             <a:pPr lvl="0"/>
             <a:r>
-              <a:rPr lang="en-US" smtClean="0"/>
+              <a:rPr lang="en-US"/>
               <a:t>Click to edit Master text styles</a:t>
             </a:r>
           </a:p>
           <a:p>
             <a:pPr lvl="1"/>
             <a:r>
-              <a:rPr lang="en-US" smtClean="0"/>
+              <a:rPr lang="en-US"/>
               <a:t>Second level</a:t>
             </a:r>
           </a:p>
           <a:p>
             <a:pPr lvl="2"/>
             <a:r>
-              <a:rPr lang="en-US" smtClean="0"/>
+              <a:rPr lang="en-US"/>
               <a:t>Third level</a:t>
             </a:r>
           </a:p>
           <a:p>
             <a:pPr lvl="3"/>
             <a:r>
-              <a:rPr lang="en-US" smtClean="0"/>
+              <a:rPr lang="en-US"/>
               <a:t>Fourth level</a:t>
             </a:r>
           </a:p>
           <a:p>
             <a:pPr lvl="4"/>
             <a:r>
-              <a:rPr lang="en-US" smtClean="0"/>
+              <a:rPr lang="en-US"/>
               <a:t>Fifth level</a:t>
             </a:r>
             <a:endParaRPr lang="en-GB"/>
@@ -735,28 +735,27 @@
           <a:lstStyle/>
           <a:p>
             <a:r>
-              <a:rPr lang="en-GB" dirty="0" smtClean="0"/>
+              <a:rPr lang="en-GB" dirty="0"/>
               <a:t>Try</a:t>
             </a:r>
           </a:p>
           <a:p>
             <a:r>
-              <a:rPr lang="en-GB" dirty="0" smtClean="0"/>
+              <a:rPr lang="en-GB" dirty="0"/>
               <a:t>Might want different configurations for different</a:t>
             </a:r>
             <a:r>
-              <a:rPr lang="en-GB" baseline="0" dirty="0" smtClean="0"/>
+              <a:rPr lang="en-GB" baseline="0" dirty="0"/>
               <a:t> computers, no of screens </a:t>
             </a:r>
             <a:r>
-              <a:rPr lang="en-GB" baseline="0" dirty="0" err="1" smtClean="0"/>
+              <a:rPr lang="en-GB" baseline="0" dirty="0" err="1"/>
               <a:t>etc</a:t>
             </a:r>
             <a:r>
-              <a:rPr lang="en-GB" dirty="0" smtClean="0"/>
+              <a:rPr lang="en-GB" dirty="0"/>
               <a:t> </a:t>
             </a:r>
-            <a:endParaRPr lang="en-GB" dirty="0"/>
           </a:p>
         </p:txBody>
       </p:sp>
@@ -978,22 +977,22 @@
           <a:lstStyle/>
           <a:p>
             <a:r>
-              <a:rPr lang="en-GB" dirty="0" smtClean="0"/>
+              <a:rPr lang="en-GB" dirty="0"/>
               <a:t>Bit like an</a:t>
             </a:r>
             <a:r>
-              <a:rPr lang="en-GB" baseline="0" dirty="0" smtClean="0"/>
+              <a:rPr lang="en-GB" baseline="0" dirty="0"/>
               <a:t> inline function</a:t>
             </a:r>
-            <a:endParaRPr lang="en-GB" dirty="0" smtClean="0"/>
-          </a:p>
-          <a:p>
-            <a:r>
-              <a:rPr lang="en-GB" dirty="0" smtClean="0"/>
+            <a:endParaRPr lang="en-GB" dirty="0"/>
+          </a:p>
+          <a:p>
+            <a:r>
+              <a:rPr lang="en-GB" dirty="0"/>
               <a:t>Show creating polynomial</a:t>
             </a:r>
             <a:r>
-              <a:rPr lang="en-GB" baseline="0" dirty="0" smtClean="0"/>
+              <a:rPr lang="en-GB" baseline="0" dirty="0"/>
               <a:t>  poly = @(x) 4*x.^2 + 3.*x + 7</a:t>
             </a:r>
             <a:endParaRPr lang="en-GB" dirty="0"/>
@@ -1106,29 +1105,29 @@
           <a:lstStyle/>
           <a:p>
             <a:r>
-              <a:rPr lang="en-GB" dirty="0" smtClean="0"/>
+              <a:rPr lang="en-GB" dirty="0"/>
               <a:t>Built up basics to be able</a:t>
             </a:r>
             <a:r>
-              <a:rPr lang="en-GB" baseline="0" dirty="0" smtClean="0"/>
+              <a:rPr lang="en-GB" baseline="0" dirty="0"/>
               <a:t> to write code </a:t>
             </a:r>
           </a:p>
           <a:p>
             <a:r>
-              <a:rPr lang="en-GB" baseline="0" dirty="0" smtClean="0"/>
+              <a:rPr lang="en-GB" baseline="0" dirty="0"/>
               <a:t>Need the tools to be able to write well constructed programs</a:t>
             </a:r>
           </a:p>
           <a:p>
             <a:r>
-              <a:rPr lang="en-GB" baseline="0" dirty="0" smtClean="0"/>
+              <a:rPr lang="en-GB" baseline="0" dirty="0"/>
               <a:t>Good practice to include H1 line to show input/output arguments</a:t>
             </a:r>
           </a:p>
           <a:p>
             <a:r>
-              <a:rPr lang="en-GB" baseline="0" dirty="0" smtClean="0"/>
+              <a:rPr lang="en-GB" baseline="0" dirty="0"/>
               <a:t>Dummy arguments are basically templates</a:t>
             </a:r>
           </a:p>
@@ -1318,7 +1317,7 @@
           </a:lstStyle>
           <a:p>
             <a:r>
-              <a:rPr lang="en-US" smtClean="0"/>
+              <a:rPr lang="en-US"/>
               <a:t>Click to edit Master title style</a:t>
             </a:r>
             <a:endParaRPr lang="en-US" dirty="0"/>
@@ -1383,7 +1382,7 @@
           </a:lstStyle>
           <a:p>
             <a:r>
-              <a:rPr lang="en-US" smtClean="0"/>
+              <a:rPr lang="en-US"/>
               <a:t>Click to edit Master subtitle style</a:t>
             </a:r>
             <a:endParaRPr lang="en-US" dirty="0"/>
@@ -1407,7 +1406,7 @@
           <a:p>
             <a:fld id="{F4D14FF6-3E0D-407D-982E-9B686EE47223}" type="datetimeFigureOut">
               <a:rPr lang="en-GB" smtClean="0"/>
-              <a:t>23/05/2019</a:t>
+              <a:t>23/05/2022</a:t>
             </a:fld>
             <a:endParaRPr lang="en-GB"/>
           </a:p>
@@ -1501,7 +1500,7 @@
           <a:lstStyle/>
           <a:p>
             <a:r>
-              <a:rPr lang="en-US" smtClean="0"/>
+              <a:rPr lang="en-US"/>
               <a:t>Click to edit Master title style</a:t>
             </a:r>
             <a:endParaRPr lang="en-US" dirty="0"/>
@@ -1525,35 +1524,35 @@
           <a:p>
             <a:pPr lvl="0"/>
             <a:r>
-              <a:rPr lang="en-US" smtClean="0"/>
+              <a:rPr lang="en-US"/>
               <a:t>Click to edit Master text styles</a:t>
             </a:r>
           </a:p>
           <a:p>
             <a:pPr lvl="1"/>
             <a:r>
-              <a:rPr lang="en-US" smtClean="0"/>
+              <a:rPr lang="en-US"/>
               <a:t>Second level</a:t>
             </a:r>
           </a:p>
           <a:p>
             <a:pPr lvl="2"/>
             <a:r>
-              <a:rPr lang="en-US" smtClean="0"/>
+              <a:rPr lang="en-US"/>
               <a:t>Third level</a:t>
             </a:r>
           </a:p>
           <a:p>
             <a:pPr lvl="3"/>
             <a:r>
-              <a:rPr lang="en-US" smtClean="0"/>
+              <a:rPr lang="en-US"/>
               <a:t>Fourth level</a:t>
             </a:r>
           </a:p>
           <a:p>
             <a:pPr lvl="4"/>
             <a:r>
-              <a:rPr lang="en-US" smtClean="0"/>
+              <a:rPr lang="en-US"/>
               <a:t>Fifth level</a:t>
             </a:r>
             <a:endParaRPr lang="en-US" dirty="0"/>
@@ -1577,7 +1576,7 @@
           <a:p>
             <a:fld id="{F4D14FF6-3E0D-407D-982E-9B686EE47223}" type="datetimeFigureOut">
               <a:rPr lang="en-GB" smtClean="0"/>
-              <a:t>23/05/2019</a:t>
+              <a:t>23/05/2022</a:t>
             </a:fld>
             <a:endParaRPr lang="en-GB"/>
           </a:p>
@@ -1676,7 +1675,7 @@
           <a:lstStyle/>
           <a:p>
             <a:r>
-              <a:rPr lang="en-US" smtClean="0"/>
+              <a:rPr lang="en-US"/>
               <a:t>Click to edit Master title style</a:t>
             </a:r>
             <a:endParaRPr lang="en-US" dirty="0"/>
@@ -1705,35 +1704,35 @@
           <a:p>
             <a:pPr lvl="0"/>
             <a:r>
-              <a:rPr lang="en-US" smtClean="0"/>
+              <a:rPr lang="en-US"/>
               <a:t>Click to edit Master text styles</a:t>
             </a:r>
           </a:p>
           <a:p>
             <a:pPr lvl="1"/>
             <a:r>
-              <a:rPr lang="en-US" smtClean="0"/>
+              <a:rPr lang="en-US"/>
               <a:t>Second level</a:t>
             </a:r>
           </a:p>
           <a:p>
             <a:pPr lvl="2"/>
             <a:r>
-              <a:rPr lang="en-US" smtClean="0"/>
+              <a:rPr lang="en-US"/>
               <a:t>Third level</a:t>
             </a:r>
           </a:p>
           <a:p>
             <a:pPr lvl="3"/>
             <a:r>
-              <a:rPr lang="en-US" smtClean="0"/>
+              <a:rPr lang="en-US"/>
               <a:t>Fourth level</a:t>
             </a:r>
           </a:p>
           <a:p>
             <a:pPr lvl="4"/>
             <a:r>
-              <a:rPr lang="en-US" smtClean="0"/>
+              <a:rPr lang="en-US"/>
               <a:t>Fifth level</a:t>
             </a:r>
             <a:endParaRPr lang="en-US" dirty="0"/>
@@ -1757,7 +1756,7 @@
           <a:p>
             <a:fld id="{F4D14FF6-3E0D-407D-982E-9B686EE47223}" type="datetimeFigureOut">
               <a:rPr lang="en-GB" smtClean="0"/>
-              <a:t>23/05/2019</a:t>
+              <a:t>23/05/2022</a:t>
             </a:fld>
             <a:endParaRPr lang="en-GB"/>
           </a:p>
@@ -1860,7 +1859,7 @@
               <a:defRPr/>
             </a:pPr>
             <a:r>
-              <a:rPr lang="en-US" altLang="en-US" smtClean="0"/>
+              <a:rPr lang="en-US" altLang="en-US"/>
               <a:t>14/11/2016</a:t>
             </a:r>
             <a:endParaRPr lang="en-US" altLang="en-US" sz="900"/>
@@ -1892,18 +1891,13 @@
               <a:defRPr/>
             </a:pPr>
             <a:r>
-              <a:rPr lang="en-US" altLang="en-US" smtClean="0">
+              <a:rPr lang="en-US" altLang="en-US">
                 <a:solidFill>
                   <a:srgbClr val="808080"/>
                 </a:solidFill>
               </a:rPr>
               <a:t>Coding Masterclass</a:t>
             </a:r>
-            <a:endParaRPr lang="en-US" altLang="en-US">
-              <a:solidFill>
-                <a:srgbClr val="808080"/>
-              </a:solidFill>
-            </a:endParaRPr>
           </a:p>
         </p:txBody>
       </p:sp>
@@ -2005,7 +1999,7 @@
               <a:defRPr/>
             </a:pPr>
             <a:r>
-              <a:rPr lang="en-US" altLang="en-US" smtClean="0"/>
+              <a:rPr lang="en-US" altLang="en-US"/>
               <a:t>14/11/2016</a:t>
             </a:r>
             <a:endParaRPr lang="en-US" altLang="en-US" sz="900"/>
@@ -2037,18 +2031,13 @@
               <a:defRPr/>
             </a:pPr>
             <a:r>
-              <a:rPr lang="en-US" altLang="en-US" smtClean="0">
+              <a:rPr lang="en-US" altLang="en-US">
                 <a:solidFill>
                   <a:srgbClr val="808080"/>
                 </a:solidFill>
               </a:rPr>
               <a:t>Coding Masterclass</a:t>
             </a:r>
-            <a:endParaRPr lang="en-US" altLang="en-US">
-              <a:solidFill>
-                <a:srgbClr val="808080"/>
-              </a:solidFill>
-            </a:endParaRPr>
           </a:p>
         </p:txBody>
       </p:sp>
@@ -2146,7 +2135,7 @@
           <a:lstStyle/>
           <a:p>
             <a:r>
-              <a:rPr lang="en-US" smtClean="0"/>
+              <a:rPr lang="en-US"/>
               <a:t>Click to edit Master title style</a:t>
             </a:r>
             <a:endParaRPr lang="en-GB"/>
@@ -2265,7 +2254,7 @@
           </a:lstStyle>
           <a:p>
             <a:r>
-              <a:rPr lang="en-US" smtClean="0"/>
+              <a:rPr lang="en-US"/>
               <a:t>Click to edit Master subtitle style</a:t>
             </a:r>
             <a:endParaRPr lang="en-GB"/>
@@ -2296,7 +2285,7 @@
                 </a:solidFill>
               </a:rPr>
               <a:pPr/>
-              <a:t>23/05/2019</a:t>
+              <a:t>23/05/2022</a:t>
             </a:fld>
             <a:endParaRPr lang="en-GB">
               <a:solidFill>
@@ -2415,7 +2404,7 @@
           <a:lstStyle/>
           <a:p>
             <a:r>
-              <a:rPr lang="en-US" smtClean="0"/>
+              <a:rPr lang="en-US"/>
               <a:t>Click to edit Master title style</a:t>
             </a:r>
             <a:endParaRPr lang="en-GB"/>
@@ -2439,35 +2428,35 @@
           <a:p>
             <a:pPr lvl="0"/>
             <a:r>
-              <a:rPr lang="en-US" smtClean="0"/>
+              <a:rPr lang="en-US"/>
               <a:t>Click to edit Master text styles</a:t>
             </a:r>
           </a:p>
           <a:p>
             <a:pPr lvl="1"/>
             <a:r>
-              <a:rPr lang="en-US" smtClean="0"/>
+              <a:rPr lang="en-US"/>
               <a:t>Second level</a:t>
             </a:r>
           </a:p>
           <a:p>
             <a:pPr lvl="2"/>
             <a:r>
-              <a:rPr lang="en-US" smtClean="0"/>
+              <a:rPr lang="en-US"/>
               <a:t>Third level</a:t>
             </a:r>
           </a:p>
           <a:p>
             <a:pPr lvl="3"/>
             <a:r>
-              <a:rPr lang="en-US" smtClean="0"/>
+              <a:rPr lang="en-US"/>
               <a:t>Fourth level</a:t>
             </a:r>
           </a:p>
           <a:p>
             <a:pPr lvl="4"/>
             <a:r>
-              <a:rPr lang="en-US" smtClean="0"/>
+              <a:rPr lang="en-US"/>
               <a:t>Fifth level</a:t>
             </a:r>
             <a:endParaRPr lang="en-GB"/>
@@ -2498,7 +2487,7 @@
                 </a:solidFill>
               </a:rPr>
               <a:pPr/>
-              <a:t>23/05/2019</a:t>
+              <a:t>23/05/2022</a:t>
             </a:fld>
             <a:endParaRPr lang="en-GB">
               <a:solidFill>
@@ -2626,7 +2615,7 @@
           </a:lstStyle>
           <a:p>
             <a:r>
-              <a:rPr lang="en-US" smtClean="0"/>
+              <a:rPr lang="en-US"/>
               <a:t>Click to edit Master title style</a:t>
             </a:r>
             <a:endParaRPr lang="en-GB"/>
@@ -2746,7 +2735,7 @@
           <a:p>
             <a:pPr lvl="0"/>
             <a:r>
-              <a:rPr lang="en-US" smtClean="0"/>
+              <a:rPr lang="en-US"/>
               <a:t>Click to edit Master text styles</a:t>
             </a:r>
           </a:p>
@@ -2776,7 +2765,7 @@
                 </a:solidFill>
               </a:rPr>
               <a:pPr/>
-              <a:t>23/05/2019</a:t>
+              <a:t>23/05/2022</a:t>
             </a:fld>
             <a:endParaRPr lang="en-GB">
               <a:solidFill>
@@ -2895,7 +2884,7 @@
           <a:lstStyle/>
           <a:p>
             <a:r>
-              <a:rPr lang="en-US" smtClean="0"/>
+              <a:rPr lang="en-US"/>
               <a:t>Click to edit Master title style</a:t>
             </a:r>
             <a:endParaRPr lang="en-GB"/>
@@ -2952,35 +2941,35 @@
           <a:p>
             <a:pPr lvl="0"/>
             <a:r>
-              <a:rPr lang="en-US" smtClean="0"/>
+              <a:rPr lang="en-US"/>
               <a:t>Click to edit Master text styles</a:t>
             </a:r>
           </a:p>
           <a:p>
             <a:pPr lvl="1"/>
             <a:r>
-              <a:rPr lang="en-US" smtClean="0"/>
+              <a:rPr lang="en-US"/>
               <a:t>Second level</a:t>
             </a:r>
           </a:p>
           <a:p>
             <a:pPr lvl="2"/>
             <a:r>
-              <a:rPr lang="en-US" smtClean="0"/>
+              <a:rPr lang="en-US"/>
               <a:t>Third level</a:t>
             </a:r>
           </a:p>
           <a:p>
             <a:pPr lvl="3"/>
             <a:r>
-              <a:rPr lang="en-US" smtClean="0"/>
+              <a:rPr lang="en-US"/>
               <a:t>Fourth level</a:t>
             </a:r>
           </a:p>
           <a:p>
             <a:pPr lvl="4"/>
             <a:r>
-              <a:rPr lang="en-US" smtClean="0"/>
+              <a:rPr lang="en-US"/>
               <a:t>Fifth level</a:t>
             </a:r>
             <a:endParaRPr lang="en-GB"/>
@@ -3037,35 +3026,35 @@
           <a:p>
             <a:pPr lvl="0"/>
             <a:r>
-              <a:rPr lang="en-US" smtClean="0"/>
+              <a:rPr lang="en-US"/>
               <a:t>Click to edit Master text styles</a:t>
             </a:r>
           </a:p>
           <a:p>
             <a:pPr lvl="1"/>
             <a:r>
-              <a:rPr lang="en-US" smtClean="0"/>
+              <a:rPr lang="en-US"/>
               <a:t>Second level</a:t>
             </a:r>
           </a:p>
           <a:p>
             <a:pPr lvl="2"/>
             <a:r>
-              <a:rPr lang="en-US" smtClean="0"/>
+              <a:rPr lang="en-US"/>
               <a:t>Third level</a:t>
             </a:r>
           </a:p>
           <a:p>
             <a:pPr lvl="3"/>
             <a:r>
-              <a:rPr lang="en-US" smtClean="0"/>
+              <a:rPr lang="en-US"/>
               <a:t>Fourth level</a:t>
             </a:r>
           </a:p>
           <a:p>
             <a:pPr lvl="4"/>
             <a:r>
-              <a:rPr lang="en-US" smtClean="0"/>
+              <a:rPr lang="en-US"/>
               <a:t>Fifth level</a:t>
             </a:r>
             <a:endParaRPr lang="en-GB"/>
@@ -3096,7 +3085,7 @@
                 </a:solidFill>
               </a:rPr>
               <a:pPr/>
-              <a:t>23/05/2019</a:t>
+              <a:t>23/05/2022</a:t>
             </a:fld>
             <a:endParaRPr lang="en-GB">
               <a:solidFill>
@@ -3219,7 +3208,7 @@
           </a:lstStyle>
           <a:p>
             <a:r>
-              <a:rPr lang="en-US" smtClean="0"/>
+              <a:rPr lang="en-US"/>
               <a:t>Click to edit Master title style</a:t>
             </a:r>
             <a:endParaRPr lang="en-GB"/>
@@ -3285,7 +3274,7 @@
           <a:p>
             <a:pPr lvl="0"/>
             <a:r>
-              <a:rPr lang="en-US" smtClean="0"/>
+              <a:rPr lang="en-US"/>
               <a:t>Click to edit Master text styles</a:t>
             </a:r>
           </a:p>
@@ -3341,35 +3330,35 @@
           <a:p>
             <a:pPr lvl="0"/>
             <a:r>
-              <a:rPr lang="en-US" smtClean="0"/>
+              <a:rPr lang="en-US"/>
               <a:t>Click to edit Master text styles</a:t>
             </a:r>
           </a:p>
           <a:p>
             <a:pPr lvl="1"/>
             <a:r>
-              <a:rPr lang="en-US" smtClean="0"/>
+              <a:rPr lang="en-US"/>
               <a:t>Second level</a:t>
             </a:r>
           </a:p>
           <a:p>
             <a:pPr lvl="2"/>
             <a:r>
-              <a:rPr lang="en-US" smtClean="0"/>
+              <a:rPr lang="en-US"/>
               <a:t>Third level</a:t>
             </a:r>
           </a:p>
           <a:p>
             <a:pPr lvl="3"/>
             <a:r>
-              <a:rPr lang="en-US" smtClean="0"/>
+              <a:rPr lang="en-US"/>
               <a:t>Fourth level</a:t>
             </a:r>
           </a:p>
           <a:p>
             <a:pPr lvl="4"/>
             <a:r>
-              <a:rPr lang="en-US" smtClean="0"/>
+              <a:rPr lang="en-US"/>
               <a:t>Fifth level</a:t>
             </a:r>
             <a:endParaRPr lang="en-GB"/>
@@ -3435,7 +3424,7 @@
           <a:p>
             <a:pPr lvl="0"/>
             <a:r>
-              <a:rPr lang="en-US" smtClean="0"/>
+              <a:rPr lang="en-US"/>
               <a:t>Click to edit Master text styles</a:t>
             </a:r>
           </a:p>
@@ -3491,35 +3480,35 @@
           <a:p>
             <a:pPr lvl="0"/>
             <a:r>
-              <a:rPr lang="en-US" smtClean="0"/>
+              <a:rPr lang="en-US"/>
               <a:t>Click to edit Master text styles</a:t>
             </a:r>
           </a:p>
           <a:p>
             <a:pPr lvl="1"/>
             <a:r>
-              <a:rPr lang="en-US" smtClean="0"/>
+              <a:rPr lang="en-US"/>
               <a:t>Second level</a:t>
             </a:r>
           </a:p>
           <a:p>
             <a:pPr lvl="2"/>
             <a:r>
-              <a:rPr lang="en-US" smtClean="0"/>
+              <a:rPr lang="en-US"/>
               <a:t>Third level</a:t>
             </a:r>
           </a:p>
           <a:p>
             <a:pPr lvl="3"/>
             <a:r>
-              <a:rPr lang="en-US" smtClean="0"/>
+              <a:rPr lang="en-US"/>
               <a:t>Fourth level</a:t>
             </a:r>
           </a:p>
           <a:p>
             <a:pPr lvl="4"/>
             <a:r>
-              <a:rPr lang="en-US" smtClean="0"/>
+              <a:rPr lang="en-US"/>
               <a:t>Fifth level</a:t>
             </a:r>
             <a:endParaRPr lang="en-GB"/>
@@ -3550,7 +3539,7 @@
                 </a:solidFill>
               </a:rPr>
               <a:pPr/>
-              <a:t>23/05/2019</a:t>
+              <a:t>23/05/2022</a:t>
             </a:fld>
             <a:endParaRPr lang="en-GB">
               <a:solidFill>
@@ -3669,7 +3658,7 @@
           <a:lstStyle/>
           <a:p>
             <a:r>
-              <a:rPr lang="en-US" smtClean="0"/>
+              <a:rPr lang="en-US"/>
               <a:t>Click to edit Master title style</a:t>
             </a:r>
             <a:endParaRPr lang="en-GB"/>
@@ -3700,7 +3689,7 @@
                 </a:solidFill>
               </a:rPr>
               <a:pPr/>
-              <a:t>23/05/2019</a:t>
+              <a:t>23/05/2022</a:t>
             </a:fld>
             <a:endParaRPr lang="en-GB">
               <a:solidFill>
@@ -3819,7 +3808,7 @@
           <a:lstStyle/>
           <a:p>
             <a:r>
-              <a:rPr lang="en-US" smtClean="0"/>
+              <a:rPr lang="en-US"/>
               <a:t>Click to edit Master title style</a:t>
             </a:r>
             <a:endParaRPr lang="en-US" dirty="0"/>
@@ -3843,35 +3832,35 @@
           <a:p>
             <a:pPr lvl="0"/>
             <a:r>
-              <a:rPr lang="en-US" smtClean="0"/>
+              <a:rPr lang="en-US"/>
               <a:t>Click to edit Master text styles</a:t>
             </a:r>
           </a:p>
           <a:p>
             <a:pPr lvl="1"/>
             <a:r>
-              <a:rPr lang="en-US" smtClean="0"/>
+              <a:rPr lang="en-US"/>
               <a:t>Second level</a:t>
             </a:r>
           </a:p>
           <a:p>
             <a:pPr lvl="2"/>
             <a:r>
-              <a:rPr lang="en-US" smtClean="0"/>
+              <a:rPr lang="en-US"/>
               <a:t>Third level</a:t>
             </a:r>
           </a:p>
           <a:p>
             <a:pPr lvl="3"/>
             <a:r>
-              <a:rPr lang="en-US" smtClean="0"/>
+              <a:rPr lang="en-US"/>
               <a:t>Fourth level</a:t>
             </a:r>
           </a:p>
           <a:p>
             <a:pPr lvl="4"/>
             <a:r>
-              <a:rPr lang="en-US" smtClean="0"/>
+              <a:rPr lang="en-US"/>
               <a:t>Fifth level</a:t>
             </a:r>
             <a:endParaRPr lang="en-US" dirty="0"/>
@@ -3895,7 +3884,7 @@
           <a:p>
             <a:fld id="{F4D14FF6-3E0D-407D-982E-9B686EE47223}" type="datetimeFigureOut">
               <a:rPr lang="en-GB" smtClean="0"/>
-              <a:t>23/05/2019</a:t>
+              <a:t>23/05/2022</a:t>
             </a:fld>
             <a:endParaRPr lang="en-GB"/>
           </a:p>
@@ -3997,7 +3986,7 @@
                 </a:solidFill>
               </a:rPr>
               <a:pPr/>
-              <a:t>23/05/2019</a:t>
+              <a:t>23/05/2022</a:t>
             </a:fld>
             <a:endParaRPr lang="en-GB">
               <a:solidFill>
@@ -4125,7 +4114,7 @@
           </a:lstStyle>
           <a:p>
             <a:r>
-              <a:rPr lang="en-US" smtClean="0"/>
+              <a:rPr lang="en-US"/>
               <a:t>Click to edit Master title style</a:t>
             </a:r>
             <a:endParaRPr lang="en-GB"/>
@@ -4182,35 +4171,35 @@
           <a:p>
             <a:pPr lvl="0"/>
             <a:r>
-              <a:rPr lang="en-US" smtClean="0"/>
+              <a:rPr lang="en-US"/>
               <a:t>Click to edit Master text styles</a:t>
             </a:r>
           </a:p>
           <a:p>
             <a:pPr lvl="1"/>
             <a:r>
-              <a:rPr lang="en-US" smtClean="0"/>
+              <a:rPr lang="en-US"/>
               <a:t>Second level</a:t>
             </a:r>
           </a:p>
           <a:p>
             <a:pPr lvl="2"/>
             <a:r>
-              <a:rPr lang="en-US" smtClean="0"/>
+              <a:rPr lang="en-US"/>
               <a:t>Third level</a:t>
             </a:r>
           </a:p>
           <a:p>
             <a:pPr lvl="3"/>
             <a:r>
-              <a:rPr lang="en-US" smtClean="0"/>
+              <a:rPr lang="en-US"/>
               <a:t>Fourth level</a:t>
             </a:r>
           </a:p>
           <a:p>
             <a:pPr lvl="4"/>
             <a:r>
-              <a:rPr lang="en-US" smtClean="0"/>
+              <a:rPr lang="en-US"/>
               <a:t>Fifth level</a:t>
             </a:r>
             <a:endParaRPr lang="en-GB"/>
@@ -4276,7 +4265,7 @@
           <a:p>
             <a:pPr lvl="0"/>
             <a:r>
-              <a:rPr lang="en-US" smtClean="0"/>
+              <a:rPr lang="en-US"/>
               <a:t>Click to edit Master text styles</a:t>
             </a:r>
           </a:p>
@@ -4306,7 +4295,7 @@
                 </a:solidFill>
               </a:rPr>
               <a:pPr/>
-              <a:t>23/05/2019</a:t>
+              <a:t>23/05/2022</a:t>
             </a:fld>
             <a:endParaRPr lang="en-GB">
               <a:solidFill>
@@ -4434,7 +4423,7 @@
           </a:lstStyle>
           <a:p>
             <a:r>
-              <a:rPr lang="en-US" smtClean="0"/>
+              <a:rPr lang="en-US"/>
               <a:t>Click to edit Master title style</a:t>
             </a:r>
             <a:endParaRPr lang="en-GB"/>
@@ -4561,7 +4550,7 @@
           <a:p>
             <a:pPr lvl="0"/>
             <a:r>
-              <a:rPr lang="en-US" smtClean="0"/>
+              <a:rPr lang="en-US"/>
               <a:t>Click to edit Master text styles</a:t>
             </a:r>
           </a:p>
@@ -4591,7 +4580,7 @@
                 </a:solidFill>
               </a:rPr>
               <a:pPr/>
-              <a:t>23/05/2019</a:t>
+              <a:t>23/05/2022</a:t>
             </a:fld>
             <a:endParaRPr lang="en-GB">
               <a:solidFill>
@@ -4710,7 +4699,7 @@
           <a:lstStyle/>
           <a:p>
             <a:r>
-              <a:rPr lang="en-US" smtClean="0"/>
+              <a:rPr lang="en-US"/>
               <a:t>Click to edit Master title style</a:t>
             </a:r>
             <a:endParaRPr lang="en-GB"/>
@@ -4734,35 +4723,35 @@
           <a:p>
             <a:pPr lvl="0"/>
             <a:r>
-              <a:rPr lang="en-US" smtClean="0"/>
+              <a:rPr lang="en-US"/>
               <a:t>Click to edit Master text styles</a:t>
             </a:r>
           </a:p>
           <a:p>
             <a:pPr lvl="1"/>
             <a:r>
-              <a:rPr lang="en-US" smtClean="0"/>
+              <a:rPr lang="en-US"/>
               <a:t>Second level</a:t>
             </a:r>
           </a:p>
           <a:p>
             <a:pPr lvl="2"/>
             <a:r>
-              <a:rPr lang="en-US" smtClean="0"/>
+              <a:rPr lang="en-US"/>
               <a:t>Third level</a:t>
             </a:r>
           </a:p>
           <a:p>
             <a:pPr lvl="3"/>
             <a:r>
-              <a:rPr lang="en-US" smtClean="0"/>
+              <a:rPr lang="en-US"/>
               <a:t>Fourth level</a:t>
             </a:r>
           </a:p>
           <a:p>
             <a:pPr lvl="4"/>
             <a:r>
-              <a:rPr lang="en-US" smtClean="0"/>
+              <a:rPr lang="en-US"/>
               <a:t>Fifth level</a:t>
             </a:r>
             <a:endParaRPr lang="en-GB"/>
@@ -4793,7 +4782,7 @@
                 </a:solidFill>
               </a:rPr>
               <a:pPr/>
-              <a:t>23/05/2019</a:t>
+              <a:t>23/05/2022</a:t>
             </a:fld>
             <a:endParaRPr lang="en-GB">
               <a:solidFill>
@@ -4917,7 +4906,7 @@
           <a:lstStyle/>
           <a:p>
             <a:r>
-              <a:rPr lang="en-US" smtClean="0"/>
+              <a:rPr lang="en-US"/>
               <a:t>Click to edit Master title style</a:t>
             </a:r>
             <a:endParaRPr lang="en-GB"/>
@@ -4946,35 +4935,35 @@
           <a:p>
             <a:pPr lvl="0"/>
             <a:r>
-              <a:rPr lang="en-US" smtClean="0"/>
+              <a:rPr lang="en-US"/>
               <a:t>Click to edit Master text styles</a:t>
             </a:r>
           </a:p>
           <a:p>
             <a:pPr lvl="1"/>
             <a:r>
-              <a:rPr lang="en-US" smtClean="0"/>
+              <a:rPr lang="en-US"/>
               <a:t>Second level</a:t>
             </a:r>
           </a:p>
           <a:p>
             <a:pPr lvl="2"/>
             <a:r>
-              <a:rPr lang="en-US" smtClean="0"/>
+              <a:rPr lang="en-US"/>
               <a:t>Third level</a:t>
             </a:r>
           </a:p>
           <a:p>
             <a:pPr lvl="3"/>
             <a:r>
-              <a:rPr lang="en-US" smtClean="0"/>
+              <a:rPr lang="en-US"/>
               <a:t>Fourth level</a:t>
             </a:r>
           </a:p>
           <a:p>
             <a:pPr lvl="4"/>
             <a:r>
-              <a:rPr lang="en-US" smtClean="0"/>
+              <a:rPr lang="en-US"/>
               <a:t>Fifth level</a:t>
             </a:r>
             <a:endParaRPr lang="en-GB"/>
@@ -5005,7 +4994,7 @@
                 </a:solidFill>
               </a:rPr>
               <a:pPr/>
-              <a:t>23/05/2019</a:t>
+              <a:t>23/05/2022</a:t>
             </a:fld>
             <a:endParaRPr lang="en-GB">
               <a:solidFill>
@@ -5142,7 +5131,7 @@
           </a:lstStyle>
           <a:p>
             <a:r>
-              <a:rPr lang="en-GB" dirty="0" smtClean="0"/>
+              <a:rPr lang="en-GB" dirty="0"/>
               <a:t>Click to edit Master title style</a:t>
             </a:r>
             <a:endParaRPr lang="en-US" dirty="0"/>
@@ -5205,35 +5194,35 @@
           <a:p>
             <a:pPr lvl="0"/>
             <a:r>
-              <a:rPr lang="en-GB" dirty="0" smtClean="0"/>
+              <a:rPr lang="en-GB" dirty="0"/>
               <a:t>Click to edit Master text styles</a:t>
             </a:r>
           </a:p>
           <a:p>
             <a:pPr lvl="1"/>
             <a:r>
-              <a:rPr lang="en-GB" dirty="0" smtClean="0"/>
+              <a:rPr lang="en-GB" dirty="0"/>
               <a:t>Second level</a:t>
             </a:r>
           </a:p>
           <a:p>
             <a:pPr lvl="2"/>
             <a:r>
-              <a:rPr lang="en-GB" dirty="0" smtClean="0"/>
+              <a:rPr lang="en-GB" dirty="0"/>
               <a:t>Third level</a:t>
             </a:r>
           </a:p>
           <a:p>
             <a:pPr lvl="3"/>
             <a:r>
-              <a:rPr lang="en-GB" dirty="0" smtClean="0"/>
+              <a:rPr lang="en-GB" dirty="0"/>
               <a:t>Fourth level</a:t>
             </a:r>
           </a:p>
           <a:p>
             <a:pPr lvl="4"/>
             <a:r>
-              <a:rPr lang="en-GB" dirty="0" smtClean="0"/>
+              <a:rPr lang="en-GB" dirty="0"/>
               <a:t>Fifth level</a:t>
             </a:r>
             <a:endParaRPr lang="en-US" dirty="0"/>
@@ -5304,7 +5293,7 @@
           </a:lstStyle>
           <a:p>
             <a:r>
-              <a:rPr lang="en-GB" dirty="0" smtClean="0"/>
+              <a:rPr lang="en-GB" dirty="0"/>
               <a:t>Click to edit Master title style</a:t>
             </a:r>
             <a:endParaRPr lang="en-US" dirty="0"/>
@@ -5367,35 +5356,35 @@
           <a:p>
             <a:pPr lvl="0"/>
             <a:r>
-              <a:rPr lang="en-GB" dirty="0" smtClean="0"/>
+              <a:rPr lang="en-GB" dirty="0"/>
               <a:t>Click to edit Master text styles</a:t>
             </a:r>
           </a:p>
           <a:p>
             <a:pPr lvl="1"/>
             <a:r>
-              <a:rPr lang="en-GB" dirty="0" smtClean="0"/>
+              <a:rPr lang="en-GB" dirty="0"/>
               <a:t>Second level</a:t>
             </a:r>
           </a:p>
           <a:p>
             <a:pPr lvl="2"/>
             <a:r>
-              <a:rPr lang="en-GB" dirty="0" smtClean="0"/>
+              <a:rPr lang="en-GB" dirty="0"/>
               <a:t>Third level</a:t>
             </a:r>
           </a:p>
           <a:p>
             <a:pPr lvl="3"/>
             <a:r>
-              <a:rPr lang="en-GB" dirty="0" smtClean="0"/>
+              <a:rPr lang="en-GB" dirty="0"/>
               <a:t>Fourth level</a:t>
             </a:r>
           </a:p>
           <a:p>
             <a:pPr lvl="4"/>
             <a:r>
-              <a:rPr lang="en-GB" dirty="0" smtClean="0"/>
+              <a:rPr lang="en-GB" dirty="0"/>
               <a:t>Fifth level</a:t>
             </a:r>
             <a:endParaRPr lang="en-US" dirty="0"/>
@@ -5412,13 +5401,6 @@
   <p:clrMapOvr>
     <a:masterClrMapping/>
   </p:clrMapOvr>
-  <p:timing>
-    <p:tnLst>
-      <p:par>
-        <p:cTn id="1" dur="indefinite" restart="never" nodeType="tmRoot"/>
-      </p:par>
-    </p:tnLst>
-  </p:timing>
 </p:sldLayout>
 </file>
 
@@ -5473,7 +5455,7 @@
           </a:lstStyle>
           <a:p>
             <a:r>
-              <a:rPr lang="en-GB" dirty="0" smtClean="0"/>
+              <a:rPr lang="en-GB" dirty="0"/>
               <a:t>Click to edit Master title style</a:t>
             </a:r>
             <a:endParaRPr lang="en-US" dirty="0"/>
@@ -5536,35 +5518,35 @@
           <a:p>
             <a:pPr lvl="0"/>
             <a:r>
-              <a:rPr lang="en-GB" dirty="0" smtClean="0"/>
+              <a:rPr lang="en-GB" dirty="0"/>
               <a:t>Click to edit Master text styles</a:t>
             </a:r>
           </a:p>
           <a:p>
             <a:pPr lvl="1"/>
             <a:r>
-              <a:rPr lang="en-GB" dirty="0" smtClean="0"/>
+              <a:rPr lang="en-GB" dirty="0"/>
               <a:t>Second level</a:t>
             </a:r>
           </a:p>
           <a:p>
             <a:pPr lvl="2"/>
             <a:r>
-              <a:rPr lang="en-GB" dirty="0" smtClean="0"/>
+              <a:rPr lang="en-GB" dirty="0"/>
               <a:t>Third level</a:t>
             </a:r>
           </a:p>
           <a:p>
             <a:pPr lvl="3"/>
             <a:r>
-              <a:rPr lang="en-GB" dirty="0" smtClean="0"/>
+              <a:rPr lang="en-GB" dirty="0"/>
               <a:t>Fourth level</a:t>
             </a:r>
           </a:p>
           <a:p>
             <a:pPr lvl="4"/>
             <a:r>
-              <a:rPr lang="en-GB" dirty="0" smtClean="0"/>
+              <a:rPr lang="en-GB" dirty="0"/>
               <a:t>Fifth level</a:t>
             </a:r>
             <a:endParaRPr lang="en-US" dirty="0"/>
@@ -5596,35 +5578,35 @@
           <a:p>
             <a:pPr lvl="0"/>
             <a:r>
-              <a:rPr lang="en-GB" smtClean="0"/>
+              <a:rPr lang="en-GB"/>
               <a:t>Click to edit Master text styles</a:t>
             </a:r>
           </a:p>
           <a:p>
             <a:pPr lvl="1"/>
             <a:r>
-              <a:rPr lang="en-GB" smtClean="0"/>
+              <a:rPr lang="en-GB"/>
               <a:t>Second level</a:t>
             </a:r>
           </a:p>
           <a:p>
             <a:pPr lvl="2"/>
             <a:r>
-              <a:rPr lang="en-GB" smtClean="0"/>
+              <a:rPr lang="en-GB"/>
               <a:t>Third level</a:t>
             </a:r>
           </a:p>
           <a:p>
             <a:pPr lvl="3"/>
             <a:r>
-              <a:rPr lang="en-GB" smtClean="0"/>
+              <a:rPr lang="en-GB"/>
               <a:t>Fourth level</a:t>
             </a:r>
           </a:p>
           <a:p>
             <a:pPr lvl="4"/>
             <a:r>
-              <a:rPr lang="en-GB" smtClean="0"/>
+              <a:rPr lang="en-GB"/>
               <a:t>Fifth level</a:t>
             </a:r>
             <a:endParaRPr lang="en-US"/>
@@ -5695,7 +5677,7 @@
           </a:lstStyle>
           <a:p>
             <a:r>
-              <a:rPr lang="en-GB" dirty="0" smtClean="0"/>
+              <a:rPr lang="en-GB" dirty="0"/>
               <a:t>Click to edit Master title style</a:t>
             </a:r>
             <a:endParaRPr lang="en-US" dirty="0"/>
@@ -5758,35 +5740,35 @@
           <a:p>
             <a:pPr lvl="0"/>
             <a:r>
-              <a:rPr lang="en-GB" dirty="0" smtClean="0"/>
+              <a:rPr lang="en-GB" dirty="0"/>
               <a:t>Click to edit Master text styles</a:t>
             </a:r>
           </a:p>
           <a:p>
             <a:pPr lvl="1"/>
             <a:r>
-              <a:rPr lang="en-GB" dirty="0" smtClean="0"/>
+              <a:rPr lang="en-GB" dirty="0"/>
               <a:t>Second level</a:t>
             </a:r>
           </a:p>
           <a:p>
             <a:pPr lvl="2"/>
             <a:r>
-              <a:rPr lang="en-GB" dirty="0" smtClean="0"/>
+              <a:rPr lang="en-GB" dirty="0"/>
               <a:t>Third level</a:t>
             </a:r>
           </a:p>
           <a:p>
             <a:pPr lvl="3"/>
             <a:r>
-              <a:rPr lang="en-GB" dirty="0" smtClean="0"/>
+              <a:rPr lang="en-GB" dirty="0"/>
               <a:t>Fourth level</a:t>
             </a:r>
           </a:p>
           <a:p>
             <a:pPr lvl="4"/>
             <a:r>
-              <a:rPr lang="en-GB" dirty="0" smtClean="0"/>
+              <a:rPr lang="en-GB" dirty="0"/>
               <a:t>Fifth level</a:t>
             </a:r>
             <a:endParaRPr lang="en-US" dirty="0"/>
@@ -5818,35 +5800,35 @@
           <a:p>
             <a:pPr lvl="0"/>
             <a:r>
-              <a:rPr lang="en-GB" dirty="0" smtClean="0"/>
+              <a:rPr lang="en-GB" dirty="0"/>
               <a:t>Click to edit Master text styles</a:t>
             </a:r>
           </a:p>
           <a:p>
             <a:pPr lvl="1"/>
             <a:r>
-              <a:rPr lang="en-GB" dirty="0" smtClean="0"/>
+              <a:rPr lang="en-GB" dirty="0"/>
               <a:t>Second level</a:t>
             </a:r>
           </a:p>
           <a:p>
             <a:pPr lvl="2"/>
             <a:r>
-              <a:rPr lang="en-GB" dirty="0" smtClean="0"/>
+              <a:rPr lang="en-GB" dirty="0"/>
               <a:t>Third level</a:t>
             </a:r>
           </a:p>
           <a:p>
             <a:pPr lvl="3"/>
             <a:r>
-              <a:rPr lang="en-GB" dirty="0" smtClean="0"/>
+              <a:rPr lang="en-GB" dirty="0"/>
               <a:t>Fourth level</a:t>
             </a:r>
           </a:p>
           <a:p>
             <a:pPr lvl="4"/>
             <a:r>
-              <a:rPr lang="en-GB" dirty="0" smtClean="0"/>
+              <a:rPr lang="en-GB" dirty="0"/>
               <a:t>Fifth level</a:t>
             </a:r>
             <a:endParaRPr lang="en-US" dirty="0"/>
@@ -5917,7 +5899,7 @@
           </a:lstStyle>
           <a:p>
             <a:r>
-              <a:rPr lang="en-GB" dirty="0" smtClean="0"/>
+              <a:rPr lang="en-GB" dirty="0"/>
               <a:t>Click to edit Master title style</a:t>
             </a:r>
             <a:endParaRPr lang="en-US" dirty="0"/>
@@ -6006,7 +5988,7 @@
           </a:lstStyle>
           <a:p>
             <a:r>
-              <a:rPr lang="en-US" smtClean="0"/>
+              <a:rPr lang="en-US"/>
               <a:t>Click to edit Master title style</a:t>
             </a:r>
             <a:endParaRPr lang="en-US" dirty="0"/>
@@ -6124,7 +6106,7 @@
           <a:p>
             <a:pPr lvl="0"/>
             <a:r>
-              <a:rPr lang="en-US" smtClean="0"/>
+              <a:rPr lang="en-US"/>
               <a:t>Click to edit Master text styles</a:t>
             </a:r>
           </a:p>
@@ -6147,7 +6129,7 @@
           <a:p>
             <a:fld id="{F4D14FF6-3E0D-407D-982E-9B686EE47223}" type="datetimeFigureOut">
               <a:rPr lang="en-GB" smtClean="0"/>
-              <a:t>23/05/2019</a:t>
+              <a:t>23/05/2022</a:t>
             </a:fld>
             <a:endParaRPr lang="en-GB"/>
           </a:p>
@@ -6259,7 +6241,7 @@
           </a:lstStyle>
           <a:p>
             <a:r>
-              <a:rPr lang="en-GB" dirty="0" smtClean="0"/>
+              <a:rPr lang="en-GB" dirty="0"/>
               <a:t>Click to edit Master title style</a:t>
             </a:r>
             <a:endParaRPr lang="en-US" dirty="0"/>
@@ -6295,35 +6277,35 @@
           <a:p>
             <a:pPr lvl="0"/>
             <a:r>
-              <a:rPr lang="en-GB" dirty="0" smtClean="0"/>
+              <a:rPr lang="en-GB" dirty="0"/>
               <a:t>Click to edit Master text styles</a:t>
             </a:r>
           </a:p>
           <a:p>
             <a:pPr lvl="1"/>
             <a:r>
-              <a:rPr lang="en-GB" dirty="0" smtClean="0"/>
+              <a:rPr lang="en-GB" dirty="0"/>
               <a:t>Second level</a:t>
             </a:r>
           </a:p>
           <a:p>
             <a:pPr lvl="2"/>
             <a:r>
-              <a:rPr lang="en-GB" dirty="0" smtClean="0"/>
+              <a:rPr lang="en-GB" dirty="0"/>
               <a:t>Third level</a:t>
             </a:r>
           </a:p>
           <a:p>
             <a:pPr lvl="3"/>
             <a:r>
-              <a:rPr lang="en-GB" dirty="0" smtClean="0"/>
+              <a:rPr lang="en-GB" dirty="0"/>
               <a:t>Fourth level</a:t>
             </a:r>
           </a:p>
           <a:p>
             <a:pPr lvl="4"/>
             <a:r>
-              <a:rPr lang="en-GB" dirty="0" smtClean="0"/>
+              <a:rPr lang="en-GB" dirty="0"/>
               <a:t>Fifth level</a:t>
             </a:r>
             <a:endParaRPr lang="en-US" dirty="0"/>
@@ -6421,7 +6403,7 @@
           </a:lstStyle>
           <a:p>
             <a:r>
-              <a:rPr lang="en-GB" dirty="0" smtClean="0"/>
+              <a:rPr lang="en-GB" dirty="0"/>
               <a:t>Click to edit Master title style</a:t>
             </a:r>
             <a:endParaRPr lang="en-US" dirty="0"/>
@@ -6484,35 +6466,35 @@
           <a:p>
             <a:pPr lvl="0"/>
             <a:r>
-              <a:rPr lang="en-GB" dirty="0" smtClean="0"/>
+              <a:rPr lang="en-GB" dirty="0"/>
               <a:t>Click to edit Master text styles</a:t>
             </a:r>
           </a:p>
           <a:p>
             <a:pPr lvl="1"/>
             <a:r>
-              <a:rPr lang="en-GB" dirty="0" smtClean="0"/>
+              <a:rPr lang="en-GB" dirty="0"/>
               <a:t>Second level</a:t>
             </a:r>
           </a:p>
           <a:p>
             <a:pPr lvl="2"/>
             <a:r>
-              <a:rPr lang="en-GB" dirty="0" smtClean="0"/>
+              <a:rPr lang="en-GB" dirty="0"/>
               <a:t>Third level</a:t>
             </a:r>
           </a:p>
           <a:p>
             <a:pPr lvl="3"/>
             <a:r>
-              <a:rPr lang="en-GB" dirty="0" smtClean="0"/>
+              <a:rPr lang="en-GB" dirty="0"/>
               <a:t>Fourth level</a:t>
             </a:r>
           </a:p>
           <a:p>
             <a:pPr lvl="4"/>
             <a:r>
-              <a:rPr lang="en-GB" dirty="0" smtClean="0"/>
+              <a:rPr lang="en-GB" dirty="0"/>
               <a:t>Fifth level</a:t>
             </a:r>
             <a:endParaRPr lang="en-US" dirty="0"/>
@@ -6610,7 +6592,7 @@
           </a:lstStyle>
           <a:p>
             <a:r>
-              <a:rPr lang="en-GB" dirty="0" smtClean="0"/>
+              <a:rPr lang="en-GB" dirty="0"/>
               <a:t>Click to edit Master title style</a:t>
             </a:r>
             <a:endParaRPr lang="en-US" dirty="0"/>
@@ -6673,28 +6655,28 @@
           <a:p>
             <a:pPr lvl="0"/>
             <a:r>
-              <a:rPr lang="en-GB" dirty="0" smtClean="0"/>
+              <a:rPr lang="en-GB" dirty="0"/>
               <a:t>Click to edit Master text styles</a:t>
             </a:r>
           </a:p>
           <a:p>
             <a:pPr lvl="1"/>
             <a:r>
-              <a:rPr lang="en-GB" dirty="0" smtClean="0"/>
+              <a:rPr lang="en-GB" dirty="0"/>
               <a:t>Second level</a:t>
             </a:r>
           </a:p>
           <a:p>
             <a:pPr lvl="2"/>
             <a:r>
-              <a:rPr lang="en-GB" dirty="0" smtClean="0"/>
+              <a:rPr lang="en-GB" dirty="0"/>
               <a:t>Third level</a:t>
             </a:r>
           </a:p>
           <a:p>
             <a:pPr lvl="3"/>
             <a:r>
-              <a:rPr lang="en-GB" dirty="0" smtClean="0"/>
+              <a:rPr lang="en-GB" dirty="0"/>
               <a:t>Fourth level</a:t>
             </a:r>
             <a:endParaRPr lang="en-US" dirty="0"/>
@@ -6726,21 +6708,21 @@
           <a:p>
             <a:pPr lvl="0"/>
             <a:r>
-              <a:rPr lang="en-GB" dirty="0" smtClean="0"/>
+              <a:rPr lang="en-GB" dirty="0"/>
               <a:t>Click to edit Master text styles</a:t>
             </a:r>
           </a:p>
           <a:p>
             <a:pPr lvl="1"/>
             <a:r>
-              <a:rPr lang="en-GB" dirty="0" smtClean="0"/>
+              <a:rPr lang="en-GB" dirty="0"/>
               <a:t>Second level</a:t>
             </a:r>
           </a:p>
           <a:p>
             <a:pPr lvl="2"/>
             <a:r>
-              <a:rPr lang="en-GB" dirty="0" smtClean="0"/>
+              <a:rPr lang="en-GB" dirty="0"/>
               <a:t>Third level</a:t>
             </a:r>
             <a:endParaRPr lang="en-US" dirty="0"/>
@@ -6772,21 +6754,21 @@
           <a:p>
             <a:pPr lvl="0"/>
             <a:r>
-              <a:rPr lang="en-GB" dirty="0" smtClean="0"/>
+              <a:rPr lang="en-GB" dirty="0"/>
               <a:t>Click to edit Master text styles</a:t>
             </a:r>
           </a:p>
           <a:p>
             <a:pPr lvl="1"/>
             <a:r>
-              <a:rPr lang="en-GB" dirty="0" smtClean="0"/>
+              <a:rPr lang="en-GB" dirty="0"/>
               <a:t>Second level</a:t>
             </a:r>
           </a:p>
           <a:p>
             <a:pPr lvl="2"/>
             <a:r>
-              <a:rPr lang="en-GB" dirty="0" smtClean="0"/>
+              <a:rPr lang="en-GB" dirty="0"/>
               <a:t>Third level</a:t>
             </a:r>
             <a:endParaRPr lang="en-US" dirty="0"/>
@@ -6818,21 +6800,21 @@
           <a:p>
             <a:pPr lvl="0"/>
             <a:r>
-              <a:rPr lang="en-GB" dirty="0" smtClean="0"/>
+              <a:rPr lang="en-GB" dirty="0"/>
               <a:t>Click to edit Master text styles</a:t>
             </a:r>
           </a:p>
           <a:p>
             <a:pPr lvl="1"/>
             <a:r>
-              <a:rPr lang="en-GB" dirty="0" smtClean="0"/>
+              <a:rPr lang="en-GB" dirty="0"/>
               <a:t>Second level</a:t>
             </a:r>
           </a:p>
           <a:p>
             <a:pPr lvl="2"/>
             <a:r>
-              <a:rPr lang="en-GB" dirty="0" smtClean="0"/>
+              <a:rPr lang="en-GB" dirty="0"/>
               <a:t>Third level</a:t>
             </a:r>
             <a:endParaRPr lang="en-US" dirty="0"/>
@@ -6903,7 +6885,7 @@
           </a:lstStyle>
           <a:p>
             <a:r>
-              <a:rPr lang="en-GB" dirty="0" smtClean="0"/>
+              <a:rPr lang="en-GB" dirty="0"/>
               <a:t>Click to edit Master title style</a:t>
             </a:r>
             <a:endParaRPr lang="en-US" dirty="0"/>
@@ -6966,35 +6948,35 @@
           <a:p>
             <a:pPr lvl="0"/>
             <a:r>
-              <a:rPr lang="en-GB" dirty="0" smtClean="0"/>
+              <a:rPr lang="en-GB" dirty="0"/>
               <a:t>Click to edit Master text styles</a:t>
             </a:r>
           </a:p>
           <a:p>
             <a:pPr lvl="1"/>
             <a:r>
-              <a:rPr lang="en-GB" dirty="0" smtClean="0"/>
+              <a:rPr lang="en-GB" dirty="0"/>
               <a:t>Second level</a:t>
             </a:r>
           </a:p>
           <a:p>
             <a:pPr lvl="2"/>
             <a:r>
-              <a:rPr lang="en-GB" dirty="0" smtClean="0"/>
+              <a:rPr lang="en-GB" dirty="0"/>
               <a:t>Third level</a:t>
             </a:r>
           </a:p>
           <a:p>
             <a:pPr lvl="3"/>
             <a:r>
-              <a:rPr lang="en-GB" dirty="0" smtClean="0"/>
+              <a:rPr lang="en-GB" dirty="0"/>
               <a:t>Fourth level</a:t>
             </a:r>
           </a:p>
           <a:p>
             <a:pPr lvl="4"/>
             <a:r>
-              <a:rPr lang="en-GB" dirty="0" smtClean="0"/>
+              <a:rPr lang="en-GB" dirty="0"/>
               <a:t>Fifth level</a:t>
             </a:r>
             <a:endParaRPr lang="en-US" dirty="0"/>
@@ -7026,21 +7008,21 @@
           <a:p>
             <a:pPr lvl="0"/>
             <a:r>
-              <a:rPr lang="en-GB" dirty="0" smtClean="0"/>
+              <a:rPr lang="en-GB" dirty="0"/>
               <a:t>Click to edit Master text styles</a:t>
             </a:r>
           </a:p>
           <a:p>
             <a:pPr lvl="1"/>
             <a:r>
-              <a:rPr lang="en-GB" dirty="0" smtClean="0"/>
+              <a:rPr lang="en-GB" dirty="0"/>
               <a:t>Second level</a:t>
             </a:r>
           </a:p>
           <a:p>
             <a:pPr lvl="2"/>
             <a:r>
-              <a:rPr lang="en-GB" dirty="0" smtClean="0"/>
+              <a:rPr lang="en-GB" dirty="0"/>
               <a:t>Third level</a:t>
             </a:r>
           </a:p>
@@ -7071,21 +7053,21 @@
           <a:p>
             <a:pPr lvl="0"/>
             <a:r>
-              <a:rPr lang="en-GB" dirty="0" smtClean="0"/>
+              <a:rPr lang="en-GB" dirty="0"/>
               <a:t>Click to edit Master text styles</a:t>
             </a:r>
           </a:p>
           <a:p>
             <a:pPr lvl="1"/>
             <a:r>
-              <a:rPr lang="en-GB" dirty="0" smtClean="0"/>
+              <a:rPr lang="en-GB" dirty="0"/>
               <a:t>Second level</a:t>
             </a:r>
           </a:p>
           <a:p>
             <a:pPr lvl="2"/>
             <a:r>
-              <a:rPr lang="en-GB" dirty="0" smtClean="0"/>
+              <a:rPr lang="en-GB" dirty="0"/>
               <a:t>Third level</a:t>
             </a:r>
             <a:endParaRPr lang="en-US" dirty="0"/>
@@ -7156,7 +7138,7 @@
           </a:lstStyle>
           <a:p>
             <a:r>
-              <a:rPr lang="en-GB" dirty="0" smtClean="0"/>
+              <a:rPr lang="en-GB" dirty="0"/>
               <a:t>Click to edit Master title style</a:t>
             </a:r>
             <a:endParaRPr lang="en-US" dirty="0"/>
@@ -7188,35 +7170,35 @@
           <a:p>
             <a:pPr lvl="0"/>
             <a:r>
-              <a:rPr lang="en-GB" dirty="0" smtClean="0"/>
+              <a:rPr lang="en-GB" dirty="0"/>
               <a:t>Click to edit Master text styles</a:t>
             </a:r>
           </a:p>
           <a:p>
             <a:pPr lvl="1"/>
             <a:r>
-              <a:rPr lang="en-GB" dirty="0" smtClean="0"/>
+              <a:rPr lang="en-GB" dirty="0"/>
               <a:t>Second level</a:t>
             </a:r>
           </a:p>
           <a:p>
             <a:pPr lvl="2"/>
             <a:r>
-              <a:rPr lang="en-GB" dirty="0" smtClean="0"/>
+              <a:rPr lang="en-GB" dirty="0"/>
               <a:t>Third level</a:t>
             </a:r>
           </a:p>
           <a:p>
             <a:pPr lvl="3"/>
             <a:r>
-              <a:rPr lang="en-GB" dirty="0" smtClean="0"/>
+              <a:rPr lang="en-GB" dirty="0"/>
               <a:t>Fourth level</a:t>
             </a:r>
           </a:p>
           <a:p>
             <a:pPr lvl="4"/>
             <a:r>
-              <a:rPr lang="en-GB" dirty="0" smtClean="0"/>
+              <a:rPr lang="en-GB" dirty="0"/>
               <a:t>Fifth level</a:t>
             </a:r>
             <a:endParaRPr lang="en-US" dirty="0"/>
@@ -7248,35 +7230,35 @@
           <a:p>
             <a:pPr lvl="0"/>
             <a:r>
-              <a:rPr lang="en-GB" dirty="0" smtClean="0"/>
+              <a:rPr lang="en-GB" dirty="0"/>
               <a:t>Click to edit Master text styles</a:t>
             </a:r>
           </a:p>
           <a:p>
             <a:pPr lvl="1"/>
             <a:r>
-              <a:rPr lang="en-GB" dirty="0" smtClean="0"/>
+              <a:rPr lang="en-GB" dirty="0"/>
               <a:t>Second level</a:t>
             </a:r>
           </a:p>
           <a:p>
             <a:pPr lvl="2"/>
             <a:r>
-              <a:rPr lang="en-GB" dirty="0" smtClean="0"/>
+              <a:rPr lang="en-GB" dirty="0"/>
               <a:t>Third level</a:t>
             </a:r>
           </a:p>
           <a:p>
             <a:pPr lvl="3"/>
             <a:r>
-              <a:rPr lang="en-GB" dirty="0" smtClean="0"/>
+              <a:rPr lang="en-GB" dirty="0"/>
               <a:t>Fourth level</a:t>
             </a:r>
           </a:p>
           <a:p>
             <a:pPr lvl="4"/>
             <a:r>
-              <a:rPr lang="en-GB" dirty="0" smtClean="0"/>
+              <a:rPr lang="en-GB" dirty="0"/>
               <a:t>Fifth level</a:t>
             </a:r>
             <a:endParaRPr lang="en-US" dirty="0"/>
@@ -7337,7 +7319,7 @@
           <a:lstStyle/>
           <a:p>
             <a:r>
-              <a:rPr lang="en-US" smtClean="0"/>
+              <a:rPr lang="en-US"/>
               <a:t>Click to edit Master title style</a:t>
             </a:r>
             <a:endParaRPr lang="en-GB"/>
@@ -7369,35 +7351,35 @@
           <a:p>
             <a:pPr lvl="0"/>
             <a:r>
-              <a:rPr lang="en-US" smtClean="0"/>
+              <a:rPr lang="en-US"/>
               <a:t>Click to edit Master text styles</a:t>
             </a:r>
           </a:p>
           <a:p>
             <a:pPr lvl="1"/>
             <a:r>
-              <a:rPr lang="en-US" smtClean="0"/>
+              <a:rPr lang="en-US"/>
               <a:t>Second level</a:t>
             </a:r>
           </a:p>
           <a:p>
             <a:pPr lvl="2"/>
             <a:r>
-              <a:rPr lang="en-US" smtClean="0"/>
+              <a:rPr lang="en-US"/>
               <a:t>Third level</a:t>
             </a:r>
           </a:p>
           <a:p>
             <a:pPr lvl="3"/>
             <a:r>
-              <a:rPr lang="en-US" smtClean="0"/>
+              <a:rPr lang="en-US"/>
               <a:t>Fourth level</a:t>
             </a:r>
           </a:p>
           <a:p>
             <a:pPr lvl="4"/>
             <a:r>
-              <a:rPr lang="en-US" smtClean="0"/>
+              <a:rPr lang="en-US"/>
               <a:t>Fifth level</a:t>
             </a:r>
             <a:endParaRPr lang="en-GB"/>
@@ -7462,7 +7444,7 @@
           </a:lstStyle>
           <a:p>
             <a:r>
-              <a:rPr lang="en-US" smtClean="0"/>
+              <a:rPr lang="en-US"/>
               <a:t>Click to edit Master title style</a:t>
             </a:r>
             <a:endParaRPr lang="en-GB"/>
@@ -7530,7 +7512,7 @@
           </a:lstStyle>
           <a:p>
             <a:r>
-              <a:rPr lang="en-US" smtClean="0"/>
+              <a:rPr lang="en-US"/>
               <a:t>Click to edit Master subtitle style</a:t>
             </a:r>
             <a:endParaRPr lang="en-GB"/>
@@ -7570,7 +7552,7 @@
                 </a:solidFill>
               </a:rPr>
               <a:pPr defTabSz="342900"/>
-              <a:t>23/05/2019</a:t>
+              <a:t>23/05/2022</a:t>
             </a:fld>
             <a:endParaRPr lang="en-GB">
               <a:solidFill>
@@ -7707,7 +7689,7 @@
           <a:lstStyle/>
           <a:p>
             <a:r>
-              <a:rPr lang="en-US" smtClean="0"/>
+              <a:rPr lang="en-US"/>
               <a:t>Click to edit Master title style</a:t>
             </a:r>
             <a:endParaRPr lang="en-US" dirty="0"/>
@@ -7736,35 +7718,35 @@
           <a:p>
             <a:pPr lvl="0"/>
             <a:r>
-              <a:rPr lang="en-US" smtClean="0"/>
+              <a:rPr lang="en-US"/>
               <a:t>Click to edit Master text styles</a:t>
             </a:r>
           </a:p>
           <a:p>
             <a:pPr lvl="1"/>
             <a:r>
-              <a:rPr lang="en-US" smtClean="0"/>
+              <a:rPr lang="en-US"/>
               <a:t>Second level</a:t>
             </a:r>
           </a:p>
           <a:p>
             <a:pPr lvl="2"/>
             <a:r>
-              <a:rPr lang="en-US" smtClean="0"/>
+              <a:rPr lang="en-US"/>
               <a:t>Third level</a:t>
             </a:r>
           </a:p>
           <a:p>
             <a:pPr lvl="3"/>
             <a:r>
-              <a:rPr lang="en-US" smtClean="0"/>
+              <a:rPr lang="en-US"/>
               <a:t>Fourth level</a:t>
             </a:r>
           </a:p>
           <a:p>
             <a:pPr lvl="4"/>
             <a:r>
-              <a:rPr lang="en-US" smtClean="0"/>
+              <a:rPr lang="en-US"/>
               <a:t>Fifth level</a:t>
             </a:r>
             <a:endParaRPr lang="en-US" dirty="0"/>
@@ -7793,35 +7775,35 @@
           <a:p>
             <a:pPr lvl="0"/>
             <a:r>
-              <a:rPr lang="en-US" smtClean="0"/>
+              <a:rPr lang="en-US"/>
               <a:t>Click to edit Master text styles</a:t>
             </a:r>
           </a:p>
           <a:p>
             <a:pPr lvl="1"/>
             <a:r>
-              <a:rPr lang="en-US" smtClean="0"/>
+              <a:rPr lang="en-US"/>
               <a:t>Second level</a:t>
             </a:r>
           </a:p>
           <a:p>
             <a:pPr lvl="2"/>
             <a:r>
-              <a:rPr lang="en-US" smtClean="0"/>
+              <a:rPr lang="en-US"/>
               <a:t>Third level</a:t>
             </a:r>
           </a:p>
           <a:p>
             <a:pPr lvl="3"/>
             <a:r>
-              <a:rPr lang="en-US" smtClean="0"/>
+              <a:rPr lang="en-US"/>
               <a:t>Fourth level</a:t>
             </a:r>
           </a:p>
           <a:p>
             <a:pPr lvl="4"/>
             <a:r>
-              <a:rPr lang="en-US" smtClean="0"/>
+              <a:rPr lang="en-US"/>
               <a:t>Fifth level</a:t>
             </a:r>
             <a:endParaRPr lang="en-US" dirty="0"/>
@@ -7845,7 +7827,7 @@
           <a:p>
             <a:fld id="{F4D14FF6-3E0D-407D-982E-9B686EE47223}" type="datetimeFigureOut">
               <a:rPr lang="en-GB" smtClean="0"/>
-              <a:t>23/05/2019</a:t>
+              <a:t>23/05/2022</a:t>
             </a:fld>
             <a:endParaRPr lang="en-GB"/>
           </a:p>
@@ -7944,7 +7926,7 @@
           <a:lstStyle/>
           <a:p>
             <a:r>
-              <a:rPr lang="en-US" smtClean="0"/>
+              <a:rPr lang="en-US"/>
               <a:t>Click to edit Master title style</a:t>
             </a:r>
             <a:endParaRPr lang="en-US" dirty="0"/>
@@ -8010,7 +7992,7 @@
           <a:p>
             <a:pPr lvl="0"/>
             <a:r>
-              <a:rPr lang="en-US" smtClean="0"/>
+              <a:rPr lang="en-US"/>
               <a:t>Click to edit Master text styles</a:t>
             </a:r>
           </a:p>
@@ -8038,35 +8020,35 @@
           <a:p>
             <a:pPr lvl="0"/>
             <a:r>
-              <a:rPr lang="en-US" smtClean="0"/>
+              <a:rPr lang="en-US"/>
               <a:t>Click to edit Master text styles</a:t>
             </a:r>
           </a:p>
           <a:p>
             <a:pPr lvl="1"/>
             <a:r>
-              <a:rPr lang="en-US" smtClean="0"/>
+              <a:rPr lang="en-US"/>
               <a:t>Second level</a:t>
             </a:r>
           </a:p>
           <a:p>
             <a:pPr lvl="2"/>
             <a:r>
-              <a:rPr lang="en-US" smtClean="0"/>
+              <a:rPr lang="en-US"/>
               <a:t>Third level</a:t>
             </a:r>
           </a:p>
           <a:p>
             <a:pPr lvl="3"/>
             <a:r>
-              <a:rPr lang="en-US" smtClean="0"/>
+              <a:rPr lang="en-US"/>
               <a:t>Fourth level</a:t>
             </a:r>
           </a:p>
           <a:p>
             <a:pPr lvl="4"/>
             <a:r>
-              <a:rPr lang="en-US" smtClean="0"/>
+              <a:rPr lang="en-US"/>
               <a:t>Fifth level</a:t>
             </a:r>
             <a:endParaRPr lang="en-US" dirty="0"/>
@@ -8132,7 +8114,7 @@
           <a:p>
             <a:pPr lvl="0"/>
             <a:r>
-              <a:rPr lang="en-US" smtClean="0"/>
+              <a:rPr lang="en-US"/>
               <a:t>Click to edit Master text styles</a:t>
             </a:r>
           </a:p>
@@ -8160,35 +8142,35 @@
           <a:p>
             <a:pPr lvl="0"/>
             <a:r>
-              <a:rPr lang="en-US" smtClean="0"/>
+              <a:rPr lang="en-US"/>
               <a:t>Click to edit Master text styles</a:t>
             </a:r>
           </a:p>
           <a:p>
             <a:pPr lvl="1"/>
             <a:r>
-              <a:rPr lang="en-US" smtClean="0"/>
+              <a:rPr lang="en-US"/>
               <a:t>Second level</a:t>
             </a:r>
           </a:p>
           <a:p>
             <a:pPr lvl="2"/>
             <a:r>
-              <a:rPr lang="en-US" smtClean="0"/>
+              <a:rPr lang="en-US"/>
               <a:t>Third level</a:t>
             </a:r>
           </a:p>
           <a:p>
             <a:pPr lvl="3"/>
             <a:r>
-              <a:rPr lang="en-US" smtClean="0"/>
+              <a:rPr lang="en-US"/>
               <a:t>Fourth level</a:t>
             </a:r>
           </a:p>
           <a:p>
             <a:pPr lvl="4"/>
             <a:r>
-              <a:rPr lang="en-US" smtClean="0"/>
+              <a:rPr lang="en-US"/>
               <a:t>Fifth level</a:t>
             </a:r>
             <a:endParaRPr lang="en-US" dirty="0"/>
@@ -8212,7 +8194,7 @@
           <a:p>
             <a:fld id="{F4D14FF6-3E0D-407D-982E-9B686EE47223}" type="datetimeFigureOut">
               <a:rPr lang="en-GB" smtClean="0"/>
-              <a:t>23/05/2019</a:t>
+              <a:t>23/05/2022</a:t>
             </a:fld>
             <a:endParaRPr lang="en-GB"/>
           </a:p>
@@ -8306,7 +8288,7 @@
           <a:lstStyle/>
           <a:p>
             <a:r>
-              <a:rPr lang="en-US" smtClean="0"/>
+              <a:rPr lang="en-US"/>
               <a:t>Click to edit Master title style</a:t>
             </a:r>
             <a:endParaRPr lang="en-US" dirty="0"/>
@@ -8330,7 +8312,7 @@
           <a:p>
             <a:fld id="{F4D14FF6-3E0D-407D-982E-9B686EE47223}" type="datetimeFigureOut">
               <a:rPr lang="en-GB" smtClean="0"/>
-              <a:t>23/05/2019</a:t>
+              <a:t>23/05/2022</a:t>
             </a:fld>
             <a:endParaRPr lang="en-GB"/>
           </a:p>
@@ -8425,7 +8407,7 @@
           <a:p>
             <a:fld id="{F4D14FF6-3E0D-407D-982E-9B686EE47223}" type="datetimeFigureOut">
               <a:rPr lang="en-GB" smtClean="0"/>
-              <a:t>23/05/2019</a:t>
+              <a:t>23/05/2022</a:t>
             </a:fld>
             <a:endParaRPr lang="en-GB"/>
           </a:p>
@@ -8528,7 +8510,7 @@
           </a:lstStyle>
           <a:p>
             <a:r>
-              <a:rPr lang="en-US" smtClean="0"/>
+              <a:rPr lang="en-US"/>
               <a:t>Click to edit Master title style</a:t>
             </a:r>
             <a:endParaRPr lang="en-US" dirty="0"/>
@@ -8585,35 +8567,35 @@
           <a:p>
             <a:pPr lvl="0"/>
             <a:r>
-              <a:rPr lang="en-US" smtClean="0"/>
+              <a:rPr lang="en-US"/>
               <a:t>Click to edit Master text styles</a:t>
             </a:r>
           </a:p>
           <a:p>
             <a:pPr lvl="1"/>
             <a:r>
-              <a:rPr lang="en-US" smtClean="0"/>
+              <a:rPr lang="en-US"/>
               <a:t>Second level</a:t>
             </a:r>
           </a:p>
           <a:p>
             <a:pPr lvl="2"/>
             <a:r>
-              <a:rPr lang="en-US" smtClean="0"/>
+              <a:rPr lang="en-US"/>
               <a:t>Third level</a:t>
             </a:r>
           </a:p>
           <a:p>
             <a:pPr lvl="3"/>
             <a:r>
-              <a:rPr lang="en-US" smtClean="0"/>
+              <a:rPr lang="en-US"/>
               <a:t>Fourth level</a:t>
             </a:r>
           </a:p>
           <a:p>
             <a:pPr lvl="4"/>
             <a:r>
-              <a:rPr lang="en-US" smtClean="0"/>
+              <a:rPr lang="en-US"/>
               <a:t>Fifth level</a:t>
             </a:r>
             <a:endParaRPr lang="en-US" dirty="0"/>
@@ -8679,7 +8661,7 @@
           <a:p>
             <a:pPr lvl="0"/>
             <a:r>
-              <a:rPr lang="en-US" smtClean="0"/>
+              <a:rPr lang="en-US"/>
               <a:t>Click to edit Master text styles</a:t>
             </a:r>
           </a:p>
@@ -8702,7 +8684,7 @@
           <a:p>
             <a:fld id="{F4D14FF6-3E0D-407D-982E-9B686EE47223}" type="datetimeFigureOut">
               <a:rPr lang="en-GB" smtClean="0"/>
-              <a:t>23/05/2019</a:t>
+              <a:t>23/05/2022</a:t>
             </a:fld>
             <a:endParaRPr lang="en-GB"/>
           </a:p>
@@ -8805,7 +8787,7 @@
           </a:lstStyle>
           <a:p>
             <a:r>
-              <a:rPr lang="en-US" smtClean="0"/>
+              <a:rPr lang="en-US"/>
               <a:t>Click to edit Master title style</a:t>
             </a:r>
             <a:endParaRPr lang="en-US" dirty="0"/>
@@ -8870,7 +8852,7 @@
           </a:lstStyle>
           <a:p>
             <a:r>
-              <a:rPr lang="en-US" smtClean="0"/>
+              <a:rPr lang="en-US"/>
               <a:t>Click icon to add picture</a:t>
             </a:r>
             <a:endParaRPr lang="en-US" dirty="0"/>
@@ -8936,7 +8918,7 @@
           <a:p>
             <a:pPr lvl="0"/>
             <a:r>
-              <a:rPr lang="en-US" smtClean="0"/>
+              <a:rPr lang="en-US"/>
               <a:t>Click to edit Master text styles</a:t>
             </a:r>
           </a:p>
@@ -8959,7 +8941,7 @@
           <a:p>
             <a:fld id="{F4D14FF6-3E0D-407D-982E-9B686EE47223}" type="datetimeFigureOut">
               <a:rPr lang="en-GB" smtClean="0"/>
-              <a:t>23/05/2019</a:t>
+              <a:t>23/05/2022</a:t>
             </a:fld>
             <a:endParaRPr lang="en-GB"/>
           </a:p>
@@ -9068,7 +9050,7 @@
           <a:lstStyle/>
           <a:p>
             <a:r>
-              <a:rPr lang="en-US" smtClean="0"/>
+              <a:rPr lang="en-US"/>
               <a:t>Click to edit Master title style</a:t>
             </a:r>
             <a:endParaRPr lang="en-US" dirty="0"/>
@@ -9102,35 +9084,35 @@
           <a:p>
             <a:pPr lvl="0"/>
             <a:r>
-              <a:rPr lang="en-US" smtClean="0"/>
+              <a:rPr lang="en-US"/>
               <a:t>Click to edit Master text styles</a:t>
             </a:r>
           </a:p>
           <a:p>
             <a:pPr lvl="1"/>
             <a:r>
-              <a:rPr lang="en-US" smtClean="0"/>
+              <a:rPr lang="en-US"/>
               <a:t>Second level</a:t>
             </a:r>
           </a:p>
           <a:p>
             <a:pPr lvl="2"/>
             <a:r>
-              <a:rPr lang="en-US" smtClean="0"/>
+              <a:rPr lang="en-US"/>
               <a:t>Third level</a:t>
             </a:r>
           </a:p>
           <a:p>
             <a:pPr lvl="3"/>
             <a:r>
-              <a:rPr lang="en-US" smtClean="0"/>
+              <a:rPr lang="en-US"/>
               <a:t>Fourth level</a:t>
             </a:r>
           </a:p>
           <a:p>
             <a:pPr lvl="4"/>
             <a:r>
-              <a:rPr lang="en-US" smtClean="0"/>
+              <a:rPr lang="en-US"/>
               <a:t>Fifth level</a:t>
             </a:r>
             <a:endParaRPr lang="en-US" dirty="0"/>
@@ -9172,7 +9154,7 @@
           <a:p>
             <a:fld id="{F4D14FF6-3E0D-407D-982E-9B686EE47223}" type="datetimeFigureOut">
               <a:rPr lang="en-GB" smtClean="0"/>
-              <a:t>23/05/2019</a:t>
+              <a:t>23/05/2022</a:t>
             </a:fld>
             <a:endParaRPr lang="en-GB"/>
           </a:p>
@@ -9610,7 +9592,7 @@
           <a:lstStyle/>
           <a:p>
             <a:r>
-              <a:rPr lang="en-US" smtClean="0"/>
+              <a:rPr lang="en-US"/>
               <a:t>Click to edit Master title style</a:t>
             </a:r>
             <a:endParaRPr lang="en-GB"/>
@@ -9644,35 +9626,35 @@
           <a:p>
             <a:pPr lvl="0"/>
             <a:r>
-              <a:rPr lang="en-US" smtClean="0"/>
+              <a:rPr lang="en-US"/>
               <a:t>Click to edit Master text styles</a:t>
             </a:r>
           </a:p>
           <a:p>
             <a:pPr lvl="1"/>
             <a:r>
-              <a:rPr lang="en-US" smtClean="0"/>
+              <a:rPr lang="en-US"/>
               <a:t>Second level</a:t>
             </a:r>
           </a:p>
           <a:p>
             <a:pPr lvl="2"/>
             <a:r>
-              <a:rPr lang="en-US" smtClean="0"/>
+              <a:rPr lang="en-US"/>
               <a:t>Third level</a:t>
             </a:r>
           </a:p>
           <a:p>
             <a:pPr lvl="3"/>
             <a:r>
-              <a:rPr lang="en-US" smtClean="0"/>
+              <a:rPr lang="en-US"/>
               <a:t>Fourth level</a:t>
             </a:r>
           </a:p>
           <a:p>
             <a:pPr lvl="4"/>
             <a:r>
-              <a:rPr lang="en-US" smtClean="0"/>
+              <a:rPr lang="en-US"/>
               <a:t>Fifth level</a:t>
             </a:r>
             <a:endParaRPr lang="en-GB"/>
@@ -9721,7 +9703,7 @@
                 </a:solidFill>
               </a:rPr>
               <a:pPr/>
-              <a:t>23/05/2019</a:t>
+              <a:t>23/05/2022</a:t>
             </a:fld>
             <a:endParaRPr lang="en-GB">
               <a:solidFill>
@@ -10602,10 +10584,9 @@
           <a:lstStyle/>
           <a:p>
             <a:r>
-              <a:rPr lang="en-GB" dirty="0" smtClean="0"/>
+              <a:rPr lang="en-GB" dirty="0"/>
               <a:t>Further MATLAB Programming – Make Your Code Efficient and Robust</a:t>
             </a:r>
-            <a:endParaRPr lang="en-GB" dirty="0"/>
           </a:p>
         </p:txBody>
       </p:sp>
@@ -10634,10 +10615,13 @@
               <a:t>Louise Brown, </a:t>
             </a:r>
             <a:r>
-              <a:rPr lang="en-GB" sz="2400" dirty="0" smtClean="0"/>
-              <a:t>Peter Zacharzewski</a:t>
-            </a:r>
-            <a:endParaRPr lang="en-GB" sz="2400" dirty="0"/>
+              <a:rPr lang="en-GB" sz="2400" dirty="0" err="1"/>
+              <a:t>Yijie</a:t>
+            </a:r>
+            <a:r>
+              <a:rPr lang="en-GB" sz="2400" dirty="0"/>
+              <a:t> (Amy) Zheng</a:t>
+            </a:r>
           </a:p>
         </p:txBody>
       </p:sp>
@@ -10674,13 +10658,6 @@
   <p:clrMapOvr>
     <a:masterClrMapping/>
   </p:clrMapOvr>
-  <p:timing>
-    <p:tnLst>
-      <p:par>
-        <p:cTn id="1" dur="indefinite" restart="never" nodeType="tmRoot"/>
-      </p:par>
-    </p:tnLst>
-  </p:timing>
 </p:sld>
 </file>
 
@@ -10706,7 +10683,7 @@
           <p:cNvPr id="2" name="Title 1">
             <a:extLst>
               <a:ext uri="{FF2B5EF4-FFF2-40B4-BE49-F238E27FC236}">
-                <a16:creationId xmlns:a16="http://schemas.microsoft.com/office/drawing/2014/main" xmlns="" id="{7F265545-9C47-264F-AEB2-F3B7F412195B}"/>
+                <a16:creationId xmlns:a16="http://schemas.microsoft.com/office/drawing/2014/main" id="{7F265545-9C47-264F-AEB2-F3B7F412195B}"/>
               </a:ext>
             </a:extLst>
           </p:cNvPr>
@@ -10739,7 +10716,7 @@
           <p:cNvPr id="8" name="TextBox 7">
             <a:extLst>
               <a:ext uri="{FF2B5EF4-FFF2-40B4-BE49-F238E27FC236}">
-                <a16:creationId xmlns:a16="http://schemas.microsoft.com/office/drawing/2014/main" xmlns="" id="{4BADE409-24C2-D84F-AE34-BE29E9A971E0}"/>
+                <a16:creationId xmlns:a16="http://schemas.microsoft.com/office/drawing/2014/main" id="{4BADE409-24C2-D84F-AE34-BE29E9A971E0}"/>
               </a:ext>
             </a:extLst>
           </p:cNvPr>
@@ -10792,7 +10769,7 @@
           <p:cNvPr id="4" name="Content Placeholder 3">
             <a:extLst>
               <a:ext uri="{FF2B5EF4-FFF2-40B4-BE49-F238E27FC236}">
-                <a16:creationId xmlns:a16="http://schemas.microsoft.com/office/drawing/2014/main" xmlns="" id="{BB4187F1-B6EE-5848-AACD-A927DB7B8202}"/>
+                <a16:creationId xmlns:a16="http://schemas.microsoft.com/office/drawing/2014/main" id="{BB4187F1-B6EE-5848-AACD-A927DB7B8202}"/>
               </a:ext>
             </a:extLst>
           </p:cNvPr>
@@ -10845,7 +10822,7 @@
           <p:cNvPr id="7" name="TextBox 6">
             <a:extLst>
               <a:ext uri="{FF2B5EF4-FFF2-40B4-BE49-F238E27FC236}">
-                <a16:creationId xmlns:a16="http://schemas.microsoft.com/office/drawing/2014/main" xmlns="" id="{A5967B7D-6F17-7A46-A036-8BF0232F7134}"/>
+                <a16:creationId xmlns:a16="http://schemas.microsoft.com/office/drawing/2014/main" id="{A5967B7D-6F17-7A46-A036-8BF0232F7134}"/>
               </a:ext>
             </a:extLst>
           </p:cNvPr>
@@ -10931,13 +10908,6 @@
   <p:clrMapOvr>
     <a:masterClrMapping/>
   </p:clrMapOvr>
-  <p:timing>
-    <p:tnLst>
-      <p:par>
-        <p:cTn id="1" dur="indefinite" restart="never" nodeType="tmRoot"/>
-      </p:par>
-    </p:tnLst>
-  </p:timing>
 </p:sld>
 </file>
 
@@ -10963,7 +10933,7 @@
           <p:cNvPr id="2" name="Title 1">
             <a:extLst>
               <a:ext uri="{FF2B5EF4-FFF2-40B4-BE49-F238E27FC236}">
-                <a16:creationId xmlns:a16="http://schemas.microsoft.com/office/drawing/2014/main" xmlns="" id="{7F265545-9C47-264F-AEB2-F3B7F412195B}"/>
+                <a16:creationId xmlns:a16="http://schemas.microsoft.com/office/drawing/2014/main" id="{7F265545-9C47-264F-AEB2-F3B7F412195B}"/>
               </a:ext>
             </a:extLst>
           </p:cNvPr>
@@ -10996,7 +10966,7 @@
           <p:cNvPr id="8" name="TextBox 7">
             <a:extLst>
               <a:ext uri="{FF2B5EF4-FFF2-40B4-BE49-F238E27FC236}">
-                <a16:creationId xmlns:a16="http://schemas.microsoft.com/office/drawing/2014/main" xmlns="" id="{4BADE409-24C2-D84F-AE34-BE29E9A971E0}"/>
+                <a16:creationId xmlns:a16="http://schemas.microsoft.com/office/drawing/2014/main" id="{4BADE409-24C2-D84F-AE34-BE29E9A971E0}"/>
               </a:ext>
             </a:extLst>
           </p:cNvPr>
@@ -11084,7 +11054,7 @@
           <p:cNvPr id="4" name="Content Placeholder 3">
             <a:extLst>
               <a:ext uri="{FF2B5EF4-FFF2-40B4-BE49-F238E27FC236}">
-                <a16:creationId xmlns:a16="http://schemas.microsoft.com/office/drawing/2014/main" xmlns="" id="{BB4187F1-B6EE-5848-AACD-A927DB7B8202}"/>
+                <a16:creationId xmlns:a16="http://schemas.microsoft.com/office/drawing/2014/main" id="{BB4187F1-B6EE-5848-AACD-A927DB7B8202}"/>
               </a:ext>
             </a:extLst>
           </p:cNvPr>
@@ -11121,7 +11091,7 @@
           <p:cNvPr id="6" name="TextBox 5">
             <a:extLst>
               <a:ext uri="{FF2B5EF4-FFF2-40B4-BE49-F238E27FC236}">
-                <a16:creationId xmlns:a16="http://schemas.microsoft.com/office/drawing/2014/main" xmlns="" id="{0A6E3050-AFC6-2C4C-B955-90E5A5806C74}"/>
+                <a16:creationId xmlns:a16="http://schemas.microsoft.com/office/drawing/2014/main" id="{0A6E3050-AFC6-2C4C-B955-90E5A5806C74}"/>
               </a:ext>
             </a:extLst>
           </p:cNvPr>
@@ -11216,13 +11186,6 @@
   <p:clrMapOvr>
     <a:masterClrMapping/>
   </p:clrMapOvr>
-  <p:timing>
-    <p:tnLst>
-      <p:par>
-        <p:cTn id="1" dur="indefinite" restart="never" nodeType="tmRoot"/>
-      </p:par>
-    </p:tnLst>
-  </p:timing>
 </p:sld>
 </file>
 
@@ -11248,7 +11211,7 @@
           <p:cNvPr id="2" name="Title 1">
             <a:extLst>
               <a:ext uri="{FF2B5EF4-FFF2-40B4-BE49-F238E27FC236}">
-                <a16:creationId xmlns:a16="http://schemas.microsoft.com/office/drawing/2014/main" xmlns="" id="{7F265545-9C47-264F-AEB2-F3B7F412195B}"/>
+                <a16:creationId xmlns:a16="http://schemas.microsoft.com/office/drawing/2014/main" id="{7F265545-9C47-264F-AEB2-F3B7F412195B}"/>
               </a:ext>
             </a:extLst>
           </p:cNvPr>
@@ -11281,7 +11244,7 @@
           <p:cNvPr id="8" name="TextBox 7">
             <a:extLst>
               <a:ext uri="{FF2B5EF4-FFF2-40B4-BE49-F238E27FC236}">
-                <a16:creationId xmlns:a16="http://schemas.microsoft.com/office/drawing/2014/main" xmlns="" id="{4BADE409-24C2-D84F-AE34-BE29E9A971E0}"/>
+                <a16:creationId xmlns:a16="http://schemas.microsoft.com/office/drawing/2014/main" id="{4BADE409-24C2-D84F-AE34-BE29E9A971E0}"/>
               </a:ext>
             </a:extLst>
           </p:cNvPr>
@@ -11427,13 +11390,6 @@
   <p:clrMapOvr>
     <a:masterClrMapping/>
   </p:clrMapOvr>
-  <p:timing>
-    <p:tnLst>
-      <p:par>
-        <p:cTn id="1" dur="indefinite" restart="never" nodeType="tmRoot"/>
-      </p:par>
-    </p:tnLst>
-  </p:timing>
 </p:sld>
 </file>
 
@@ -11471,10 +11427,9 @@
           <a:p>
             <a:pPr algn="ctr"/>
             <a:r>
-              <a:rPr lang="en-GB" dirty="0" smtClean="0"/>
+              <a:rPr lang="en-GB" dirty="0"/>
               <a:t>Linear Regression Models</a:t>
             </a:r>
-            <a:endParaRPr lang="en-GB" dirty="0"/>
           </a:p>
         </p:txBody>
       </p:sp>
@@ -11504,13 +11459,8 @@
               <a:p>
                 <a:r>
                   <a:rPr lang="en-GB" sz="2400" dirty="0"/>
-                  <a:t>Regression is the process of using measured data to fit a model of a relationship between </a:t>
+                  <a:t>Regression is the process of using measured data to fit a model of a relationship between variables</a:t>
                 </a:r>
-                <a:r>
-                  <a:rPr lang="en-GB" sz="2400" dirty="0" smtClean="0"/>
-                  <a:t>variables</a:t>
-                </a:r>
-                <a:endParaRPr lang="en-GB" sz="2400" dirty="0"/>
               </a:p>
               <a:p>
                 <a:r>
@@ -11628,19 +11578,7 @@
                 </a14:m>
                 <a:r>
                   <a:rPr lang="en-GB" sz="2400" dirty="0"/>
-                  <a:t> is a vector of the dependent, or response, </a:t>
-                </a:r>
-                <a:r>
-                  <a:rPr lang="en-GB" sz="2400" dirty="0" smtClean="0"/>
-                  <a:t>variables          </a:t>
-                </a:r>
-                <a:r>
-                  <a:rPr lang="en-GB" sz="2400" dirty="0"/>
-                  <a:t>	 </a:t>
-                </a:r>
-                <a:r>
-                  <a:rPr lang="en-GB" sz="2400" dirty="0" smtClean="0"/>
-                  <a:t>    (pulse pressure)</a:t>
+                  <a:t> is a vector of the dependent, or response, variables          	     (pulse pressure)</a:t>
                 </a:r>
               </a:p>
               <a:p>
@@ -11723,13 +11661,6 @@
   <p:clrMapOvr>
     <a:masterClrMapping/>
   </p:clrMapOvr>
-  <p:timing>
-    <p:tnLst>
-      <p:par>
-        <p:cTn id="1" dur="indefinite" restart="never" nodeType="tmRoot"/>
-      </p:par>
-    </p:tnLst>
-  </p:timing>
 </p:sld>
 </file>
 
@@ -11767,10 +11698,9 @@
           <a:p>
             <a:pPr algn="ctr"/>
             <a:r>
-              <a:rPr lang="en-GB" dirty="0" smtClean="0"/>
+              <a:rPr lang="en-GB" dirty="0"/>
               <a:t>Linear Regression Models</a:t>
             </a:r>
-            <a:endParaRPr lang="en-GB" dirty="0"/>
           </a:p>
         </p:txBody>
       </p:sp>
@@ -11799,7 +11729,7 @@
               <a:lstStyle/>
               <a:p>
                 <a:r>
-                  <a:rPr lang="en-GB" dirty="0" smtClean="0"/>
+                  <a:rPr lang="en-GB" dirty="0"/>
                   <a:t>Models where </a:t>
                 </a:r>
                 <a14:m>
@@ -11813,7 +11743,7 @@
                   </m:oMath>
                 </a14:m>
                 <a:r>
-                  <a:rPr lang="en-GB" dirty="0" smtClean="0"/>
+                  <a:rPr lang="en-GB" dirty="0"/>
                   <a:t> is linear in the parameters </a:t>
                 </a:r>
                 <a14:m>
@@ -11828,11 +11758,11 @@
                   </m:oMath>
                 </a14:m>
                 <a:r>
-                  <a:rPr lang="en-GB" dirty="0" smtClean="0"/>
+                  <a:rPr lang="en-GB" dirty="0"/>
                   <a:t> are called </a:t>
                 </a:r>
                 <a:r>
-                  <a:rPr lang="en-GB" i="1" dirty="0" smtClean="0"/>
+                  <a:rPr lang="en-GB" i="1" dirty="0"/>
                   <a:t>linear regression models</a:t>
                 </a:r>
               </a:p>
@@ -12012,11 +11942,11 @@
                     </m:sSup>
                   </m:oMath>
                 </a14:m>
-                <a:endParaRPr lang="en-GB" i="1" dirty="0" smtClean="0"/>
+                <a:endParaRPr lang="en-GB" i="1" dirty="0"/>
               </a:p>
               <a:p>
                 <a:r>
-                  <a:rPr lang="en-GB" dirty="0" smtClean="0"/>
+                  <a:rPr lang="en-GB" dirty="0"/>
                   <a:t>The model can be written as</a:t>
                 </a:r>
               </a:p>
@@ -12024,7 +11954,7 @@
                 <a:pPr marL="0" indent="0">
                   <a:buNone/>
                 </a:pPr>
-                <a:endParaRPr lang="en-GB" dirty="0" smtClean="0"/>
+                <a:endParaRPr lang="en-GB" dirty="0"/>
               </a:p>
               <a:p>
                 <a:pPr marL="0" indent="0">
@@ -12032,11 +11962,7 @@
                 </a:pPr>
                 <a:r>
                   <a:rPr lang="en-GB" dirty="0"/>
-                  <a:t>	</a:t>
-                </a:r>
-                <a:r>
-                  <a:rPr lang="en-GB" dirty="0" smtClean="0"/>
-                  <a:t>		</a:t>
+                  <a:t>			</a:t>
                 </a:r>
                 <a14:m>
                   <m:oMath xmlns:m="http://schemas.openxmlformats.org/officeDocument/2006/math">
@@ -12154,13 +12080,13 @@
                     </m:nary>
                   </m:oMath>
                 </a14:m>
-                <a:endParaRPr lang="en-GB" dirty="0" smtClean="0"/>
+                <a:endParaRPr lang="en-GB" dirty="0"/>
               </a:p>
               <a:p>
                 <a:pPr marL="0" indent="0">
                   <a:buNone/>
                 </a:pPr>
-                <a:endParaRPr lang="en-GB" dirty="0" smtClean="0"/>
+                <a:endParaRPr lang="en-GB" dirty="0"/>
               </a:p>
               <a:p>
                 <a:pPr marL="0" indent="0">
@@ -12168,26 +12094,22 @@
                 </a:pPr>
                 <a:r>
                   <a:rPr lang="en-GB" dirty="0"/>
-                  <a:t> </a:t>
+                  <a:t>   for some set of </a:t>
                 </a:r>
                 <a:r>
-                  <a:rPr lang="en-GB" dirty="0" smtClean="0"/>
-                  <a:t>  for some set of </a:t>
-                </a:r>
-                <a:r>
-                  <a:rPr lang="en-GB" i="1" dirty="0" smtClean="0"/>
+                  <a:rPr lang="en-GB" i="1" dirty="0"/>
                   <a:t>basis </a:t>
                 </a:r>
                 <a:r>
-                  <a:rPr lang="en-GB" dirty="0" smtClean="0"/>
+                  <a:rPr lang="en-GB" dirty="0"/>
                   <a:t>or </a:t>
                 </a:r>
                 <a:r>
-                  <a:rPr lang="en-GB" i="1" dirty="0" smtClean="0"/>
+                  <a:rPr lang="en-GB" i="1" dirty="0"/>
                   <a:t>design </a:t>
                 </a:r>
                 <a:r>
-                  <a:rPr lang="en-GB" dirty="0" smtClean="0"/>
+                  <a:rPr lang="en-GB" dirty="0"/>
                   <a:t>functions </a:t>
                 </a:r>
                 <a14:m>
@@ -12219,10 +12141,10 @@
                     </m:sSub>
                   </m:oMath>
                 </a14:m>
-                <a:endParaRPr lang="en-GB" dirty="0" smtClean="0"/>
+                <a:endParaRPr lang="en-GB" dirty="0"/>
               </a:p>
               <a:p>
-                <a:endParaRPr lang="en-GB" i="1" dirty="0" smtClean="0"/>
+                <a:endParaRPr lang="en-GB" i="1" dirty="0"/>
               </a:p>
             </p:txBody>
           </p:sp>
@@ -12525,13 +12447,6 @@
   <p:clrMapOvr>
     <a:masterClrMapping/>
   </p:clrMapOvr>
-  <p:timing>
-    <p:tnLst>
-      <p:par>
-        <p:cTn id="1" dur="indefinite" restart="never" nodeType="tmRoot"/>
-      </p:par>
-    </p:tnLst>
-  </p:timing>
 </p:sld>
 </file>
 
@@ -15888,10 +15803,9 @@
           <a:lstStyle/>
           <a:p>
             <a:r>
-              <a:rPr lang="en-GB" sz="3200" dirty="0" smtClean="0"/>
+              <a:rPr lang="en-GB" sz="3200" dirty="0"/>
               <a:t>Anonymous Functions</a:t>
             </a:r>
-            <a:endParaRPr lang="en-GB" sz="3200" dirty="0"/>
           </a:p>
         </p:txBody>
       </p:sp>
@@ -15940,7 +15854,7 @@
         <p:spPr>
           <a:xfrm>
             <a:off x="215516" y="1129659"/>
-            <a:ext cx="8676964" cy="1384995"/>
+            <a:ext cx="8676964" cy="1754326"/>
           </a:xfrm>
           <a:prstGeom prst="rect">
             <a:avLst/>
@@ -15959,7 +15873,7 @@
                   <a:prstClr val="black"/>
                 </a:solidFill>
               </a:rPr>
-              <a:t>Anonymous functions are local functions only available until the workspace is cleared</a:t>
+              <a:t>Anonymous functions are local functions only available until the workspace is cleared. They are called anonymous because they do not refer to a named function.</a:t>
             </a:r>
           </a:p>
           <a:p>
@@ -16105,16 +16019,6 @@
           <a:lstStyle/>
           <a:p>
             <a:r>
-              <a:rPr lang="en-GB" dirty="0" smtClean="0">
-                <a:solidFill>
-                  <a:prstClr val="black"/>
-                </a:solidFill>
-                <a:latin typeface="Courier New" pitchFamily="49" charset="0"/>
-                <a:cs typeface="Courier New" pitchFamily="49" charset="0"/>
-              </a:rPr>
-              <a:t>f </a:t>
-            </a:r>
-            <a:r>
               <a:rPr lang="en-GB" dirty="0">
                 <a:solidFill>
                   <a:prstClr val="black"/>
@@ -16122,10 +16026,10 @@
                 <a:latin typeface="Courier New" pitchFamily="49" charset="0"/>
                 <a:cs typeface="Courier New" pitchFamily="49" charset="0"/>
               </a:rPr>
-              <a:t>= @(</a:t>
-            </a:r>
-            <a:r>
-              <a:rPr lang="en-GB" dirty="0" err="1" smtClean="0">
+              <a:t>f = @(</a:t>
+            </a:r>
+            <a:r>
+              <a:rPr lang="en-GB" dirty="0" err="1">
                 <a:solidFill>
                   <a:prstClr val="black"/>
                 </a:solidFill>
@@ -16135,16 +16039,6 @@
               <a:t>x,y</a:t>
             </a:r>
             <a:r>
-              <a:rPr lang="en-GB" dirty="0" smtClean="0">
-                <a:solidFill>
-                  <a:prstClr val="black"/>
-                </a:solidFill>
-                <a:latin typeface="Courier New" pitchFamily="49" charset="0"/>
-                <a:cs typeface="Courier New" pitchFamily="49" charset="0"/>
-              </a:rPr>
-              <a:t>) sin(x</a:t>
-            </a:r>
-            <a:r>
               <a:rPr lang="en-GB" dirty="0">
                 <a:solidFill>
                   <a:prstClr val="black"/>
@@ -16152,25 +16046,8 @@
                 <a:latin typeface="Courier New" pitchFamily="49" charset="0"/>
                 <a:cs typeface="Courier New" pitchFamily="49" charset="0"/>
               </a:rPr>
-              <a:t>) + </a:t>
-            </a:r>
-            <a:r>
-              <a:rPr lang="en-GB" dirty="0" smtClean="0">
-                <a:solidFill>
-                  <a:prstClr val="black"/>
-                </a:solidFill>
-                <a:latin typeface="Courier New" pitchFamily="49" charset="0"/>
-                <a:cs typeface="Courier New" pitchFamily="49" charset="0"/>
-              </a:rPr>
-              <a:t>y</a:t>
-            </a:r>
-            <a:endParaRPr lang="en-GB" dirty="0">
-              <a:solidFill>
-                <a:prstClr val="black"/>
-              </a:solidFill>
-              <a:latin typeface="Courier New" pitchFamily="49" charset="0"/>
-              <a:cs typeface="Courier New" pitchFamily="49" charset="0"/>
-            </a:endParaRPr>
+              <a:t>) sin(x) + y</a:t>
+            </a:r>
           </a:p>
         </p:txBody>
       </p:sp>
@@ -16237,25 +16114,8 @@
                 <a:latin typeface="Courier New" pitchFamily="49" charset="0"/>
                 <a:cs typeface="Courier New" pitchFamily="49" charset="0"/>
               </a:rPr>
-              <a:t>&gt;&gt; </a:t>
-            </a:r>
-            <a:r>
-              <a:rPr lang="en-GB" dirty="0" smtClean="0">
-                <a:solidFill>
-                  <a:prstClr val="black"/>
-                </a:solidFill>
-                <a:latin typeface="Courier New" pitchFamily="49" charset="0"/>
-                <a:cs typeface="Courier New" pitchFamily="49" charset="0"/>
-              </a:rPr>
-              <a:t>f(pi/6, 0.5)</a:t>
-            </a:r>
-            <a:endParaRPr lang="en-GB" dirty="0">
-              <a:solidFill>
-                <a:prstClr val="black"/>
-              </a:solidFill>
-              <a:latin typeface="Courier New" pitchFamily="49" charset="0"/>
-              <a:cs typeface="Courier New" pitchFamily="49" charset="0"/>
-            </a:endParaRPr>
+              <a:t>&gt;&gt; f(pi/6, 0.5)</a:t>
+            </a:r>
           </a:p>
           <a:p>
             <a:endParaRPr lang="en-GB" dirty="0">
@@ -16306,25 +16166,8 @@
                 <a:latin typeface="Courier New" pitchFamily="49" charset="0"/>
                 <a:cs typeface="Courier New" pitchFamily="49" charset="0"/>
               </a:rPr>
-              <a:t>    </a:t>
-            </a:r>
-            <a:r>
-              <a:rPr lang="en-GB" dirty="0" smtClean="0">
-                <a:solidFill>
-                  <a:prstClr val="black"/>
-                </a:solidFill>
-                <a:latin typeface="Courier New" pitchFamily="49" charset="0"/>
-                <a:cs typeface="Courier New" pitchFamily="49" charset="0"/>
-              </a:rPr>
-              <a:t>1</a:t>
-            </a:r>
-            <a:endParaRPr lang="en-GB" dirty="0">
-              <a:solidFill>
-                <a:prstClr val="black"/>
-              </a:solidFill>
-              <a:latin typeface="Courier New" pitchFamily="49" charset="0"/>
-              <a:cs typeface="Courier New" pitchFamily="49" charset="0"/>
-            </a:endParaRPr>
+              <a:t>    1</a:t>
+            </a:r>
           </a:p>
         </p:txBody>
       </p:sp>
@@ -16586,7 +16429,7 @@
           <a:lstStyle/>
           <a:p>
             <a:r>
-              <a:rPr lang="en-GB" sz="2000" dirty="0" smtClean="0">
+              <a:rPr lang="en-GB" sz="2000" dirty="0">
                 <a:solidFill>
                   <a:srgbClr val="000000"/>
                 </a:solidFill>
@@ -16604,7 +16447,7 @@
           </a:p>
           <a:p>
             <a:r>
-              <a:rPr lang="en-GB" dirty="0" err="1" smtClean="0">
+              <a:rPr lang="en-GB" dirty="0" err="1">
                 <a:solidFill>
                   <a:srgbClr val="000000"/>
                 </a:solidFill>
@@ -16613,7 +16456,7 @@
               <a:t>modelFun</a:t>
             </a:r>
             <a:r>
-              <a:rPr lang="en-GB" dirty="0" smtClean="0">
+              <a:rPr lang="en-GB" dirty="0">
                 <a:solidFill>
                   <a:srgbClr val="000000"/>
                 </a:solidFill>
@@ -16622,7 +16465,7 @@
               <a:t> = @(c, x1, x2) c(1)+c(2)*x1+c(3)*x2c(4)*x1.^2 + </a:t>
             </a:r>
             <a:r>
-              <a:rPr lang="en-GB" dirty="0" smtClean="0">
+              <a:rPr lang="en-GB" dirty="0">
                 <a:solidFill>
                   <a:srgbClr val="0000FF"/>
                 </a:solidFill>
@@ -16633,73 +16476,14 @@
           </a:p>
           <a:p>
             <a:r>
-              <a:rPr lang="en-GB" dirty="0" smtClean="0">
-                <a:solidFill>
-                  <a:srgbClr val="000000"/>
-                </a:solidFill>
-                <a:latin typeface="Courier New" panose="02070309020205020404" pitchFamily="49" charset="0"/>
-              </a:rPr>
-              <a:t>    </a:t>
-            </a:r>
-            <a:r>
               <a:rPr lang="en-GB" dirty="0">
                 <a:solidFill>
                   <a:srgbClr val="000000"/>
                 </a:solidFill>
                 <a:latin typeface="Courier New" panose="02070309020205020404" pitchFamily="49" charset="0"/>
               </a:rPr>
-              <a:t>c(5)*x2.^2 + c(6)*</a:t>
-            </a:r>
-            <a:r>
-              <a:rPr lang="en-GB" dirty="0" smtClean="0">
-                <a:solidFill>
-                  <a:srgbClr val="000000"/>
-                </a:solidFill>
-                <a:latin typeface="Courier New" panose="02070309020205020404" pitchFamily="49" charset="0"/>
-              </a:rPr>
-              <a:t>x1.*</a:t>
-            </a:r>
-            <a:r>
-              <a:rPr lang="en-GB" dirty="0">
-                <a:solidFill>
-                  <a:srgbClr val="000000"/>
-                </a:solidFill>
-                <a:latin typeface="Courier New" panose="02070309020205020404" pitchFamily="49" charset="0"/>
-              </a:rPr>
-              <a:t>x2</a:t>
-            </a:r>
-            <a:r>
-              <a:rPr lang="en-GB" dirty="0" smtClean="0">
-                <a:solidFill>
-                  <a:srgbClr val="000000"/>
-                </a:solidFill>
-                <a:latin typeface="Courier New" panose="02070309020205020404" pitchFamily="49" charset="0"/>
-              </a:rPr>
-              <a:t>;</a:t>
-            </a:r>
-          </a:p>
-          <a:p>
-            <a:endParaRPr lang="en-GB" dirty="0" smtClean="0">
-              <a:solidFill>
-                <a:srgbClr val="000000"/>
-              </a:solidFill>
-              <a:latin typeface="Courier New" panose="02070309020205020404" pitchFamily="49" charset="0"/>
-            </a:endParaRPr>
-          </a:p>
-          <a:p>
-            <a:r>
-              <a:rPr lang="en-GB" dirty="0" smtClean="0">
-                <a:solidFill>
-                  <a:srgbClr val="000000"/>
-                </a:solidFill>
-              </a:rPr>
-              <a:t>Mathematical notation</a:t>
-            </a:r>
-            <a:endParaRPr lang="en-GB" dirty="0">
-              <a:solidFill>
-                <a:srgbClr val="000000"/>
-              </a:solidFill>
-            </a:endParaRPr>
+              <a:t>    c(5)*x2.^2 + c(6)*x1.*x2;</a:t>
+            </a:r>
           </a:p>
           <a:p>
             <a:endParaRPr lang="en-GB" dirty="0">
@@ -16711,30 +16495,36 @@
           </a:p>
           <a:p>
             <a:r>
-              <a:rPr lang="en-GB" dirty="0" smtClean="0">
-                <a:latin typeface="Courier New" panose="02070309020205020404" pitchFamily="49" charset="0"/>
+              <a:rPr lang="en-GB" dirty="0">
+                <a:solidFill>
+                  <a:srgbClr val="000000"/>
+                </a:solidFill>
               </a:rPr>
-              <a:t>f(x1</a:t>
-            </a:r>
+              <a:t>Mathematical notation</a:t>
+            </a:r>
+          </a:p>
+          <a:p>
+            <a:endParaRPr lang="en-GB" dirty="0">
+              <a:solidFill>
+                <a:srgbClr val="000000"/>
+              </a:solidFill>
+              <a:latin typeface="Courier New" panose="02070309020205020404" pitchFamily="49" charset="0"/>
+            </a:endParaRPr>
+          </a:p>
+          <a:p>
             <a:r>
               <a:rPr lang="en-GB" dirty="0">
                 <a:latin typeface="Courier New" panose="02070309020205020404" pitchFamily="49" charset="0"/>
               </a:rPr>
-              <a:t>, x2) = c(1) +c(2)*x1 +c(3)*x2 + c(4)*x1.^2 + ...</a:t>
-            </a:r>
-          </a:p>
-          <a:p>
-            <a:r>
-              <a:rPr lang="en-GB" dirty="0" smtClean="0">
-                <a:latin typeface="Courier New" panose="02070309020205020404" pitchFamily="49" charset="0"/>
-              </a:rPr>
-              <a:t>   </a:t>
-            </a:r>
+              <a:t>f(x1, x2) = c(1) +c(2)*x1 +c(3)*x2 + c(4)*x1.^2 + ...</a:t>
+            </a:r>
+          </a:p>
+          <a:p>
             <a:r>
               <a:rPr lang="en-GB" dirty="0">
                 <a:latin typeface="Courier New" panose="02070309020205020404" pitchFamily="49" charset="0"/>
               </a:rPr>
-              <a:t>c(5)*x2.^2 + c(6)*x1*x2</a:t>
+              <a:t>   c(5)*x2.^2 + c(6)*x1*x2</a:t>
             </a:r>
           </a:p>
         </p:txBody>
@@ -16778,7 +16568,7 @@
           </a:lstStyle>
           <a:p>
             <a:r>
-              <a:rPr lang="en-GB" sz="3200" smtClean="0"/>
+              <a:rPr lang="en-GB" sz="3200"/>
               <a:t>Anonymous Functions</a:t>
             </a:r>
             <a:endParaRPr lang="en-GB" sz="3200" dirty="0"/>
@@ -16795,13 +16585,6 @@
   <p:clrMapOvr>
     <a:masterClrMapping/>
   </p:clrMapOvr>
-  <p:timing>
-    <p:tnLst>
-      <p:par>
-        <p:cTn id="1" dur="indefinite" restart="never" nodeType="tmRoot"/>
-      </p:par>
-    </p:tnLst>
-  </p:timing>
 </p:sld>
 </file>
 
@@ -16863,10 +16646,9 @@
           <a:p>
             <a:pPr algn="ctr"/>
             <a:r>
-              <a:rPr lang="en-GB" sz="3300" dirty="0" smtClean="0"/>
+              <a:rPr lang="en-GB" sz="3300" dirty="0"/>
               <a:t>Making Grids</a:t>
             </a:r>
-            <a:endParaRPr lang="en-GB" sz="3300" dirty="0"/>
           </a:p>
         </p:txBody>
       </p:sp>
@@ -16893,25 +16675,25 @@
           <a:lstStyle/>
           <a:p>
             <a:r>
-              <a:rPr lang="en-GB" dirty="0" smtClean="0"/>
+              <a:rPr lang="en-GB" dirty="0"/>
               <a:t>The </a:t>
             </a:r>
             <a:r>
-              <a:rPr lang="en-GB" dirty="0" err="1" smtClean="0">
+              <a:rPr lang="en-GB" dirty="0" err="1">
                 <a:latin typeface="Courier New" panose="02070309020205020404" pitchFamily="49" charset="0"/>
                 <a:cs typeface="Courier New" panose="02070309020205020404" pitchFamily="49" charset="0"/>
               </a:rPr>
               <a:t>meshgrid</a:t>
             </a:r>
             <a:r>
-              <a:rPr lang="en-GB" dirty="0" smtClean="0">
+              <a:rPr lang="en-GB" dirty="0">
                 <a:latin typeface="Courier New" panose="02070309020205020404" pitchFamily="49" charset="0"/>
                 <a:cs typeface="Courier New" panose="02070309020205020404" pitchFamily="49" charset="0"/>
               </a:rPr>
               <a:t> </a:t>
             </a:r>
             <a:r>
-              <a:rPr lang="en-GB" dirty="0" smtClean="0">
+              <a:rPr lang="en-GB" dirty="0">
                 <a:cs typeface="Courier New" panose="02070309020205020404" pitchFamily="49" charset="0"/>
               </a:rPr>
               <a:t>function converts vectors of points into matrices that can represent a grid of points in the x-y plane</a:t>
@@ -16928,7 +16710,7 @@
         </p:nvSpPr>
         <p:spPr>
           <a:xfrm>
-            <a:off x="723899" y="1809430"/>
+            <a:off x="802872" y="1809429"/>
             <a:ext cx="6981825" cy="4893647"/>
           </a:xfrm>
           <a:prstGeom prst="rect">
@@ -16947,8 +16729,22 @@
                 <a:latin typeface="Courier New" panose="02070309020205020404" pitchFamily="49" charset="0"/>
                 <a:cs typeface="Courier New" panose="02070309020205020404" pitchFamily="49" charset="0"/>
               </a:rPr>
-              <a:t>&gt;&gt; x = -2:4;</a:t>
-            </a:r>
+              <a:t>&gt;&gt; x = -2:4; </a:t>
+            </a:r>
+            <a:r>
+              <a:rPr lang="es-ES" dirty="0">
+                <a:solidFill>
+                  <a:srgbClr val="00B050"/>
+                </a:solidFill>
+                <a:latin typeface="Courier New" panose="02070309020205020404" pitchFamily="49" charset="0"/>
+                <a:cs typeface="Courier New" panose="02070309020205020404" pitchFamily="49" charset="0"/>
+              </a:rPr>
+              <a:t>% 1 x 7 vector</a:t>
+            </a:r>
+            <a:endParaRPr lang="es-ES" dirty="0">
+              <a:latin typeface="Courier New" panose="02070309020205020404" pitchFamily="49" charset="0"/>
+              <a:cs typeface="Courier New" panose="02070309020205020404" pitchFamily="49" charset="0"/>
+            </a:endParaRPr>
           </a:p>
           <a:p>
             <a:r>
@@ -16956,8 +16752,22 @@
                 <a:latin typeface="Courier New" panose="02070309020205020404" pitchFamily="49" charset="0"/>
                 <a:cs typeface="Courier New" panose="02070309020205020404" pitchFamily="49" charset="0"/>
               </a:rPr>
-              <a:t>&gt;&gt; y = 0:5;</a:t>
-            </a:r>
+              <a:t>&gt;&gt; y = 0:5;  </a:t>
+            </a:r>
+            <a:r>
+              <a:rPr lang="es-ES" dirty="0">
+                <a:solidFill>
+                  <a:srgbClr val="00B050"/>
+                </a:solidFill>
+                <a:latin typeface="Courier New" panose="02070309020205020404" pitchFamily="49" charset="0"/>
+                <a:cs typeface="Courier New" panose="02070309020205020404" pitchFamily="49" charset="0"/>
+              </a:rPr>
+              <a:t>% 1 x 6 vector</a:t>
+            </a:r>
+            <a:endParaRPr lang="es-ES" dirty="0">
+              <a:latin typeface="Courier New" panose="02070309020205020404" pitchFamily="49" charset="0"/>
+              <a:cs typeface="Courier New" panose="02070309020205020404" pitchFamily="49" charset="0"/>
+            </a:endParaRPr>
           </a:p>
           <a:p>
             <a:r>
@@ -17008,19 +16818,8 @@
                 <a:latin typeface="Courier New" panose="02070309020205020404" pitchFamily="49" charset="0"/>
                 <a:cs typeface="Courier New" panose="02070309020205020404" pitchFamily="49" charset="0"/>
               </a:rPr>
-              <a:t>X </a:t>
-            </a:r>
-            <a:r>
-              <a:rPr lang="es-ES" sz="1600" dirty="0" smtClean="0">
-                <a:latin typeface="Courier New" panose="02070309020205020404" pitchFamily="49" charset="0"/>
-                <a:cs typeface="Courier New" panose="02070309020205020404" pitchFamily="49" charset="0"/>
-              </a:rPr>
-              <a:t>=</a:t>
-            </a:r>
-            <a:endParaRPr lang="es-ES" sz="1600" dirty="0">
-              <a:latin typeface="Courier New" panose="02070309020205020404" pitchFamily="49" charset="0"/>
-              <a:cs typeface="Courier New" panose="02070309020205020404" pitchFamily="49" charset="0"/>
-            </a:endParaRPr>
+              <a:t>X =</a:t>
+            </a:r>
           </a:p>
           <a:p>
             <a:r>
@@ -17088,19 +16887,8 @@
                 <a:latin typeface="Courier New" panose="02070309020205020404" pitchFamily="49" charset="0"/>
                 <a:cs typeface="Courier New" panose="02070309020205020404" pitchFamily="49" charset="0"/>
               </a:rPr>
-              <a:t>Y </a:t>
-            </a:r>
-            <a:r>
-              <a:rPr lang="es-ES" sz="1600" dirty="0" smtClean="0">
-                <a:latin typeface="Courier New" panose="02070309020205020404" pitchFamily="49" charset="0"/>
-                <a:cs typeface="Courier New" panose="02070309020205020404" pitchFamily="49" charset="0"/>
-              </a:rPr>
-              <a:t>=</a:t>
-            </a:r>
-            <a:endParaRPr lang="es-ES" sz="1600" dirty="0">
-              <a:latin typeface="Courier New" panose="02070309020205020404" pitchFamily="49" charset="0"/>
-              <a:cs typeface="Courier New" panose="02070309020205020404" pitchFamily="49" charset="0"/>
-            </a:endParaRPr>
+              <a:t>Y =</a:t>
+            </a:r>
           </a:p>
           <a:p>
             <a:r>
@@ -17159,6 +16947,251 @@
               <a:latin typeface="Courier New" panose="02070309020205020404" pitchFamily="49" charset="0"/>
               <a:cs typeface="Courier New" panose="02070309020205020404" pitchFamily="49" charset="0"/>
             </a:endParaRPr>
+          </a:p>
+        </p:txBody>
+      </p:sp>
+      <p:sp>
+        <p:nvSpPr>
+          <p:cNvPr id="3" name="Right Brace 2">
+            <a:extLst>
+              <a:ext uri="{FF2B5EF4-FFF2-40B4-BE49-F238E27FC236}">
+                <a16:creationId xmlns:a16="http://schemas.microsoft.com/office/drawing/2014/main" id="{31343DAE-49D5-0A64-04A4-51A98E4DC6FA}"/>
+              </a:ext>
+            </a:extLst>
+          </p:cNvPr>
+          <p:cNvSpPr/>
+          <p:nvPr/>
+        </p:nvSpPr>
+        <p:spPr>
+          <a:xfrm>
+            <a:off x="4572000" y="1809430"/>
+            <a:ext cx="245660" cy="646331"/>
+          </a:xfrm>
+          <a:prstGeom prst="rightBrace">
+            <a:avLst/>
+          </a:prstGeom>
+        </p:spPr>
+        <p:style>
+          <a:lnRef idx="1">
+            <a:schemeClr val="accent1"/>
+          </a:lnRef>
+          <a:fillRef idx="0">
+            <a:schemeClr val="accent1"/>
+          </a:fillRef>
+          <a:effectRef idx="0">
+            <a:schemeClr val="accent1"/>
+          </a:effectRef>
+          <a:fontRef idx="minor">
+            <a:schemeClr val="tx1"/>
+          </a:fontRef>
+        </p:style>
+        <p:txBody>
+          <a:bodyPr rtlCol="0" anchor="ctr"/>
+          <a:lstStyle/>
+          <a:p>
+            <a:pPr algn="ctr"/>
+            <a:endParaRPr lang="en-GB"/>
+          </a:p>
+        </p:txBody>
+      </p:sp>
+      <p:sp>
+        <p:nvSpPr>
+          <p:cNvPr id="6" name="TextBox 5">
+            <a:extLst>
+              <a:ext uri="{FF2B5EF4-FFF2-40B4-BE49-F238E27FC236}">
+                <a16:creationId xmlns:a16="http://schemas.microsoft.com/office/drawing/2014/main" id="{514CF187-C22D-DA14-EEEB-2AB713CCC707}"/>
+              </a:ext>
+            </a:extLst>
+          </p:cNvPr>
+          <p:cNvSpPr txBox="1"/>
+          <p:nvPr/>
+        </p:nvSpPr>
+        <p:spPr>
+          <a:xfrm>
+            <a:off x="4850216" y="1809429"/>
+            <a:ext cx="2620370" cy="646331"/>
+          </a:xfrm>
+          <a:prstGeom prst="rect">
+            <a:avLst/>
+          </a:prstGeom>
+          <a:noFill/>
+        </p:spPr>
+        <p:txBody>
+          <a:bodyPr wrap="square" rtlCol="0">
+            <a:spAutoFit/>
+          </a:bodyPr>
+          <a:lstStyle/>
+          <a:p>
+            <a:r>
+              <a:rPr lang="en-GB" dirty="0"/>
+              <a:t>42 points in grid of points in the </a:t>
+            </a:r>
+            <a:r>
+              <a:rPr lang="en-GB" dirty="0" err="1"/>
+              <a:t>x,y</a:t>
+            </a:r>
+            <a:r>
+              <a:rPr lang="en-GB" dirty="0"/>
+              <a:t> plan</a:t>
+            </a:r>
+          </a:p>
+        </p:txBody>
+      </p:sp>
+      <p:sp>
+        <p:nvSpPr>
+          <p:cNvPr id="7" name="Right Brace 6">
+            <a:extLst>
+              <a:ext uri="{FF2B5EF4-FFF2-40B4-BE49-F238E27FC236}">
+                <a16:creationId xmlns:a16="http://schemas.microsoft.com/office/drawing/2014/main" id="{AD20F55A-0120-FAAE-FF6E-2FFEE18BC229}"/>
+              </a:ext>
+            </a:extLst>
+          </p:cNvPr>
+          <p:cNvSpPr/>
+          <p:nvPr/>
+        </p:nvSpPr>
+        <p:spPr>
+          <a:xfrm>
+            <a:off x="6160401" y="3152633"/>
+            <a:ext cx="199456" cy="1514901"/>
+          </a:xfrm>
+          <a:prstGeom prst="rightBrace">
+            <a:avLst/>
+          </a:prstGeom>
+        </p:spPr>
+        <p:style>
+          <a:lnRef idx="1">
+            <a:schemeClr val="accent1"/>
+          </a:lnRef>
+          <a:fillRef idx="0">
+            <a:schemeClr val="accent1"/>
+          </a:fillRef>
+          <a:effectRef idx="0">
+            <a:schemeClr val="accent1"/>
+          </a:effectRef>
+          <a:fontRef idx="minor">
+            <a:schemeClr val="tx1"/>
+          </a:fontRef>
+        </p:style>
+        <p:txBody>
+          <a:bodyPr rtlCol="0" anchor="ctr"/>
+          <a:lstStyle/>
+          <a:p>
+            <a:pPr algn="ctr"/>
+            <a:endParaRPr lang="en-GB"/>
+          </a:p>
+        </p:txBody>
+      </p:sp>
+      <p:sp>
+        <p:nvSpPr>
+          <p:cNvPr id="8" name="Right Brace 7">
+            <a:extLst>
+              <a:ext uri="{FF2B5EF4-FFF2-40B4-BE49-F238E27FC236}">
+                <a16:creationId xmlns:a16="http://schemas.microsoft.com/office/drawing/2014/main" id="{230BFCCE-9F3A-32F0-8674-D1B73D723E81}"/>
+              </a:ext>
+            </a:extLst>
+          </p:cNvPr>
+          <p:cNvSpPr/>
+          <p:nvPr/>
+        </p:nvSpPr>
+        <p:spPr>
+          <a:xfrm>
+            <a:off x="6160401" y="5115386"/>
+            <a:ext cx="199456" cy="1514901"/>
+          </a:xfrm>
+          <a:prstGeom prst="rightBrace">
+            <a:avLst/>
+          </a:prstGeom>
+        </p:spPr>
+        <p:style>
+          <a:lnRef idx="1">
+            <a:schemeClr val="accent1"/>
+          </a:lnRef>
+          <a:fillRef idx="0">
+            <a:schemeClr val="accent1"/>
+          </a:fillRef>
+          <a:effectRef idx="0">
+            <a:schemeClr val="accent1"/>
+          </a:effectRef>
+          <a:fontRef idx="minor">
+            <a:schemeClr val="tx1"/>
+          </a:fontRef>
+        </p:style>
+        <p:txBody>
+          <a:bodyPr rtlCol="0" anchor="ctr"/>
+          <a:lstStyle/>
+          <a:p>
+            <a:pPr algn="ctr"/>
+            <a:endParaRPr lang="en-GB"/>
+          </a:p>
+        </p:txBody>
+      </p:sp>
+      <p:sp>
+        <p:nvSpPr>
+          <p:cNvPr id="9" name="TextBox 8">
+            <a:extLst>
+              <a:ext uri="{FF2B5EF4-FFF2-40B4-BE49-F238E27FC236}">
+                <a16:creationId xmlns:a16="http://schemas.microsoft.com/office/drawing/2014/main" id="{B1C16069-EF4B-594A-4E60-0568F3DEF66F}"/>
+              </a:ext>
+            </a:extLst>
+          </p:cNvPr>
+          <p:cNvSpPr txBox="1"/>
+          <p:nvPr/>
+        </p:nvSpPr>
+        <p:spPr>
+          <a:xfrm>
+            <a:off x="6469038" y="3576075"/>
+            <a:ext cx="2238233" cy="646331"/>
+          </a:xfrm>
+          <a:prstGeom prst="rect">
+            <a:avLst/>
+          </a:prstGeom>
+          <a:noFill/>
+        </p:spPr>
+        <p:txBody>
+          <a:bodyPr wrap="square" rtlCol="0">
+            <a:spAutoFit/>
+          </a:bodyPr>
+          <a:lstStyle/>
+          <a:p>
+            <a:r>
+              <a:rPr lang="en-GB" dirty="0"/>
+              <a:t>x coordinate at each grid point</a:t>
+            </a:r>
+          </a:p>
+        </p:txBody>
+      </p:sp>
+      <p:sp>
+        <p:nvSpPr>
+          <p:cNvPr id="11" name="TextBox 10">
+            <a:extLst>
+              <a:ext uri="{FF2B5EF4-FFF2-40B4-BE49-F238E27FC236}">
+                <a16:creationId xmlns:a16="http://schemas.microsoft.com/office/drawing/2014/main" id="{20E6FF15-DBF9-0936-31E7-76D4ABF1D3EB}"/>
+              </a:ext>
+            </a:extLst>
+          </p:cNvPr>
+          <p:cNvSpPr txBox="1"/>
+          <p:nvPr/>
+        </p:nvSpPr>
+        <p:spPr>
+          <a:xfrm>
+            <a:off x="6469038" y="5506134"/>
+            <a:ext cx="2238233" cy="646331"/>
+          </a:xfrm>
+          <a:prstGeom prst="rect">
+            <a:avLst/>
+          </a:prstGeom>
+          <a:noFill/>
+        </p:spPr>
+        <p:txBody>
+          <a:bodyPr wrap="square" rtlCol="0">
+            <a:spAutoFit/>
+          </a:bodyPr>
+          <a:lstStyle/>
+          <a:p>
+            <a:r>
+              <a:rPr lang="en-GB" dirty="0"/>
+              <a:t>y coordinate at each grid point</a:t>
+            </a:r>
           </a:p>
         </p:txBody>
       </p:sp>
@@ -17172,13 +17205,6 @@
   <p:clrMapOvr>
     <a:masterClrMapping/>
   </p:clrMapOvr>
-  <p:timing>
-    <p:tnLst>
-      <p:par>
-        <p:cTn id="1" dur="indefinite" restart="never" nodeType="tmRoot"/>
-      </p:par>
-    </p:tnLst>
-  </p:timing>
 </p:sld>
 </file>
 
@@ -17222,10 +17248,9 @@
           <a:lstStyle/>
           <a:p>
             <a:r>
-              <a:rPr lang="en-GB" dirty="0" smtClean="0"/>
+              <a:rPr lang="en-GB" dirty="0"/>
               <a:t>Creating a Function</a:t>
             </a:r>
-            <a:endParaRPr lang="en-GB" dirty="0"/>
           </a:p>
         </p:txBody>
       </p:sp>
@@ -17293,82 +17318,64 @@
                   <a:latin typeface="Courier New" pitchFamily="49" charset="0"/>
                   <a:cs typeface="Courier New" pitchFamily="49" charset="0"/>
                 </a:rPr>
-                <a:t>function </a:t>
+                <a:t>function [</a:t>
               </a:r>
               <a:r>
-                <a:rPr lang="en-GB" dirty="0" smtClean="0">
-                  <a:latin typeface="Courier New" pitchFamily="49" charset="0"/>
-                  <a:cs typeface="Courier New" pitchFamily="49" charset="0"/>
-                </a:rPr>
-                <a:t>[</a:t>
-              </a:r>
-              <a:r>
-                <a:rPr lang="en-GB" dirty="0" err="1" smtClean="0">
+                <a:rPr lang="en-GB" dirty="0" err="1">
                   <a:latin typeface="Courier New" pitchFamily="49" charset="0"/>
                   <a:cs typeface="Courier New" pitchFamily="49" charset="0"/>
                 </a:rPr>
                 <a:t>modelCoeffs</a:t>
               </a:r>
               <a:r>
-                <a:rPr lang="en-GB" dirty="0" smtClean="0">
+                <a:rPr lang="en-GB" dirty="0">
                   <a:latin typeface="Courier New" pitchFamily="49" charset="0"/>
                   <a:cs typeface="Courier New" pitchFamily="49" charset="0"/>
                 </a:rPr>
                 <a:t>, </a:t>
               </a:r>
               <a:r>
-                <a:rPr lang="en-GB" dirty="0" err="1" smtClean="0">
+                <a:rPr lang="en-GB" dirty="0" err="1">
                   <a:latin typeface="Courier New" pitchFamily="49" charset="0"/>
                   <a:cs typeface="Courier New" pitchFamily="49" charset="0"/>
                 </a:rPr>
                 <a:t>fh</a:t>
               </a:r>
               <a:r>
-                <a:rPr lang="en-GB" dirty="0" smtClean="0">
+                <a:rPr lang="en-GB" dirty="0">
                   <a:latin typeface="Courier New" pitchFamily="49" charset="0"/>
                   <a:cs typeface="Courier New" pitchFamily="49" charset="0"/>
                 </a:rPr>
-                <a:t>] </a:t>
+                <a:t>] = </a:t>
+              </a:r>
+              <a:r>
+                <a:rPr lang="en-GB" dirty="0" err="1">
+                  <a:latin typeface="Courier New" pitchFamily="49" charset="0"/>
+                  <a:cs typeface="Courier New" pitchFamily="49" charset="0"/>
+                </a:rPr>
+                <a:t>fitQuadModel</a:t>
               </a:r>
               <a:r>
                 <a:rPr lang="en-GB" dirty="0">
                   <a:latin typeface="Courier New" pitchFamily="49" charset="0"/>
                   <a:cs typeface="Courier New" pitchFamily="49" charset="0"/>
                 </a:rPr>
-                <a:t>= </a:t>
-              </a:r>
-              <a:r>
-                <a:rPr lang="en-GB" dirty="0" err="1" smtClean="0">
-                  <a:latin typeface="Courier New" pitchFamily="49" charset="0"/>
-                  <a:cs typeface="Courier New" pitchFamily="49" charset="0"/>
-                </a:rPr>
-                <a:t>fitQuadModel</a:t>
-              </a:r>
-              <a:r>
-                <a:rPr lang="en-GB" dirty="0" smtClean="0">
-                  <a:latin typeface="Courier New" pitchFamily="49" charset="0"/>
-                  <a:cs typeface="Courier New" pitchFamily="49" charset="0"/>
-                </a:rPr>
                 <a:t>(X, y, </a:t>
               </a:r>
               <a:r>
-                <a:rPr lang="en-GB" dirty="0" err="1" smtClean="0">
+                <a:rPr lang="en-GB" dirty="0" err="1">
                   <a:latin typeface="Courier New" pitchFamily="49" charset="0"/>
                   <a:cs typeface="Courier New" pitchFamily="49" charset="0"/>
                 </a:rPr>
                 <a:t>showplot</a:t>
               </a:r>
               <a:r>
-                <a:rPr lang="en-GB" dirty="0" smtClean="0">
+                <a:rPr lang="en-GB" dirty="0">
                   <a:latin typeface="Courier New" pitchFamily="49" charset="0"/>
                   <a:cs typeface="Courier New" pitchFamily="49" charset="0"/>
                 </a:rPr>
                 <a:t>)</a:t>
               </a:r>
-              <a:endParaRPr lang="en-GB" dirty="0">
-                <a:latin typeface="Courier New" pitchFamily="49" charset="0"/>
-                <a:cs typeface="Courier New" pitchFamily="49" charset="0"/>
-              </a:endParaRPr>
             </a:p>
             <a:p>
               <a:r>
@@ -17376,47 +17383,26 @@
                   <a:latin typeface="Courier New" pitchFamily="49" charset="0"/>
                   <a:cs typeface="Courier New" pitchFamily="49" charset="0"/>
                 </a:rPr>
-                <a:t>% </a:t>
-              </a:r>
-              <a:r>
-                <a:rPr lang="en-GB" dirty="0" smtClean="0">
-                  <a:latin typeface="Courier New" pitchFamily="49" charset="0"/>
-                  <a:cs typeface="Courier New" pitchFamily="49" charset="0"/>
-                </a:rPr>
-                <a:t>FITQUADMODEL Fits a quadratic model to the response data</a:t>
+                <a:t>% FITQUADMODEL Fits a quadratic model to the response data</a:t>
               </a:r>
             </a:p>
             <a:p>
-              <a:r>
-                <a:rPr lang="en-GB" dirty="0" smtClean="0">
-                  <a:latin typeface="Courier New" pitchFamily="49" charset="0"/>
-                  <a:cs typeface="Courier New" pitchFamily="49" charset="0"/>
-                </a:rPr>
-                <a:t>% using the</a:t>
-              </a:r>
               <a:r>
                 <a:rPr lang="en-GB" dirty="0">
                   <a:latin typeface="Courier New" pitchFamily="49" charset="0"/>
                   <a:cs typeface="Courier New" pitchFamily="49" charset="0"/>
                 </a:rPr>
-                <a:t> </a:t>
+                <a:t>% using the columns of X as </a:t>
               </a:r>
               <a:r>
-                <a:rPr lang="en-GB" dirty="0" smtClean="0">
-                  <a:latin typeface="Courier New" pitchFamily="49" charset="0"/>
-                  <a:cs typeface="Courier New" pitchFamily="49" charset="0"/>
-                </a:rPr>
-                <a:t>columns of X as </a:t>
-              </a:r>
-              <a:r>
-                <a:rPr lang="en-GB" dirty="0" err="1" smtClean="0">
+                <a:rPr lang="en-GB" dirty="0" err="1">
                   <a:latin typeface="Courier New" pitchFamily="49" charset="0"/>
                   <a:cs typeface="Courier New" pitchFamily="49" charset="0"/>
                 </a:rPr>
                 <a:t>regressors</a:t>
               </a:r>
               <a:r>
-                <a:rPr lang="en-GB" dirty="0" smtClean="0">
+                <a:rPr lang="en-GB" dirty="0">
                   <a:latin typeface="Courier New" pitchFamily="49" charset="0"/>
                   <a:cs typeface="Courier New" pitchFamily="49" charset="0"/>
                 </a:rPr>
@@ -17425,30 +17411,12 @@
             </a:p>
             <a:p>
               <a:r>
-                <a:rPr lang="en-GB" dirty="0" smtClean="0">
-                  <a:latin typeface="Courier New" pitchFamily="49" charset="0"/>
-                  <a:cs typeface="Courier New" pitchFamily="49" charset="0"/>
-                </a:rPr>
-                <a:t>% columns; y is a vector with</a:t>
-              </a:r>
-              <a:r>
                 <a:rPr lang="en-GB" dirty="0">
                   <a:latin typeface="Courier New" pitchFamily="49" charset="0"/>
                   <a:cs typeface="Courier New" pitchFamily="49" charset="0"/>
                 </a:rPr>
-                <a:t> </a:t>
+                <a:t>% columns; y is a vector with the same number of rows as X.</a:t>
               </a:r>
-              <a:r>
-                <a:rPr lang="en-GB" dirty="0" smtClean="0">
-                  <a:latin typeface="Courier New" pitchFamily="49" charset="0"/>
-                  <a:cs typeface="Courier New" pitchFamily="49" charset="0"/>
-                </a:rPr>
-                <a:t>the same number of rows as X.</a:t>
-              </a:r>
-              <a:endParaRPr lang="en-GB" dirty="0">
-                <a:latin typeface="Courier New" pitchFamily="49" charset="0"/>
-                <a:cs typeface="Courier New" pitchFamily="49" charset="0"/>
-              </a:endParaRPr>
             </a:p>
             <a:p>
               <a:endParaRPr lang="en-GB" dirty="0"/>
@@ -17478,11 +17446,11 @@
             <a:lstStyle/>
             <a:p>
               <a:r>
-                <a:rPr lang="en-GB" dirty="0" smtClean="0"/>
+                <a:rPr lang="en-GB" dirty="0"/>
                 <a:t>Must be the same as the filename – </a:t>
               </a:r>
               <a:r>
-                <a:rPr lang="en-GB" dirty="0" err="1" smtClean="0"/>
+                <a:rPr lang="en-GB" dirty="0" err="1"/>
                 <a:t>fitQuadModel.m</a:t>
               </a:r>
               <a:endParaRPr lang="en-GB" dirty="0"/>
@@ -17512,10 +17480,9 @@
             <a:lstStyle/>
             <a:p>
               <a:r>
-                <a:rPr lang="en-GB" dirty="0" smtClean="0"/>
+                <a:rPr lang="en-GB" dirty="0"/>
                 <a:t>Input arguments</a:t>
               </a:r>
-              <a:endParaRPr lang="en-GB" dirty="0"/>
             </a:p>
           </p:txBody>
         </p:sp>
@@ -17542,10 +17509,9 @@
             <a:lstStyle/>
             <a:p>
               <a:r>
-                <a:rPr lang="en-GB" dirty="0" smtClean="0"/>
+                <a:rPr lang="en-GB" dirty="0"/>
                 <a:t>Must have  function declaration on line 1 of file</a:t>
               </a:r>
-              <a:endParaRPr lang="en-GB" dirty="0"/>
             </a:p>
           </p:txBody>
         </p:sp>
@@ -17572,10 +17538,9 @@
             <a:lstStyle/>
             <a:p>
               <a:r>
-                <a:rPr lang="en-GB" dirty="0" smtClean="0"/>
+                <a:rPr lang="en-GB" dirty="0"/>
                 <a:t>Output arguments </a:t>
               </a:r>
-              <a:endParaRPr lang="en-GB" dirty="0"/>
             </a:p>
           </p:txBody>
         </p:sp>
@@ -17734,13 +17699,6 @@
   <p:clrMapOvr>
     <a:masterClrMapping/>
   </p:clrMapOvr>
-  <p:timing>
-    <p:tnLst>
-      <p:par>
-        <p:cTn id="1" dur="indefinite" restart="never" nodeType="tmRoot"/>
-      </p:par>
-    </p:tnLst>
-  </p:timing>
 </p:sld>
 </file>
 
@@ -17780,7 +17738,7 @@
               <a:defRPr/>
             </a:pPr>
             <a:r>
-              <a:rPr lang="en-US" altLang="en-US" smtClean="0"/>
+              <a:rPr lang="en-US" altLang="en-US"/>
               <a:t>14/11/2016</a:t>
             </a:r>
             <a:endParaRPr lang="en-US" altLang="en-US" sz="900"/>
@@ -17806,18 +17764,13 @@
               <a:defRPr/>
             </a:pPr>
             <a:r>
-              <a:rPr lang="en-US" altLang="en-US" smtClean="0">
+              <a:rPr lang="en-US" altLang="en-US">
                 <a:solidFill>
                   <a:srgbClr val="808080"/>
                 </a:solidFill>
               </a:rPr>
               <a:t>Coding Masterclass</a:t>
             </a:r>
-            <a:endParaRPr lang="en-US" altLang="en-US">
-              <a:solidFill>
-                <a:srgbClr val="808080"/>
-              </a:solidFill>
-            </a:endParaRPr>
           </a:p>
         </p:txBody>
       </p:sp>
@@ -17881,18 +17834,13 @@
           <a:lstStyle/>
           <a:p>
             <a:r>
-              <a:rPr lang="en-GB" sz="2400" dirty="0" smtClean="0">
+              <a:rPr lang="en-GB" sz="2400" dirty="0">
                 <a:solidFill>
                   <a:schemeClr val="bg1"/>
                 </a:solidFill>
               </a:rPr>
               <a:t>It’s all gone horribly wrong!</a:t>
             </a:r>
-            <a:endParaRPr lang="en-GB" sz="2400" dirty="0">
-              <a:solidFill>
-                <a:schemeClr val="bg1"/>
-              </a:solidFill>
-            </a:endParaRPr>
           </a:p>
         </p:txBody>
       </p:sp>
@@ -17919,38 +17867,37 @@
           <a:lstStyle/>
           <a:p>
             <a:r>
-              <a:rPr lang="en-GB" sz="2400" dirty="0" smtClean="0"/>
+              <a:rPr lang="en-GB" sz="2400" dirty="0"/>
               <a:t>Does this look familiar?</a:t>
             </a:r>
           </a:p>
           <a:p>
-            <a:endParaRPr lang="en-GB" sz="2400" dirty="0" smtClean="0"/>
-          </a:p>
-          <a:p>
-            <a:r>
-              <a:rPr lang="en-GB" sz="2400" dirty="0" err="1" smtClean="0"/>
+            <a:endParaRPr lang="en-GB" sz="2400" dirty="0"/>
+          </a:p>
+          <a:p>
+            <a:r>
+              <a:rPr lang="en-GB" sz="2400" dirty="0" err="1"/>
               <a:t>TestCode.m</a:t>
             </a:r>
-            <a:endParaRPr lang="en-GB" sz="2400" dirty="0" smtClean="0"/>
-          </a:p>
-          <a:p>
-            <a:r>
-              <a:rPr lang="en-GB" sz="2400" dirty="0" smtClean="0"/>
+            <a:endParaRPr lang="en-GB" sz="2400" dirty="0"/>
+          </a:p>
+          <a:p>
+            <a:r>
+              <a:rPr lang="en-GB" sz="2400" dirty="0"/>
               <a:t>TestCode_data_set1.m</a:t>
             </a:r>
           </a:p>
           <a:p>
             <a:r>
-              <a:rPr lang="en-GB" sz="2400" dirty="0" smtClean="0"/>
+              <a:rPr lang="en-GB" sz="2400" dirty="0"/>
               <a:t>TestCode_data_set1_v2.m</a:t>
             </a:r>
           </a:p>
           <a:p>
             <a:r>
-              <a:rPr lang="en-GB" sz="2400" dirty="0" smtClean="0"/>
+              <a:rPr lang="en-GB" sz="2400" dirty="0"/>
               <a:t>TestCode_data_set1_v2_with_output.m</a:t>
             </a:r>
-            <a:endParaRPr lang="en-GB" sz="2400" dirty="0"/>
           </a:p>
         </p:txBody>
       </p:sp>
@@ -17977,15 +17924,15 @@
           <a:lstStyle/>
           <a:p>
             <a:r>
-              <a:rPr lang="en-GB" sz="2400" dirty="0" smtClean="0"/>
+              <a:rPr lang="en-GB" sz="2400" dirty="0"/>
               <a:t>Use version control, </a:t>
             </a:r>
             <a:r>
-              <a:rPr lang="en-GB" sz="2400" dirty="0" err="1" smtClean="0"/>
+              <a:rPr lang="en-GB" sz="2400" dirty="0" err="1"/>
               <a:t>eg</a:t>
             </a:r>
             <a:r>
-              <a:rPr lang="en-GB" sz="2400" dirty="0" smtClean="0"/>
+              <a:rPr lang="en-GB" sz="2400" dirty="0"/>
               <a:t> Git, Subversion or Mercurial</a:t>
             </a:r>
           </a:p>
@@ -18033,10 +17980,9 @@
           </a:lstStyle>
           <a:p>
             <a:r>
-              <a:rPr lang="en-GB" sz="3600" dirty="0" smtClean="0"/>
+              <a:rPr lang="en-GB" sz="3600" dirty="0"/>
               <a:t>Version Control</a:t>
             </a:r>
-            <a:endParaRPr lang="en-GB" sz="3600" dirty="0"/>
           </a:p>
         </p:txBody>
       </p:sp>
@@ -18166,10 +18112,9 @@
           <a:lstStyle/>
           <a:p>
             <a:r>
-              <a:rPr lang="en-GB" sz="3600" dirty="0" smtClean="0"/>
+              <a:rPr lang="en-GB" sz="3600" dirty="0"/>
               <a:t>Debugging and Improving Performance</a:t>
             </a:r>
-            <a:endParaRPr lang="en-GB" sz="3600" dirty="0"/>
           </a:p>
         </p:txBody>
       </p:sp>
@@ -18193,40 +18138,40 @@
             <a:pPr marL="0" indent="0">
               <a:buNone/>
             </a:pPr>
-            <a:endParaRPr lang="en-GB" sz="2800" dirty="0" smtClean="0"/>
-          </a:p>
-          <a:p>
-            <a:r>
-              <a:rPr lang="en-GB" sz="2800" dirty="0" smtClean="0"/>
+            <a:endParaRPr lang="en-GB" sz="2800" dirty="0"/>
+          </a:p>
+          <a:p>
+            <a:r>
+              <a:rPr lang="en-GB" sz="2800" dirty="0"/>
               <a:t>Diagnosing problems</a:t>
             </a:r>
           </a:p>
           <a:p>
             <a:r>
-              <a:rPr lang="en-GB" sz="2800" dirty="0" smtClean="0"/>
+              <a:rPr lang="en-GB" sz="2800" dirty="0"/>
               <a:t>Identifying common errors</a:t>
             </a:r>
           </a:p>
           <a:p>
             <a:r>
-              <a:rPr lang="en-GB" sz="2800" dirty="0" smtClean="0"/>
+              <a:rPr lang="en-GB" sz="2800" dirty="0"/>
               <a:t>Evaluation of code performance</a:t>
             </a:r>
           </a:p>
           <a:p>
             <a:r>
-              <a:rPr lang="en-GB" sz="2800" dirty="0" smtClean="0"/>
+              <a:rPr lang="en-GB" sz="2800" dirty="0"/>
               <a:t>Vectorisation techniques</a:t>
             </a:r>
           </a:p>
           <a:p>
             <a:r>
-              <a:rPr lang="en-GB" sz="2800" dirty="0" smtClean="0"/>
+              <a:rPr lang="en-GB" sz="2800" dirty="0"/>
               <a:t>Managing memory effectively</a:t>
             </a:r>
           </a:p>
           <a:p>
-            <a:endParaRPr lang="en-GB" sz="2800" dirty="0" smtClean="0"/>
+            <a:endParaRPr lang="en-GB" sz="2800" dirty="0"/>
           </a:p>
           <a:p>
             <a:endParaRPr lang="en-GB" sz="2800" dirty="0"/>
@@ -18279,13 +18224,6 @@
   <p:clrMapOvr>
     <a:masterClrMapping/>
   </p:clrMapOvr>
-  <p:timing>
-    <p:tnLst>
-      <p:par>
-        <p:cTn id="1" dur="indefinite" restart="never" nodeType="tmRoot"/>
-      </p:par>
-    </p:tnLst>
-  </p:timing>
 </p:sld>
 </file>
 
@@ -18332,7 +18270,7 @@
               <a:buNone/>
             </a:pPr>
             <a:r>
-              <a:rPr lang="en-GB" sz="2400" dirty="0" smtClean="0"/>
+              <a:rPr lang="en-GB" sz="2400" dirty="0"/>
               <a:t>Efficient matrix and array operations rely on data being located together in a contiguous block of memory addresses</a:t>
             </a:r>
           </a:p>
@@ -18347,7 +18285,7 @@
               <a:buNone/>
             </a:pPr>
             <a:r>
-              <a:rPr lang="en-GB" sz="2400" dirty="0" smtClean="0"/>
+              <a:rPr lang="en-GB" sz="2400" dirty="0"/>
               <a:t>Create a dummy version of a variable of appropriate size</a:t>
             </a:r>
           </a:p>
@@ -18356,21 +18294,21 @@
               <a:buNone/>
             </a:pPr>
             <a:r>
-              <a:rPr lang="en-GB" sz="2400" dirty="0" smtClean="0">
+              <a:rPr lang="en-GB" sz="2400" dirty="0">
                 <a:latin typeface="Courier New" panose="02070309020205020404" pitchFamily="49" charset="0"/>
                 <a:cs typeface="Courier New" panose="02070309020205020404" pitchFamily="49" charset="0"/>
               </a:rPr>
               <a:t>&gt;&gt; A = zeros(</a:t>
             </a:r>
             <a:r>
-              <a:rPr lang="en-GB" sz="2400" dirty="0" err="1" smtClean="0">
+              <a:rPr lang="en-GB" sz="2400" dirty="0" err="1">
                 <a:latin typeface="Courier New" panose="02070309020205020404" pitchFamily="49" charset="0"/>
                 <a:cs typeface="Courier New" panose="02070309020205020404" pitchFamily="49" charset="0"/>
               </a:rPr>
               <a:t>m,n</a:t>
             </a:r>
             <a:r>
-              <a:rPr lang="en-GB" sz="2400" dirty="0" smtClean="0">
+              <a:rPr lang="en-GB" sz="2400" dirty="0">
                 <a:latin typeface="Courier New" panose="02070309020205020404" pitchFamily="49" charset="0"/>
                 <a:cs typeface="Courier New" panose="02070309020205020404" pitchFamily="49" charset="0"/>
               </a:rPr>
@@ -18382,7 +18320,7 @@
               <a:buNone/>
             </a:pPr>
             <a:r>
-              <a:rPr lang="en-GB" sz="2400" dirty="0" smtClean="0">
+              <a:rPr lang="en-GB" sz="2400" dirty="0">
                 <a:cs typeface="Courier New" panose="02070309020205020404" pitchFamily="49" charset="0"/>
               </a:rPr>
               <a:t>Subsequent operations then overwrite the zeros with the required values</a:t>
@@ -18401,7 +18339,7 @@
               <a:buNone/>
             </a:pPr>
             <a:r>
-              <a:rPr lang="en-GB" sz="2400" dirty="0" smtClean="0">
+              <a:rPr lang="en-GB" sz="2400" dirty="0">
                 <a:cs typeface="Courier New" panose="02070309020205020404" pitchFamily="49" charset="0"/>
               </a:rPr>
               <a:t>Assigning the last element of an array first creates an array of the appropriate size</a:t>
@@ -18416,19 +18354,8 @@
                 <a:latin typeface="Courier New" panose="02070309020205020404" pitchFamily="49" charset="0"/>
                 <a:cs typeface="Courier New" panose="02070309020205020404" pitchFamily="49" charset="0"/>
               </a:rPr>
-              <a:t>&gt;&gt; x(8) = </a:t>
-            </a:r>
-            <a:r>
-              <a:rPr lang="en-GB" sz="2400" dirty="0" smtClean="0">
-                <a:latin typeface="Courier New" panose="02070309020205020404" pitchFamily="49" charset="0"/>
-                <a:cs typeface="Courier New" panose="02070309020205020404" pitchFamily="49" charset="0"/>
-              </a:rPr>
-              <a:t>3</a:t>
-            </a:r>
-            <a:endParaRPr lang="en-GB" sz="2400" dirty="0">
-              <a:latin typeface="Courier New" panose="02070309020205020404" pitchFamily="49" charset="0"/>
-              <a:cs typeface="Courier New" panose="02070309020205020404" pitchFamily="49" charset="0"/>
-            </a:endParaRPr>
+              <a:t>&gt;&gt; x(8) = 3</a:t>
+            </a:r>
           </a:p>
           <a:p>
             <a:pPr marL="0" indent="0">
@@ -18439,19 +18366,8 @@
                 <a:latin typeface="Courier New" panose="02070309020205020404" pitchFamily="49" charset="0"/>
                 <a:cs typeface="Courier New" panose="02070309020205020404" pitchFamily="49" charset="0"/>
               </a:rPr>
-              <a:t>x </a:t>
-            </a:r>
-            <a:r>
-              <a:rPr lang="en-GB" sz="2400" dirty="0" smtClean="0">
-                <a:latin typeface="Courier New" panose="02070309020205020404" pitchFamily="49" charset="0"/>
-                <a:cs typeface="Courier New" panose="02070309020205020404" pitchFamily="49" charset="0"/>
-              </a:rPr>
-              <a:t>=</a:t>
-            </a:r>
-            <a:endParaRPr lang="en-GB" sz="2400" dirty="0">
-              <a:latin typeface="Courier New" panose="02070309020205020404" pitchFamily="49" charset="0"/>
-              <a:cs typeface="Courier New" panose="02070309020205020404" pitchFamily="49" charset="0"/>
-            </a:endParaRPr>
+              <a:t>x =</a:t>
+            </a:r>
           </a:p>
           <a:p>
             <a:pPr marL="0" indent="0">
@@ -18464,10 +18380,6 @@
               </a:rPr>
               <a:t>     0     0     0     0     0     0     0     3</a:t>
             </a:r>
-            <a:endParaRPr lang="en-GB" sz="2400" dirty="0" smtClean="0">
-              <a:latin typeface="Courier New" panose="02070309020205020404" pitchFamily="49" charset="0"/>
-              <a:cs typeface="Courier New" panose="02070309020205020404" pitchFamily="49" charset="0"/>
-            </a:endParaRPr>
           </a:p>
         </p:txBody>
       </p:sp>
@@ -18530,14 +18442,13 @@
           <a:lstStyle/>
           <a:p>
             <a:r>
-              <a:rPr lang="en-GB" sz="3600" dirty="0" err="1" smtClean="0"/>
+              <a:rPr lang="en-GB" sz="3600" dirty="0" err="1"/>
               <a:t>Preallocation</a:t>
             </a:r>
             <a:r>
-              <a:rPr lang="en-GB" sz="3600" dirty="0" smtClean="0"/>
+              <a:rPr lang="en-GB" sz="3600" dirty="0"/>
               <a:t> of Memory</a:t>
             </a:r>
-            <a:endParaRPr lang="en-GB" sz="3600" dirty="0"/>
           </a:p>
         </p:txBody>
       </p:sp>
@@ -18551,13 +18462,6 @@
   <p:clrMapOvr>
     <a:masterClrMapping/>
   </p:clrMapOvr>
-  <p:timing>
-    <p:tnLst>
-      <p:par>
-        <p:cTn id="1" dur="indefinite" restart="never" nodeType="tmRoot"/>
-      </p:par>
-    </p:tnLst>
-  </p:timing>
 </p:sld>
 </file>
 
@@ -18653,14 +18557,13 @@
           </a:lstStyle>
           <a:p>
             <a:r>
-              <a:rPr lang="en-GB" sz="3600" dirty="0" err="1" smtClean="0"/>
+              <a:rPr lang="en-GB" sz="3600" dirty="0" err="1"/>
               <a:t>Preallocating</a:t>
             </a:r>
             <a:r>
-              <a:rPr lang="en-GB" sz="3600" dirty="0" smtClean="0"/>
+              <a:rPr lang="en-GB" sz="3600" dirty="0"/>
               <a:t> Cells and Structures</a:t>
             </a:r>
-            <a:endParaRPr lang="en-GB" sz="3600" dirty="0"/>
           </a:p>
         </p:txBody>
       </p:sp>
@@ -18687,10 +18590,9 @@
           <a:lstStyle/>
           <a:p>
             <a:r>
-              <a:rPr lang="en-GB" sz="2000" dirty="0" smtClean="0"/>
+              <a:rPr lang="en-GB" sz="2000" dirty="0"/>
               <a:t>Cell arrays and structure arrays act as containers for various types of data</a:t>
             </a:r>
-            <a:endParaRPr lang="en-GB" sz="2000" dirty="0"/>
           </a:p>
         </p:txBody>
       </p:sp>
@@ -19498,30 +19400,30 @@
           <a:lstStyle/>
           <a:p>
             <a:r>
-              <a:rPr lang="en-GB" sz="2000" dirty="0" smtClean="0"/>
+              <a:rPr lang="en-GB" sz="2000" dirty="0"/>
               <a:t>The </a:t>
             </a:r>
             <a:r>
-              <a:rPr lang="en-GB" sz="2000" dirty="0" smtClean="0">
+              <a:rPr lang="en-GB" sz="2000" dirty="0">
                 <a:latin typeface="Courier New" panose="02070309020205020404" pitchFamily="49" charset="0"/>
                 <a:cs typeface="Courier New" panose="02070309020205020404" pitchFamily="49" charset="0"/>
               </a:rPr>
               <a:t>cell </a:t>
             </a:r>
             <a:r>
-              <a:rPr lang="en-GB" sz="2000" dirty="0" smtClean="0">
+              <a:rPr lang="en-GB" sz="2000" dirty="0">
                 <a:cs typeface="Courier New" panose="02070309020205020404" pitchFamily="49" charset="0"/>
               </a:rPr>
               <a:t>command </a:t>
             </a:r>
             <a:r>
-              <a:rPr lang="en-GB" sz="2000" dirty="0" err="1" smtClean="0">
+              <a:rPr lang="en-GB" sz="2000" dirty="0" err="1">
                 <a:cs typeface="Courier New" panose="02070309020205020404" pitchFamily="49" charset="0"/>
               </a:rPr>
               <a:t>preallocates</a:t>
             </a:r>
             <a:r>
-              <a:rPr lang="en-GB" sz="2000" dirty="0" smtClean="0">
+              <a:rPr lang="en-GB" sz="2000" dirty="0">
                 <a:cs typeface="Courier New" panose="02070309020205020404" pitchFamily="49" charset="0"/>
               </a:rPr>
               <a:t> the container</a:t>
@@ -19624,10 +19526,9 @@
           <a:lstStyle/>
           <a:p>
             <a:r>
-              <a:rPr lang="en-GB" dirty="0" smtClean="0"/>
+              <a:rPr lang="en-GB" dirty="0"/>
               <a:t>Define the last element in a structure array</a:t>
             </a:r>
-            <a:endParaRPr lang="en-GB" dirty="0"/>
           </a:p>
         </p:txBody>
       </p:sp>
@@ -19869,10 +19770,9 @@
           </a:lstStyle>
           <a:p>
             <a:r>
-              <a:rPr lang="en-GB" sz="3600" dirty="0" smtClean="0"/>
+              <a:rPr lang="en-GB" sz="3600" dirty="0"/>
               <a:t>In-Place Optimisation</a:t>
             </a:r>
-            <a:endParaRPr lang="en-GB" sz="3600" dirty="0"/>
           </a:p>
         </p:txBody>
       </p:sp>
@@ -19899,7 +19799,7 @@
           <a:lstStyle/>
           <a:p>
             <a:r>
-              <a:rPr lang="en-GB" sz="2000" dirty="0" smtClean="0"/>
+              <a:rPr lang="en-GB" sz="2000" dirty="0"/>
               <a:t>In-place optimisation saves on memory by reusing an input variable for output</a:t>
             </a:r>
           </a:p>
@@ -19908,7 +19808,7 @@
           </a:p>
           <a:p>
             <a:r>
-              <a:rPr lang="en-GB" sz="2000" dirty="0" smtClean="0">
+              <a:rPr lang="en-GB" sz="2000" dirty="0">
                 <a:latin typeface="Courier New" panose="02070309020205020404" pitchFamily="49" charset="0"/>
                 <a:cs typeface="Courier New" panose="02070309020205020404" pitchFamily="49" charset="0"/>
               </a:rPr>
@@ -19921,30 +19821,23 @@
                 <a:latin typeface="Courier New" panose="02070309020205020404" pitchFamily="49" charset="0"/>
                 <a:cs typeface="Courier New" panose="02070309020205020404" pitchFamily="49" charset="0"/>
               </a:rPr>
-              <a:t>x</a:t>
-            </a:r>
-            <a:r>
-              <a:rPr lang="en-GB" sz="2000" dirty="0" smtClean="0">
-                <a:latin typeface="Courier New" panose="02070309020205020404" pitchFamily="49" charset="0"/>
-                <a:cs typeface="Courier New" panose="02070309020205020404" pitchFamily="49" charset="0"/>
-              </a:rPr>
-              <a:t> = 2*x + 3;    </a:t>
-            </a:r>
-            <a:r>
-              <a:rPr lang="en-GB" sz="2000" dirty="0" smtClean="0">
+              <a:t>x = 2*x + 3;    </a:t>
+            </a:r>
+            <a:r>
+              <a:rPr lang="en-GB" sz="2000" dirty="0">
                 <a:cs typeface="Courier New" panose="02070309020205020404" pitchFamily="49" charset="0"/>
               </a:rPr>
               <a:t>Saves memory by assigning back into variable </a:t>
             </a:r>
             <a:r>
-              <a:rPr lang="en-GB" sz="2000" dirty="0" smtClean="0">
+              <a:rPr lang="en-GB" sz="2000" dirty="0">
                 <a:latin typeface="Courier New" panose="02070309020205020404" pitchFamily="49" charset="0"/>
                 <a:cs typeface="Courier New" panose="02070309020205020404" pitchFamily="49" charset="0"/>
               </a:rPr>
               <a:t>x </a:t>
             </a:r>
             <a:r>
-              <a:rPr lang="en-GB" sz="2000" dirty="0" smtClean="0">
+              <a:rPr lang="en-GB" sz="2000" dirty="0">
                 <a:cs typeface="Courier New" panose="02070309020205020404" pitchFamily="49" charset="0"/>
               </a:rPr>
               <a:t>and 		           execution time for allocating memory</a:t>
@@ -20017,7 +19910,7 @@
           <a:lstStyle/>
           <a:p>
             <a:r>
-              <a:rPr lang="en-GB" dirty="0" smtClean="0">
+              <a:rPr lang="en-GB" dirty="0">
                 <a:latin typeface="Courier New" panose="02070309020205020404" pitchFamily="49" charset="0"/>
                 <a:cs typeface="Courier New" panose="02070309020205020404" pitchFamily="49" charset="0"/>
               </a:rPr>
@@ -20026,21 +19919,21 @@
           </a:p>
           <a:p>
             <a:r>
-              <a:rPr lang="en-GB" dirty="0" smtClean="0">
+              <a:rPr lang="en-GB" dirty="0">
                 <a:latin typeface="Courier New" panose="02070309020205020404" pitchFamily="49" charset="0"/>
                 <a:cs typeface="Courier New" panose="02070309020205020404" pitchFamily="49" charset="0"/>
               </a:rPr>
               <a:t>x = </a:t>
             </a:r>
             <a:r>
-              <a:rPr lang="en-GB" dirty="0" err="1" smtClean="0">
+              <a:rPr lang="en-GB" dirty="0" err="1">
                 <a:latin typeface="Courier New" panose="02070309020205020404" pitchFamily="49" charset="0"/>
                 <a:cs typeface="Courier New" panose="02070309020205020404" pitchFamily="49" charset="0"/>
               </a:rPr>
               <a:t>myfun</a:t>
             </a:r>
             <a:r>
-              <a:rPr lang="en-GB" dirty="0" smtClean="0">
+              <a:rPr lang="en-GB" dirty="0">
                 <a:latin typeface="Courier New" panose="02070309020205020404" pitchFamily="49" charset="0"/>
                 <a:cs typeface="Courier New" panose="02070309020205020404" pitchFamily="49" charset="0"/>
               </a:rPr>
@@ -20049,16 +19942,12 @@
           </a:p>
           <a:p>
             <a:r>
-              <a:rPr lang="en-GB" dirty="0" smtClean="0">
+              <a:rPr lang="en-GB" dirty="0">
                 <a:latin typeface="Courier New" panose="02070309020205020404" pitchFamily="49" charset="0"/>
                 <a:cs typeface="Courier New" panose="02070309020205020404" pitchFamily="49" charset="0"/>
               </a:rPr>
               <a:t>....</a:t>
             </a:r>
-            <a:endParaRPr lang="en-GB" dirty="0">
-              <a:latin typeface="Courier New" panose="02070309020205020404" pitchFamily="49" charset="0"/>
-              <a:cs typeface="Courier New" panose="02070309020205020404" pitchFamily="49" charset="0"/>
-            </a:endParaRPr>
           </a:p>
         </p:txBody>
       </p:sp>
@@ -20090,21 +19979,21 @@
           <a:lstStyle/>
           <a:p>
             <a:r>
-              <a:rPr lang="en-GB" dirty="0" smtClean="0">
+              <a:rPr lang="en-GB" dirty="0">
                 <a:latin typeface="Courier New" panose="02070309020205020404" pitchFamily="49" charset="0"/>
                 <a:cs typeface="Courier New" panose="02070309020205020404" pitchFamily="49" charset="0"/>
               </a:rPr>
               <a:t>Function y = </a:t>
             </a:r>
             <a:r>
-              <a:rPr lang="en-GB" dirty="0" err="1" smtClean="0">
+              <a:rPr lang="en-GB" dirty="0" err="1">
                 <a:latin typeface="Courier New" panose="02070309020205020404" pitchFamily="49" charset="0"/>
                 <a:cs typeface="Courier New" panose="02070309020205020404" pitchFamily="49" charset="0"/>
               </a:rPr>
               <a:t>myfun</a:t>
             </a:r>
             <a:r>
-              <a:rPr lang="en-GB" dirty="0" smtClean="0">
+              <a:rPr lang="en-GB" dirty="0">
                 <a:latin typeface="Courier New" panose="02070309020205020404" pitchFamily="49" charset="0"/>
                 <a:cs typeface="Courier New" panose="02070309020205020404" pitchFamily="49" charset="0"/>
               </a:rPr>
@@ -20113,16 +20002,12 @@
           </a:p>
           <a:p>
             <a:r>
-              <a:rPr lang="en-GB" dirty="0" smtClean="0">
+              <a:rPr lang="en-GB" dirty="0">
                 <a:latin typeface="Courier New" panose="02070309020205020404" pitchFamily="49" charset="0"/>
                 <a:cs typeface="Courier New" panose="02070309020205020404" pitchFamily="49" charset="0"/>
               </a:rPr>
               <a:t>y = 2*x + 3;</a:t>
             </a:r>
-            <a:endParaRPr lang="en-GB" dirty="0">
-              <a:latin typeface="Courier New" panose="02070309020205020404" pitchFamily="49" charset="0"/>
-              <a:cs typeface="Courier New" panose="02070309020205020404" pitchFamily="49" charset="0"/>
-            </a:endParaRPr>
           </a:p>
         </p:txBody>
       </p:sp>
@@ -20155,7 +20040,7 @@
           <a:p>
             <a:pPr algn="ctr"/>
             <a:r>
-              <a:rPr lang="en-GB" dirty="0" err="1" smtClean="0"/>
+              <a:rPr lang="en-GB" dirty="0" err="1"/>
               <a:t>myfun</a:t>
             </a:r>
             <a:endParaRPr lang="en-GB" dirty="0"/>
@@ -20185,16 +20070,12 @@
           <a:lstStyle/>
           <a:p>
             <a:r>
-              <a:rPr lang="en-GB" dirty="0" smtClean="0">
+              <a:rPr lang="en-GB" dirty="0">
                 <a:latin typeface="Courier New" panose="02070309020205020404" pitchFamily="49" charset="0"/>
                 <a:cs typeface="Courier New" panose="02070309020205020404" pitchFamily="49" charset="0"/>
               </a:rPr>
               <a:t>x</a:t>
             </a:r>
-            <a:endParaRPr lang="en-GB" dirty="0">
-              <a:latin typeface="Courier New" panose="02070309020205020404" pitchFamily="49" charset="0"/>
-              <a:cs typeface="Courier New" panose="02070309020205020404" pitchFamily="49" charset="0"/>
-            </a:endParaRPr>
           </a:p>
         </p:txBody>
       </p:sp>
@@ -20221,16 +20102,12 @@
           <a:lstStyle/>
           <a:p>
             <a:r>
-              <a:rPr lang="en-GB" dirty="0" smtClean="0">
+              <a:rPr lang="en-GB" dirty="0">
                 <a:latin typeface="Courier New" panose="02070309020205020404" pitchFamily="49" charset="0"/>
                 <a:cs typeface="Courier New" panose="02070309020205020404" pitchFamily="49" charset="0"/>
               </a:rPr>
               <a:t>y</a:t>
             </a:r>
-            <a:endParaRPr lang="en-GB" dirty="0">
-              <a:latin typeface="Courier New" panose="02070309020205020404" pitchFamily="49" charset="0"/>
-              <a:cs typeface="Courier New" panose="02070309020205020404" pitchFamily="49" charset="0"/>
-            </a:endParaRPr>
           </a:p>
         </p:txBody>
       </p:sp>
@@ -20257,10 +20134,9 @@
           <a:lstStyle/>
           <a:p>
             <a:r>
-              <a:rPr lang="en-GB" dirty="0" smtClean="0"/>
+              <a:rPr lang="en-GB" dirty="0"/>
               <a:t>Regular Function</a:t>
             </a:r>
-            <a:endParaRPr lang="en-GB" dirty="0"/>
           </a:p>
         </p:txBody>
       </p:sp>
@@ -20292,21 +20168,21 @@
           <a:lstStyle/>
           <a:p>
             <a:r>
-              <a:rPr lang="en-GB" dirty="0" smtClean="0">
+              <a:rPr lang="en-GB" dirty="0">
                 <a:latin typeface="Courier New" panose="02070309020205020404" pitchFamily="49" charset="0"/>
                 <a:cs typeface="Courier New" panose="02070309020205020404" pitchFamily="49" charset="0"/>
               </a:rPr>
               <a:t>Function x = </a:t>
             </a:r>
             <a:r>
-              <a:rPr lang="en-GB" dirty="0" err="1" smtClean="0">
+              <a:rPr lang="en-GB" dirty="0" err="1">
                 <a:latin typeface="Courier New" panose="02070309020205020404" pitchFamily="49" charset="0"/>
                 <a:cs typeface="Courier New" panose="02070309020205020404" pitchFamily="49" charset="0"/>
               </a:rPr>
               <a:t>myfun</a:t>
             </a:r>
             <a:r>
-              <a:rPr lang="en-GB" dirty="0" smtClean="0">
+              <a:rPr lang="en-GB" dirty="0">
                 <a:latin typeface="Courier New" panose="02070309020205020404" pitchFamily="49" charset="0"/>
                 <a:cs typeface="Courier New" panose="02070309020205020404" pitchFamily="49" charset="0"/>
               </a:rPr>
@@ -20315,23 +20191,19 @@
           </a:p>
           <a:p>
             <a:r>
-              <a:rPr lang="en-GB" smtClean="0">
+              <a:rPr lang="en-GB">
                 <a:latin typeface="Courier New" panose="02070309020205020404" pitchFamily="49" charset="0"/>
                 <a:cs typeface="Courier New" panose="02070309020205020404" pitchFamily="49" charset="0"/>
               </a:rPr>
               <a:t>x </a:t>
             </a:r>
             <a:r>
-              <a:rPr lang="en-GB" dirty="0" smtClean="0">
+              <a:rPr lang="en-GB" dirty="0">
                 <a:latin typeface="Courier New" panose="02070309020205020404" pitchFamily="49" charset="0"/>
                 <a:cs typeface="Courier New" panose="02070309020205020404" pitchFamily="49" charset="0"/>
               </a:rPr>
               <a:t>= 2*x + 3;</a:t>
             </a:r>
-            <a:endParaRPr lang="en-GB" dirty="0">
-              <a:latin typeface="Courier New" panose="02070309020205020404" pitchFamily="49" charset="0"/>
-              <a:cs typeface="Courier New" panose="02070309020205020404" pitchFamily="49" charset="0"/>
-            </a:endParaRPr>
           </a:p>
         </p:txBody>
       </p:sp>
@@ -20364,7 +20236,7 @@
           <a:p>
             <a:pPr algn="ctr"/>
             <a:r>
-              <a:rPr lang="en-GB" dirty="0" err="1" smtClean="0"/>
+              <a:rPr lang="en-GB" dirty="0" err="1"/>
               <a:t>myfun</a:t>
             </a:r>
             <a:endParaRPr lang="en-GB" dirty="0"/>
@@ -20394,16 +20266,12 @@
           <a:lstStyle/>
           <a:p>
             <a:r>
-              <a:rPr lang="en-GB" dirty="0" smtClean="0">
+              <a:rPr lang="en-GB" dirty="0">
                 <a:latin typeface="Courier New" panose="02070309020205020404" pitchFamily="49" charset="0"/>
                 <a:cs typeface="Courier New" panose="02070309020205020404" pitchFamily="49" charset="0"/>
               </a:rPr>
               <a:t>x</a:t>
             </a:r>
-            <a:endParaRPr lang="en-GB" dirty="0">
-              <a:latin typeface="Courier New" panose="02070309020205020404" pitchFamily="49" charset="0"/>
-              <a:cs typeface="Courier New" panose="02070309020205020404" pitchFamily="49" charset="0"/>
-            </a:endParaRPr>
           </a:p>
         </p:txBody>
       </p:sp>
@@ -20430,10 +20298,9 @@
           <a:lstStyle/>
           <a:p>
             <a:r>
-              <a:rPr lang="en-GB" dirty="0" smtClean="0"/>
+              <a:rPr lang="en-GB" dirty="0"/>
               <a:t>In-Place Optimisation</a:t>
             </a:r>
-            <a:endParaRPr lang="en-GB" dirty="0"/>
           </a:p>
         </p:txBody>
       </p:sp>
@@ -20701,10 +20568,9 @@
           <a:lstStyle/>
           <a:p>
             <a:r>
-              <a:rPr lang="en-GB" sz="2400" dirty="0" smtClean="0"/>
+              <a:rPr lang="en-GB" sz="2400" dirty="0"/>
               <a:t>Functions</a:t>
             </a:r>
-            <a:endParaRPr lang="en-GB" sz="2400" dirty="0"/>
           </a:p>
         </p:txBody>
       </p:sp>
@@ -21336,10 +21202,9 @@
           <a:lstStyle/>
           <a:p>
             <a:r>
-              <a:rPr lang="en-GB" dirty="0" smtClean="0"/>
+              <a:rPr lang="en-GB" dirty="0"/>
               <a:t>Before you leave, please complete the online course evaluation</a:t>
             </a:r>
-            <a:endParaRPr lang="en-GB" dirty="0"/>
           </a:p>
         </p:txBody>
       </p:sp>
@@ -21423,27 +21288,18 @@
               <a:t>Input the course date as </a:t>
             </a:r>
             <a:r>
-              <a:rPr lang="en-GB" sz="3600" dirty="0" smtClean="0">
+              <a:rPr lang="en-GB" sz="3600" dirty="0">
                 <a:solidFill>
                   <a:srgbClr val="FF0000"/>
                 </a:solidFill>
               </a:rPr>
               <a:t>23/05/2019</a:t>
             </a:r>
-            <a:endParaRPr lang="en-GB" sz="3600" dirty="0">
-              <a:solidFill>
-                <a:srgbClr val="FF0000"/>
-              </a:solidFill>
-            </a:endParaRPr>
           </a:p>
           <a:p>
             <a:r>
               <a:rPr lang="en-GB" sz="3600" dirty="0"/>
-              <a:t>Input the course code as </a:t>
-            </a:r>
-            <a:r>
-              <a:rPr lang="en-GB" sz="3600" dirty="0" smtClean="0"/>
-              <a:t>GSTML3</a:t>
+              <a:t>Input the course code as GSTML3</a:t>
             </a:r>
           </a:p>
           <a:p>
@@ -21465,13 +21321,6 @@
   <p:clrMapOvr>
     <a:masterClrMapping/>
   </p:clrMapOvr>
-  <p:timing>
-    <p:tnLst>
-      <p:par>
-        <p:cTn id="1" dur="indefinite" restart="never" nodeType="tmRoot"/>
-      </p:par>
-    </p:tnLst>
-  </p:timing>
 </p:sld>
 </file>
 
@@ -21511,7 +21360,7 @@
               <a:defRPr/>
             </a:pPr>
             <a:r>
-              <a:rPr lang="en-US" altLang="en-US" smtClean="0"/>
+              <a:rPr lang="en-US" altLang="en-US"/>
               <a:t>14/11/2016</a:t>
             </a:r>
             <a:endParaRPr lang="en-US" altLang="en-US" sz="900"/>
@@ -21537,18 +21386,13 @@
               <a:defRPr/>
             </a:pPr>
             <a:r>
-              <a:rPr lang="en-US" altLang="en-US" smtClean="0">
+              <a:rPr lang="en-US" altLang="en-US">
                 <a:solidFill>
                   <a:srgbClr val="808080"/>
                 </a:solidFill>
               </a:rPr>
               <a:t>Coding Masterclass</a:t>
             </a:r>
-            <a:endParaRPr lang="en-US" altLang="en-US">
-              <a:solidFill>
-                <a:srgbClr val="808080"/>
-              </a:solidFill>
-            </a:endParaRPr>
           </a:p>
         </p:txBody>
       </p:sp>
@@ -21612,18 +21456,13 @@
           <a:lstStyle/>
           <a:p>
             <a:r>
-              <a:rPr lang="en-GB" sz="2400" dirty="0" smtClean="0">
+              <a:rPr lang="en-GB" sz="2400" dirty="0">
                 <a:solidFill>
                   <a:schemeClr val="bg1"/>
                 </a:solidFill>
               </a:rPr>
               <a:t>It’s all gone horribly wrong!</a:t>
             </a:r>
-            <a:endParaRPr lang="en-GB" sz="2400" dirty="0">
-              <a:solidFill>
-                <a:schemeClr val="bg1"/>
-              </a:solidFill>
-            </a:endParaRPr>
           </a:p>
         </p:txBody>
       </p:sp>
@@ -22850,10 +22689,9 @@
           <a:lstStyle/>
           <a:p>
             <a:r>
-              <a:rPr lang="en-GB" dirty="0" smtClean="0"/>
+              <a:rPr lang="en-GB" dirty="0"/>
               <a:t>1</a:t>
             </a:r>
-            <a:endParaRPr lang="en-GB" dirty="0"/>
           </a:p>
         </p:txBody>
       </p:sp>
@@ -22909,10 +22747,9 @@
           <a:lstStyle/>
           <a:p>
             <a:r>
-              <a:rPr lang="en-GB" dirty="0" smtClean="0"/>
+              <a:rPr lang="en-GB" dirty="0"/>
               <a:t>3</a:t>
             </a:r>
-            <a:endParaRPr lang="en-GB" dirty="0"/>
           </a:p>
         </p:txBody>
       </p:sp>
@@ -23113,10 +22950,9 @@
           <a:lstStyle/>
           <a:p>
             <a:r>
-              <a:rPr lang="en-GB" dirty="0" smtClean="0"/>
+              <a:rPr lang="en-GB" dirty="0"/>
               <a:t>10</a:t>
             </a:r>
-            <a:endParaRPr lang="en-GB" dirty="0"/>
           </a:p>
         </p:txBody>
       </p:sp>
@@ -23143,10 +22979,9 @@
           <a:lstStyle/>
           <a:p>
             <a:r>
-              <a:rPr lang="en-GB" dirty="0" smtClean="0"/>
+              <a:rPr lang="en-GB" dirty="0"/>
               <a:t>T1</a:t>
             </a:r>
-            <a:endParaRPr lang="en-GB" dirty="0"/>
           </a:p>
         </p:txBody>
       </p:sp>
@@ -23173,10 +23008,9 @@
           <a:lstStyle/>
           <a:p>
             <a:r>
-              <a:rPr lang="en-GB" dirty="0" smtClean="0"/>
+              <a:rPr lang="en-GB" dirty="0"/>
               <a:t>T2</a:t>
             </a:r>
-            <a:endParaRPr lang="en-GB" dirty="0"/>
           </a:p>
         </p:txBody>
       </p:sp>
@@ -23203,10 +23037,9 @@
           <a:lstStyle/>
           <a:p>
             <a:r>
-              <a:rPr lang="en-GB" dirty="0" smtClean="0"/>
+              <a:rPr lang="en-GB" dirty="0"/>
               <a:t>Trunk</a:t>
             </a:r>
-            <a:endParaRPr lang="en-GB" dirty="0"/>
           </a:p>
         </p:txBody>
       </p:sp>
@@ -23233,10 +23066,9 @@
           <a:lstStyle/>
           <a:p>
             <a:r>
-              <a:rPr lang="en-GB" dirty="0" smtClean="0"/>
+              <a:rPr lang="en-GB" dirty="0"/>
               <a:t>Branch</a:t>
             </a:r>
-            <a:endParaRPr lang="en-GB" dirty="0"/>
           </a:p>
         </p:txBody>
       </p:sp>
@@ -23263,10 +23095,9 @@
           <a:lstStyle/>
           <a:p>
             <a:r>
-              <a:rPr lang="en-GB" dirty="0" smtClean="0"/>
+              <a:rPr lang="en-GB" dirty="0"/>
               <a:t>Tag</a:t>
             </a:r>
-            <a:endParaRPr lang="en-GB" dirty="0"/>
           </a:p>
         </p:txBody>
       </p:sp>
@@ -23293,10 +23124,9 @@
           <a:lstStyle/>
           <a:p>
             <a:r>
-              <a:rPr lang="en-GB" dirty="0" smtClean="0"/>
+              <a:rPr lang="en-GB" dirty="0"/>
               <a:t>Discontinued branch</a:t>
             </a:r>
-            <a:endParaRPr lang="en-GB" dirty="0"/>
           </a:p>
         </p:txBody>
       </p:sp>
@@ -23323,10 +23153,9 @@
           <a:lstStyle/>
           <a:p>
             <a:r>
-              <a:rPr lang="en-GB" dirty="0" smtClean="0"/>
+              <a:rPr lang="en-GB" dirty="0"/>
               <a:t>Tags can correspond to code producing results for research papers</a:t>
             </a:r>
-            <a:endParaRPr lang="en-GB" dirty="0"/>
           </a:p>
         </p:txBody>
       </p:sp>
@@ -23369,10 +23198,9 @@
           </a:lstStyle>
           <a:p>
             <a:r>
-              <a:rPr lang="en-GB" sz="3600" dirty="0" smtClean="0"/>
+              <a:rPr lang="en-GB" sz="3600" dirty="0"/>
               <a:t>Git Workflow</a:t>
             </a:r>
-            <a:endParaRPr lang="en-GB" sz="3600" dirty="0"/>
           </a:p>
         </p:txBody>
       </p:sp>
@@ -23386,13 +23214,6 @@
   <p:clrMapOvr>
     <a:masterClrMapping/>
   </p:clrMapOvr>
-  <p:timing>
-    <p:tnLst>
-      <p:par>
-        <p:cTn id="1" dur="indefinite" restart="never" nodeType="tmRoot"/>
-      </p:par>
-    </p:tnLst>
-  </p:timing>
 </p:sld>
 </file>
 
@@ -23518,10 +23339,9 @@
           </a:lstStyle>
           <a:p>
             <a:r>
-              <a:rPr lang="en-GB" sz="3600" dirty="0" smtClean="0"/>
+              <a:rPr lang="en-GB" sz="3600" dirty="0"/>
               <a:t>Git Workflow</a:t>
             </a:r>
-            <a:endParaRPr lang="en-GB" sz="3600" dirty="0"/>
           </a:p>
         </p:txBody>
       </p:sp>
@@ -23548,10 +23368,9 @@
           <a:lstStyle/>
           <a:p>
             <a:r>
-              <a:rPr lang="en-GB" sz="2800" dirty="0" smtClean="0"/>
+              <a:rPr lang="en-GB" sz="2800" dirty="0"/>
               <a:t>GitHub</a:t>
             </a:r>
-            <a:endParaRPr lang="en-GB" sz="2800" dirty="0"/>
           </a:p>
         </p:txBody>
       </p:sp>
@@ -23747,14 +23566,11 @@
           <a:p>
             <a:pPr algn="ctr"/>
             <a:r>
-              <a:rPr lang="en-GB" dirty="0" smtClean="0">
+              <a:rPr lang="en-GB" dirty="0">
                 <a:latin typeface="Calibri" panose="020F0502020204030204" pitchFamily="34" charset="0"/>
               </a:rPr>
               <a:t>Clone Course Materials</a:t>
             </a:r>
-            <a:endParaRPr lang="en-GB" dirty="0">
-              <a:latin typeface="Calibri" panose="020F0502020204030204" pitchFamily="34" charset="0"/>
-            </a:endParaRPr>
           </a:p>
         </p:txBody>
       </p:sp>
@@ -23808,24 +23624,24 @@
               <a:buChar char="•"/>
             </a:pPr>
             <a:r>
-              <a:rPr lang="en-GB" sz="2400" dirty="0" err="1" smtClean="0"/>
+              <a:rPr lang="en-GB" sz="2400" dirty="0" err="1"/>
               <a:t>louisepb</a:t>
             </a:r>
             <a:r>
-              <a:rPr lang="en-GB" sz="2400" dirty="0" smtClean="0"/>
+              <a:rPr lang="en-GB" sz="2400" dirty="0"/>
               <a:t>/</a:t>
             </a:r>
             <a:r>
-              <a:rPr lang="en-GB" sz="2400" dirty="0" err="1" smtClean="0"/>
+              <a:rPr lang="en-GB" sz="2400" dirty="0" err="1"/>
               <a:t>Nottingham_Workshop</a:t>
             </a:r>
             <a:r>
-              <a:rPr lang="en-GB" sz="2400" dirty="0" smtClean="0"/>
+              <a:rPr lang="en-GB" sz="2400" dirty="0"/>
               <a:t>  on GitHub</a:t>
             </a:r>
           </a:p>
           <a:p>
-            <a:endParaRPr lang="en-GB" sz="2400" dirty="0" smtClean="0"/>
+            <a:endParaRPr lang="en-GB" sz="2400" dirty="0"/>
           </a:p>
           <a:p>
             <a:pPr marL="342900" indent="-342900">
@@ -23833,18 +23649,17 @@
               <a:buChar char="•"/>
             </a:pPr>
             <a:r>
-              <a:rPr lang="en-GB" sz="2400" dirty="0" smtClean="0"/>
+              <a:rPr lang="en-GB" sz="2400" dirty="0"/>
               <a:t>Clone the repo into </a:t>
             </a:r>
             <a:r>
-              <a:rPr lang="en-GB" sz="2400" dirty="0" err="1" smtClean="0"/>
+              <a:rPr lang="en-GB" sz="2400" dirty="0" err="1"/>
               <a:t>BootCampFiles</a:t>
             </a:r>
             <a:r>
-              <a:rPr lang="en-GB" sz="2400" dirty="0" smtClean="0"/>
+              <a:rPr lang="en-GB" sz="2400" dirty="0"/>
               <a:t> folder</a:t>
             </a:r>
-            <a:endParaRPr lang="en-GB" sz="2400" dirty="0"/>
           </a:p>
           <a:p>
             <a:endParaRPr lang="en-GB" sz="2400" dirty="0"/>
@@ -23860,11 +23675,7 @@
             </a:r>
             <a:r>
               <a:rPr lang="en-GB" sz="2400" dirty="0" err="1"/>
-              <a:t>s</a:t>
-            </a:r>
-            <a:r>
-              <a:rPr lang="en-GB" sz="2400" dirty="0" err="1" smtClean="0"/>
-              <a:t>etupPath.m</a:t>
+              <a:t>setupPath.m</a:t>
             </a:r>
             <a:endParaRPr lang="en-GB" sz="2400" dirty="0"/>
           </a:p>
@@ -23880,13 +23691,6 @@
   <p:clrMapOvr>
     <a:masterClrMapping/>
   </p:clrMapOvr>
-  <p:timing>
-    <p:tnLst>
-      <p:par>
-        <p:cTn id="1" dur="indefinite" restart="never" nodeType="tmRoot"/>
-      </p:par>
-    </p:tnLst>
-  </p:timing>
 </p:sld>
 </file>
 
@@ -23967,7 +23771,7 @@
           <p:cNvPr id="9" name="Picture 8">
             <a:extLst>
               <a:ext uri="{FF2B5EF4-FFF2-40B4-BE49-F238E27FC236}">
-                <a16:creationId xmlns:a16="http://schemas.microsoft.com/office/drawing/2014/main" xmlns="" id="{63F0EBBF-9B28-9F49-888B-326C203D95EB}"/>
+                <a16:creationId xmlns:a16="http://schemas.microsoft.com/office/drawing/2014/main" id="{63F0EBBF-9B28-9F49-888B-326C203D95EB}"/>
               </a:ext>
             </a:extLst>
           </p:cNvPr>
@@ -24008,13 +23812,6 @@
   <p:clrMapOvr>
     <a:masterClrMapping/>
   </p:clrMapOvr>
-  <p:timing>
-    <p:tnLst>
-      <p:par>
-        <p:cTn id="1" dur="indefinite" restart="never" nodeType="tmRoot"/>
-      </p:par>
-    </p:tnLst>
-  </p:timing>
 </p:sld>
 </file>
 
@@ -24040,7 +23837,7 @@
           <p:cNvPr id="2" name="Title 1">
             <a:extLst>
               <a:ext uri="{FF2B5EF4-FFF2-40B4-BE49-F238E27FC236}">
-                <a16:creationId xmlns:a16="http://schemas.microsoft.com/office/drawing/2014/main" xmlns="" id="{7F265545-9C47-264F-AEB2-F3B7F412195B}"/>
+                <a16:creationId xmlns:a16="http://schemas.microsoft.com/office/drawing/2014/main" id="{7F265545-9C47-264F-AEB2-F3B7F412195B}"/>
               </a:ext>
             </a:extLst>
           </p:cNvPr>
@@ -24073,7 +23870,7 @@
           <p:cNvPr id="5" name="Content Placeholder 4">
             <a:extLst>
               <a:ext uri="{FF2B5EF4-FFF2-40B4-BE49-F238E27FC236}">
-                <a16:creationId xmlns:a16="http://schemas.microsoft.com/office/drawing/2014/main" xmlns="" id="{23782A0C-2CE7-C648-A15B-B1069B93347B}"/>
+                <a16:creationId xmlns:a16="http://schemas.microsoft.com/office/drawing/2014/main" id="{23782A0C-2CE7-C648-A15B-B1069B93347B}"/>
               </a:ext>
             </a:extLst>
           </p:cNvPr>
@@ -24108,7 +23905,7 @@
           <p:cNvPr id="7" name="Picture 6">
             <a:extLst>
               <a:ext uri="{FF2B5EF4-FFF2-40B4-BE49-F238E27FC236}">
-                <a16:creationId xmlns:a16="http://schemas.microsoft.com/office/drawing/2014/main" xmlns="" id="{EE9A639F-B246-F041-AD8F-A05E4F108EBE}"/>
+                <a16:creationId xmlns:a16="http://schemas.microsoft.com/office/drawing/2014/main" id="{EE9A639F-B246-F041-AD8F-A05E4F108EBE}"/>
               </a:ext>
             </a:extLst>
           </p:cNvPr>
@@ -24144,7 +23941,7 @@
           <p:cNvPr id="8" name="TextBox 7">
             <a:extLst>
               <a:ext uri="{FF2B5EF4-FFF2-40B4-BE49-F238E27FC236}">
-                <a16:creationId xmlns:a16="http://schemas.microsoft.com/office/drawing/2014/main" xmlns="" id="{4BADE409-24C2-D84F-AE34-BE29E9A971E0}"/>
+                <a16:creationId xmlns:a16="http://schemas.microsoft.com/office/drawing/2014/main" id="{4BADE409-24C2-D84F-AE34-BE29E9A971E0}"/>
               </a:ext>
             </a:extLst>
           </p:cNvPr>
@@ -24190,13 +23987,6 @@
   <p:clrMapOvr>
     <a:masterClrMapping/>
   </p:clrMapOvr>
-  <p:timing>
-    <p:tnLst>
-      <p:par>
-        <p:cTn id="1" dur="indefinite" restart="never" nodeType="tmRoot"/>
-      </p:par>
-    </p:tnLst>
-  </p:timing>
 </p:sld>
 </file>
 
@@ -24222,7 +24012,7 @@
           <p:cNvPr id="2" name="Title 1">
             <a:extLst>
               <a:ext uri="{FF2B5EF4-FFF2-40B4-BE49-F238E27FC236}">
-                <a16:creationId xmlns:a16="http://schemas.microsoft.com/office/drawing/2014/main" xmlns="" id="{7F265545-9C47-264F-AEB2-F3B7F412195B}"/>
+                <a16:creationId xmlns:a16="http://schemas.microsoft.com/office/drawing/2014/main" id="{7F265545-9C47-264F-AEB2-F3B7F412195B}"/>
               </a:ext>
             </a:extLst>
           </p:cNvPr>
@@ -24255,7 +24045,7 @@
           <p:cNvPr id="9" name="Content Placeholder 8">
             <a:extLst>
               <a:ext uri="{FF2B5EF4-FFF2-40B4-BE49-F238E27FC236}">
-                <a16:creationId xmlns:a16="http://schemas.microsoft.com/office/drawing/2014/main" xmlns="" id="{76E309AD-3163-EB4C-857E-33FA9FE76127}"/>
+                <a16:creationId xmlns:a16="http://schemas.microsoft.com/office/drawing/2014/main" id="{76E309AD-3163-EB4C-857E-33FA9FE76127}"/>
               </a:ext>
             </a:extLst>
           </p:cNvPr>
@@ -24290,7 +24080,7 @@
           <p:cNvPr id="8" name="TextBox 7">
             <a:extLst>
               <a:ext uri="{FF2B5EF4-FFF2-40B4-BE49-F238E27FC236}">
-                <a16:creationId xmlns:a16="http://schemas.microsoft.com/office/drawing/2014/main" xmlns="" id="{4BADE409-24C2-D84F-AE34-BE29E9A971E0}"/>
+                <a16:creationId xmlns:a16="http://schemas.microsoft.com/office/drawing/2014/main" id="{4BADE409-24C2-D84F-AE34-BE29E9A971E0}"/>
               </a:ext>
             </a:extLst>
           </p:cNvPr>
@@ -24423,13 +24213,6 @@
   <p:clrMapOvr>
     <a:masterClrMapping/>
   </p:clrMapOvr>
-  <p:timing>
-    <p:tnLst>
-      <p:par>
-        <p:cTn id="1" dur="indefinite" restart="never" nodeType="tmRoot"/>
-      </p:par>
-    </p:tnLst>
-  </p:timing>
 </p:sld>
 </file>
 
@@ -24455,7 +24238,7 @@
           <p:cNvPr id="2" name="Title 1">
             <a:extLst>
               <a:ext uri="{FF2B5EF4-FFF2-40B4-BE49-F238E27FC236}">
-                <a16:creationId xmlns:a16="http://schemas.microsoft.com/office/drawing/2014/main" xmlns="" id="{7F265545-9C47-264F-AEB2-F3B7F412195B}"/>
+                <a16:creationId xmlns:a16="http://schemas.microsoft.com/office/drawing/2014/main" id="{7F265545-9C47-264F-AEB2-F3B7F412195B}"/>
               </a:ext>
             </a:extLst>
           </p:cNvPr>
@@ -24488,7 +24271,7 @@
           <p:cNvPr id="10" name="Content Placeholder 9">
             <a:extLst>
               <a:ext uri="{FF2B5EF4-FFF2-40B4-BE49-F238E27FC236}">
-                <a16:creationId xmlns:a16="http://schemas.microsoft.com/office/drawing/2014/main" xmlns="" id="{C900B298-4356-FC4D-923D-15B39FE9BE45}"/>
+                <a16:creationId xmlns:a16="http://schemas.microsoft.com/office/drawing/2014/main" id="{C900B298-4356-FC4D-923D-15B39FE9BE45}"/>
               </a:ext>
             </a:extLst>
           </p:cNvPr>
@@ -24523,7 +24306,7 @@
           <p:cNvPr id="8" name="TextBox 7">
             <a:extLst>
               <a:ext uri="{FF2B5EF4-FFF2-40B4-BE49-F238E27FC236}">
-                <a16:creationId xmlns:a16="http://schemas.microsoft.com/office/drawing/2014/main" xmlns="" id="{4BADE409-24C2-D84F-AE34-BE29E9A971E0}"/>
+                <a16:creationId xmlns:a16="http://schemas.microsoft.com/office/drawing/2014/main" id="{4BADE409-24C2-D84F-AE34-BE29E9A971E0}"/>
               </a:ext>
             </a:extLst>
           </p:cNvPr>
@@ -24710,24 +24493,17 @@
                 <a:latin typeface="Consolas" panose="020B0609020204030204" pitchFamily="49" charset="0"/>
                 <a:cs typeface="Consolas" panose="020B0609020204030204" pitchFamily="49" charset="0"/>
               </a:rPr>
-              <a:t>f</a:t>
-            </a:r>
-            <a:r>
-              <a:rPr lang="en-US" sz="1600" dirty="0" err="1" smtClean="0">
-                <a:latin typeface="Consolas" panose="020B0609020204030204" pitchFamily="49" charset="0"/>
-                <a:cs typeface="Consolas" panose="020B0609020204030204" pitchFamily="49" charset="0"/>
-              </a:rPr>
-              <a:t>close</a:t>
-            </a:r>
-            <a:r>
-              <a:rPr lang="en-US" sz="1600" dirty="0" smtClean="0">
+              <a:t>fclose</a:t>
+            </a:r>
+            <a:r>
+              <a:rPr lang="en-US" sz="1600" dirty="0">
                 <a:latin typeface="Consolas" panose="020B0609020204030204" pitchFamily="49" charset="0"/>
                 <a:cs typeface="Consolas" panose="020B0609020204030204" pitchFamily="49" charset="0"/>
               </a:rPr>
               <a:t>(</a:t>
             </a:r>
             <a:r>
-              <a:rPr lang="en-US" sz="1600" dirty="0" err="1" smtClean="0">
+              <a:rPr lang="en-US" sz="1600" dirty="0" err="1">
                 <a:latin typeface="Consolas" panose="020B0609020204030204" pitchFamily="49" charset="0"/>
                 <a:cs typeface="Consolas" panose="020B0609020204030204" pitchFamily="49" charset="0"/>
               </a:rPr>
@@ -24753,13 +24529,6 @@
   <p:clrMapOvr>
     <a:masterClrMapping/>
   </p:clrMapOvr>
-  <p:timing>
-    <p:tnLst>
-      <p:par>
-        <p:cTn id="1" dur="indefinite" restart="never" nodeType="tmRoot"/>
-      </p:par>
-    </p:tnLst>
-  </p:timing>
 </p:sld>
 </file>
 

</xml_diff>

<commit_message>
Added Chapter 0 - Matlab and git
</commit_message>
<xml_diff>
--- a/InstructorMaterials/Best Practices for Software Development using MATLAB.pptx
+++ b/InstructorMaterials/Best Practices for Software Development using MATLAB.pptx
@@ -222,7 +222,7 @@
           <a:p>
             <a:fld id="{6C06565E-6C9B-4A06-A09A-D231B01EEF1C}" type="datetimeFigureOut">
               <a:rPr lang="en-GB" smtClean="0"/>
-              <a:t>23/05/2022</a:t>
+              <a:t>27/05/2022</a:t>
             </a:fld>
             <a:endParaRPr lang="en-GB"/>
           </a:p>
@@ -1406,7 +1406,7 @@
           <a:p>
             <a:fld id="{F4D14FF6-3E0D-407D-982E-9B686EE47223}" type="datetimeFigureOut">
               <a:rPr lang="en-GB" smtClean="0"/>
-              <a:t>23/05/2022</a:t>
+              <a:t>27/05/2022</a:t>
             </a:fld>
             <a:endParaRPr lang="en-GB"/>
           </a:p>
@@ -1576,7 +1576,7 @@
           <a:p>
             <a:fld id="{F4D14FF6-3E0D-407D-982E-9B686EE47223}" type="datetimeFigureOut">
               <a:rPr lang="en-GB" smtClean="0"/>
-              <a:t>23/05/2022</a:t>
+              <a:t>27/05/2022</a:t>
             </a:fld>
             <a:endParaRPr lang="en-GB"/>
           </a:p>
@@ -1756,7 +1756,7 @@
           <a:p>
             <a:fld id="{F4D14FF6-3E0D-407D-982E-9B686EE47223}" type="datetimeFigureOut">
               <a:rPr lang="en-GB" smtClean="0"/>
-              <a:t>23/05/2022</a:t>
+              <a:t>27/05/2022</a:t>
             </a:fld>
             <a:endParaRPr lang="en-GB"/>
           </a:p>
@@ -2285,7 +2285,7 @@
                 </a:solidFill>
               </a:rPr>
               <a:pPr/>
-              <a:t>23/05/2022</a:t>
+              <a:t>27/05/2022</a:t>
             </a:fld>
             <a:endParaRPr lang="en-GB">
               <a:solidFill>
@@ -2487,7 +2487,7 @@
                 </a:solidFill>
               </a:rPr>
               <a:pPr/>
-              <a:t>23/05/2022</a:t>
+              <a:t>27/05/2022</a:t>
             </a:fld>
             <a:endParaRPr lang="en-GB">
               <a:solidFill>
@@ -2765,7 +2765,7 @@
                 </a:solidFill>
               </a:rPr>
               <a:pPr/>
-              <a:t>23/05/2022</a:t>
+              <a:t>27/05/2022</a:t>
             </a:fld>
             <a:endParaRPr lang="en-GB">
               <a:solidFill>
@@ -3085,7 +3085,7 @@
                 </a:solidFill>
               </a:rPr>
               <a:pPr/>
-              <a:t>23/05/2022</a:t>
+              <a:t>27/05/2022</a:t>
             </a:fld>
             <a:endParaRPr lang="en-GB">
               <a:solidFill>
@@ -3539,7 +3539,7 @@
                 </a:solidFill>
               </a:rPr>
               <a:pPr/>
-              <a:t>23/05/2022</a:t>
+              <a:t>27/05/2022</a:t>
             </a:fld>
             <a:endParaRPr lang="en-GB">
               <a:solidFill>
@@ -3689,7 +3689,7 @@
                 </a:solidFill>
               </a:rPr>
               <a:pPr/>
-              <a:t>23/05/2022</a:t>
+              <a:t>27/05/2022</a:t>
             </a:fld>
             <a:endParaRPr lang="en-GB">
               <a:solidFill>
@@ -3884,7 +3884,7 @@
           <a:p>
             <a:fld id="{F4D14FF6-3E0D-407D-982E-9B686EE47223}" type="datetimeFigureOut">
               <a:rPr lang="en-GB" smtClean="0"/>
-              <a:t>23/05/2022</a:t>
+              <a:t>27/05/2022</a:t>
             </a:fld>
             <a:endParaRPr lang="en-GB"/>
           </a:p>
@@ -3986,7 +3986,7 @@
                 </a:solidFill>
               </a:rPr>
               <a:pPr/>
-              <a:t>23/05/2022</a:t>
+              <a:t>27/05/2022</a:t>
             </a:fld>
             <a:endParaRPr lang="en-GB">
               <a:solidFill>
@@ -4295,7 +4295,7 @@
                 </a:solidFill>
               </a:rPr>
               <a:pPr/>
-              <a:t>23/05/2022</a:t>
+              <a:t>27/05/2022</a:t>
             </a:fld>
             <a:endParaRPr lang="en-GB">
               <a:solidFill>
@@ -4580,7 +4580,7 @@
                 </a:solidFill>
               </a:rPr>
               <a:pPr/>
-              <a:t>23/05/2022</a:t>
+              <a:t>27/05/2022</a:t>
             </a:fld>
             <a:endParaRPr lang="en-GB">
               <a:solidFill>
@@ -4782,7 +4782,7 @@
                 </a:solidFill>
               </a:rPr>
               <a:pPr/>
-              <a:t>23/05/2022</a:t>
+              <a:t>27/05/2022</a:t>
             </a:fld>
             <a:endParaRPr lang="en-GB">
               <a:solidFill>
@@ -4994,7 +4994,7 @@
                 </a:solidFill>
               </a:rPr>
               <a:pPr/>
-              <a:t>23/05/2022</a:t>
+              <a:t>27/05/2022</a:t>
             </a:fld>
             <a:endParaRPr lang="en-GB">
               <a:solidFill>
@@ -6129,7 +6129,7 @@
           <a:p>
             <a:fld id="{F4D14FF6-3E0D-407D-982E-9B686EE47223}" type="datetimeFigureOut">
               <a:rPr lang="en-GB" smtClean="0"/>
-              <a:t>23/05/2022</a:t>
+              <a:t>27/05/2022</a:t>
             </a:fld>
             <a:endParaRPr lang="en-GB"/>
           </a:p>
@@ -7552,7 +7552,7 @@
                 </a:solidFill>
               </a:rPr>
               <a:pPr defTabSz="342900"/>
-              <a:t>23/05/2022</a:t>
+              <a:t>27/05/2022</a:t>
             </a:fld>
             <a:endParaRPr lang="en-GB">
               <a:solidFill>
@@ -7827,7 +7827,7 @@
           <a:p>
             <a:fld id="{F4D14FF6-3E0D-407D-982E-9B686EE47223}" type="datetimeFigureOut">
               <a:rPr lang="en-GB" smtClean="0"/>
-              <a:t>23/05/2022</a:t>
+              <a:t>27/05/2022</a:t>
             </a:fld>
             <a:endParaRPr lang="en-GB"/>
           </a:p>
@@ -8194,7 +8194,7 @@
           <a:p>
             <a:fld id="{F4D14FF6-3E0D-407D-982E-9B686EE47223}" type="datetimeFigureOut">
               <a:rPr lang="en-GB" smtClean="0"/>
-              <a:t>23/05/2022</a:t>
+              <a:t>27/05/2022</a:t>
             </a:fld>
             <a:endParaRPr lang="en-GB"/>
           </a:p>
@@ -8312,7 +8312,7 @@
           <a:p>
             <a:fld id="{F4D14FF6-3E0D-407D-982E-9B686EE47223}" type="datetimeFigureOut">
               <a:rPr lang="en-GB" smtClean="0"/>
-              <a:t>23/05/2022</a:t>
+              <a:t>27/05/2022</a:t>
             </a:fld>
             <a:endParaRPr lang="en-GB"/>
           </a:p>
@@ -8407,7 +8407,7 @@
           <a:p>
             <a:fld id="{F4D14FF6-3E0D-407D-982E-9B686EE47223}" type="datetimeFigureOut">
               <a:rPr lang="en-GB" smtClean="0"/>
-              <a:t>23/05/2022</a:t>
+              <a:t>27/05/2022</a:t>
             </a:fld>
             <a:endParaRPr lang="en-GB"/>
           </a:p>
@@ -8684,7 +8684,7 @@
           <a:p>
             <a:fld id="{F4D14FF6-3E0D-407D-982E-9B686EE47223}" type="datetimeFigureOut">
               <a:rPr lang="en-GB" smtClean="0"/>
-              <a:t>23/05/2022</a:t>
+              <a:t>27/05/2022</a:t>
             </a:fld>
             <a:endParaRPr lang="en-GB"/>
           </a:p>
@@ -8941,7 +8941,7 @@
           <a:p>
             <a:fld id="{F4D14FF6-3E0D-407D-982E-9B686EE47223}" type="datetimeFigureOut">
               <a:rPr lang="en-GB" smtClean="0"/>
-              <a:t>23/05/2022</a:t>
+              <a:t>27/05/2022</a:t>
             </a:fld>
             <a:endParaRPr lang="en-GB"/>
           </a:p>
@@ -9154,7 +9154,7 @@
           <a:p>
             <a:fld id="{F4D14FF6-3E0D-407D-982E-9B686EE47223}" type="datetimeFigureOut">
               <a:rPr lang="en-GB" smtClean="0"/>
-              <a:t>23/05/2022</a:t>
+              <a:t>27/05/2022</a:t>
             </a:fld>
             <a:endParaRPr lang="en-GB"/>
           </a:p>
@@ -9703,7 +9703,7 @@
                 </a:solidFill>
               </a:rPr>
               <a:pPr/>
-              <a:t>23/05/2022</a:t>
+              <a:t>27/05/2022</a:t>
             </a:fld>
             <a:endParaRPr lang="en-GB">
               <a:solidFill>
@@ -23407,6 +23407,131 @@
           </a:fontRef>
         </p:style>
       </p:cxnSp>
+      <p:sp>
+        <p:nvSpPr>
+          <p:cNvPr id="6" name="TextBox 5">
+            <a:extLst>
+              <a:ext uri="{FF2B5EF4-FFF2-40B4-BE49-F238E27FC236}">
+                <a16:creationId xmlns:a16="http://schemas.microsoft.com/office/drawing/2014/main" id="{1084895B-A6D2-84E7-5CC0-6E50CEBB0691}"/>
+              </a:ext>
+            </a:extLst>
+          </p:cNvPr>
+          <p:cNvSpPr txBox="1"/>
+          <p:nvPr/>
+        </p:nvSpPr>
+        <p:spPr>
+          <a:xfrm>
+            <a:off x="457200" y="5527343"/>
+            <a:ext cx="7871943" cy="1323439"/>
+          </a:xfrm>
+          <a:prstGeom prst="rect">
+            <a:avLst/>
+          </a:prstGeom>
+          <a:noFill/>
+        </p:spPr>
+        <p:txBody>
+          <a:bodyPr wrap="square" rtlCol="0">
+            <a:spAutoFit/>
+          </a:bodyPr>
+          <a:lstStyle/>
+          <a:p>
+            <a:r>
+              <a:rPr lang="en-GB" sz="2000" dirty="0"/>
+              <a:t>Use </a:t>
+            </a:r>
+            <a:r>
+              <a:rPr lang="en-GB" sz="2000"/>
+              <a:t>git in MATLAB: </a:t>
+            </a:r>
+            <a:r>
+              <a:rPr lang="en-GB" sz="2000">
+                <a:hlinkClick r:id="rId3"/>
+              </a:rPr>
+              <a:t>https://uk.mathworks.com/help/matlab/matlab_prog/use-git-in-matlab.html</a:t>
+            </a:r>
+            <a:endParaRPr lang="en-GB" sz="2000"/>
+          </a:p>
+          <a:p>
+            <a:endParaRPr lang="en-GB" sz="2000"/>
+          </a:p>
+        </p:txBody>
+      </p:sp>
+      <p:sp>
+        <p:nvSpPr>
+          <p:cNvPr id="8" name="TextBox 7">
+            <a:extLst>
+              <a:ext uri="{FF2B5EF4-FFF2-40B4-BE49-F238E27FC236}">
+                <a16:creationId xmlns:a16="http://schemas.microsoft.com/office/drawing/2014/main" id="{A65A539E-F7D3-3102-CD63-517A938B9E00}"/>
+              </a:ext>
+            </a:extLst>
+          </p:cNvPr>
+          <p:cNvSpPr txBox="1"/>
+          <p:nvPr/>
+        </p:nvSpPr>
+        <p:spPr>
+          <a:xfrm>
+            <a:off x="150124" y="1623599"/>
+            <a:ext cx="2115403" cy="369332"/>
+          </a:xfrm>
+          <a:prstGeom prst="rect">
+            <a:avLst/>
+          </a:prstGeom>
+          <a:noFill/>
+        </p:spPr>
+        <p:txBody>
+          <a:bodyPr wrap="square" rtlCol="0">
+            <a:spAutoFit/>
+          </a:bodyPr>
+          <a:lstStyle/>
+          <a:p>
+            <a:r>
+              <a:rPr lang="en-GB" dirty="0"/>
+              <a:t>Or working folder</a:t>
+            </a:r>
+          </a:p>
+        </p:txBody>
+      </p:sp>
+      <p:cxnSp>
+        <p:nvCxnSpPr>
+          <p:cNvPr id="10" name="Straight Arrow Connector 9">
+            <a:extLst>
+              <a:ext uri="{FF2B5EF4-FFF2-40B4-BE49-F238E27FC236}">
+                <a16:creationId xmlns:a16="http://schemas.microsoft.com/office/drawing/2014/main" id="{C5E4E8BF-8050-637E-43D9-5EBC61C43A12}"/>
+              </a:ext>
+            </a:extLst>
+          </p:cNvPr>
+          <p:cNvCxnSpPr>
+            <a:cxnSpLocks/>
+          </p:cNvCxnSpPr>
+          <p:nvPr/>
+        </p:nvCxnSpPr>
+        <p:spPr>
+          <a:xfrm>
+            <a:off x="982639" y="1915267"/>
+            <a:ext cx="122830" cy="331169"/>
+          </a:xfrm>
+          <a:prstGeom prst="straightConnector1">
+            <a:avLst/>
+          </a:prstGeom>
+          <a:ln w="28575">
+            <a:tailEnd type="triangle"/>
+          </a:ln>
+        </p:spPr>
+        <p:style>
+          <a:lnRef idx="1">
+            <a:schemeClr val="accent1"/>
+          </a:lnRef>
+          <a:fillRef idx="0">
+            <a:schemeClr val="accent1"/>
+          </a:fillRef>
+          <a:effectRef idx="0">
+            <a:schemeClr val="accent1"/>
+          </a:effectRef>
+          <a:fontRef idx="minor">
+            <a:schemeClr val="tx1"/>
+          </a:fontRef>
+        </p:style>
+      </p:cxnSp>
     </p:spTree>
     <p:extLst>
       <p:ext uri="{BB962C8B-B14F-4D97-AF65-F5344CB8AC3E}">

</xml_diff>

<commit_message>
Updated slides and removed StudentMaterial folder
</commit_message>
<xml_diff>
--- a/InstructorMaterials/Best Practices for Software Development using MATLAB.pptx
+++ b/InstructorMaterials/Best Practices for Software Development using MATLAB.pptx
@@ -7,7 +7,7 @@
     <p:sldMasterId id="2147483696" r:id="rId3"/>
   </p:sldMasterIdLst>
   <p:notesMasterIdLst>
-    <p:notesMasterId r:id="rId37"/>
+    <p:notesMasterId r:id="rId38"/>
   </p:notesMasterIdLst>
   <p:sldIdLst>
     <p:sldId id="257" r:id="rId4"/>
@@ -32,17 +32,18 @@
     <p:sldId id="260" r:id="rId23"/>
     <p:sldId id="261" r:id="rId24"/>
     <p:sldId id="262" r:id="rId25"/>
-    <p:sldId id="263" r:id="rId26"/>
-    <p:sldId id="274" r:id="rId27"/>
-    <p:sldId id="264" r:id="rId28"/>
-    <p:sldId id="265" r:id="rId29"/>
-    <p:sldId id="282" r:id="rId30"/>
-    <p:sldId id="284" r:id="rId31"/>
-    <p:sldId id="283" r:id="rId32"/>
-    <p:sldId id="266" r:id="rId33"/>
-    <p:sldId id="267" r:id="rId34"/>
-    <p:sldId id="268" r:id="rId35"/>
-    <p:sldId id="270" r:id="rId36"/>
+    <p:sldId id="413" r:id="rId26"/>
+    <p:sldId id="263" r:id="rId27"/>
+    <p:sldId id="274" r:id="rId28"/>
+    <p:sldId id="264" r:id="rId29"/>
+    <p:sldId id="265" r:id="rId30"/>
+    <p:sldId id="282" r:id="rId31"/>
+    <p:sldId id="284" r:id="rId32"/>
+    <p:sldId id="283" r:id="rId33"/>
+    <p:sldId id="266" r:id="rId34"/>
+    <p:sldId id="267" r:id="rId35"/>
+    <p:sldId id="268" r:id="rId36"/>
+    <p:sldId id="270" r:id="rId37"/>
   </p:sldIdLst>
   <p:sldSz cx="9144000" cy="6858000" type="screen4x3"/>
   <p:notesSz cx="6858000" cy="9144000"/>
@@ -1067,7 +1068,7 @@
                 </a:solidFill>
               </a:rPr>
               <a:pPr/>
-              <a:t>23</a:t>
+              <a:t>24</a:t>
             </a:fld>
             <a:endParaRPr lang="en-GB">
               <a:solidFill>
@@ -1196,7 +1197,7 @@
           <a:p>
             <a:fld id="{0561F5E7-E9A3-428D-802F-730F07CBE60A}" type="slidenum">
               <a:rPr lang="en-GB" smtClean="0"/>
-              <a:t>26</a:t>
+              <a:t>27</a:t>
             </a:fld>
             <a:endParaRPr lang="en-GB"/>
           </a:p>
@@ -20137,6 +20138,207 @@
       </p:grpSpPr>
       <p:sp>
         <p:nvSpPr>
+          <p:cNvPr id="2" name="Title 1">
+            <a:extLst>
+              <a:ext uri="{FF2B5EF4-FFF2-40B4-BE49-F238E27FC236}">
+                <a16:creationId xmlns:a16="http://schemas.microsoft.com/office/drawing/2014/main" id="{93D04027-176D-7C37-0665-3ED3C4B7E0FD}"/>
+              </a:ext>
+            </a:extLst>
+          </p:cNvPr>
+          <p:cNvSpPr>
+            <a:spLocks noGrp="1"/>
+          </p:cNvSpPr>
+          <p:nvPr>
+            <p:ph type="title"/>
+          </p:nvPr>
+        </p:nvSpPr>
+        <p:spPr/>
+        <p:txBody>
+          <a:bodyPr/>
+          <a:lstStyle/>
+          <a:p>
+            <a:pPr algn="ctr"/>
+            <a:r>
+              <a:rPr lang="en-GB" dirty="0"/>
+              <a:t>Slash and Backslash</a:t>
+            </a:r>
+          </a:p>
+        </p:txBody>
+      </p:sp>
+      <p:sp>
+        <p:nvSpPr>
+          <p:cNvPr id="3" name="Content Placeholder 2">
+            <a:extLst>
+              <a:ext uri="{FF2B5EF4-FFF2-40B4-BE49-F238E27FC236}">
+                <a16:creationId xmlns:a16="http://schemas.microsoft.com/office/drawing/2014/main" id="{144233E6-8DF7-7DE7-7AD6-44903869EAF5}"/>
+              </a:ext>
+            </a:extLst>
+          </p:cNvPr>
+          <p:cNvSpPr>
+            <a:spLocks noGrp="1"/>
+          </p:cNvSpPr>
+          <p:nvPr>
+            <p:ph idx="1"/>
+          </p:nvPr>
+        </p:nvSpPr>
+        <p:spPr>
+          <a:xfrm>
+            <a:off x="357053" y="1808534"/>
+            <a:ext cx="8573301" cy="4351338"/>
+          </a:xfrm>
+        </p:spPr>
+        <p:txBody>
+          <a:bodyPr>
+            <a:normAutofit fontScale="92500" lnSpcReduction="20000"/>
+          </a:bodyPr>
+          <a:lstStyle/>
+          <a:p>
+            <a:r>
+              <a:rPr lang="en-GB" sz="2400" dirty="0"/>
+              <a:t>Matrix multiplication is not commutative (generally AB ≠ BA) </a:t>
+            </a:r>
+          </a:p>
+          <a:p>
+            <a:endParaRPr lang="en-GB" sz="2400" dirty="0"/>
+          </a:p>
+          <a:p>
+            <a:r>
+              <a:rPr lang="en-GB" sz="2400" dirty="0"/>
+              <a:t>AX = B and XA = B represent different systems of equations for X</a:t>
+            </a:r>
+          </a:p>
+          <a:p>
+            <a:pPr marL="0" indent="0">
+              <a:buNone/>
+            </a:pPr>
+            <a:endParaRPr lang="en-GB" sz="2400" dirty="0"/>
+          </a:p>
+          <a:p>
+            <a:r>
+              <a:rPr lang="en-GB" sz="2400" dirty="0"/>
+              <a:t>MATLAB uses / and \ to distinguish between these:</a:t>
+            </a:r>
+          </a:p>
+          <a:p>
+            <a:endParaRPr lang="en-GB" sz="2400" dirty="0"/>
+          </a:p>
+          <a:p>
+            <a:pPr marL="457200" lvl="1" indent="0">
+              <a:buNone/>
+            </a:pPr>
+            <a:r>
+              <a:rPr lang="en-GB" dirty="0">
+                <a:latin typeface="Courier New" panose="02070309020205020404" pitchFamily="49" charset="0"/>
+                <a:cs typeface="Courier New" panose="02070309020205020404" pitchFamily="49" charset="0"/>
+              </a:rPr>
+              <a:t>&gt;&gt; X = B/A    </a:t>
+            </a:r>
+            <a:r>
+              <a:rPr lang="en-GB" dirty="0">
+                <a:cs typeface="Courier New" panose="02070309020205020404" pitchFamily="49" charset="0"/>
+              </a:rPr>
+              <a:t>represents “solve the system XA = B”, while</a:t>
+            </a:r>
+          </a:p>
+          <a:p>
+            <a:pPr marL="457200" lvl="1" indent="0">
+              <a:buNone/>
+            </a:pPr>
+            <a:endParaRPr lang="en-GB" dirty="0">
+              <a:cs typeface="Courier New" panose="02070309020205020404" pitchFamily="49" charset="0"/>
+            </a:endParaRPr>
+          </a:p>
+          <a:p>
+            <a:pPr marL="457200" lvl="1" indent="0">
+              <a:buNone/>
+            </a:pPr>
+            <a:r>
+              <a:rPr lang="en-GB" dirty="0">
+                <a:latin typeface="Courier New" panose="02070309020205020404" pitchFamily="49" charset="0"/>
+                <a:cs typeface="Courier New" panose="02070309020205020404" pitchFamily="49" charset="0"/>
+              </a:rPr>
+              <a:t>&gt;&gt; X = B\A    </a:t>
+            </a:r>
+            <a:r>
+              <a:rPr lang="en-GB" dirty="0">
+                <a:cs typeface="Courier New" panose="02070309020205020404" pitchFamily="49" charset="0"/>
+              </a:rPr>
+              <a:t>represents “solve the system AX = B”</a:t>
+            </a:r>
+            <a:endParaRPr lang="en-GB" dirty="0">
+              <a:latin typeface="Courier New" panose="02070309020205020404" pitchFamily="49" charset="0"/>
+              <a:cs typeface="Courier New" panose="02070309020205020404" pitchFamily="49" charset="0"/>
+            </a:endParaRPr>
+          </a:p>
+          <a:p>
+            <a:pPr marL="457200" lvl="1" indent="0">
+              <a:buNone/>
+            </a:pPr>
+            <a:endParaRPr lang="en-GB" sz="1600" dirty="0">
+              <a:latin typeface="Courier New" panose="02070309020205020404" pitchFamily="49" charset="0"/>
+              <a:cs typeface="Courier New" panose="02070309020205020404" pitchFamily="49" charset="0"/>
+            </a:endParaRPr>
+          </a:p>
+          <a:p>
+            <a:pPr marL="457200" lvl="1" indent="0">
+              <a:buNone/>
+            </a:pPr>
+            <a:endParaRPr lang="en-GB" sz="1600" dirty="0">
+              <a:latin typeface="Courier New" panose="02070309020205020404" pitchFamily="49" charset="0"/>
+              <a:cs typeface="Courier New" panose="02070309020205020404" pitchFamily="49" charset="0"/>
+            </a:endParaRPr>
+          </a:p>
+          <a:p>
+            <a:pPr marL="457200" lvl="1" indent="0">
+              <a:buNone/>
+            </a:pPr>
+            <a:endParaRPr lang="en-GB" sz="1600" dirty="0">
+              <a:cs typeface="Courier New" panose="02070309020205020404" pitchFamily="49" charset="0"/>
+            </a:endParaRPr>
+          </a:p>
+          <a:p>
+            <a:pPr marL="0" indent="0">
+              <a:buNone/>
+            </a:pPr>
+            <a:r>
+              <a:rPr lang="en-GB" dirty="0"/>
+              <a:t>  </a:t>
+            </a:r>
+          </a:p>
+        </p:txBody>
+      </p:sp>
+    </p:spTree>
+    <p:extLst>
+      <p:ext uri="{BB962C8B-B14F-4D97-AF65-F5344CB8AC3E}">
+        <p14:creationId xmlns:p14="http://schemas.microsoft.com/office/powerpoint/2010/main" val="2718025386"/>
+      </p:ext>
+    </p:extLst>
+  </p:cSld>
+  <p:clrMapOvr>
+    <a:masterClrMapping/>
+  </p:clrMapOvr>
+</p:sld>
+</file>
+
+<file path=ppt/slides/slide24.xml><?xml version="1.0" encoding="utf-8"?>
+<p:sld xmlns:a="http://schemas.openxmlformats.org/drawingml/2006/main" xmlns:r="http://schemas.openxmlformats.org/officeDocument/2006/relationships" xmlns:p="http://schemas.openxmlformats.org/presentationml/2006/main">
+  <p:cSld>
+    <p:spTree>
+      <p:nvGrpSpPr>
+        <p:cNvPr id="1" name=""/>
+        <p:cNvGrpSpPr/>
+        <p:nvPr/>
+      </p:nvGrpSpPr>
+      <p:grpSpPr>
+        <a:xfrm>
+          <a:off x="0" y="0"/>
+          <a:ext cx="0" cy="0"/>
+          <a:chOff x="0" y="0"/>
+          <a:chExt cx="0" cy="0"/>
+        </a:xfrm>
+      </p:grpSpPr>
+      <p:sp>
+        <p:nvSpPr>
           <p:cNvPr id="2" name="Title 1"/>
           <p:cNvSpPr>
             <a:spLocks noGrp="1"/>
@@ -20188,7 +20390,7 @@
                 </a:solidFill>
               </a:rPr>
               <a:pPr/>
-              <a:t>23</a:t>
+              <a:t>24</a:t>
             </a:fld>
             <a:endParaRPr lang="en-GB">
               <a:solidFill>
@@ -20290,7 +20492,7 @@
         </p:nvSpPr>
         <p:spPr>
           <a:xfrm>
-            <a:off x="1115616" y="2924944"/>
+            <a:off x="1163690" y="3238243"/>
             <a:ext cx="3672408" cy="369332"/>
           </a:xfrm>
           <a:prstGeom prst="rect">
@@ -20323,7 +20525,7 @@
         </p:nvCxnSpPr>
         <p:spPr>
           <a:xfrm flipH="1" flipV="1">
-            <a:off x="1896010" y="2469989"/>
+            <a:off x="1944084" y="2783288"/>
             <a:ext cx="147940" cy="432048"/>
           </a:xfrm>
           <a:prstGeom prst="straightConnector1">
@@ -20709,7 +20911,7 @@
 </p:sld>
 </file>
 
-<file path=ppt/slides/slide24.xml><?xml version="1.0" encoding="utf-8"?>
+<file path=ppt/slides/slide25.xml><?xml version="1.0" encoding="utf-8"?>
 <p:sld xmlns:a="http://schemas.openxmlformats.org/drawingml/2006/main" xmlns:r="http://schemas.openxmlformats.org/officeDocument/2006/relationships" xmlns:p="http://schemas.openxmlformats.org/presentationml/2006/main">
   <p:cSld>
     <p:spTree>
@@ -20750,7 +20952,7 @@
                 </a:solidFill>
               </a:rPr>
               <a:pPr/>
-              <a:t>24</a:t>
+              <a:t>25</a:t>
             </a:fld>
             <a:endParaRPr lang="en-GB">
               <a:solidFill>
@@ -20930,630 +21132,522 @@
           </a:p>
         </p:txBody>
       </p:sp>
+      <mc:AlternateContent xmlns:mc="http://schemas.openxmlformats.org/markup-compatibility/2006">
+        <mc:Choice xmlns:a14="http://schemas.microsoft.com/office/drawing/2010/main" Requires="a14">
+          <p:sp>
+            <p:nvSpPr>
+              <p:cNvPr id="6" name="TextBox 5">
+                <a:extLst>
+                  <a:ext uri="{FF2B5EF4-FFF2-40B4-BE49-F238E27FC236}">
+                    <a16:creationId xmlns:a16="http://schemas.microsoft.com/office/drawing/2014/main" id="{F451868F-F6A7-A0EB-FD56-4AD3AFC21A19}"/>
+                  </a:ext>
+                </a:extLst>
+              </p:cNvPr>
+              <p:cNvSpPr txBox="1"/>
+              <p:nvPr/>
+            </p:nvSpPr>
+            <p:spPr>
+              <a:xfrm>
+                <a:off x="611025" y="5238481"/>
+                <a:ext cx="5652188" cy="280718"/>
+              </a:xfrm>
+              <a:prstGeom prst="rect">
+                <a:avLst/>
+              </a:prstGeom>
+              <a:noFill/>
+            </p:spPr>
+            <p:txBody>
+              <a:bodyPr wrap="none" lIns="0" tIns="0" rIns="0" bIns="0" rtlCol="0">
+                <a:spAutoFit/>
+              </a:bodyPr>
+              <a:lstStyle/>
+              <a:p>
+                <a14:m>
+                  <m:oMath xmlns:m="http://schemas.openxmlformats.org/officeDocument/2006/math">
+                    <m:r>
+                      <a:rPr lang="en-GB" b="0" i="1" smtClean="0">
+                        <a:latin typeface="Cambria Math" panose="02040503050406030204" pitchFamily="18" charset="0"/>
+                      </a:rPr>
+                      <m:t>𝑓</m:t>
+                    </m:r>
+                    <m:r>
+                      <a:rPr lang="en-GB" b="0" i="1" smtClean="0">
+                        <a:latin typeface="Cambria Math" panose="02040503050406030204" pitchFamily="18" charset="0"/>
+                      </a:rPr>
+                      <m:t>( </m:t>
+                    </m:r>
+                    <m:sSub>
+                      <m:sSubPr>
+                        <m:ctrlPr>
+                          <a:rPr lang="en-GB" b="0" i="1" smtClean="0">
+                            <a:latin typeface="Cambria Math" panose="02040503050406030204" pitchFamily="18" charset="0"/>
+                          </a:rPr>
+                        </m:ctrlPr>
+                      </m:sSubPr>
+                      <m:e>
+                        <m:r>
+                          <a:rPr lang="en-GB" b="0" i="1" smtClean="0">
+                            <a:latin typeface="Cambria Math" panose="02040503050406030204" pitchFamily="18" charset="0"/>
+                          </a:rPr>
+                          <m:t>𝑥</m:t>
+                        </m:r>
+                      </m:e>
+                      <m:sub>
+                        <m:r>
+                          <a:rPr lang="en-GB" b="0" i="1" smtClean="0">
+                            <a:latin typeface="Cambria Math" panose="02040503050406030204" pitchFamily="18" charset="0"/>
+                          </a:rPr>
+                          <m:t>1</m:t>
+                        </m:r>
+                      </m:sub>
+                    </m:sSub>
+                  </m:oMath>
+                </a14:m>
+                <a:r>
+                  <a:rPr lang="en-GB" dirty="0"/>
+                  <a:t>,</a:t>
+                </a:r>
+                <a14:m>
+                  <m:oMath xmlns:m="http://schemas.openxmlformats.org/officeDocument/2006/math">
+                    <m:sSub>
+                      <m:sSubPr>
+                        <m:ctrlPr>
+                          <a:rPr lang="en-GB" i="1" dirty="0" smtClean="0">
+                            <a:latin typeface="Cambria Math" panose="02040503050406030204" pitchFamily="18" charset="0"/>
+                          </a:rPr>
+                        </m:ctrlPr>
+                      </m:sSubPr>
+                      <m:e>
+                        <m:r>
+                          <a:rPr lang="en-GB" b="0" i="1" dirty="0" smtClean="0">
+                            <a:latin typeface="Cambria Math" panose="02040503050406030204" pitchFamily="18" charset="0"/>
+                          </a:rPr>
+                          <m:t>𝑥</m:t>
+                        </m:r>
+                      </m:e>
+                      <m:sub>
+                        <m:r>
+                          <a:rPr lang="en-GB" b="0" i="1" dirty="0" smtClean="0">
+                            <a:latin typeface="Cambria Math" panose="02040503050406030204" pitchFamily="18" charset="0"/>
+                          </a:rPr>
+                          <m:t>2</m:t>
+                        </m:r>
+                      </m:sub>
+                    </m:sSub>
+                    <m:r>
+                      <a:rPr lang="en-GB" b="0" i="1" dirty="0" smtClean="0">
+                        <a:latin typeface="Cambria Math" panose="02040503050406030204" pitchFamily="18" charset="0"/>
+                      </a:rPr>
+                      <m:t>)=</m:t>
+                    </m:r>
+                    <m:sSub>
+                      <m:sSubPr>
+                        <m:ctrlPr>
+                          <a:rPr lang="en-GB" b="0" i="1" dirty="0" smtClean="0">
+                            <a:latin typeface="Cambria Math" panose="02040503050406030204" pitchFamily="18" charset="0"/>
+                          </a:rPr>
+                        </m:ctrlPr>
+                      </m:sSubPr>
+                      <m:e>
+                        <m:r>
+                          <a:rPr lang="en-GB" b="0" i="1" dirty="0" smtClean="0">
+                            <a:latin typeface="Cambria Math" panose="02040503050406030204" pitchFamily="18" charset="0"/>
+                          </a:rPr>
+                          <m:t>𝑐</m:t>
+                        </m:r>
+                      </m:e>
+                      <m:sub>
+                        <m:r>
+                          <a:rPr lang="en-GB" b="0" i="1" dirty="0" smtClean="0">
+                            <a:latin typeface="Cambria Math" panose="02040503050406030204" pitchFamily="18" charset="0"/>
+                          </a:rPr>
+                          <m:t>1</m:t>
+                        </m:r>
+                      </m:sub>
+                    </m:sSub>
+                    <m:r>
+                      <a:rPr lang="en-GB" b="0" i="1" dirty="0" smtClean="0">
+                        <a:latin typeface="Cambria Math" panose="02040503050406030204" pitchFamily="18" charset="0"/>
+                      </a:rPr>
+                      <m:t>+ </m:t>
+                    </m:r>
+                    <m:sSub>
+                      <m:sSubPr>
+                        <m:ctrlPr>
+                          <a:rPr lang="en-GB" b="0" i="1" dirty="0" smtClean="0">
+                            <a:latin typeface="Cambria Math" panose="02040503050406030204" pitchFamily="18" charset="0"/>
+                          </a:rPr>
+                        </m:ctrlPr>
+                      </m:sSubPr>
+                      <m:e>
+                        <m:r>
+                          <a:rPr lang="en-GB" b="0" i="1" dirty="0" smtClean="0">
+                            <a:latin typeface="Cambria Math" panose="02040503050406030204" pitchFamily="18" charset="0"/>
+                          </a:rPr>
+                          <m:t>𝑐</m:t>
+                        </m:r>
+                      </m:e>
+                      <m:sub>
+                        <m:r>
+                          <a:rPr lang="en-GB" b="0" i="1" dirty="0" smtClean="0">
+                            <a:latin typeface="Cambria Math" panose="02040503050406030204" pitchFamily="18" charset="0"/>
+                          </a:rPr>
+                          <m:t>2</m:t>
+                        </m:r>
+                      </m:sub>
+                    </m:sSub>
+                    <m:sSub>
+                      <m:sSubPr>
+                        <m:ctrlPr>
+                          <a:rPr lang="en-GB" b="0" i="1" dirty="0" smtClean="0">
+                            <a:latin typeface="Cambria Math" panose="02040503050406030204" pitchFamily="18" charset="0"/>
+                          </a:rPr>
+                        </m:ctrlPr>
+                      </m:sSubPr>
+                      <m:e>
+                        <m:r>
+                          <a:rPr lang="en-GB" b="0" i="1" dirty="0" smtClean="0">
+                            <a:latin typeface="Cambria Math" panose="02040503050406030204" pitchFamily="18" charset="0"/>
+                          </a:rPr>
+                          <m:t>𝑥</m:t>
+                        </m:r>
+                      </m:e>
+                      <m:sub>
+                        <m:r>
+                          <a:rPr lang="en-GB" b="0" i="1" dirty="0" smtClean="0">
+                            <a:latin typeface="Cambria Math" panose="02040503050406030204" pitchFamily="18" charset="0"/>
+                          </a:rPr>
+                          <m:t>1</m:t>
+                        </m:r>
+                      </m:sub>
+                    </m:sSub>
+                    <m:r>
+                      <a:rPr lang="en-GB" b="0" i="1" dirty="0" smtClean="0">
+                        <a:latin typeface="Cambria Math" panose="02040503050406030204" pitchFamily="18" charset="0"/>
+                      </a:rPr>
+                      <m:t>+</m:t>
+                    </m:r>
+                    <m:sSub>
+                      <m:sSubPr>
+                        <m:ctrlPr>
+                          <a:rPr lang="en-GB" i="1" dirty="0">
+                            <a:latin typeface="Cambria Math" panose="02040503050406030204" pitchFamily="18" charset="0"/>
+                          </a:rPr>
+                        </m:ctrlPr>
+                      </m:sSubPr>
+                      <m:e>
+                        <m:r>
+                          <a:rPr lang="en-GB" i="1" dirty="0">
+                            <a:latin typeface="Cambria Math" panose="02040503050406030204" pitchFamily="18" charset="0"/>
+                          </a:rPr>
+                          <m:t>𝑐</m:t>
+                        </m:r>
+                      </m:e>
+                      <m:sub>
+                        <m:r>
+                          <a:rPr lang="en-GB" b="0" i="1" dirty="0" smtClean="0">
+                            <a:latin typeface="Cambria Math" panose="02040503050406030204" pitchFamily="18" charset="0"/>
+                          </a:rPr>
+                          <m:t>3</m:t>
+                        </m:r>
+                      </m:sub>
+                    </m:sSub>
+                    <m:sSub>
+                      <m:sSubPr>
+                        <m:ctrlPr>
+                          <a:rPr lang="en-GB" i="1" dirty="0">
+                            <a:latin typeface="Cambria Math" panose="02040503050406030204" pitchFamily="18" charset="0"/>
+                          </a:rPr>
+                        </m:ctrlPr>
+                      </m:sSubPr>
+                      <m:e>
+                        <m:r>
+                          <a:rPr lang="en-GB" i="1" dirty="0">
+                            <a:latin typeface="Cambria Math" panose="02040503050406030204" pitchFamily="18" charset="0"/>
+                          </a:rPr>
+                          <m:t>𝑥</m:t>
+                        </m:r>
+                      </m:e>
+                      <m:sub>
+                        <m:r>
+                          <a:rPr lang="en-GB" b="0" i="1" dirty="0" smtClean="0">
+                            <a:latin typeface="Cambria Math" panose="02040503050406030204" pitchFamily="18" charset="0"/>
+                          </a:rPr>
+                          <m:t>2</m:t>
+                        </m:r>
+                      </m:sub>
+                    </m:sSub>
+                    <m:r>
+                      <a:rPr lang="en-GB" b="0" i="1" dirty="0" smtClean="0">
+                        <a:latin typeface="Cambria Math" panose="02040503050406030204" pitchFamily="18" charset="0"/>
+                      </a:rPr>
+                      <m:t>+ </m:t>
+                    </m:r>
+                    <m:sSub>
+                      <m:sSubPr>
+                        <m:ctrlPr>
+                          <a:rPr lang="en-GB" b="0" i="1" dirty="0" smtClean="0">
+                            <a:latin typeface="Cambria Math" panose="02040503050406030204" pitchFamily="18" charset="0"/>
+                          </a:rPr>
+                        </m:ctrlPr>
+                      </m:sSubPr>
+                      <m:e>
+                        <m:r>
+                          <a:rPr lang="en-GB" b="0" i="1" dirty="0" smtClean="0">
+                            <a:latin typeface="Cambria Math" panose="02040503050406030204" pitchFamily="18" charset="0"/>
+                          </a:rPr>
+                          <m:t>𝑐</m:t>
+                        </m:r>
+                      </m:e>
+                      <m:sub>
+                        <m:r>
+                          <a:rPr lang="en-GB" b="0" i="1" dirty="0" smtClean="0">
+                            <a:latin typeface="Cambria Math" panose="02040503050406030204" pitchFamily="18" charset="0"/>
+                          </a:rPr>
+                          <m:t>4</m:t>
+                        </m:r>
+                      </m:sub>
+                    </m:sSub>
+                    <m:sSubSup>
+                      <m:sSubSupPr>
+                        <m:ctrlPr>
+                          <a:rPr lang="en-GB" b="0" i="1" dirty="0" smtClean="0">
+                            <a:latin typeface="Cambria Math" panose="02040503050406030204" pitchFamily="18" charset="0"/>
+                          </a:rPr>
+                        </m:ctrlPr>
+                      </m:sSubSupPr>
+                      <m:e>
+                        <m:r>
+                          <a:rPr lang="en-GB" b="0" i="1" dirty="0" smtClean="0">
+                            <a:latin typeface="Cambria Math" panose="02040503050406030204" pitchFamily="18" charset="0"/>
+                          </a:rPr>
+                          <m:t>𝑥</m:t>
+                        </m:r>
+                      </m:e>
+                      <m:sub>
+                        <m:r>
+                          <a:rPr lang="en-GB" b="0" i="1" dirty="0" smtClean="0">
+                            <a:latin typeface="Cambria Math" panose="02040503050406030204" pitchFamily="18" charset="0"/>
+                          </a:rPr>
+                          <m:t>1</m:t>
+                        </m:r>
+                      </m:sub>
+                      <m:sup>
+                        <m:r>
+                          <a:rPr lang="en-GB" b="0" i="1" dirty="0" smtClean="0">
+                            <a:latin typeface="Cambria Math" panose="02040503050406030204" pitchFamily="18" charset="0"/>
+                          </a:rPr>
+                          <m:t>2</m:t>
+                        </m:r>
+                      </m:sup>
+                    </m:sSubSup>
+                    <m:r>
+                      <a:rPr lang="en-GB" b="0" i="1" dirty="0" smtClean="0">
+                        <a:latin typeface="Cambria Math" panose="02040503050406030204" pitchFamily="18" charset="0"/>
+                      </a:rPr>
+                      <m:t>+ </m:t>
+                    </m:r>
+                    <m:sSub>
+                      <m:sSubPr>
+                        <m:ctrlPr>
+                          <a:rPr lang="en-GB" b="0" i="1" dirty="0" smtClean="0">
+                            <a:latin typeface="Cambria Math" panose="02040503050406030204" pitchFamily="18" charset="0"/>
+                          </a:rPr>
+                        </m:ctrlPr>
+                      </m:sSubPr>
+                      <m:e>
+                        <m:r>
+                          <a:rPr lang="en-GB" b="0" i="1" dirty="0" smtClean="0">
+                            <a:latin typeface="Cambria Math" panose="02040503050406030204" pitchFamily="18" charset="0"/>
+                          </a:rPr>
+                          <m:t>𝑐</m:t>
+                        </m:r>
+                      </m:e>
+                      <m:sub>
+                        <m:r>
+                          <a:rPr lang="en-GB" b="0" i="1" dirty="0" smtClean="0">
+                            <a:latin typeface="Cambria Math" panose="02040503050406030204" pitchFamily="18" charset="0"/>
+                          </a:rPr>
+                          <m:t>5</m:t>
+                        </m:r>
+                      </m:sub>
+                    </m:sSub>
+                    <m:sSubSup>
+                      <m:sSubSupPr>
+                        <m:ctrlPr>
+                          <a:rPr lang="en-GB" b="0" i="1" dirty="0" smtClean="0">
+                            <a:latin typeface="Cambria Math" panose="02040503050406030204" pitchFamily="18" charset="0"/>
+                          </a:rPr>
+                        </m:ctrlPr>
+                      </m:sSubSupPr>
+                      <m:e>
+                        <m:r>
+                          <a:rPr lang="en-GB" b="0" i="1" dirty="0" smtClean="0">
+                            <a:latin typeface="Cambria Math" panose="02040503050406030204" pitchFamily="18" charset="0"/>
+                          </a:rPr>
+                          <m:t>𝑥</m:t>
+                        </m:r>
+                      </m:e>
+                      <m:sub>
+                        <m:r>
+                          <a:rPr lang="en-GB" b="0" i="1" dirty="0" smtClean="0">
+                            <a:latin typeface="Cambria Math" panose="02040503050406030204" pitchFamily="18" charset="0"/>
+                          </a:rPr>
+                          <m:t>2</m:t>
+                        </m:r>
+                      </m:sub>
+                      <m:sup>
+                        <m:r>
+                          <a:rPr lang="en-GB" b="0" i="1" dirty="0" smtClean="0">
+                            <a:latin typeface="Cambria Math" panose="02040503050406030204" pitchFamily="18" charset="0"/>
+                          </a:rPr>
+                          <m:t>2</m:t>
+                        </m:r>
+                      </m:sup>
+                    </m:sSubSup>
+                    <m:r>
+                      <a:rPr lang="en-GB" b="0" i="1" dirty="0" smtClean="0">
+                        <a:latin typeface="Cambria Math" panose="02040503050406030204" pitchFamily="18" charset="0"/>
+                      </a:rPr>
+                      <m:t>+ </m:t>
+                    </m:r>
+                    <m:sSub>
+                      <m:sSubPr>
+                        <m:ctrlPr>
+                          <a:rPr lang="en-GB" b="0" i="1" dirty="0" smtClean="0">
+                            <a:latin typeface="Cambria Math" panose="02040503050406030204" pitchFamily="18" charset="0"/>
+                          </a:rPr>
+                        </m:ctrlPr>
+                      </m:sSubPr>
+                      <m:e>
+                        <m:r>
+                          <a:rPr lang="en-GB" b="0" i="1" dirty="0" smtClean="0">
+                            <a:latin typeface="Cambria Math" panose="02040503050406030204" pitchFamily="18" charset="0"/>
+                          </a:rPr>
+                          <m:t>𝑐</m:t>
+                        </m:r>
+                      </m:e>
+                      <m:sub>
+                        <m:r>
+                          <a:rPr lang="en-GB" b="0" i="1" dirty="0" smtClean="0">
+                            <a:latin typeface="Cambria Math" panose="02040503050406030204" pitchFamily="18" charset="0"/>
+                          </a:rPr>
+                          <m:t>6</m:t>
+                        </m:r>
+                      </m:sub>
+                    </m:sSub>
+                    <m:sSub>
+                      <m:sSubPr>
+                        <m:ctrlPr>
+                          <a:rPr lang="en-GB" b="0" i="1" dirty="0" smtClean="0">
+                            <a:latin typeface="Cambria Math" panose="02040503050406030204" pitchFamily="18" charset="0"/>
+                          </a:rPr>
+                        </m:ctrlPr>
+                      </m:sSubPr>
+                      <m:e>
+                        <m:r>
+                          <a:rPr lang="en-GB" b="0" i="1" dirty="0" smtClean="0">
+                            <a:latin typeface="Cambria Math" panose="02040503050406030204" pitchFamily="18" charset="0"/>
+                          </a:rPr>
+                          <m:t>𝑥</m:t>
+                        </m:r>
+                      </m:e>
+                      <m:sub>
+                        <m:r>
+                          <a:rPr lang="en-GB" b="0" i="1" dirty="0" smtClean="0">
+                            <a:latin typeface="Cambria Math" panose="02040503050406030204" pitchFamily="18" charset="0"/>
+                          </a:rPr>
+                          <m:t>1</m:t>
+                        </m:r>
+                      </m:sub>
+                    </m:sSub>
+                    <m:sSub>
+                      <m:sSubPr>
+                        <m:ctrlPr>
+                          <a:rPr lang="en-GB" b="0" i="1" dirty="0" smtClean="0">
+                            <a:latin typeface="Cambria Math" panose="02040503050406030204" pitchFamily="18" charset="0"/>
+                          </a:rPr>
+                        </m:ctrlPr>
+                      </m:sSubPr>
+                      <m:e>
+                        <m:r>
+                          <a:rPr lang="en-GB" b="0" i="1" dirty="0" smtClean="0">
+                            <a:latin typeface="Cambria Math" panose="02040503050406030204" pitchFamily="18" charset="0"/>
+                          </a:rPr>
+                          <m:t>𝑥</m:t>
+                        </m:r>
+                      </m:e>
+                      <m:sub>
+                        <m:r>
+                          <a:rPr lang="en-GB" b="0" i="1" dirty="0" smtClean="0">
+                            <a:latin typeface="Cambria Math" panose="02040503050406030204" pitchFamily="18" charset="0"/>
+                          </a:rPr>
+                          <m:t>2</m:t>
+                        </m:r>
+                      </m:sub>
+                    </m:sSub>
+                    <m:r>
+                      <a:rPr lang="en-GB" b="0" i="1" dirty="0" smtClean="0">
+                        <a:latin typeface="Cambria Math" panose="02040503050406030204" pitchFamily="18" charset="0"/>
+                      </a:rPr>
+                      <m:t>  </m:t>
+                    </m:r>
+                  </m:oMath>
+                </a14:m>
+                <a:endParaRPr lang="en-GB" dirty="0"/>
+              </a:p>
+            </p:txBody>
+          </p:sp>
+        </mc:Choice>
+        <mc:Fallback>
+          <p:sp>
+            <p:nvSpPr>
+              <p:cNvPr id="6" name="TextBox 5">
+                <a:extLst>
+                  <a:ext uri="{FF2B5EF4-FFF2-40B4-BE49-F238E27FC236}">
+                    <a16:creationId xmlns:a16="http://schemas.microsoft.com/office/drawing/2014/main" id="{F451868F-F6A7-A0EB-FD56-4AD3AFC21A19}"/>
+                  </a:ext>
+                </a:extLst>
+              </p:cNvPr>
+              <p:cNvSpPr txBox="1">
+                <a:spLocks noRot="1" noChangeAspect="1" noMove="1" noResize="1" noEditPoints="1" noAdjustHandles="1" noChangeArrowheads="1" noChangeShapeType="1" noTextEdit="1"/>
+              </p:cNvSpPr>
+              <p:nvPr/>
+            </p:nvSpPr>
+            <p:spPr>
+              <a:xfrm>
+                <a:off x="611025" y="5238481"/>
+                <a:ext cx="5652188" cy="280718"/>
+              </a:xfrm>
+              <a:prstGeom prst="rect">
+                <a:avLst/>
+              </a:prstGeom>
+              <a:blipFill>
+                <a:blip r:embed="rId2"/>
+                <a:stretch>
+                  <a:fillRect l="-1942" t="-26087" b="-52174"/>
+                </a:stretch>
+              </a:blipFill>
+            </p:spPr>
+            <p:txBody>
+              <a:bodyPr/>
+              <a:lstStyle/>
+              <a:p>
+                <a:r>
+                  <a:rPr lang="en-GB">
+                    <a:noFill/>
+                  </a:rPr>
+                  <a:t> </a:t>
+                </a:r>
+              </a:p>
+            </p:txBody>
+          </p:sp>
+        </mc:Fallback>
+      </mc:AlternateContent>
     </p:spTree>
     <p:extLst>
       <p:ext uri="{BB962C8B-B14F-4D97-AF65-F5344CB8AC3E}">
         <p14:creationId xmlns:p14="http://schemas.microsoft.com/office/powerpoint/2010/main" val="2149098042"/>
-      </p:ext>
-    </p:extLst>
-  </p:cSld>
-  <p:clrMapOvr>
-    <a:masterClrMapping/>
-  </p:clrMapOvr>
-</p:sld>
-</file>
-
-<file path=ppt/slides/slide25.xml><?xml version="1.0" encoding="utf-8"?>
-<p:sld xmlns:a="http://schemas.openxmlformats.org/drawingml/2006/main" xmlns:r="http://schemas.openxmlformats.org/officeDocument/2006/relationships" xmlns:p="http://schemas.openxmlformats.org/presentationml/2006/main">
-  <p:cSld>
-    <p:spTree>
-      <p:nvGrpSpPr>
-        <p:cNvPr id="1" name=""/>
-        <p:cNvGrpSpPr/>
-        <p:nvPr/>
-      </p:nvGrpSpPr>
-      <p:grpSpPr>
-        <a:xfrm>
-          <a:off x="0" y="0"/>
-          <a:ext cx="0" cy="0"/>
-          <a:chOff x="0" y="0"/>
-          <a:chExt cx="0" cy="0"/>
-        </a:xfrm>
-      </p:grpSpPr>
-      <p:sp>
-        <p:nvSpPr>
-          <p:cNvPr id="2" name="Title 1"/>
-          <p:cNvSpPr txBox="1">
-            <a:spLocks/>
-          </p:cNvSpPr>
-          <p:nvPr/>
-        </p:nvSpPr>
-        <p:spPr>
-          <a:xfrm>
-            <a:off x="466725" y="339470"/>
-            <a:ext cx="7886700" cy="554831"/>
-          </a:xfrm>
-          <a:prstGeom prst="rect">
-            <a:avLst/>
-          </a:prstGeom>
-        </p:spPr>
-        <p:txBody>
-          <a:bodyPr/>
-          <a:lstStyle>
-            <a:lvl1pPr algn="l" defTabSz="914400" rtl="0" eaLnBrk="1" latinLnBrk="0" hangingPunct="1">
-              <a:lnSpc>
-                <a:spcPct val="90000"/>
-              </a:lnSpc>
-              <a:spcBef>
-                <a:spcPct val="0"/>
-              </a:spcBef>
-              <a:buNone/>
-              <a:defRPr sz="4400" kern="1200">
-                <a:solidFill>
-                  <a:schemeClr val="tx1"/>
-                </a:solidFill>
-                <a:latin typeface="+mj-lt"/>
-                <a:ea typeface="+mj-ea"/>
-                <a:cs typeface="+mj-cs"/>
-              </a:defRPr>
-            </a:lvl1pPr>
-          </a:lstStyle>
-          <a:p>
-            <a:pPr algn="ctr"/>
-            <a:r>
-              <a:rPr lang="en-GB" sz="3300" dirty="0"/>
-              <a:t>Making Grids</a:t>
-            </a:r>
-          </a:p>
-        </p:txBody>
-      </p:sp>
-      <p:sp>
-        <p:nvSpPr>
-          <p:cNvPr id="4" name="TextBox 3"/>
-          <p:cNvSpPr txBox="1"/>
-          <p:nvPr/>
-        </p:nvSpPr>
-        <p:spPr>
-          <a:xfrm>
-            <a:off x="600075" y="1028700"/>
-            <a:ext cx="7496175" cy="646331"/>
-          </a:xfrm>
-          <a:prstGeom prst="rect">
-            <a:avLst/>
-          </a:prstGeom>
-          <a:noFill/>
-        </p:spPr>
-        <p:txBody>
-          <a:bodyPr wrap="square" rtlCol="0">
-            <a:spAutoFit/>
-          </a:bodyPr>
-          <a:lstStyle/>
-          <a:p>
-            <a:r>
-              <a:rPr lang="en-GB" dirty="0"/>
-              <a:t>The </a:t>
-            </a:r>
-            <a:r>
-              <a:rPr lang="en-GB" dirty="0" err="1">
-                <a:latin typeface="Courier New" panose="02070309020205020404" pitchFamily="49" charset="0"/>
-                <a:cs typeface="Courier New" panose="02070309020205020404" pitchFamily="49" charset="0"/>
-              </a:rPr>
-              <a:t>meshgrid</a:t>
-            </a:r>
-            <a:r>
-              <a:rPr lang="en-GB" dirty="0">
-                <a:latin typeface="Courier New" panose="02070309020205020404" pitchFamily="49" charset="0"/>
-                <a:cs typeface="Courier New" panose="02070309020205020404" pitchFamily="49" charset="0"/>
-              </a:rPr>
-              <a:t> </a:t>
-            </a:r>
-            <a:r>
-              <a:rPr lang="en-GB" dirty="0">
-                <a:cs typeface="Courier New" panose="02070309020205020404" pitchFamily="49" charset="0"/>
-              </a:rPr>
-              <a:t>function converts vectors of points into matrices that can represent a grid of points in the x-y plane</a:t>
-            </a:r>
-            <a:endParaRPr lang="en-GB" dirty="0"/>
-          </a:p>
-        </p:txBody>
-      </p:sp>
-      <p:sp>
-        <p:nvSpPr>
-          <p:cNvPr id="5" name="TextBox 4"/>
-          <p:cNvSpPr txBox="1"/>
-          <p:nvPr/>
-        </p:nvSpPr>
-        <p:spPr>
-          <a:xfrm>
-            <a:off x="802872" y="1809429"/>
-            <a:ext cx="6981825" cy="4893647"/>
-          </a:xfrm>
-          <a:prstGeom prst="rect">
-            <a:avLst/>
-          </a:prstGeom>
-          <a:noFill/>
-        </p:spPr>
-        <p:txBody>
-          <a:bodyPr wrap="square" rtlCol="0">
-            <a:spAutoFit/>
-          </a:bodyPr>
-          <a:lstStyle/>
-          <a:p>
-            <a:r>
-              <a:rPr lang="es-ES" dirty="0">
-                <a:latin typeface="Courier New" panose="02070309020205020404" pitchFamily="49" charset="0"/>
-                <a:cs typeface="Courier New" panose="02070309020205020404" pitchFamily="49" charset="0"/>
-              </a:rPr>
-              <a:t>&gt;&gt; x = -2:4; </a:t>
-            </a:r>
-            <a:r>
-              <a:rPr lang="es-ES" dirty="0">
-                <a:solidFill>
-                  <a:srgbClr val="00B050"/>
-                </a:solidFill>
-                <a:latin typeface="Courier New" panose="02070309020205020404" pitchFamily="49" charset="0"/>
-                <a:cs typeface="Courier New" panose="02070309020205020404" pitchFamily="49" charset="0"/>
-              </a:rPr>
-              <a:t>% 1 x 7 vector</a:t>
-            </a:r>
-            <a:endParaRPr lang="es-ES" dirty="0">
-              <a:latin typeface="Courier New" panose="02070309020205020404" pitchFamily="49" charset="0"/>
-              <a:cs typeface="Courier New" panose="02070309020205020404" pitchFamily="49" charset="0"/>
-            </a:endParaRPr>
-          </a:p>
-          <a:p>
-            <a:r>
-              <a:rPr lang="es-ES" dirty="0">
-                <a:latin typeface="Courier New" panose="02070309020205020404" pitchFamily="49" charset="0"/>
-                <a:cs typeface="Courier New" panose="02070309020205020404" pitchFamily="49" charset="0"/>
-              </a:rPr>
-              <a:t>&gt;&gt; y = 0:5;  </a:t>
-            </a:r>
-            <a:r>
-              <a:rPr lang="es-ES" dirty="0">
-                <a:solidFill>
-                  <a:srgbClr val="00B050"/>
-                </a:solidFill>
-                <a:latin typeface="Courier New" panose="02070309020205020404" pitchFamily="49" charset="0"/>
-                <a:cs typeface="Courier New" panose="02070309020205020404" pitchFamily="49" charset="0"/>
-              </a:rPr>
-              <a:t>% 1 x 6 vector</a:t>
-            </a:r>
-            <a:endParaRPr lang="es-ES" dirty="0">
-              <a:latin typeface="Courier New" panose="02070309020205020404" pitchFamily="49" charset="0"/>
-              <a:cs typeface="Courier New" panose="02070309020205020404" pitchFamily="49" charset="0"/>
-            </a:endParaRPr>
-          </a:p>
-          <a:p>
-            <a:r>
-              <a:rPr lang="es-ES" dirty="0">
-                <a:latin typeface="Courier New" panose="02070309020205020404" pitchFamily="49" charset="0"/>
-                <a:cs typeface="Courier New" panose="02070309020205020404" pitchFamily="49" charset="0"/>
-              </a:rPr>
-              <a:t>&gt;&gt; [X,Y] = </a:t>
-            </a:r>
-            <a:r>
-              <a:rPr lang="es-ES" dirty="0" err="1">
-                <a:latin typeface="Courier New" panose="02070309020205020404" pitchFamily="49" charset="0"/>
-                <a:cs typeface="Courier New" panose="02070309020205020404" pitchFamily="49" charset="0"/>
-              </a:rPr>
-              <a:t>meshgrid</a:t>
-            </a:r>
-            <a:r>
-              <a:rPr lang="es-ES" dirty="0">
-                <a:latin typeface="Courier New" panose="02070309020205020404" pitchFamily="49" charset="0"/>
-                <a:cs typeface="Courier New" panose="02070309020205020404" pitchFamily="49" charset="0"/>
-              </a:rPr>
-              <a:t>(</a:t>
-            </a:r>
-            <a:r>
-              <a:rPr lang="es-ES" dirty="0" err="1">
-                <a:latin typeface="Courier New" panose="02070309020205020404" pitchFamily="49" charset="0"/>
-                <a:cs typeface="Courier New" panose="02070309020205020404" pitchFamily="49" charset="0"/>
-              </a:rPr>
-              <a:t>x,y</a:t>
-            </a:r>
-            <a:r>
-              <a:rPr lang="es-ES" dirty="0">
-                <a:latin typeface="Courier New" panose="02070309020205020404" pitchFamily="49" charset="0"/>
-                <a:cs typeface="Courier New" panose="02070309020205020404" pitchFamily="49" charset="0"/>
-              </a:rPr>
-              <a:t>)</a:t>
-            </a:r>
-          </a:p>
-          <a:p>
-            <a:endParaRPr lang="es-ES" dirty="0">
-              <a:latin typeface="Courier New" panose="02070309020205020404" pitchFamily="49" charset="0"/>
-              <a:cs typeface="Courier New" panose="02070309020205020404" pitchFamily="49" charset="0"/>
-            </a:endParaRPr>
-          </a:p>
-          <a:p>
-            <a:r>
-              <a:rPr lang="es-ES" sz="1600" dirty="0">
-                <a:latin typeface="Courier New" panose="02070309020205020404" pitchFamily="49" charset="0"/>
-                <a:cs typeface="Courier New" panose="02070309020205020404" pitchFamily="49" charset="0"/>
-              </a:rPr>
-              <a:t>X =</a:t>
-            </a:r>
-          </a:p>
-          <a:p>
-            <a:r>
-              <a:rPr lang="es-ES" sz="1600" dirty="0">
-                <a:latin typeface="Courier New" panose="02070309020205020404" pitchFamily="49" charset="0"/>
-                <a:cs typeface="Courier New" panose="02070309020205020404" pitchFamily="49" charset="0"/>
-              </a:rPr>
-              <a:t>    -2    -1     0     1     2     3     4</a:t>
-            </a:r>
-          </a:p>
-          <a:p>
-            <a:r>
-              <a:rPr lang="es-ES" sz="1600" dirty="0">
-                <a:latin typeface="Courier New" panose="02070309020205020404" pitchFamily="49" charset="0"/>
-                <a:cs typeface="Courier New" panose="02070309020205020404" pitchFamily="49" charset="0"/>
-              </a:rPr>
-              <a:t>    -2    -1     0     1     2     3     4</a:t>
-            </a:r>
-          </a:p>
-          <a:p>
-            <a:r>
-              <a:rPr lang="es-ES" sz="1600" dirty="0">
-                <a:latin typeface="Courier New" panose="02070309020205020404" pitchFamily="49" charset="0"/>
-                <a:cs typeface="Courier New" panose="02070309020205020404" pitchFamily="49" charset="0"/>
-              </a:rPr>
-              <a:t>    -2    -1     0     1     2     3     4</a:t>
-            </a:r>
-          </a:p>
-          <a:p>
-            <a:r>
-              <a:rPr lang="es-ES" sz="1600" dirty="0">
-                <a:latin typeface="Courier New" panose="02070309020205020404" pitchFamily="49" charset="0"/>
-                <a:cs typeface="Courier New" panose="02070309020205020404" pitchFamily="49" charset="0"/>
-              </a:rPr>
-              <a:t>    -2    -1     0     1     2     3     4</a:t>
-            </a:r>
-          </a:p>
-          <a:p>
-            <a:r>
-              <a:rPr lang="es-ES" sz="1600" dirty="0">
-                <a:latin typeface="Courier New" panose="02070309020205020404" pitchFamily="49" charset="0"/>
-                <a:cs typeface="Courier New" panose="02070309020205020404" pitchFamily="49" charset="0"/>
-              </a:rPr>
-              <a:t>    -2    -1     0     1     2     3     4</a:t>
-            </a:r>
-          </a:p>
-          <a:p>
-            <a:r>
-              <a:rPr lang="es-ES" sz="1600" dirty="0">
-                <a:latin typeface="Courier New" panose="02070309020205020404" pitchFamily="49" charset="0"/>
-                <a:cs typeface="Courier New" panose="02070309020205020404" pitchFamily="49" charset="0"/>
-              </a:rPr>
-              <a:t>    -2    -1     0     1     2     3     4</a:t>
-            </a:r>
-          </a:p>
-          <a:p>
-            <a:endParaRPr lang="es-ES" sz="1600" dirty="0">
-              <a:latin typeface="Courier New" panose="02070309020205020404" pitchFamily="49" charset="0"/>
-              <a:cs typeface="Courier New" panose="02070309020205020404" pitchFamily="49" charset="0"/>
-            </a:endParaRPr>
-          </a:p>
-          <a:p>
-            <a:r>
-              <a:rPr lang="es-ES" sz="1600" dirty="0">
-                <a:latin typeface="Courier New" panose="02070309020205020404" pitchFamily="49" charset="0"/>
-                <a:cs typeface="Courier New" panose="02070309020205020404" pitchFamily="49" charset="0"/>
-              </a:rPr>
-              <a:t>Y =</a:t>
-            </a:r>
-          </a:p>
-          <a:p>
-            <a:r>
-              <a:rPr lang="es-ES" sz="1600" dirty="0">
-                <a:latin typeface="Courier New" panose="02070309020205020404" pitchFamily="49" charset="0"/>
-                <a:cs typeface="Courier New" panose="02070309020205020404" pitchFamily="49" charset="0"/>
-              </a:rPr>
-              <a:t>     0     0     0     0     0     0     0</a:t>
-            </a:r>
-          </a:p>
-          <a:p>
-            <a:r>
-              <a:rPr lang="es-ES" sz="1600" dirty="0">
-                <a:latin typeface="Courier New" panose="02070309020205020404" pitchFamily="49" charset="0"/>
-                <a:cs typeface="Courier New" panose="02070309020205020404" pitchFamily="49" charset="0"/>
-              </a:rPr>
-              <a:t>     1     1     1     1     1     1     1</a:t>
-            </a:r>
-          </a:p>
-          <a:p>
-            <a:r>
-              <a:rPr lang="es-ES" sz="1600" dirty="0">
-                <a:latin typeface="Courier New" panose="02070309020205020404" pitchFamily="49" charset="0"/>
-                <a:cs typeface="Courier New" panose="02070309020205020404" pitchFamily="49" charset="0"/>
-              </a:rPr>
-              <a:t>     2     2     2     2     2     2     2</a:t>
-            </a:r>
-          </a:p>
-          <a:p>
-            <a:r>
-              <a:rPr lang="es-ES" sz="1600" dirty="0">
-                <a:latin typeface="Courier New" panose="02070309020205020404" pitchFamily="49" charset="0"/>
-                <a:cs typeface="Courier New" panose="02070309020205020404" pitchFamily="49" charset="0"/>
-              </a:rPr>
-              <a:t>     3     3     3     3     3     3     3</a:t>
-            </a:r>
-          </a:p>
-          <a:p>
-            <a:r>
-              <a:rPr lang="es-ES" sz="1600" dirty="0">
-                <a:latin typeface="Courier New" panose="02070309020205020404" pitchFamily="49" charset="0"/>
-                <a:cs typeface="Courier New" panose="02070309020205020404" pitchFamily="49" charset="0"/>
-              </a:rPr>
-              <a:t>     4     4     4     4     4     4     4</a:t>
-            </a:r>
-          </a:p>
-          <a:p>
-            <a:r>
-              <a:rPr lang="es-ES" sz="1600" dirty="0">
-                <a:latin typeface="Courier New" panose="02070309020205020404" pitchFamily="49" charset="0"/>
-                <a:cs typeface="Courier New" panose="02070309020205020404" pitchFamily="49" charset="0"/>
-              </a:rPr>
-              <a:t>     5     5     5     5     5     5     5</a:t>
-            </a:r>
-            <a:endParaRPr lang="en-GB" sz="1600" dirty="0">
-              <a:latin typeface="Courier New" panose="02070309020205020404" pitchFamily="49" charset="0"/>
-              <a:cs typeface="Courier New" panose="02070309020205020404" pitchFamily="49" charset="0"/>
-            </a:endParaRPr>
-          </a:p>
-        </p:txBody>
-      </p:sp>
-      <p:sp>
-        <p:nvSpPr>
-          <p:cNvPr id="3" name="Right Brace 2">
-            <a:extLst>
-              <a:ext uri="{FF2B5EF4-FFF2-40B4-BE49-F238E27FC236}">
-                <a16:creationId xmlns:a16="http://schemas.microsoft.com/office/drawing/2014/main" id="{31343DAE-49D5-0A64-04A4-51A98E4DC6FA}"/>
-              </a:ext>
-            </a:extLst>
-          </p:cNvPr>
-          <p:cNvSpPr/>
-          <p:nvPr/>
-        </p:nvSpPr>
-        <p:spPr>
-          <a:xfrm>
-            <a:off x="4572000" y="1809430"/>
-            <a:ext cx="245660" cy="646331"/>
-          </a:xfrm>
-          <a:prstGeom prst="rightBrace">
-            <a:avLst/>
-          </a:prstGeom>
-        </p:spPr>
-        <p:style>
-          <a:lnRef idx="1">
-            <a:schemeClr val="accent1"/>
-          </a:lnRef>
-          <a:fillRef idx="0">
-            <a:schemeClr val="accent1"/>
-          </a:fillRef>
-          <a:effectRef idx="0">
-            <a:schemeClr val="accent1"/>
-          </a:effectRef>
-          <a:fontRef idx="minor">
-            <a:schemeClr val="tx1"/>
-          </a:fontRef>
-        </p:style>
-        <p:txBody>
-          <a:bodyPr rtlCol="0" anchor="ctr"/>
-          <a:lstStyle/>
-          <a:p>
-            <a:pPr algn="ctr"/>
-            <a:endParaRPr lang="en-GB"/>
-          </a:p>
-        </p:txBody>
-      </p:sp>
-      <p:sp>
-        <p:nvSpPr>
-          <p:cNvPr id="6" name="TextBox 5">
-            <a:extLst>
-              <a:ext uri="{FF2B5EF4-FFF2-40B4-BE49-F238E27FC236}">
-                <a16:creationId xmlns:a16="http://schemas.microsoft.com/office/drawing/2014/main" id="{514CF187-C22D-DA14-EEEB-2AB713CCC707}"/>
-              </a:ext>
-            </a:extLst>
-          </p:cNvPr>
-          <p:cNvSpPr txBox="1"/>
-          <p:nvPr/>
-        </p:nvSpPr>
-        <p:spPr>
-          <a:xfrm>
-            <a:off x="4850216" y="1809429"/>
-            <a:ext cx="2620370" cy="646331"/>
-          </a:xfrm>
-          <a:prstGeom prst="rect">
-            <a:avLst/>
-          </a:prstGeom>
-          <a:noFill/>
-        </p:spPr>
-        <p:txBody>
-          <a:bodyPr wrap="square" rtlCol="0">
-            <a:spAutoFit/>
-          </a:bodyPr>
-          <a:lstStyle/>
-          <a:p>
-            <a:r>
-              <a:rPr lang="en-GB" dirty="0"/>
-              <a:t>42 points in grid of points in the </a:t>
-            </a:r>
-            <a:r>
-              <a:rPr lang="en-GB" dirty="0" err="1"/>
-              <a:t>x,y</a:t>
-            </a:r>
-            <a:r>
-              <a:rPr lang="en-GB" dirty="0"/>
-              <a:t> plan</a:t>
-            </a:r>
-          </a:p>
-        </p:txBody>
-      </p:sp>
-      <p:sp>
-        <p:nvSpPr>
-          <p:cNvPr id="7" name="Right Brace 6">
-            <a:extLst>
-              <a:ext uri="{FF2B5EF4-FFF2-40B4-BE49-F238E27FC236}">
-                <a16:creationId xmlns:a16="http://schemas.microsoft.com/office/drawing/2014/main" id="{AD20F55A-0120-FAAE-FF6E-2FFEE18BC229}"/>
-              </a:ext>
-            </a:extLst>
-          </p:cNvPr>
-          <p:cNvSpPr/>
-          <p:nvPr/>
-        </p:nvSpPr>
-        <p:spPr>
-          <a:xfrm>
-            <a:off x="6160401" y="3152633"/>
-            <a:ext cx="199456" cy="1514901"/>
-          </a:xfrm>
-          <a:prstGeom prst="rightBrace">
-            <a:avLst/>
-          </a:prstGeom>
-        </p:spPr>
-        <p:style>
-          <a:lnRef idx="1">
-            <a:schemeClr val="accent1"/>
-          </a:lnRef>
-          <a:fillRef idx="0">
-            <a:schemeClr val="accent1"/>
-          </a:fillRef>
-          <a:effectRef idx="0">
-            <a:schemeClr val="accent1"/>
-          </a:effectRef>
-          <a:fontRef idx="minor">
-            <a:schemeClr val="tx1"/>
-          </a:fontRef>
-        </p:style>
-        <p:txBody>
-          <a:bodyPr rtlCol="0" anchor="ctr"/>
-          <a:lstStyle/>
-          <a:p>
-            <a:pPr algn="ctr"/>
-            <a:endParaRPr lang="en-GB"/>
-          </a:p>
-        </p:txBody>
-      </p:sp>
-      <p:sp>
-        <p:nvSpPr>
-          <p:cNvPr id="8" name="Right Brace 7">
-            <a:extLst>
-              <a:ext uri="{FF2B5EF4-FFF2-40B4-BE49-F238E27FC236}">
-                <a16:creationId xmlns:a16="http://schemas.microsoft.com/office/drawing/2014/main" id="{230BFCCE-9F3A-32F0-8674-D1B73D723E81}"/>
-              </a:ext>
-            </a:extLst>
-          </p:cNvPr>
-          <p:cNvSpPr/>
-          <p:nvPr/>
-        </p:nvSpPr>
-        <p:spPr>
-          <a:xfrm>
-            <a:off x="6160401" y="5115386"/>
-            <a:ext cx="199456" cy="1514901"/>
-          </a:xfrm>
-          <a:prstGeom prst="rightBrace">
-            <a:avLst/>
-          </a:prstGeom>
-        </p:spPr>
-        <p:style>
-          <a:lnRef idx="1">
-            <a:schemeClr val="accent1"/>
-          </a:lnRef>
-          <a:fillRef idx="0">
-            <a:schemeClr val="accent1"/>
-          </a:fillRef>
-          <a:effectRef idx="0">
-            <a:schemeClr val="accent1"/>
-          </a:effectRef>
-          <a:fontRef idx="minor">
-            <a:schemeClr val="tx1"/>
-          </a:fontRef>
-        </p:style>
-        <p:txBody>
-          <a:bodyPr rtlCol="0" anchor="ctr"/>
-          <a:lstStyle/>
-          <a:p>
-            <a:pPr algn="ctr"/>
-            <a:endParaRPr lang="en-GB"/>
-          </a:p>
-        </p:txBody>
-      </p:sp>
-      <p:sp>
-        <p:nvSpPr>
-          <p:cNvPr id="9" name="TextBox 8">
-            <a:extLst>
-              <a:ext uri="{FF2B5EF4-FFF2-40B4-BE49-F238E27FC236}">
-                <a16:creationId xmlns:a16="http://schemas.microsoft.com/office/drawing/2014/main" id="{B1C16069-EF4B-594A-4E60-0568F3DEF66F}"/>
-              </a:ext>
-            </a:extLst>
-          </p:cNvPr>
-          <p:cNvSpPr txBox="1"/>
-          <p:nvPr/>
-        </p:nvSpPr>
-        <p:spPr>
-          <a:xfrm>
-            <a:off x="6469038" y="3576075"/>
-            <a:ext cx="2238233" cy="646331"/>
-          </a:xfrm>
-          <a:prstGeom prst="rect">
-            <a:avLst/>
-          </a:prstGeom>
-          <a:noFill/>
-        </p:spPr>
-        <p:txBody>
-          <a:bodyPr wrap="square" rtlCol="0">
-            <a:spAutoFit/>
-          </a:bodyPr>
-          <a:lstStyle/>
-          <a:p>
-            <a:r>
-              <a:rPr lang="en-GB" dirty="0"/>
-              <a:t>x coordinate at each grid point</a:t>
-            </a:r>
-          </a:p>
-        </p:txBody>
-      </p:sp>
-      <p:sp>
-        <p:nvSpPr>
-          <p:cNvPr id="11" name="TextBox 10">
-            <a:extLst>
-              <a:ext uri="{FF2B5EF4-FFF2-40B4-BE49-F238E27FC236}">
-                <a16:creationId xmlns:a16="http://schemas.microsoft.com/office/drawing/2014/main" id="{20E6FF15-DBF9-0936-31E7-76D4ABF1D3EB}"/>
-              </a:ext>
-            </a:extLst>
-          </p:cNvPr>
-          <p:cNvSpPr txBox="1"/>
-          <p:nvPr/>
-        </p:nvSpPr>
-        <p:spPr>
-          <a:xfrm>
-            <a:off x="6469038" y="5506134"/>
-            <a:ext cx="2238233" cy="646331"/>
-          </a:xfrm>
-          <a:prstGeom prst="rect">
-            <a:avLst/>
-          </a:prstGeom>
-          <a:noFill/>
-        </p:spPr>
-        <p:txBody>
-          <a:bodyPr wrap="square" rtlCol="0">
-            <a:spAutoFit/>
-          </a:bodyPr>
-          <a:lstStyle/>
-          <a:p>
-            <a:r>
-              <a:rPr lang="en-GB" dirty="0"/>
-              <a:t>y coordinate at each grid point</a:t>
-            </a:r>
-          </a:p>
-        </p:txBody>
-      </p:sp>
-    </p:spTree>
-    <p:extLst>
-      <p:ext uri="{BB962C8B-B14F-4D97-AF65-F5344CB8AC3E}">
-        <p14:creationId xmlns:p14="http://schemas.microsoft.com/office/powerpoint/2010/main" val="4200687632"/>
       </p:ext>
     </p:extLst>
   </p:cSld>
@@ -21583,6 +21677,626 @@
       <p:sp>
         <p:nvSpPr>
           <p:cNvPr id="2" name="Title 1"/>
+          <p:cNvSpPr txBox="1">
+            <a:spLocks/>
+          </p:cNvSpPr>
+          <p:nvPr/>
+        </p:nvSpPr>
+        <p:spPr>
+          <a:xfrm>
+            <a:off x="466725" y="339470"/>
+            <a:ext cx="7886700" cy="554831"/>
+          </a:xfrm>
+          <a:prstGeom prst="rect">
+            <a:avLst/>
+          </a:prstGeom>
+        </p:spPr>
+        <p:txBody>
+          <a:bodyPr/>
+          <a:lstStyle>
+            <a:lvl1pPr algn="l" defTabSz="914400" rtl="0" eaLnBrk="1" latinLnBrk="0" hangingPunct="1">
+              <a:lnSpc>
+                <a:spcPct val="90000"/>
+              </a:lnSpc>
+              <a:spcBef>
+                <a:spcPct val="0"/>
+              </a:spcBef>
+              <a:buNone/>
+              <a:defRPr sz="4400" kern="1200">
+                <a:solidFill>
+                  <a:schemeClr val="tx1"/>
+                </a:solidFill>
+                <a:latin typeface="+mj-lt"/>
+                <a:ea typeface="+mj-ea"/>
+                <a:cs typeface="+mj-cs"/>
+              </a:defRPr>
+            </a:lvl1pPr>
+          </a:lstStyle>
+          <a:p>
+            <a:pPr algn="ctr"/>
+            <a:r>
+              <a:rPr lang="en-GB" sz="3300" dirty="0"/>
+              <a:t>Making Grids</a:t>
+            </a:r>
+          </a:p>
+        </p:txBody>
+      </p:sp>
+      <p:sp>
+        <p:nvSpPr>
+          <p:cNvPr id="4" name="TextBox 3"/>
+          <p:cNvSpPr txBox="1"/>
+          <p:nvPr/>
+        </p:nvSpPr>
+        <p:spPr>
+          <a:xfrm>
+            <a:off x="600075" y="1028700"/>
+            <a:ext cx="7496175" cy="646331"/>
+          </a:xfrm>
+          <a:prstGeom prst="rect">
+            <a:avLst/>
+          </a:prstGeom>
+          <a:noFill/>
+        </p:spPr>
+        <p:txBody>
+          <a:bodyPr wrap="square" rtlCol="0">
+            <a:spAutoFit/>
+          </a:bodyPr>
+          <a:lstStyle/>
+          <a:p>
+            <a:r>
+              <a:rPr lang="en-GB" dirty="0"/>
+              <a:t>The </a:t>
+            </a:r>
+            <a:r>
+              <a:rPr lang="en-GB" dirty="0" err="1">
+                <a:latin typeface="Courier New" panose="02070309020205020404" pitchFamily="49" charset="0"/>
+                <a:cs typeface="Courier New" panose="02070309020205020404" pitchFamily="49" charset="0"/>
+              </a:rPr>
+              <a:t>meshgrid</a:t>
+            </a:r>
+            <a:r>
+              <a:rPr lang="en-GB" dirty="0">
+                <a:latin typeface="Courier New" panose="02070309020205020404" pitchFamily="49" charset="0"/>
+                <a:cs typeface="Courier New" panose="02070309020205020404" pitchFamily="49" charset="0"/>
+              </a:rPr>
+              <a:t> </a:t>
+            </a:r>
+            <a:r>
+              <a:rPr lang="en-GB" dirty="0">
+                <a:cs typeface="Courier New" panose="02070309020205020404" pitchFamily="49" charset="0"/>
+              </a:rPr>
+              <a:t>function converts vectors of points into matrices that can represent a grid of points in the x-y plane</a:t>
+            </a:r>
+            <a:endParaRPr lang="en-GB" dirty="0"/>
+          </a:p>
+        </p:txBody>
+      </p:sp>
+      <p:sp>
+        <p:nvSpPr>
+          <p:cNvPr id="5" name="TextBox 4"/>
+          <p:cNvSpPr txBox="1"/>
+          <p:nvPr/>
+        </p:nvSpPr>
+        <p:spPr>
+          <a:xfrm>
+            <a:off x="802872" y="1809429"/>
+            <a:ext cx="6981825" cy="4893647"/>
+          </a:xfrm>
+          <a:prstGeom prst="rect">
+            <a:avLst/>
+          </a:prstGeom>
+          <a:noFill/>
+        </p:spPr>
+        <p:txBody>
+          <a:bodyPr wrap="square" rtlCol="0">
+            <a:spAutoFit/>
+          </a:bodyPr>
+          <a:lstStyle/>
+          <a:p>
+            <a:r>
+              <a:rPr lang="es-ES" dirty="0">
+                <a:latin typeface="Courier New" panose="02070309020205020404" pitchFamily="49" charset="0"/>
+                <a:cs typeface="Courier New" panose="02070309020205020404" pitchFamily="49" charset="0"/>
+              </a:rPr>
+              <a:t>&gt;&gt; x = -2:4; </a:t>
+            </a:r>
+            <a:r>
+              <a:rPr lang="es-ES" dirty="0">
+                <a:solidFill>
+                  <a:srgbClr val="00B050"/>
+                </a:solidFill>
+                <a:latin typeface="Courier New" panose="02070309020205020404" pitchFamily="49" charset="0"/>
+                <a:cs typeface="Courier New" panose="02070309020205020404" pitchFamily="49" charset="0"/>
+              </a:rPr>
+              <a:t>% 1 x 7 vector</a:t>
+            </a:r>
+            <a:endParaRPr lang="es-ES" dirty="0">
+              <a:latin typeface="Courier New" panose="02070309020205020404" pitchFamily="49" charset="0"/>
+              <a:cs typeface="Courier New" panose="02070309020205020404" pitchFamily="49" charset="0"/>
+            </a:endParaRPr>
+          </a:p>
+          <a:p>
+            <a:r>
+              <a:rPr lang="es-ES" dirty="0">
+                <a:latin typeface="Courier New" panose="02070309020205020404" pitchFamily="49" charset="0"/>
+                <a:cs typeface="Courier New" panose="02070309020205020404" pitchFamily="49" charset="0"/>
+              </a:rPr>
+              <a:t>&gt;&gt; y = 0:5;  </a:t>
+            </a:r>
+            <a:r>
+              <a:rPr lang="es-ES" dirty="0">
+                <a:solidFill>
+                  <a:srgbClr val="00B050"/>
+                </a:solidFill>
+                <a:latin typeface="Courier New" panose="02070309020205020404" pitchFamily="49" charset="0"/>
+                <a:cs typeface="Courier New" panose="02070309020205020404" pitchFamily="49" charset="0"/>
+              </a:rPr>
+              <a:t>% 1 x 6 vector</a:t>
+            </a:r>
+            <a:endParaRPr lang="es-ES" dirty="0">
+              <a:latin typeface="Courier New" panose="02070309020205020404" pitchFamily="49" charset="0"/>
+              <a:cs typeface="Courier New" panose="02070309020205020404" pitchFamily="49" charset="0"/>
+            </a:endParaRPr>
+          </a:p>
+          <a:p>
+            <a:r>
+              <a:rPr lang="es-ES" dirty="0">
+                <a:latin typeface="Courier New" panose="02070309020205020404" pitchFamily="49" charset="0"/>
+                <a:cs typeface="Courier New" panose="02070309020205020404" pitchFamily="49" charset="0"/>
+              </a:rPr>
+              <a:t>&gt;&gt; [X,Y] = </a:t>
+            </a:r>
+            <a:r>
+              <a:rPr lang="es-ES" dirty="0" err="1">
+                <a:latin typeface="Courier New" panose="02070309020205020404" pitchFamily="49" charset="0"/>
+                <a:cs typeface="Courier New" panose="02070309020205020404" pitchFamily="49" charset="0"/>
+              </a:rPr>
+              <a:t>meshgrid</a:t>
+            </a:r>
+            <a:r>
+              <a:rPr lang="es-ES" dirty="0">
+                <a:latin typeface="Courier New" panose="02070309020205020404" pitchFamily="49" charset="0"/>
+                <a:cs typeface="Courier New" panose="02070309020205020404" pitchFamily="49" charset="0"/>
+              </a:rPr>
+              <a:t>(</a:t>
+            </a:r>
+            <a:r>
+              <a:rPr lang="es-ES" dirty="0" err="1">
+                <a:latin typeface="Courier New" panose="02070309020205020404" pitchFamily="49" charset="0"/>
+                <a:cs typeface="Courier New" panose="02070309020205020404" pitchFamily="49" charset="0"/>
+              </a:rPr>
+              <a:t>x,y</a:t>
+            </a:r>
+            <a:r>
+              <a:rPr lang="es-ES" dirty="0">
+                <a:latin typeface="Courier New" panose="02070309020205020404" pitchFamily="49" charset="0"/>
+                <a:cs typeface="Courier New" panose="02070309020205020404" pitchFamily="49" charset="0"/>
+              </a:rPr>
+              <a:t>)</a:t>
+            </a:r>
+          </a:p>
+          <a:p>
+            <a:endParaRPr lang="es-ES" dirty="0">
+              <a:latin typeface="Courier New" panose="02070309020205020404" pitchFamily="49" charset="0"/>
+              <a:cs typeface="Courier New" panose="02070309020205020404" pitchFamily="49" charset="0"/>
+            </a:endParaRPr>
+          </a:p>
+          <a:p>
+            <a:r>
+              <a:rPr lang="es-ES" sz="1600" dirty="0">
+                <a:latin typeface="Courier New" panose="02070309020205020404" pitchFamily="49" charset="0"/>
+                <a:cs typeface="Courier New" panose="02070309020205020404" pitchFamily="49" charset="0"/>
+              </a:rPr>
+              <a:t>X =</a:t>
+            </a:r>
+          </a:p>
+          <a:p>
+            <a:r>
+              <a:rPr lang="es-ES" sz="1600" dirty="0">
+                <a:latin typeface="Courier New" panose="02070309020205020404" pitchFamily="49" charset="0"/>
+                <a:cs typeface="Courier New" panose="02070309020205020404" pitchFamily="49" charset="0"/>
+              </a:rPr>
+              <a:t>    -2    -1     0     1     2     3     4</a:t>
+            </a:r>
+          </a:p>
+          <a:p>
+            <a:r>
+              <a:rPr lang="es-ES" sz="1600" dirty="0">
+                <a:latin typeface="Courier New" panose="02070309020205020404" pitchFamily="49" charset="0"/>
+                <a:cs typeface="Courier New" panose="02070309020205020404" pitchFamily="49" charset="0"/>
+              </a:rPr>
+              <a:t>    -2    -1     0     1     2     3     4</a:t>
+            </a:r>
+          </a:p>
+          <a:p>
+            <a:r>
+              <a:rPr lang="es-ES" sz="1600" dirty="0">
+                <a:latin typeface="Courier New" panose="02070309020205020404" pitchFamily="49" charset="0"/>
+                <a:cs typeface="Courier New" panose="02070309020205020404" pitchFamily="49" charset="0"/>
+              </a:rPr>
+              <a:t>    -2    -1     0     1     2     3     4</a:t>
+            </a:r>
+          </a:p>
+          <a:p>
+            <a:r>
+              <a:rPr lang="es-ES" sz="1600" dirty="0">
+                <a:latin typeface="Courier New" panose="02070309020205020404" pitchFamily="49" charset="0"/>
+                <a:cs typeface="Courier New" panose="02070309020205020404" pitchFamily="49" charset="0"/>
+              </a:rPr>
+              <a:t>    -2    -1     0     1     2     3     4</a:t>
+            </a:r>
+          </a:p>
+          <a:p>
+            <a:r>
+              <a:rPr lang="es-ES" sz="1600" dirty="0">
+                <a:latin typeface="Courier New" panose="02070309020205020404" pitchFamily="49" charset="0"/>
+                <a:cs typeface="Courier New" panose="02070309020205020404" pitchFamily="49" charset="0"/>
+              </a:rPr>
+              <a:t>    -2    -1     0     1     2     3     4</a:t>
+            </a:r>
+          </a:p>
+          <a:p>
+            <a:r>
+              <a:rPr lang="es-ES" sz="1600" dirty="0">
+                <a:latin typeface="Courier New" panose="02070309020205020404" pitchFamily="49" charset="0"/>
+                <a:cs typeface="Courier New" panose="02070309020205020404" pitchFamily="49" charset="0"/>
+              </a:rPr>
+              <a:t>    -2    -1     0     1     2     3     4</a:t>
+            </a:r>
+          </a:p>
+          <a:p>
+            <a:endParaRPr lang="es-ES" sz="1600" dirty="0">
+              <a:latin typeface="Courier New" panose="02070309020205020404" pitchFamily="49" charset="0"/>
+              <a:cs typeface="Courier New" panose="02070309020205020404" pitchFamily="49" charset="0"/>
+            </a:endParaRPr>
+          </a:p>
+          <a:p>
+            <a:r>
+              <a:rPr lang="es-ES" sz="1600" dirty="0">
+                <a:latin typeface="Courier New" panose="02070309020205020404" pitchFamily="49" charset="0"/>
+                <a:cs typeface="Courier New" panose="02070309020205020404" pitchFamily="49" charset="0"/>
+              </a:rPr>
+              <a:t>Y =</a:t>
+            </a:r>
+          </a:p>
+          <a:p>
+            <a:r>
+              <a:rPr lang="es-ES" sz="1600" dirty="0">
+                <a:latin typeface="Courier New" panose="02070309020205020404" pitchFamily="49" charset="0"/>
+                <a:cs typeface="Courier New" panose="02070309020205020404" pitchFamily="49" charset="0"/>
+              </a:rPr>
+              <a:t>     0     0     0     0     0     0     0</a:t>
+            </a:r>
+          </a:p>
+          <a:p>
+            <a:r>
+              <a:rPr lang="es-ES" sz="1600" dirty="0">
+                <a:latin typeface="Courier New" panose="02070309020205020404" pitchFamily="49" charset="0"/>
+                <a:cs typeface="Courier New" panose="02070309020205020404" pitchFamily="49" charset="0"/>
+              </a:rPr>
+              <a:t>     1     1     1     1     1     1     1</a:t>
+            </a:r>
+          </a:p>
+          <a:p>
+            <a:r>
+              <a:rPr lang="es-ES" sz="1600" dirty="0">
+                <a:latin typeface="Courier New" panose="02070309020205020404" pitchFamily="49" charset="0"/>
+                <a:cs typeface="Courier New" panose="02070309020205020404" pitchFamily="49" charset="0"/>
+              </a:rPr>
+              <a:t>     2     2     2     2     2     2     2</a:t>
+            </a:r>
+          </a:p>
+          <a:p>
+            <a:r>
+              <a:rPr lang="es-ES" sz="1600" dirty="0">
+                <a:latin typeface="Courier New" panose="02070309020205020404" pitchFamily="49" charset="0"/>
+                <a:cs typeface="Courier New" panose="02070309020205020404" pitchFamily="49" charset="0"/>
+              </a:rPr>
+              <a:t>     3     3     3     3     3     3     3</a:t>
+            </a:r>
+          </a:p>
+          <a:p>
+            <a:r>
+              <a:rPr lang="es-ES" sz="1600" dirty="0">
+                <a:latin typeface="Courier New" panose="02070309020205020404" pitchFamily="49" charset="0"/>
+                <a:cs typeface="Courier New" panose="02070309020205020404" pitchFamily="49" charset="0"/>
+              </a:rPr>
+              <a:t>     4     4     4     4     4     4     4</a:t>
+            </a:r>
+          </a:p>
+          <a:p>
+            <a:r>
+              <a:rPr lang="es-ES" sz="1600" dirty="0">
+                <a:latin typeface="Courier New" panose="02070309020205020404" pitchFamily="49" charset="0"/>
+                <a:cs typeface="Courier New" panose="02070309020205020404" pitchFamily="49" charset="0"/>
+              </a:rPr>
+              <a:t>     5     5     5     5     5     5     5</a:t>
+            </a:r>
+            <a:endParaRPr lang="en-GB" sz="1600" dirty="0">
+              <a:latin typeface="Courier New" panose="02070309020205020404" pitchFamily="49" charset="0"/>
+              <a:cs typeface="Courier New" panose="02070309020205020404" pitchFamily="49" charset="0"/>
+            </a:endParaRPr>
+          </a:p>
+        </p:txBody>
+      </p:sp>
+      <p:sp>
+        <p:nvSpPr>
+          <p:cNvPr id="3" name="Right Brace 2">
+            <a:extLst>
+              <a:ext uri="{FF2B5EF4-FFF2-40B4-BE49-F238E27FC236}">
+                <a16:creationId xmlns:a16="http://schemas.microsoft.com/office/drawing/2014/main" id="{31343DAE-49D5-0A64-04A4-51A98E4DC6FA}"/>
+              </a:ext>
+            </a:extLst>
+          </p:cNvPr>
+          <p:cNvSpPr/>
+          <p:nvPr/>
+        </p:nvSpPr>
+        <p:spPr>
+          <a:xfrm>
+            <a:off x="4572000" y="1809430"/>
+            <a:ext cx="245660" cy="646331"/>
+          </a:xfrm>
+          <a:prstGeom prst="rightBrace">
+            <a:avLst/>
+          </a:prstGeom>
+        </p:spPr>
+        <p:style>
+          <a:lnRef idx="1">
+            <a:schemeClr val="accent1"/>
+          </a:lnRef>
+          <a:fillRef idx="0">
+            <a:schemeClr val="accent1"/>
+          </a:fillRef>
+          <a:effectRef idx="0">
+            <a:schemeClr val="accent1"/>
+          </a:effectRef>
+          <a:fontRef idx="minor">
+            <a:schemeClr val="tx1"/>
+          </a:fontRef>
+        </p:style>
+        <p:txBody>
+          <a:bodyPr rtlCol="0" anchor="ctr"/>
+          <a:lstStyle/>
+          <a:p>
+            <a:pPr algn="ctr"/>
+            <a:endParaRPr lang="en-GB"/>
+          </a:p>
+        </p:txBody>
+      </p:sp>
+      <p:sp>
+        <p:nvSpPr>
+          <p:cNvPr id="6" name="TextBox 5">
+            <a:extLst>
+              <a:ext uri="{FF2B5EF4-FFF2-40B4-BE49-F238E27FC236}">
+                <a16:creationId xmlns:a16="http://schemas.microsoft.com/office/drawing/2014/main" id="{514CF187-C22D-DA14-EEEB-2AB713CCC707}"/>
+              </a:ext>
+            </a:extLst>
+          </p:cNvPr>
+          <p:cNvSpPr txBox="1"/>
+          <p:nvPr/>
+        </p:nvSpPr>
+        <p:spPr>
+          <a:xfrm>
+            <a:off x="4850216" y="1809429"/>
+            <a:ext cx="2620370" cy="646331"/>
+          </a:xfrm>
+          <a:prstGeom prst="rect">
+            <a:avLst/>
+          </a:prstGeom>
+          <a:noFill/>
+        </p:spPr>
+        <p:txBody>
+          <a:bodyPr wrap="square" rtlCol="0">
+            <a:spAutoFit/>
+          </a:bodyPr>
+          <a:lstStyle/>
+          <a:p>
+            <a:r>
+              <a:rPr lang="en-GB" dirty="0"/>
+              <a:t>42 points in grid of points in the </a:t>
+            </a:r>
+            <a:r>
+              <a:rPr lang="en-GB" dirty="0" err="1"/>
+              <a:t>x,y</a:t>
+            </a:r>
+            <a:r>
+              <a:rPr lang="en-GB" dirty="0"/>
+              <a:t> plan</a:t>
+            </a:r>
+          </a:p>
+        </p:txBody>
+      </p:sp>
+      <p:sp>
+        <p:nvSpPr>
+          <p:cNvPr id="7" name="Right Brace 6">
+            <a:extLst>
+              <a:ext uri="{FF2B5EF4-FFF2-40B4-BE49-F238E27FC236}">
+                <a16:creationId xmlns:a16="http://schemas.microsoft.com/office/drawing/2014/main" id="{AD20F55A-0120-FAAE-FF6E-2FFEE18BC229}"/>
+              </a:ext>
+            </a:extLst>
+          </p:cNvPr>
+          <p:cNvSpPr/>
+          <p:nvPr/>
+        </p:nvSpPr>
+        <p:spPr>
+          <a:xfrm>
+            <a:off x="6160401" y="3152633"/>
+            <a:ext cx="199456" cy="1514901"/>
+          </a:xfrm>
+          <a:prstGeom prst="rightBrace">
+            <a:avLst/>
+          </a:prstGeom>
+        </p:spPr>
+        <p:style>
+          <a:lnRef idx="1">
+            <a:schemeClr val="accent1"/>
+          </a:lnRef>
+          <a:fillRef idx="0">
+            <a:schemeClr val="accent1"/>
+          </a:fillRef>
+          <a:effectRef idx="0">
+            <a:schemeClr val="accent1"/>
+          </a:effectRef>
+          <a:fontRef idx="minor">
+            <a:schemeClr val="tx1"/>
+          </a:fontRef>
+        </p:style>
+        <p:txBody>
+          <a:bodyPr rtlCol="0" anchor="ctr"/>
+          <a:lstStyle/>
+          <a:p>
+            <a:pPr algn="ctr"/>
+            <a:endParaRPr lang="en-GB"/>
+          </a:p>
+        </p:txBody>
+      </p:sp>
+      <p:sp>
+        <p:nvSpPr>
+          <p:cNvPr id="8" name="Right Brace 7">
+            <a:extLst>
+              <a:ext uri="{FF2B5EF4-FFF2-40B4-BE49-F238E27FC236}">
+                <a16:creationId xmlns:a16="http://schemas.microsoft.com/office/drawing/2014/main" id="{230BFCCE-9F3A-32F0-8674-D1B73D723E81}"/>
+              </a:ext>
+            </a:extLst>
+          </p:cNvPr>
+          <p:cNvSpPr/>
+          <p:nvPr/>
+        </p:nvSpPr>
+        <p:spPr>
+          <a:xfrm>
+            <a:off x="6160401" y="5115386"/>
+            <a:ext cx="199456" cy="1514901"/>
+          </a:xfrm>
+          <a:prstGeom prst="rightBrace">
+            <a:avLst/>
+          </a:prstGeom>
+        </p:spPr>
+        <p:style>
+          <a:lnRef idx="1">
+            <a:schemeClr val="accent1"/>
+          </a:lnRef>
+          <a:fillRef idx="0">
+            <a:schemeClr val="accent1"/>
+          </a:fillRef>
+          <a:effectRef idx="0">
+            <a:schemeClr val="accent1"/>
+          </a:effectRef>
+          <a:fontRef idx="minor">
+            <a:schemeClr val="tx1"/>
+          </a:fontRef>
+        </p:style>
+        <p:txBody>
+          <a:bodyPr rtlCol="0" anchor="ctr"/>
+          <a:lstStyle/>
+          <a:p>
+            <a:pPr algn="ctr"/>
+            <a:endParaRPr lang="en-GB"/>
+          </a:p>
+        </p:txBody>
+      </p:sp>
+      <p:sp>
+        <p:nvSpPr>
+          <p:cNvPr id="9" name="TextBox 8">
+            <a:extLst>
+              <a:ext uri="{FF2B5EF4-FFF2-40B4-BE49-F238E27FC236}">
+                <a16:creationId xmlns:a16="http://schemas.microsoft.com/office/drawing/2014/main" id="{B1C16069-EF4B-594A-4E60-0568F3DEF66F}"/>
+              </a:ext>
+            </a:extLst>
+          </p:cNvPr>
+          <p:cNvSpPr txBox="1"/>
+          <p:nvPr/>
+        </p:nvSpPr>
+        <p:spPr>
+          <a:xfrm>
+            <a:off x="6469038" y="3576075"/>
+            <a:ext cx="2238233" cy="646331"/>
+          </a:xfrm>
+          <a:prstGeom prst="rect">
+            <a:avLst/>
+          </a:prstGeom>
+          <a:noFill/>
+        </p:spPr>
+        <p:txBody>
+          <a:bodyPr wrap="square" rtlCol="0">
+            <a:spAutoFit/>
+          </a:bodyPr>
+          <a:lstStyle/>
+          <a:p>
+            <a:r>
+              <a:rPr lang="en-GB" dirty="0"/>
+              <a:t>x coordinate at each grid point</a:t>
+            </a:r>
+          </a:p>
+        </p:txBody>
+      </p:sp>
+      <p:sp>
+        <p:nvSpPr>
+          <p:cNvPr id="11" name="TextBox 10">
+            <a:extLst>
+              <a:ext uri="{FF2B5EF4-FFF2-40B4-BE49-F238E27FC236}">
+                <a16:creationId xmlns:a16="http://schemas.microsoft.com/office/drawing/2014/main" id="{20E6FF15-DBF9-0936-31E7-76D4ABF1D3EB}"/>
+              </a:ext>
+            </a:extLst>
+          </p:cNvPr>
+          <p:cNvSpPr txBox="1"/>
+          <p:nvPr/>
+        </p:nvSpPr>
+        <p:spPr>
+          <a:xfrm>
+            <a:off x="6469038" y="5506134"/>
+            <a:ext cx="2238233" cy="646331"/>
+          </a:xfrm>
+          <a:prstGeom prst="rect">
+            <a:avLst/>
+          </a:prstGeom>
+          <a:noFill/>
+        </p:spPr>
+        <p:txBody>
+          <a:bodyPr wrap="square" rtlCol="0">
+            <a:spAutoFit/>
+          </a:bodyPr>
+          <a:lstStyle/>
+          <a:p>
+            <a:r>
+              <a:rPr lang="en-GB" dirty="0"/>
+              <a:t>y coordinate at each grid point</a:t>
+            </a:r>
+          </a:p>
+        </p:txBody>
+      </p:sp>
+    </p:spTree>
+    <p:extLst>
+      <p:ext uri="{BB962C8B-B14F-4D97-AF65-F5344CB8AC3E}">
+        <p14:creationId xmlns:p14="http://schemas.microsoft.com/office/powerpoint/2010/main" val="4200687632"/>
+      </p:ext>
+    </p:extLst>
+  </p:cSld>
+  <p:clrMapOvr>
+    <a:masterClrMapping/>
+  </p:clrMapOvr>
+</p:sld>
+</file>
+
+<file path=ppt/slides/slide27.xml><?xml version="1.0" encoding="utf-8"?>
+<p:sld xmlns:a="http://schemas.openxmlformats.org/drawingml/2006/main" xmlns:r="http://schemas.openxmlformats.org/officeDocument/2006/relationships" xmlns:p="http://schemas.openxmlformats.org/presentationml/2006/main">
+  <p:cSld>
+    <p:spTree>
+      <p:nvGrpSpPr>
+        <p:cNvPr id="1" name=""/>
+        <p:cNvGrpSpPr/>
+        <p:nvPr/>
+      </p:nvGrpSpPr>
+      <p:grpSpPr>
+        <a:xfrm>
+          <a:off x="0" y="0"/>
+          <a:ext cx="0" cy="0"/>
+          <a:chOff x="0" y="0"/>
+          <a:chExt cx="0" cy="0"/>
+        </a:xfrm>
+      </p:grpSpPr>
+      <p:sp>
+        <p:nvSpPr>
+          <p:cNvPr id="2" name="Title 1"/>
           <p:cNvSpPr>
             <a:spLocks noGrp="1"/>
           </p:cNvSpPr>
@@ -21626,7 +22340,7 @@
           <a:p>
             <a:fld id="{83730267-60C2-4514-997F-6A8804439442}" type="slidenum">
               <a:rPr lang="en-GB" smtClean="0"/>
-              <a:t>26</a:t>
+              <a:t>27</a:t>
             </a:fld>
             <a:endParaRPr lang="en-GB"/>
           </a:p>
@@ -22057,149 +22771,6 @@
 </p:sld>
 </file>
 
-<file path=ppt/slides/slide27.xml><?xml version="1.0" encoding="utf-8"?>
-<p:sld xmlns:a="http://schemas.openxmlformats.org/drawingml/2006/main" xmlns:r="http://schemas.openxmlformats.org/officeDocument/2006/relationships" xmlns:p="http://schemas.openxmlformats.org/presentationml/2006/main">
-  <p:cSld>
-    <p:spTree>
-      <p:nvGrpSpPr>
-        <p:cNvPr id="1" name=""/>
-        <p:cNvGrpSpPr/>
-        <p:nvPr/>
-      </p:nvGrpSpPr>
-      <p:grpSpPr>
-        <a:xfrm>
-          <a:off x="0" y="0"/>
-          <a:ext cx="0" cy="0"/>
-          <a:chOff x="0" y="0"/>
-          <a:chExt cx="0" cy="0"/>
-        </a:xfrm>
-      </p:grpSpPr>
-      <p:sp>
-        <p:nvSpPr>
-          <p:cNvPr id="2" name="Title 1">
-            <a:extLst>
-              <a:ext uri="{FF2B5EF4-FFF2-40B4-BE49-F238E27FC236}">
-                <a16:creationId xmlns:a16="http://schemas.microsoft.com/office/drawing/2014/main" id="{6526419F-0E68-9C26-274E-F6801E82F293}"/>
-              </a:ext>
-            </a:extLst>
-          </p:cNvPr>
-          <p:cNvSpPr>
-            <a:spLocks noGrp="1"/>
-          </p:cNvSpPr>
-          <p:nvPr>
-            <p:ph type="title"/>
-          </p:nvPr>
-        </p:nvSpPr>
-        <p:spPr/>
-        <p:txBody>
-          <a:bodyPr/>
-          <a:lstStyle/>
-          <a:p>
-            <a:r>
-              <a:rPr lang="en-GB" dirty="0"/>
-              <a:t>Software Testing</a:t>
-            </a:r>
-          </a:p>
-        </p:txBody>
-      </p:sp>
-      <p:sp>
-        <p:nvSpPr>
-          <p:cNvPr id="3" name="Content Placeholder 2">
-            <a:extLst>
-              <a:ext uri="{FF2B5EF4-FFF2-40B4-BE49-F238E27FC236}">
-                <a16:creationId xmlns:a16="http://schemas.microsoft.com/office/drawing/2014/main" id="{4795FF2B-4679-C340-3F12-BED74CA25425}"/>
-              </a:ext>
-            </a:extLst>
-          </p:cNvPr>
-          <p:cNvSpPr>
-            <a:spLocks noGrp="1"/>
-          </p:cNvSpPr>
-          <p:nvPr>
-            <p:ph idx="1"/>
-          </p:nvPr>
-        </p:nvSpPr>
-        <p:spPr/>
-        <p:txBody>
-          <a:bodyPr/>
-          <a:lstStyle/>
-          <a:p>
-            <a:pPr marL="0" indent="0">
-              <a:buNone/>
-            </a:pPr>
-            <a:r>
-              <a:rPr lang="en-GB" dirty="0"/>
-              <a:t>Please take a look at this blog before the session tomorrow:</a:t>
-            </a:r>
-          </a:p>
-          <a:p>
-            <a:pPr marL="0" indent="0">
-              <a:buNone/>
-            </a:pPr>
-            <a:r>
-              <a:rPr lang="en-GB" dirty="0">
-                <a:hlinkClick r:id="rId2"/>
-              </a:rPr>
-              <a:t>A Brief Introduction to Software Testing</a:t>
-            </a:r>
-            <a:endParaRPr lang="en-GB" dirty="0"/>
-          </a:p>
-        </p:txBody>
-      </p:sp>
-      <p:sp>
-        <p:nvSpPr>
-          <p:cNvPr id="4" name="Slide Number Placeholder 3">
-            <a:extLst>
-              <a:ext uri="{FF2B5EF4-FFF2-40B4-BE49-F238E27FC236}">
-                <a16:creationId xmlns:a16="http://schemas.microsoft.com/office/drawing/2014/main" id="{AF86B5FF-55B2-D4F8-CA74-07D9F383239A}"/>
-              </a:ext>
-            </a:extLst>
-          </p:cNvPr>
-          <p:cNvSpPr>
-            <a:spLocks noGrp="1"/>
-          </p:cNvSpPr>
-          <p:nvPr>
-            <p:ph type="sldNum" sz="quarter" idx="12"/>
-          </p:nvPr>
-        </p:nvSpPr>
-        <p:spPr/>
-        <p:txBody>
-          <a:bodyPr/>
-          <a:lstStyle/>
-          <a:p>
-            <a:fld id="{83730267-60C2-4514-997F-6A8804439442}" type="slidenum">
-              <a:rPr lang="en-GB" smtClean="0">
-                <a:solidFill>
-                  <a:prstClr val="black">
-                    <a:tint val="75000"/>
-                  </a:prstClr>
-                </a:solidFill>
-              </a:rPr>
-              <a:pPr/>
-              <a:t>27</a:t>
-            </a:fld>
-            <a:endParaRPr lang="en-GB">
-              <a:solidFill>
-                <a:prstClr val="black">
-                  <a:tint val="75000"/>
-                </a:prstClr>
-              </a:solidFill>
-            </a:endParaRPr>
-          </a:p>
-        </p:txBody>
-      </p:sp>
-    </p:spTree>
-    <p:extLst>
-      <p:ext uri="{BB962C8B-B14F-4D97-AF65-F5344CB8AC3E}">
-        <p14:creationId xmlns:p14="http://schemas.microsoft.com/office/powerpoint/2010/main" val="2224768003"/>
-      </p:ext>
-    </p:extLst>
-  </p:cSld>
-  <p:clrMapOvr>
-    <a:masterClrMapping/>
-  </p:clrMapOvr>
-</p:sld>
-</file>
-
 <file path=ppt/slides/slide28.xml><?xml version="1.0" encoding="utf-8"?>
 <p:sld xmlns:a="http://schemas.openxmlformats.org/drawingml/2006/main" xmlns:r="http://schemas.openxmlformats.org/officeDocument/2006/relationships" xmlns:p="http://schemas.openxmlformats.org/presentationml/2006/main">
   <p:cSld>
@@ -22222,6 +22793,149 @@
           <p:cNvPr id="2" name="Title 1">
             <a:extLst>
               <a:ext uri="{FF2B5EF4-FFF2-40B4-BE49-F238E27FC236}">
+                <a16:creationId xmlns:a16="http://schemas.microsoft.com/office/drawing/2014/main" id="{6526419F-0E68-9C26-274E-F6801E82F293}"/>
+              </a:ext>
+            </a:extLst>
+          </p:cNvPr>
+          <p:cNvSpPr>
+            <a:spLocks noGrp="1"/>
+          </p:cNvSpPr>
+          <p:nvPr>
+            <p:ph type="title"/>
+          </p:nvPr>
+        </p:nvSpPr>
+        <p:spPr/>
+        <p:txBody>
+          <a:bodyPr/>
+          <a:lstStyle/>
+          <a:p>
+            <a:r>
+              <a:rPr lang="en-GB" dirty="0"/>
+              <a:t>Software Testing</a:t>
+            </a:r>
+          </a:p>
+        </p:txBody>
+      </p:sp>
+      <p:sp>
+        <p:nvSpPr>
+          <p:cNvPr id="3" name="Content Placeholder 2">
+            <a:extLst>
+              <a:ext uri="{FF2B5EF4-FFF2-40B4-BE49-F238E27FC236}">
+                <a16:creationId xmlns:a16="http://schemas.microsoft.com/office/drawing/2014/main" id="{4795FF2B-4679-C340-3F12-BED74CA25425}"/>
+              </a:ext>
+            </a:extLst>
+          </p:cNvPr>
+          <p:cNvSpPr>
+            <a:spLocks noGrp="1"/>
+          </p:cNvSpPr>
+          <p:nvPr>
+            <p:ph idx="1"/>
+          </p:nvPr>
+        </p:nvSpPr>
+        <p:spPr/>
+        <p:txBody>
+          <a:bodyPr/>
+          <a:lstStyle/>
+          <a:p>
+            <a:pPr marL="0" indent="0">
+              <a:buNone/>
+            </a:pPr>
+            <a:r>
+              <a:rPr lang="en-GB" dirty="0"/>
+              <a:t>Please take a look at this blog before the session tomorrow:</a:t>
+            </a:r>
+          </a:p>
+          <a:p>
+            <a:pPr marL="0" indent="0">
+              <a:buNone/>
+            </a:pPr>
+            <a:r>
+              <a:rPr lang="en-GB" dirty="0">
+                <a:hlinkClick r:id="rId2"/>
+              </a:rPr>
+              <a:t>A Brief Introduction to Software Testing</a:t>
+            </a:r>
+            <a:endParaRPr lang="en-GB" dirty="0"/>
+          </a:p>
+        </p:txBody>
+      </p:sp>
+      <p:sp>
+        <p:nvSpPr>
+          <p:cNvPr id="4" name="Slide Number Placeholder 3">
+            <a:extLst>
+              <a:ext uri="{FF2B5EF4-FFF2-40B4-BE49-F238E27FC236}">
+                <a16:creationId xmlns:a16="http://schemas.microsoft.com/office/drawing/2014/main" id="{AF86B5FF-55B2-D4F8-CA74-07D9F383239A}"/>
+              </a:ext>
+            </a:extLst>
+          </p:cNvPr>
+          <p:cNvSpPr>
+            <a:spLocks noGrp="1"/>
+          </p:cNvSpPr>
+          <p:nvPr>
+            <p:ph type="sldNum" sz="quarter" idx="12"/>
+          </p:nvPr>
+        </p:nvSpPr>
+        <p:spPr/>
+        <p:txBody>
+          <a:bodyPr/>
+          <a:lstStyle/>
+          <a:p>
+            <a:fld id="{83730267-60C2-4514-997F-6A8804439442}" type="slidenum">
+              <a:rPr lang="en-GB" smtClean="0">
+                <a:solidFill>
+                  <a:prstClr val="black">
+                    <a:tint val="75000"/>
+                  </a:prstClr>
+                </a:solidFill>
+              </a:rPr>
+              <a:pPr/>
+              <a:t>28</a:t>
+            </a:fld>
+            <a:endParaRPr lang="en-GB">
+              <a:solidFill>
+                <a:prstClr val="black">
+                  <a:tint val="75000"/>
+                </a:prstClr>
+              </a:solidFill>
+            </a:endParaRPr>
+          </a:p>
+        </p:txBody>
+      </p:sp>
+    </p:spTree>
+    <p:extLst>
+      <p:ext uri="{BB962C8B-B14F-4D97-AF65-F5344CB8AC3E}">
+        <p14:creationId xmlns:p14="http://schemas.microsoft.com/office/powerpoint/2010/main" val="2224768003"/>
+      </p:ext>
+    </p:extLst>
+  </p:cSld>
+  <p:clrMapOvr>
+    <a:masterClrMapping/>
+  </p:clrMapOvr>
+</p:sld>
+</file>
+
+<file path=ppt/slides/slide29.xml><?xml version="1.0" encoding="utf-8"?>
+<p:sld xmlns:a="http://schemas.openxmlformats.org/drawingml/2006/main" xmlns:r="http://schemas.openxmlformats.org/officeDocument/2006/relationships" xmlns:p="http://schemas.openxmlformats.org/presentationml/2006/main">
+  <p:cSld>
+    <p:spTree>
+      <p:nvGrpSpPr>
+        <p:cNvPr id="1" name=""/>
+        <p:cNvGrpSpPr/>
+        <p:nvPr/>
+      </p:nvGrpSpPr>
+      <p:grpSpPr>
+        <a:xfrm>
+          <a:off x="0" y="0"/>
+          <a:ext cx="0" cy="0"/>
+          <a:chOff x="0" y="0"/>
+          <a:chExt cx="0" cy="0"/>
+        </a:xfrm>
+      </p:grpSpPr>
+      <p:sp>
+        <p:nvSpPr>
+          <p:cNvPr id="2" name="Title 1">
+            <a:extLst>
+              <a:ext uri="{FF2B5EF4-FFF2-40B4-BE49-F238E27FC236}">
                 <a16:creationId xmlns:a16="http://schemas.microsoft.com/office/drawing/2014/main" id="{31633C75-3577-AFEF-F7BA-3EEBB07F1061}"/>
               </a:ext>
             </a:extLst>
@@ -22508,7 +23222,7 @@
                 </a:solidFill>
               </a:rPr>
               <a:pPr/>
-              <a:t>28</a:t>
+              <a:t>29</a:t>
             </a:fld>
             <a:endParaRPr lang="en-GB">
               <a:solidFill>
@@ -22598,138 +23312,6 @@
     <p:extLst>
       <p:ext uri="{BB962C8B-B14F-4D97-AF65-F5344CB8AC3E}">
         <p14:creationId xmlns:p14="http://schemas.microsoft.com/office/powerpoint/2010/main" val="3384248420"/>
-      </p:ext>
-    </p:extLst>
-  </p:cSld>
-  <p:clrMapOvr>
-    <a:masterClrMapping/>
-  </p:clrMapOvr>
-</p:sld>
-</file>
-
-<file path=ppt/slides/slide29.xml><?xml version="1.0" encoding="utf-8"?>
-<p:sld xmlns:a="http://schemas.openxmlformats.org/drawingml/2006/main" xmlns:r="http://schemas.openxmlformats.org/officeDocument/2006/relationships" xmlns:p="http://schemas.openxmlformats.org/presentationml/2006/main">
-  <p:cSld>
-    <p:spTree>
-      <p:nvGrpSpPr>
-        <p:cNvPr id="1" name=""/>
-        <p:cNvGrpSpPr/>
-        <p:nvPr/>
-      </p:nvGrpSpPr>
-      <p:grpSpPr>
-        <a:xfrm>
-          <a:off x="0" y="0"/>
-          <a:ext cx="0" cy="0"/>
-          <a:chOff x="0" y="0"/>
-          <a:chExt cx="0" cy="0"/>
-        </a:xfrm>
-      </p:grpSpPr>
-      <p:sp>
-        <p:nvSpPr>
-          <p:cNvPr id="2" name="Title 1">
-            <a:extLst>
-              <a:ext uri="{FF2B5EF4-FFF2-40B4-BE49-F238E27FC236}">
-                <a16:creationId xmlns:a16="http://schemas.microsoft.com/office/drawing/2014/main" id="{9ED89C86-0967-904D-1155-4FA16E169322}"/>
-              </a:ext>
-            </a:extLst>
-          </p:cNvPr>
-          <p:cNvSpPr>
-            <a:spLocks noGrp="1"/>
-          </p:cNvSpPr>
-          <p:nvPr>
-            <p:ph type="title"/>
-          </p:nvPr>
-        </p:nvSpPr>
-        <p:spPr/>
-        <p:txBody>
-          <a:bodyPr/>
-          <a:lstStyle/>
-          <a:p>
-            <a:endParaRPr lang="en-GB"/>
-          </a:p>
-        </p:txBody>
-      </p:sp>
-      <p:pic>
-        <p:nvPicPr>
-          <p:cNvPr id="6" name="Content Placeholder 5" descr="Diagram&#10;&#10;Description automatically generated">
-            <a:extLst>
-              <a:ext uri="{FF2B5EF4-FFF2-40B4-BE49-F238E27FC236}">
-                <a16:creationId xmlns:a16="http://schemas.microsoft.com/office/drawing/2014/main" id="{F27DCC23-4D6C-3103-B111-94450368BDB5}"/>
-              </a:ext>
-            </a:extLst>
-          </p:cNvPr>
-          <p:cNvPicPr>
-            <a:picLocks noGrp="1" noChangeAspect="1"/>
-          </p:cNvPicPr>
-          <p:nvPr>
-            <p:ph idx="1"/>
-          </p:nvPr>
-        </p:nvPicPr>
-        <p:blipFill>
-          <a:blip r:embed="rId2">
-            <a:extLst>
-              <a:ext uri="{28A0092B-C50C-407E-A947-70E740481C1C}">
-                <a14:useLocalDpi xmlns:a14="http://schemas.microsoft.com/office/drawing/2010/main" val="0"/>
-              </a:ext>
-            </a:extLst>
-          </a:blip>
-          <a:stretch>
-            <a:fillRect/>
-          </a:stretch>
-        </p:blipFill>
-        <p:spPr>
-          <a:xfrm>
-            <a:off x="457200" y="2286619"/>
-            <a:ext cx="8229600" cy="3153125"/>
-          </a:xfrm>
-        </p:spPr>
-      </p:pic>
-      <p:sp>
-        <p:nvSpPr>
-          <p:cNvPr id="4" name="Slide Number Placeholder 3">
-            <a:extLst>
-              <a:ext uri="{FF2B5EF4-FFF2-40B4-BE49-F238E27FC236}">
-                <a16:creationId xmlns:a16="http://schemas.microsoft.com/office/drawing/2014/main" id="{894B110F-FFA2-A062-1185-AF41F7668D65}"/>
-              </a:ext>
-            </a:extLst>
-          </p:cNvPr>
-          <p:cNvSpPr>
-            <a:spLocks noGrp="1"/>
-          </p:cNvSpPr>
-          <p:nvPr>
-            <p:ph type="sldNum" sz="quarter" idx="12"/>
-          </p:nvPr>
-        </p:nvSpPr>
-        <p:spPr/>
-        <p:txBody>
-          <a:bodyPr/>
-          <a:lstStyle/>
-          <a:p>
-            <a:fld id="{83730267-60C2-4514-997F-6A8804439442}" type="slidenum">
-              <a:rPr lang="en-GB" smtClean="0">
-                <a:solidFill>
-                  <a:prstClr val="black">
-                    <a:tint val="75000"/>
-                  </a:prstClr>
-                </a:solidFill>
-              </a:rPr>
-              <a:pPr/>
-              <a:t>29</a:t>
-            </a:fld>
-            <a:endParaRPr lang="en-GB">
-              <a:solidFill>
-                <a:prstClr val="black">
-                  <a:tint val="75000"/>
-                </a:prstClr>
-              </a:solidFill>
-            </a:endParaRPr>
-          </a:p>
-        </p:txBody>
-      </p:sp>
-    </p:spTree>
-    <p:extLst>
-      <p:ext uri="{BB962C8B-B14F-4D97-AF65-F5344CB8AC3E}">
-        <p14:creationId xmlns:p14="http://schemas.microsoft.com/office/powerpoint/2010/main" val="2564862246"/>
       </p:ext>
     </p:extLst>
   </p:cSld>
@@ -24596,7 +25178,13 @@
       </p:grpSpPr>
       <p:sp>
         <p:nvSpPr>
-          <p:cNvPr id="2" name="Title 1"/>
+          <p:cNvPr id="2" name="Title 1">
+            <a:extLst>
+              <a:ext uri="{FF2B5EF4-FFF2-40B4-BE49-F238E27FC236}">
+                <a16:creationId xmlns:a16="http://schemas.microsoft.com/office/drawing/2014/main" id="{9ED89C86-0967-904D-1155-4FA16E169322}"/>
+              </a:ext>
+            </a:extLst>
+          </p:cNvPr>
           <p:cNvSpPr>
             <a:spLocks noGrp="1"/>
           </p:cNvSpPr>
@@ -24606,81 +25194,60 @@
         </p:nvSpPr>
         <p:spPr/>
         <p:txBody>
-          <a:bodyPr>
-            <a:normAutofit/>
-          </a:bodyPr>
+          <a:bodyPr/>
           <a:lstStyle/>
           <a:p>
             <a:r>
-              <a:rPr lang="en-GB" sz="3600" dirty="0"/>
-              <a:t>Debugging and Improving Performance</a:t>
-            </a:r>
-          </a:p>
-        </p:txBody>
-      </p:sp>
-      <p:sp>
-        <p:nvSpPr>
-          <p:cNvPr id="3" name="Content Placeholder 2"/>
-          <p:cNvSpPr>
-            <a:spLocks noGrp="1"/>
-          </p:cNvSpPr>
+              <a:rPr lang="en-GB" dirty="0"/>
+              <a:t>Task Execution</a:t>
+            </a:r>
+          </a:p>
+        </p:txBody>
+      </p:sp>
+      <p:pic>
+        <p:nvPicPr>
+          <p:cNvPr id="6" name="Content Placeholder 5" descr="Diagram&#10;&#10;Description automatically generated">
+            <a:extLst>
+              <a:ext uri="{FF2B5EF4-FFF2-40B4-BE49-F238E27FC236}">
+                <a16:creationId xmlns:a16="http://schemas.microsoft.com/office/drawing/2014/main" id="{F27DCC23-4D6C-3103-B111-94450368BDB5}"/>
+              </a:ext>
+            </a:extLst>
+          </p:cNvPr>
+          <p:cNvPicPr>
+            <a:picLocks noGrp="1" noChangeAspect="1"/>
+          </p:cNvPicPr>
           <p:nvPr>
             <p:ph idx="1"/>
           </p:nvPr>
-        </p:nvSpPr>
-        <p:spPr/>
-        <p:txBody>
-          <a:bodyPr>
-            <a:normAutofit/>
-          </a:bodyPr>
-          <a:lstStyle/>
-          <a:p>
-            <a:pPr marL="0" indent="0">
-              <a:buNone/>
-            </a:pPr>
-            <a:endParaRPr lang="en-GB" sz="2800" dirty="0"/>
-          </a:p>
-          <a:p>
-            <a:r>
-              <a:rPr lang="en-GB" sz="2800" dirty="0"/>
-              <a:t>Diagnosing problems</a:t>
-            </a:r>
-          </a:p>
-          <a:p>
-            <a:r>
-              <a:rPr lang="en-GB" sz="2800" dirty="0"/>
-              <a:t>Identifying common errors</a:t>
-            </a:r>
-          </a:p>
-          <a:p>
-            <a:r>
-              <a:rPr lang="en-GB" sz="2800" dirty="0"/>
-              <a:t>Evaluation of code performance</a:t>
-            </a:r>
-          </a:p>
-          <a:p>
-            <a:r>
-              <a:rPr lang="en-GB" sz="2800" dirty="0"/>
-              <a:t>Vectorisation techniques</a:t>
-            </a:r>
-          </a:p>
-          <a:p>
-            <a:r>
-              <a:rPr lang="en-GB" sz="2800" dirty="0"/>
-              <a:t>Managing memory effectively</a:t>
-            </a:r>
-          </a:p>
-          <a:p>
-            <a:endParaRPr lang="en-GB" sz="2800" dirty="0"/>
-          </a:p>
-          <a:p>
-            <a:endParaRPr lang="en-GB" sz="2800" dirty="0"/>
-          </a:p>
-        </p:txBody>
-      </p:sp>
-      <p:sp>
-        <p:nvSpPr>
-          <p:cNvPr id="4" name="Slide Number Placeholder 3"/>
+        </p:nvPicPr>
+        <p:blipFill>
+          <a:blip r:embed="rId2">
+            <a:extLst>
+              <a:ext uri="{28A0092B-C50C-407E-A947-70E740481C1C}">
+                <a14:useLocalDpi xmlns:a14="http://schemas.microsoft.com/office/drawing/2010/main" val="0"/>
+              </a:ext>
+            </a:extLst>
+          </a:blip>
+          <a:stretch>
+            <a:fillRect/>
+          </a:stretch>
+        </p:blipFill>
+        <p:spPr>
+          <a:xfrm>
+            <a:off x="457200" y="2286619"/>
+            <a:ext cx="8229600" cy="3153125"/>
+          </a:xfrm>
+        </p:spPr>
+      </p:pic>
+      <p:sp>
+        <p:nvSpPr>
+          <p:cNvPr id="4" name="Slide Number Placeholder 3">
+            <a:extLst>
+              <a:ext uri="{FF2B5EF4-FFF2-40B4-BE49-F238E27FC236}">
+                <a16:creationId xmlns:a16="http://schemas.microsoft.com/office/drawing/2014/main" id="{894B110F-FFA2-A062-1185-AF41F7668D65}"/>
+              </a:ext>
+            </a:extLst>
+          </p:cNvPr>
           <p:cNvSpPr>
             <a:spLocks noGrp="1"/>
           </p:cNvSpPr>
@@ -24717,7 +25284,7 @@
     </p:spTree>
     <p:extLst>
       <p:ext uri="{BB962C8B-B14F-4D97-AF65-F5344CB8AC3E}">
-        <p14:creationId xmlns:p14="http://schemas.microsoft.com/office/powerpoint/2010/main" val="3630683270"/>
+        <p14:creationId xmlns:p14="http://schemas.microsoft.com/office/powerpoint/2010/main" val="2564862246"/>
       </p:ext>
     </p:extLst>
   </p:cSld>
@@ -24746,6 +25313,30 @@
       </p:grpSpPr>
       <p:sp>
         <p:nvSpPr>
+          <p:cNvPr id="2" name="Title 1"/>
+          <p:cNvSpPr>
+            <a:spLocks noGrp="1"/>
+          </p:cNvSpPr>
+          <p:nvPr>
+            <p:ph type="title"/>
+          </p:nvPr>
+        </p:nvSpPr>
+        <p:spPr/>
+        <p:txBody>
+          <a:bodyPr>
+            <a:normAutofit/>
+          </a:bodyPr>
+          <a:lstStyle/>
+          <a:p>
+            <a:r>
+              <a:rPr lang="en-GB" sz="3600" dirty="0"/>
+              <a:t>Debugging and Improving Performance</a:t>
+            </a:r>
+          </a:p>
+        </p:txBody>
+      </p:sp>
+      <p:sp>
+        <p:nvSpPr>
           <p:cNvPr id="3" name="Content Placeholder 2"/>
           <p:cNvSpPr>
             <a:spLocks noGrp="1"/>
@@ -24754,132 +25345,53 @@
             <p:ph idx="1"/>
           </p:nvPr>
         </p:nvSpPr>
-        <p:spPr>
-          <a:xfrm>
-            <a:off x="457200" y="1200152"/>
-            <a:ext cx="8382000" cy="4525963"/>
-          </a:xfrm>
-        </p:spPr>
+        <p:spPr/>
         <p:txBody>
           <a:bodyPr>
-            <a:normAutofit fontScale="92500" lnSpcReduction="20000"/>
+            <a:normAutofit/>
           </a:bodyPr>
           <a:lstStyle/>
           <a:p>
             <a:pPr marL="0" indent="0">
               <a:buNone/>
             </a:pPr>
-            <a:r>
-              <a:rPr lang="en-GB" sz="2400" dirty="0"/>
-              <a:t>Efficient matrix and array operations rely on data being located together in a contiguous block of memory addresses</a:t>
-            </a:r>
-          </a:p>
-          <a:p>
-            <a:pPr marL="0" indent="0">
-              <a:buNone/>
-            </a:pPr>
-            <a:endParaRPr lang="en-GB" sz="2400" dirty="0"/>
-          </a:p>
-          <a:p>
-            <a:pPr marL="0" indent="0">
-              <a:buNone/>
-            </a:pPr>
-            <a:r>
-              <a:rPr lang="en-GB" sz="2400" dirty="0"/>
-              <a:t>Create a dummy version of a variable of appropriate size</a:t>
-            </a:r>
-          </a:p>
-          <a:p>
-            <a:pPr marL="0" indent="0">
-              <a:buNone/>
-            </a:pPr>
-            <a:r>
-              <a:rPr lang="en-GB" sz="2400" dirty="0">
-                <a:latin typeface="Courier New" panose="02070309020205020404" pitchFamily="49" charset="0"/>
-                <a:cs typeface="Courier New" panose="02070309020205020404" pitchFamily="49" charset="0"/>
-              </a:rPr>
-              <a:t>&gt;&gt; A = zeros(</a:t>
-            </a:r>
-            <a:r>
-              <a:rPr lang="en-GB" sz="2400" dirty="0" err="1">
-                <a:latin typeface="Courier New" panose="02070309020205020404" pitchFamily="49" charset="0"/>
-                <a:cs typeface="Courier New" panose="02070309020205020404" pitchFamily="49" charset="0"/>
-              </a:rPr>
-              <a:t>m,n</a:t>
-            </a:r>
-            <a:r>
-              <a:rPr lang="en-GB" sz="2400" dirty="0">
-                <a:latin typeface="Courier New" panose="02070309020205020404" pitchFamily="49" charset="0"/>
-                <a:cs typeface="Courier New" panose="02070309020205020404" pitchFamily="49" charset="0"/>
-              </a:rPr>
-              <a:t>)</a:t>
-            </a:r>
-          </a:p>
-          <a:p>
-            <a:pPr marL="0" indent="0">
-              <a:buNone/>
-            </a:pPr>
-            <a:r>
-              <a:rPr lang="en-GB" sz="2400" dirty="0">
-                <a:cs typeface="Courier New" panose="02070309020205020404" pitchFamily="49" charset="0"/>
-              </a:rPr>
-              <a:t>Subsequent operations then overwrite the zeros with the required values</a:t>
-            </a:r>
-          </a:p>
-          <a:p>
-            <a:pPr marL="0" indent="0">
-              <a:buNone/>
-            </a:pPr>
-            <a:endParaRPr lang="en-GB" sz="2400" dirty="0">
-              <a:cs typeface="Courier New" panose="02070309020205020404" pitchFamily="49" charset="0"/>
-            </a:endParaRPr>
-          </a:p>
-          <a:p>
-            <a:pPr marL="0" indent="0">
-              <a:buNone/>
-            </a:pPr>
-            <a:r>
-              <a:rPr lang="en-GB" sz="2400" dirty="0">
-                <a:cs typeface="Courier New" panose="02070309020205020404" pitchFamily="49" charset="0"/>
-              </a:rPr>
-              <a:t>Assigning the last element of an array first creates an array of the appropriate size</a:t>
-            </a:r>
-          </a:p>
-          <a:p>
-            <a:pPr marL="0" indent="0">
-              <a:buNone/>
-            </a:pPr>
-            <a:r>
-              <a:rPr lang="en-GB" sz="2400" dirty="0">
-                <a:latin typeface="Courier New" panose="02070309020205020404" pitchFamily="49" charset="0"/>
-                <a:cs typeface="Courier New" panose="02070309020205020404" pitchFamily="49" charset="0"/>
-              </a:rPr>
-              <a:t>&gt;&gt; x(8) = 3</a:t>
-            </a:r>
-          </a:p>
-          <a:p>
-            <a:pPr marL="0" indent="0">
-              <a:buNone/>
-            </a:pPr>
-            <a:r>
-              <a:rPr lang="en-GB" sz="2400" dirty="0">
-                <a:latin typeface="Courier New" panose="02070309020205020404" pitchFamily="49" charset="0"/>
-                <a:cs typeface="Courier New" panose="02070309020205020404" pitchFamily="49" charset="0"/>
-              </a:rPr>
-              <a:t>x =</a:t>
-            </a:r>
-          </a:p>
-          <a:p>
-            <a:pPr marL="0" indent="0">
-              <a:buNone/>
-            </a:pPr>
-            <a:r>
-              <a:rPr lang="en-GB" sz="2400" dirty="0">
-                <a:latin typeface="Courier New" panose="02070309020205020404" pitchFamily="49" charset="0"/>
-                <a:cs typeface="Courier New" panose="02070309020205020404" pitchFamily="49" charset="0"/>
-              </a:rPr>
-              <a:t>     0     0     0     0     0     0     0     3</a:t>
-            </a:r>
+            <a:endParaRPr lang="en-GB" sz="2800" dirty="0"/>
+          </a:p>
+          <a:p>
+            <a:r>
+              <a:rPr lang="en-GB" sz="2800" dirty="0"/>
+              <a:t>Diagnosing problems</a:t>
+            </a:r>
+          </a:p>
+          <a:p>
+            <a:r>
+              <a:rPr lang="en-GB" sz="2800" dirty="0"/>
+              <a:t>Identifying common errors</a:t>
+            </a:r>
+          </a:p>
+          <a:p>
+            <a:r>
+              <a:rPr lang="en-GB" sz="2800" dirty="0"/>
+              <a:t>Evaluation of code performance</a:t>
+            </a:r>
+          </a:p>
+          <a:p>
+            <a:r>
+              <a:rPr lang="en-GB" sz="2800" dirty="0"/>
+              <a:t>Vectorisation techniques</a:t>
+            </a:r>
+          </a:p>
+          <a:p>
+            <a:r>
+              <a:rPr lang="en-GB" sz="2800" dirty="0"/>
+              <a:t>Managing memory effectively</a:t>
+            </a:r>
+          </a:p>
+          <a:p>
+            <a:endParaRPr lang="en-GB" sz="2800" dirty="0"/>
+          </a:p>
+          <a:p>
+            <a:endParaRPr lang="en-GB" sz="2800" dirty="0"/>
           </a:p>
         </p:txBody>
       </p:sp>
@@ -24919,43 +25431,10 @@
           </a:p>
         </p:txBody>
       </p:sp>
-      <p:sp>
-        <p:nvSpPr>
-          <p:cNvPr id="5" name="Title 1"/>
-          <p:cNvSpPr>
-            <a:spLocks noGrp="1"/>
-          </p:cNvSpPr>
-          <p:nvPr>
-            <p:ph type="title"/>
-          </p:nvPr>
-        </p:nvSpPr>
-        <p:spPr>
-          <a:xfrm>
-            <a:off x="457200" y="274638"/>
-            <a:ext cx="8229600" cy="744537"/>
-          </a:xfrm>
-        </p:spPr>
-        <p:txBody>
-          <a:bodyPr>
-            <a:normAutofit/>
-          </a:bodyPr>
-          <a:lstStyle/>
-          <a:p>
-            <a:r>
-              <a:rPr lang="en-GB" sz="3600" dirty="0" err="1"/>
-              <a:t>Preallocation</a:t>
-            </a:r>
-            <a:r>
-              <a:rPr lang="en-GB" sz="3600" dirty="0"/>
-              <a:t> of Memory</a:t>
-            </a:r>
-          </a:p>
-        </p:txBody>
-      </p:sp>
     </p:spTree>
     <p:extLst>
       <p:ext uri="{BB962C8B-B14F-4D97-AF65-F5344CB8AC3E}">
-        <p14:creationId xmlns:p14="http://schemas.microsoft.com/office/powerpoint/2010/main" val="1971529063"/>
+        <p14:creationId xmlns:p14="http://schemas.microsoft.com/office/powerpoint/2010/main" val="3630683270"/>
       </p:ext>
     </p:extLst>
   </p:cSld>
@@ -24984,7 +25463,146 @@
       </p:grpSpPr>
       <p:sp>
         <p:nvSpPr>
-          <p:cNvPr id="2" name="Slide Number Placeholder 1"/>
+          <p:cNvPr id="3" name="Content Placeholder 2"/>
+          <p:cNvSpPr>
+            <a:spLocks noGrp="1"/>
+          </p:cNvSpPr>
+          <p:nvPr>
+            <p:ph idx="1"/>
+          </p:nvPr>
+        </p:nvSpPr>
+        <p:spPr>
+          <a:xfrm>
+            <a:off x="457200" y="1200152"/>
+            <a:ext cx="8382000" cy="4525963"/>
+          </a:xfrm>
+        </p:spPr>
+        <p:txBody>
+          <a:bodyPr>
+            <a:normAutofit fontScale="92500" lnSpcReduction="20000"/>
+          </a:bodyPr>
+          <a:lstStyle/>
+          <a:p>
+            <a:pPr marL="0" indent="0">
+              <a:buNone/>
+            </a:pPr>
+            <a:r>
+              <a:rPr lang="en-GB" sz="2400" dirty="0"/>
+              <a:t>Efficient matrix and array operations rely on data being located together in a contiguous block of memory addresses</a:t>
+            </a:r>
+          </a:p>
+          <a:p>
+            <a:pPr marL="0" indent="0">
+              <a:buNone/>
+            </a:pPr>
+            <a:endParaRPr lang="en-GB" sz="2400" dirty="0"/>
+          </a:p>
+          <a:p>
+            <a:pPr marL="0" indent="0">
+              <a:buNone/>
+            </a:pPr>
+            <a:r>
+              <a:rPr lang="en-GB" sz="2400" dirty="0"/>
+              <a:t>Create a dummy version of a variable of appropriate size</a:t>
+            </a:r>
+          </a:p>
+          <a:p>
+            <a:pPr marL="0" indent="0">
+              <a:buNone/>
+            </a:pPr>
+            <a:r>
+              <a:rPr lang="en-GB" sz="2400" dirty="0">
+                <a:latin typeface="Courier New" panose="02070309020205020404" pitchFamily="49" charset="0"/>
+                <a:cs typeface="Courier New" panose="02070309020205020404" pitchFamily="49" charset="0"/>
+              </a:rPr>
+              <a:t>&gt;&gt; A = zeros(</a:t>
+            </a:r>
+            <a:r>
+              <a:rPr lang="en-GB" sz="2400" dirty="0" err="1">
+                <a:latin typeface="Courier New" panose="02070309020205020404" pitchFamily="49" charset="0"/>
+                <a:cs typeface="Courier New" panose="02070309020205020404" pitchFamily="49" charset="0"/>
+              </a:rPr>
+              <a:t>m,n</a:t>
+            </a:r>
+            <a:r>
+              <a:rPr lang="en-GB" sz="2400" dirty="0">
+                <a:latin typeface="Courier New" panose="02070309020205020404" pitchFamily="49" charset="0"/>
+                <a:cs typeface="Courier New" panose="02070309020205020404" pitchFamily="49" charset="0"/>
+              </a:rPr>
+              <a:t>)</a:t>
+            </a:r>
+          </a:p>
+          <a:p>
+            <a:pPr marL="0" indent="0">
+              <a:buNone/>
+            </a:pPr>
+            <a:r>
+              <a:rPr lang="en-GB" sz="2400" dirty="0">
+                <a:cs typeface="Courier New" panose="02070309020205020404" pitchFamily="49" charset="0"/>
+              </a:rPr>
+              <a:t>Subsequent operations then overwrite the zeros with the required values</a:t>
+            </a:r>
+          </a:p>
+          <a:p>
+            <a:pPr marL="0" indent="0">
+              <a:buNone/>
+            </a:pPr>
+            <a:endParaRPr lang="en-GB" sz="2400" dirty="0">
+              <a:cs typeface="Courier New" panose="02070309020205020404" pitchFamily="49" charset="0"/>
+            </a:endParaRPr>
+          </a:p>
+          <a:p>
+            <a:pPr marL="0" indent="0">
+              <a:buNone/>
+            </a:pPr>
+            <a:r>
+              <a:rPr lang="en-GB" sz="2400" dirty="0">
+                <a:cs typeface="Courier New" panose="02070309020205020404" pitchFamily="49" charset="0"/>
+              </a:rPr>
+              <a:t>Assigning the last element of an array first creates an array of the appropriate size</a:t>
+            </a:r>
+          </a:p>
+          <a:p>
+            <a:pPr marL="0" indent="0">
+              <a:buNone/>
+            </a:pPr>
+            <a:r>
+              <a:rPr lang="en-GB" sz="2400" dirty="0">
+                <a:latin typeface="Courier New" panose="02070309020205020404" pitchFamily="49" charset="0"/>
+                <a:cs typeface="Courier New" panose="02070309020205020404" pitchFamily="49" charset="0"/>
+              </a:rPr>
+              <a:t>&gt;&gt; x(8) = 3</a:t>
+            </a:r>
+          </a:p>
+          <a:p>
+            <a:pPr marL="0" indent="0">
+              <a:buNone/>
+            </a:pPr>
+            <a:r>
+              <a:rPr lang="en-GB" sz="2400" dirty="0">
+                <a:latin typeface="Courier New" panose="02070309020205020404" pitchFamily="49" charset="0"/>
+                <a:cs typeface="Courier New" panose="02070309020205020404" pitchFamily="49" charset="0"/>
+              </a:rPr>
+              <a:t>x =</a:t>
+            </a:r>
+          </a:p>
+          <a:p>
+            <a:pPr marL="0" indent="0">
+              <a:buNone/>
+            </a:pPr>
+            <a:r>
+              <a:rPr lang="en-GB" sz="2400" dirty="0">
+                <a:latin typeface="Courier New" panose="02070309020205020404" pitchFamily="49" charset="0"/>
+                <a:cs typeface="Courier New" panose="02070309020205020404" pitchFamily="49" charset="0"/>
+              </a:rPr>
+              <a:t>     0     0     0     0     0     0     0     3</a:t>
+            </a:r>
+          </a:p>
+        </p:txBody>
+      </p:sp>
+      <p:sp>
+        <p:nvSpPr>
+          <p:cNvPr id="4" name="Slide Number Placeholder 3"/>
           <p:cNvSpPr>
             <a:spLocks noGrp="1"/>
           </p:cNvSpPr>
@@ -25007,6 +25625,105 @@
               </a:rPr>
               <a:pPr/>
               <a:t>32</a:t>
+            </a:fld>
+            <a:endParaRPr lang="en-GB">
+              <a:solidFill>
+                <a:prstClr val="black">
+                  <a:tint val="75000"/>
+                </a:prstClr>
+              </a:solidFill>
+            </a:endParaRPr>
+          </a:p>
+        </p:txBody>
+      </p:sp>
+      <p:sp>
+        <p:nvSpPr>
+          <p:cNvPr id="5" name="Title 1"/>
+          <p:cNvSpPr>
+            <a:spLocks noGrp="1"/>
+          </p:cNvSpPr>
+          <p:nvPr>
+            <p:ph type="title"/>
+          </p:nvPr>
+        </p:nvSpPr>
+        <p:spPr>
+          <a:xfrm>
+            <a:off x="457200" y="274638"/>
+            <a:ext cx="8229600" cy="744537"/>
+          </a:xfrm>
+        </p:spPr>
+        <p:txBody>
+          <a:bodyPr>
+            <a:normAutofit/>
+          </a:bodyPr>
+          <a:lstStyle/>
+          <a:p>
+            <a:r>
+              <a:rPr lang="en-GB" sz="3600" dirty="0" err="1"/>
+              <a:t>Preallocation</a:t>
+            </a:r>
+            <a:r>
+              <a:rPr lang="en-GB" sz="3600" dirty="0"/>
+              <a:t> of Memory</a:t>
+            </a:r>
+          </a:p>
+        </p:txBody>
+      </p:sp>
+    </p:spTree>
+    <p:extLst>
+      <p:ext uri="{BB962C8B-B14F-4D97-AF65-F5344CB8AC3E}">
+        <p14:creationId xmlns:p14="http://schemas.microsoft.com/office/powerpoint/2010/main" val="1971529063"/>
+      </p:ext>
+    </p:extLst>
+  </p:cSld>
+  <p:clrMapOvr>
+    <a:masterClrMapping/>
+  </p:clrMapOvr>
+</p:sld>
+</file>
+
+<file path=ppt/slides/slide33.xml><?xml version="1.0" encoding="utf-8"?>
+<p:sld xmlns:a="http://schemas.openxmlformats.org/drawingml/2006/main" xmlns:r="http://schemas.openxmlformats.org/officeDocument/2006/relationships" xmlns:p="http://schemas.openxmlformats.org/presentationml/2006/main">
+  <p:cSld>
+    <p:spTree>
+      <p:nvGrpSpPr>
+        <p:cNvPr id="1" name=""/>
+        <p:cNvGrpSpPr/>
+        <p:nvPr/>
+      </p:nvGrpSpPr>
+      <p:grpSpPr>
+        <a:xfrm>
+          <a:off x="0" y="0"/>
+          <a:ext cx="0" cy="0"/>
+          <a:chOff x="0" y="0"/>
+          <a:chExt cx="0" cy="0"/>
+        </a:xfrm>
+      </p:grpSpPr>
+      <p:sp>
+        <p:nvSpPr>
+          <p:cNvPr id="2" name="Slide Number Placeholder 1"/>
+          <p:cNvSpPr>
+            <a:spLocks noGrp="1"/>
+          </p:cNvSpPr>
+          <p:nvPr>
+            <p:ph type="sldNum" sz="quarter" idx="12"/>
+          </p:nvPr>
+        </p:nvSpPr>
+        <p:spPr/>
+        <p:txBody>
+          <a:bodyPr/>
+          <a:lstStyle/>
+          <a:p>
+            <a:fld id="{83730267-60C2-4514-997F-6A8804439442}" type="slidenum">
+              <a:rPr lang="en-GB" smtClean="0">
+                <a:solidFill>
+                  <a:prstClr val="black">
+                    <a:tint val="75000"/>
+                  </a:prstClr>
+                </a:solidFill>
+              </a:rPr>
+              <a:pPr/>
+              <a:t>33</a:t>
             </a:fld>
             <a:endParaRPr lang="en-GB">
               <a:solidFill>
@@ -26178,7 +26895,7 @@
 </p:sld>
 </file>
 
-<file path=ppt/slides/slide33.xml><?xml version="1.0" encoding="utf-8"?>
+<file path=ppt/slides/slide34.xml><?xml version="1.0" encoding="utf-8"?>
 <p:sld xmlns:a="http://schemas.openxmlformats.org/drawingml/2006/main" xmlns:r="http://schemas.openxmlformats.org/officeDocument/2006/relationships" xmlns:p="http://schemas.openxmlformats.org/presentationml/2006/main">
   <p:cSld>
     <p:spTree>
@@ -26219,7 +26936,7 @@
                 </a:solidFill>
               </a:rPr>
               <a:pPr/>
-              <a:t>33</a:t>
+              <a:t>34</a:t>
             </a:fld>
             <a:endParaRPr lang="en-GB">
               <a:solidFill>

</xml_diff>

<commit_message>
Updated chapter 1. Changed dlmread to readmatrix.
</commit_message>
<xml_diff>
--- a/InstructorMaterials/Best Practices for Software Development using MATLAB.pptx
+++ b/InstructorMaterials/Best Practices for Software Development using MATLAB.pptx
@@ -7,7 +7,7 @@
     <p:sldMasterId id="2147483711" r:id="rId3"/>
   </p:sldMasterIdLst>
   <p:notesMasterIdLst>
-    <p:notesMasterId r:id="rId40"/>
+    <p:notesMasterId r:id="rId41"/>
   </p:notesMasterIdLst>
   <p:sldIdLst>
     <p:sldId id="257" r:id="rId4"/>
@@ -30,22 +30,23 @@
     <p:sldId id="300" r:id="rId21"/>
     <p:sldId id="346" r:id="rId22"/>
     <p:sldId id="347" r:id="rId23"/>
-    <p:sldId id="260" r:id="rId24"/>
-    <p:sldId id="261" r:id="rId25"/>
-    <p:sldId id="262" r:id="rId26"/>
-    <p:sldId id="413" r:id="rId27"/>
-    <p:sldId id="263" r:id="rId28"/>
-    <p:sldId id="274" r:id="rId29"/>
-    <p:sldId id="264" r:id="rId30"/>
-    <p:sldId id="265" r:id="rId31"/>
-    <p:sldId id="282" r:id="rId32"/>
-    <p:sldId id="284" r:id="rId33"/>
-    <p:sldId id="283" r:id="rId34"/>
-    <p:sldId id="266" r:id="rId35"/>
-    <p:sldId id="267" r:id="rId36"/>
-    <p:sldId id="268" r:id="rId37"/>
-    <p:sldId id="270" r:id="rId38"/>
-    <p:sldId id="415" r:id="rId39"/>
+    <p:sldId id="417" r:id="rId24"/>
+    <p:sldId id="260" r:id="rId25"/>
+    <p:sldId id="261" r:id="rId26"/>
+    <p:sldId id="262" r:id="rId27"/>
+    <p:sldId id="413" r:id="rId28"/>
+    <p:sldId id="263" r:id="rId29"/>
+    <p:sldId id="274" r:id="rId30"/>
+    <p:sldId id="264" r:id="rId31"/>
+    <p:sldId id="265" r:id="rId32"/>
+    <p:sldId id="282" r:id="rId33"/>
+    <p:sldId id="284" r:id="rId34"/>
+    <p:sldId id="283" r:id="rId35"/>
+    <p:sldId id="266" r:id="rId36"/>
+    <p:sldId id="267" r:id="rId37"/>
+    <p:sldId id="268" r:id="rId38"/>
+    <p:sldId id="270" r:id="rId39"/>
+    <p:sldId id="415" r:id="rId40"/>
   </p:sldIdLst>
   <p:sldSz cx="12192000" cy="6858000"/>
   <p:notesSz cx="6858000" cy="9144000"/>
@@ -234,7 +235,7 @@
           <a:p>
             <a:fld id="{6C06565E-6C9B-4A06-A09A-D231B01EEF1C}" type="datetimeFigureOut">
               <a:rPr lang="en-GB" smtClean="0"/>
-              <a:t>18/05/2023</a:t>
+              <a:t>23/05/2023</a:t>
             </a:fld>
             <a:endParaRPr lang="en-GB"/>
           </a:p>
@@ -994,8 +995,8 @@
         </p:nvSpPr>
         <p:spPr>
           <a:xfrm>
-            <a:off x="109538" y="741363"/>
-            <a:ext cx="6578600" cy="3702050"/>
+            <a:off x="2701925" y="511175"/>
+            <a:ext cx="4537075" cy="2552700"/>
           </a:xfrm>
           <a:prstGeom prst="rect">
             <a:avLst/>
@@ -1014,8 +1015,8 @@
         </p:nvSpPr>
         <p:spPr>
           <a:xfrm>
-            <a:off x="679768" y="4690270"/>
-            <a:ext cx="5438140" cy="4443413"/>
+            <a:off x="994093" y="3234178"/>
+            <a:ext cx="7952739" cy="3063954"/>
           </a:xfrm>
           <a:prstGeom prst="rect">
             <a:avLst/>
@@ -1027,23 +1028,16 @@
           <a:p>
             <a:r>
               <a:rPr lang="en-GB" dirty="0"/>
-              <a:t>Bit like an</a:t>
-            </a:r>
-            <a:r>
-              <a:rPr lang="en-GB" baseline="0" dirty="0"/>
-              <a:t> inline function</a:t>
-            </a:r>
-            <a:endParaRPr lang="en-GB" dirty="0"/>
+              <a:t>Effectively same as the way that vectors are stacked to make matrices</a:t>
+            </a:r>
           </a:p>
           <a:p>
             <a:r>
               <a:rPr lang="en-GB" dirty="0"/>
-              <a:t>Show creating polynomial</a:t>
-            </a:r>
-            <a:r>
-              <a:rPr lang="en-GB" baseline="0" dirty="0"/>
-              <a:t>  poly = @(x) 4*x.^2 + 3.*x + 7</a:t>
-            </a:r>
+              <a:t>Could also have put side by side: [A B]</a:t>
+            </a:r>
+          </a:p>
+          <a:p>
             <a:endParaRPr lang="en-GB" dirty="0"/>
           </a:p>
         </p:txBody>
@@ -1064,26 +1058,17 @@
           <a:lstStyle/>
           <a:p>
             <a:fld id="{0561F5E7-E9A3-428D-802F-730F07CBE60A}" type="slidenum">
-              <a:rPr lang="en-GB" smtClean="0">
-                <a:solidFill>
-                  <a:prstClr val="black"/>
-                </a:solidFill>
-              </a:rPr>
-              <a:pPr/>
-              <a:t>25</a:t>
+              <a:rPr lang="en-GB" smtClean="0"/>
+              <a:t>21</a:t>
             </a:fld>
-            <a:endParaRPr lang="en-GB">
-              <a:solidFill>
-                <a:prstClr val="black"/>
-              </a:solidFill>
-            </a:endParaRPr>
+            <a:endParaRPr lang="en-GB"/>
           </a:p>
         </p:txBody>
       </p:sp>
     </p:spTree>
     <p:extLst>
       <p:ext uri="{BB962C8B-B14F-4D97-AF65-F5344CB8AC3E}">
-        <p14:creationId xmlns:p14="http://schemas.microsoft.com/office/powerpoint/2010/main" val="4294141710"/>
+        <p14:creationId xmlns:p14="http://schemas.microsoft.com/office/powerpoint/2010/main" val="2532400229"/>
       </p:ext>
     </p:extLst>
   </p:cSld>
@@ -1155,30 +1140,24 @@
           <a:p>
             <a:r>
               <a:rPr lang="en-GB" dirty="0"/>
-              <a:t>Built up basics to be able</a:t>
+              <a:t>Bit like an</a:t>
             </a:r>
             <a:r>
               <a:rPr lang="en-GB" baseline="0" dirty="0"/>
-              <a:t> to write code </a:t>
-            </a:r>
-          </a:p>
-          <a:p>
+              <a:t> inline function</a:t>
+            </a:r>
+            <a:endParaRPr lang="en-GB" dirty="0"/>
+          </a:p>
+          <a:p>
+            <a:r>
+              <a:rPr lang="en-GB" dirty="0"/>
+              <a:t>Show creating polynomial</a:t>
+            </a:r>
             <a:r>
               <a:rPr lang="en-GB" baseline="0" dirty="0"/>
-              <a:t>Need the tools to be able to write well constructed programs</a:t>
-            </a:r>
-          </a:p>
-          <a:p>
-            <a:r>
-              <a:rPr lang="en-GB" baseline="0" dirty="0"/>
-              <a:t>Good practice to include H1 line to show input/output arguments</a:t>
-            </a:r>
-          </a:p>
-          <a:p>
-            <a:r>
-              <a:rPr lang="en-GB" baseline="0" dirty="0"/>
-              <a:t>Dummy arguments are basically templates</a:t>
-            </a:r>
+              <a:t>  poly = @(x) 4*x.^2 + 3.*x + 7</a:t>
+            </a:r>
+            <a:endParaRPr lang="en-GB" dirty="0"/>
           </a:p>
         </p:txBody>
       </p:sp>
@@ -1198,8 +1177,142 @@
           <a:lstStyle/>
           <a:p>
             <a:fld id="{0561F5E7-E9A3-428D-802F-730F07CBE60A}" type="slidenum">
+              <a:rPr lang="en-GB" smtClean="0">
+                <a:solidFill>
+                  <a:prstClr val="black"/>
+                </a:solidFill>
+              </a:rPr>
+              <a:pPr/>
+              <a:t>26</a:t>
+            </a:fld>
+            <a:endParaRPr lang="en-GB">
+              <a:solidFill>
+                <a:prstClr val="black"/>
+              </a:solidFill>
+            </a:endParaRPr>
+          </a:p>
+        </p:txBody>
+      </p:sp>
+    </p:spTree>
+    <p:extLst>
+      <p:ext uri="{BB962C8B-B14F-4D97-AF65-F5344CB8AC3E}">
+        <p14:creationId xmlns:p14="http://schemas.microsoft.com/office/powerpoint/2010/main" val="4294141710"/>
+      </p:ext>
+    </p:extLst>
+  </p:cSld>
+  <p:clrMapOvr>
+    <a:masterClrMapping/>
+  </p:clrMapOvr>
+</p:notes>
+</file>
+
+<file path=ppt/notesSlides/notesSlide15.xml><?xml version="1.0" encoding="utf-8"?>
+<p:notes xmlns:a="http://schemas.openxmlformats.org/drawingml/2006/main" xmlns:r="http://schemas.openxmlformats.org/officeDocument/2006/relationships" xmlns:p="http://schemas.openxmlformats.org/presentationml/2006/main">
+  <p:cSld>
+    <p:spTree>
+      <p:nvGrpSpPr>
+        <p:cNvPr id="1" name=""/>
+        <p:cNvGrpSpPr/>
+        <p:nvPr/>
+      </p:nvGrpSpPr>
+      <p:grpSpPr>
+        <a:xfrm>
+          <a:off x="0" y="0"/>
+          <a:ext cx="0" cy="0"/>
+          <a:chOff x="0" y="0"/>
+          <a:chExt cx="0" cy="0"/>
+        </a:xfrm>
+      </p:grpSpPr>
+      <p:sp>
+        <p:nvSpPr>
+          <p:cNvPr id="2" name="Slide Image Placeholder 1"/>
+          <p:cNvSpPr>
+            <a:spLocks noGrp="1" noRot="1" noChangeAspect="1"/>
+          </p:cNvSpPr>
+          <p:nvPr>
+            <p:ph type="sldImg"/>
+          </p:nvPr>
+        </p:nvSpPr>
+        <p:spPr>
+          <a:xfrm>
+            <a:off x="109538" y="741363"/>
+            <a:ext cx="6578600" cy="3702050"/>
+          </a:xfrm>
+          <a:prstGeom prst="rect">
+            <a:avLst/>
+          </a:prstGeom>
+        </p:spPr>
+      </p:sp>
+      <p:sp>
+        <p:nvSpPr>
+          <p:cNvPr id="3" name="Notes Placeholder 2"/>
+          <p:cNvSpPr>
+            <a:spLocks noGrp="1"/>
+          </p:cNvSpPr>
+          <p:nvPr>
+            <p:ph type="body" idx="1"/>
+          </p:nvPr>
+        </p:nvSpPr>
+        <p:spPr>
+          <a:xfrm>
+            <a:off x="679768" y="4690270"/>
+            <a:ext cx="5438140" cy="4443413"/>
+          </a:xfrm>
+          <a:prstGeom prst="rect">
+            <a:avLst/>
+          </a:prstGeom>
+        </p:spPr>
+        <p:txBody>
+          <a:bodyPr/>
+          <a:lstStyle/>
+          <a:p>
+            <a:r>
+              <a:rPr lang="en-GB" dirty="0"/>
+              <a:t>Built up basics to be able</a:t>
+            </a:r>
+            <a:r>
+              <a:rPr lang="en-GB" baseline="0" dirty="0"/>
+              <a:t> to write code </a:t>
+            </a:r>
+          </a:p>
+          <a:p>
+            <a:r>
+              <a:rPr lang="en-GB" baseline="0" dirty="0"/>
+              <a:t>Need the tools to be able to write well constructed programs</a:t>
+            </a:r>
+          </a:p>
+          <a:p>
+            <a:r>
+              <a:rPr lang="en-GB" baseline="0" dirty="0"/>
+              <a:t>Good practice to include H1 line to show input/output arguments</a:t>
+            </a:r>
+          </a:p>
+          <a:p>
+            <a:r>
+              <a:rPr lang="en-GB" baseline="0" dirty="0"/>
+              <a:t>Dummy arguments are basically templates</a:t>
+            </a:r>
+          </a:p>
+        </p:txBody>
+      </p:sp>
+      <p:sp>
+        <p:nvSpPr>
+          <p:cNvPr id="4" name="Slide Number Placeholder 3"/>
+          <p:cNvSpPr>
+            <a:spLocks noGrp="1"/>
+          </p:cNvSpPr>
+          <p:nvPr>
+            <p:ph type="sldNum" sz="quarter" idx="10"/>
+          </p:nvPr>
+        </p:nvSpPr>
+        <p:spPr/>
+        <p:txBody>
+          <a:bodyPr/>
+          <a:lstStyle/>
+          <a:p>
+            <a:fld id="{0561F5E7-E9A3-428D-802F-730F07CBE60A}" type="slidenum">
               <a:rPr lang="en-GB" smtClean="0"/>
-              <a:t>28</a:t>
+              <a:t>29</a:t>
             </a:fld>
             <a:endParaRPr lang="en-GB"/>
           </a:p>
@@ -2306,7 +2419,7 @@
                 </a:solidFill>
               </a:rPr>
               <a:pPr/>
-              <a:t>18/05/2023</a:t>
+              <a:t>23/05/2023</a:t>
             </a:fld>
             <a:endParaRPr lang="en-GB">
               <a:solidFill>
@@ -2508,7 +2621,7 @@
                 </a:solidFill>
               </a:rPr>
               <a:pPr/>
-              <a:t>18/05/2023</a:t>
+              <a:t>23/05/2023</a:t>
             </a:fld>
             <a:endParaRPr lang="en-GB">
               <a:solidFill>
@@ -2720,7 +2833,7 @@
                 </a:solidFill>
               </a:rPr>
               <a:pPr/>
-              <a:t>18/05/2023</a:t>
+              <a:t>23/05/2023</a:t>
             </a:fld>
             <a:endParaRPr lang="en-GB">
               <a:solidFill>
@@ -4432,7 +4545,7 @@
                 </a:solidFill>
               </a:rPr>
               <a:pPr/>
-              <a:t>18/05/2023</a:t>
+              <a:t>23/05/2023</a:t>
             </a:fld>
             <a:endParaRPr lang="en-GB">
               <a:solidFill>
@@ -5214,7 +5327,7 @@
           <a:p>
             <a:fld id="{F4D14FF6-3E0D-407D-982E-9B686EE47223}" type="datetimeFigureOut">
               <a:rPr lang="en-GB" smtClean="0"/>
-              <a:t>18/05/2023</a:t>
+              <a:t>23/05/2023</a:t>
             </a:fld>
             <a:endParaRPr lang="en-GB"/>
           </a:p>
@@ -5384,7 +5497,7 @@
           <a:p>
             <a:fld id="{F4D14FF6-3E0D-407D-982E-9B686EE47223}" type="datetimeFigureOut">
               <a:rPr lang="en-GB" smtClean="0"/>
-              <a:t>18/05/2023</a:t>
+              <a:t>23/05/2023</a:t>
             </a:fld>
             <a:endParaRPr lang="en-GB"/>
           </a:p>
@@ -5630,7 +5743,7 @@
           <a:p>
             <a:fld id="{F4D14FF6-3E0D-407D-982E-9B686EE47223}" type="datetimeFigureOut">
               <a:rPr lang="en-GB" smtClean="0"/>
-              <a:t>18/05/2023</a:t>
+              <a:t>23/05/2023</a:t>
             </a:fld>
             <a:endParaRPr lang="en-GB"/>
           </a:p>
@@ -5862,7 +5975,7 @@
           <a:p>
             <a:fld id="{F4D14FF6-3E0D-407D-982E-9B686EE47223}" type="datetimeFigureOut">
               <a:rPr lang="en-GB" smtClean="0"/>
-              <a:t>18/05/2023</a:t>
+              <a:t>23/05/2023</a:t>
             </a:fld>
             <a:endParaRPr lang="en-GB"/>
           </a:p>
@@ -6229,7 +6342,7 @@
           <a:p>
             <a:fld id="{F4D14FF6-3E0D-407D-982E-9B686EE47223}" type="datetimeFigureOut">
               <a:rPr lang="en-GB" smtClean="0"/>
-              <a:t>18/05/2023</a:t>
+              <a:t>23/05/2023</a:t>
             </a:fld>
             <a:endParaRPr lang="en-GB"/>
           </a:p>
@@ -6347,7 +6460,7 @@
           <a:p>
             <a:fld id="{F4D14FF6-3E0D-407D-982E-9B686EE47223}" type="datetimeFigureOut">
               <a:rPr lang="en-GB" smtClean="0"/>
-              <a:t>18/05/2023</a:t>
+              <a:t>23/05/2023</a:t>
             </a:fld>
             <a:endParaRPr lang="en-GB"/>
           </a:p>
@@ -6442,7 +6555,7 @@
           <a:p>
             <a:fld id="{F4D14FF6-3E0D-407D-982E-9B686EE47223}" type="datetimeFigureOut">
               <a:rPr lang="en-GB" smtClean="0"/>
-              <a:t>18/05/2023</a:t>
+              <a:t>23/05/2023</a:t>
             </a:fld>
             <a:endParaRPr lang="en-GB"/>
           </a:p>
@@ -6695,7 +6808,7 @@
                 </a:solidFill>
               </a:rPr>
               <a:pPr/>
-              <a:t>18/05/2023</a:t>
+              <a:t>23/05/2023</a:t>
             </a:fld>
             <a:endParaRPr lang="en-GB">
               <a:solidFill>
@@ -6997,7 +7110,7 @@
           <a:p>
             <a:fld id="{F4D14FF6-3E0D-407D-982E-9B686EE47223}" type="datetimeFigureOut">
               <a:rPr lang="en-GB" smtClean="0"/>
-              <a:t>18/05/2023</a:t>
+              <a:t>23/05/2023</a:t>
             </a:fld>
             <a:endParaRPr lang="en-GB"/>
           </a:p>
@@ -7254,7 +7367,7 @@
           <a:p>
             <a:fld id="{F4D14FF6-3E0D-407D-982E-9B686EE47223}" type="datetimeFigureOut">
               <a:rPr lang="en-GB" smtClean="0"/>
-              <a:t>18/05/2023</a:t>
+              <a:t>23/05/2023</a:t>
             </a:fld>
             <a:endParaRPr lang="en-GB"/>
           </a:p>
@@ -7424,7 +7537,7 @@
           <a:p>
             <a:fld id="{F4D14FF6-3E0D-407D-982E-9B686EE47223}" type="datetimeFigureOut">
               <a:rPr lang="en-GB" smtClean="0"/>
-              <a:t>18/05/2023</a:t>
+              <a:t>23/05/2023</a:t>
             </a:fld>
             <a:endParaRPr lang="en-GB"/>
           </a:p>
@@ -7604,7 +7717,7 @@
           <a:p>
             <a:fld id="{F4D14FF6-3E0D-407D-982E-9B686EE47223}" type="datetimeFigureOut">
               <a:rPr lang="en-GB" smtClean="0"/>
-              <a:t>18/05/2023</a:t>
+              <a:t>23/05/2023</a:t>
             </a:fld>
             <a:endParaRPr lang="en-GB"/>
           </a:p>
@@ -8179,7 +8292,7 @@
                 </a:solidFill>
               </a:rPr>
               <a:pPr/>
-              <a:t>18/05/2023</a:t>
+              <a:t>23/05/2023</a:t>
             </a:fld>
             <a:endParaRPr lang="en-GB">
               <a:solidFill>
@@ -8633,7 +8746,7 @@
                 </a:solidFill>
               </a:rPr>
               <a:pPr/>
-              <a:t>18/05/2023</a:t>
+              <a:t>23/05/2023</a:t>
             </a:fld>
             <a:endParaRPr lang="en-GB">
               <a:solidFill>
@@ -8783,7 +8896,7 @@
                 </a:solidFill>
               </a:rPr>
               <a:pPr/>
-              <a:t>18/05/2023</a:t>
+              <a:t>23/05/2023</a:t>
             </a:fld>
             <a:endParaRPr lang="en-GB">
               <a:solidFill>
@@ -8910,7 +9023,7 @@
                 </a:solidFill>
               </a:rPr>
               <a:pPr/>
-              <a:t>18/05/2023</a:t>
+              <a:t>23/05/2023</a:t>
             </a:fld>
             <a:endParaRPr lang="en-GB">
               <a:solidFill>
@@ -9219,7 +9332,7 @@
                 </a:solidFill>
               </a:rPr>
               <a:pPr/>
-              <a:t>18/05/2023</a:t>
+              <a:t>23/05/2023</a:t>
             </a:fld>
             <a:endParaRPr lang="en-GB">
               <a:solidFill>
@@ -9504,7 +9617,7 @@
                 </a:solidFill>
               </a:rPr>
               <a:pPr/>
-              <a:t>18/05/2023</a:t>
+              <a:t>23/05/2023</a:t>
             </a:fld>
             <a:endParaRPr lang="en-GB">
               <a:solidFill>
@@ -9749,7 +9862,7 @@
                 </a:solidFill>
               </a:rPr>
               <a:pPr/>
-              <a:t>18/05/2023</a:t>
+              <a:t>23/05/2023</a:t>
             </a:fld>
             <a:endParaRPr lang="en-GB">
               <a:solidFill>
@@ -10746,7 +10859,7 @@
           <a:p>
             <a:fld id="{F4D14FF6-3E0D-407D-982E-9B686EE47223}" type="datetimeFigureOut">
               <a:rPr lang="en-GB" smtClean="0"/>
-              <a:t>18/05/2023</a:t>
+              <a:t>23/05/2023</a:t>
             </a:fld>
             <a:endParaRPr lang="en-GB"/>
           </a:p>
@@ -15982,6 +16095,649 @@
             <p:ph type="title"/>
           </p:nvPr>
         </p:nvSpPr>
+        <p:spPr>
+          <a:xfrm>
+            <a:off x="3591344" y="100360"/>
+            <a:ext cx="4433248" cy="634082"/>
+          </a:xfrm>
+        </p:spPr>
+        <p:txBody>
+          <a:bodyPr>
+            <a:normAutofit fontScale="90000"/>
+          </a:bodyPr>
+          <a:lstStyle/>
+          <a:p>
+            <a:r>
+              <a:rPr lang="en-GB" dirty="0"/>
+              <a:t>Combining Matrices</a:t>
+            </a:r>
+          </a:p>
+        </p:txBody>
+      </p:sp>
+      <p:sp>
+        <p:nvSpPr>
+          <p:cNvPr id="3" name="Slide Number Placeholder 2"/>
+          <p:cNvSpPr>
+            <a:spLocks noGrp="1"/>
+          </p:cNvSpPr>
+          <p:nvPr>
+            <p:ph type="sldNum" sz="quarter" idx="12"/>
+          </p:nvPr>
+        </p:nvSpPr>
+        <p:spPr/>
+        <p:txBody>
+          <a:bodyPr/>
+          <a:lstStyle/>
+          <a:p>
+            <a:fld id="{83730267-60C2-4514-997F-6A8804439442}" type="slidenum">
+              <a:rPr lang="en-GB" smtClean="0"/>
+              <a:t>21</a:t>
+            </a:fld>
+            <a:endParaRPr lang="en-GB"/>
+          </a:p>
+        </p:txBody>
+      </p:sp>
+      <p:sp>
+        <p:nvSpPr>
+          <p:cNvPr id="4" name="TextBox 3"/>
+          <p:cNvSpPr txBox="1"/>
+          <p:nvPr/>
+        </p:nvSpPr>
+        <p:spPr>
+          <a:xfrm>
+            <a:off x="679776" y="1037863"/>
+            <a:ext cx="7344816" cy="3693319"/>
+          </a:xfrm>
+          <a:prstGeom prst="rect">
+            <a:avLst/>
+          </a:prstGeom>
+          <a:noFill/>
+        </p:spPr>
+        <p:txBody>
+          <a:bodyPr wrap="square" rtlCol="0">
+            <a:spAutoFit/>
+          </a:bodyPr>
+          <a:lstStyle/>
+          <a:p>
+            <a:r>
+              <a:rPr lang="en-GB" sz="2000" dirty="0"/>
+              <a:t>Larger arrays can be built up from smaller ones:</a:t>
+            </a:r>
+          </a:p>
+          <a:p>
+            <a:r>
+              <a:rPr lang="en-GB" sz="2000" dirty="0">
+                <a:latin typeface="Courier New" pitchFamily="49" charset="0"/>
+                <a:cs typeface="Courier New" pitchFamily="49" charset="0"/>
+              </a:rPr>
+              <a:t>&gt;&gt; A = [1:5;5:9]</a:t>
+            </a:r>
+          </a:p>
+          <a:p>
+            <a:r>
+              <a:rPr lang="en-GB" sz="2000" dirty="0">
+                <a:latin typeface="Courier New" pitchFamily="49" charset="0"/>
+                <a:cs typeface="Courier New" pitchFamily="49" charset="0"/>
+              </a:rPr>
+              <a:t>A =</a:t>
+            </a:r>
+          </a:p>
+          <a:p>
+            <a:r>
+              <a:rPr lang="en-GB" sz="2000" dirty="0">
+                <a:latin typeface="Courier New" pitchFamily="49" charset="0"/>
+                <a:cs typeface="Courier New" pitchFamily="49" charset="0"/>
+              </a:rPr>
+              <a:t>     1     2     3     4     5</a:t>
+            </a:r>
+          </a:p>
+          <a:p>
+            <a:r>
+              <a:rPr lang="en-GB" sz="2000" dirty="0">
+                <a:latin typeface="Courier New" pitchFamily="49" charset="0"/>
+                <a:cs typeface="Courier New" pitchFamily="49" charset="0"/>
+              </a:rPr>
+              <a:t>     5     6     7     8     9</a:t>
+            </a:r>
+          </a:p>
+          <a:p>
+            <a:r>
+              <a:rPr lang="en-GB" sz="2000" dirty="0">
+                <a:latin typeface="Courier New" pitchFamily="49" charset="0"/>
+                <a:cs typeface="Courier New" pitchFamily="49" charset="0"/>
+              </a:rPr>
+              <a:t> </a:t>
+            </a:r>
+          </a:p>
+          <a:p>
+            <a:r>
+              <a:rPr lang="en-GB" sz="2000" dirty="0">
+                <a:latin typeface="Courier New" pitchFamily="49" charset="0"/>
+                <a:cs typeface="Courier New" pitchFamily="49" charset="0"/>
+              </a:rPr>
+              <a:t>&gt;&gt; B = [1:2:9;2:2:10]</a:t>
+            </a:r>
+          </a:p>
+          <a:p>
+            <a:r>
+              <a:rPr lang="en-GB" sz="2000" dirty="0">
+                <a:latin typeface="Courier New" pitchFamily="49" charset="0"/>
+                <a:cs typeface="Courier New" pitchFamily="49" charset="0"/>
+              </a:rPr>
+              <a:t>B =</a:t>
+            </a:r>
+          </a:p>
+          <a:p>
+            <a:r>
+              <a:rPr lang="en-GB" sz="2000" dirty="0">
+                <a:latin typeface="Courier New" pitchFamily="49" charset="0"/>
+                <a:cs typeface="Courier New" pitchFamily="49" charset="0"/>
+              </a:rPr>
+              <a:t>     1     3     5     7     9</a:t>
+            </a:r>
+          </a:p>
+          <a:p>
+            <a:r>
+              <a:rPr lang="en-GB" sz="2000" dirty="0">
+                <a:latin typeface="Courier New" pitchFamily="49" charset="0"/>
+                <a:cs typeface="Courier New" pitchFamily="49" charset="0"/>
+              </a:rPr>
+              <a:t>     2     4     6     8    10</a:t>
+            </a:r>
+          </a:p>
+          <a:p>
+            <a:endParaRPr lang="en-GB" sz="1600" dirty="0">
+              <a:latin typeface="Courier New" pitchFamily="49" charset="0"/>
+              <a:cs typeface="Courier New" pitchFamily="49" charset="0"/>
+            </a:endParaRPr>
+          </a:p>
+          <a:p>
+            <a:endParaRPr lang="en-GB" dirty="0"/>
+          </a:p>
+        </p:txBody>
+      </p:sp>
+      <p:sp>
+        <p:nvSpPr>
+          <p:cNvPr id="8" name="TextBox 7"/>
+          <p:cNvSpPr txBox="1"/>
+          <p:nvPr/>
+        </p:nvSpPr>
+        <p:spPr>
+          <a:xfrm>
+            <a:off x="8949311" y="3387930"/>
+            <a:ext cx="2952328" cy="1200329"/>
+          </a:xfrm>
+          <a:prstGeom prst="rect">
+            <a:avLst/>
+          </a:prstGeom>
+          <a:noFill/>
+        </p:spPr>
+        <p:txBody>
+          <a:bodyPr wrap="square" rtlCol="0">
+            <a:spAutoFit/>
+          </a:bodyPr>
+          <a:lstStyle/>
+          <a:p>
+            <a:r>
+              <a:rPr lang="en-GB" dirty="0">
+                <a:cs typeface="Courier New" pitchFamily="49" charset="0"/>
+              </a:rPr>
+              <a:t>Note that the dimensions of arrays being joined must be consistent.</a:t>
+            </a:r>
+          </a:p>
+          <a:p>
+            <a:endParaRPr lang="en-GB" dirty="0"/>
+          </a:p>
+        </p:txBody>
+      </p:sp>
+      <p:cxnSp>
+        <p:nvCxnSpPr>
+          <p:cNvPr id="6" name="Straight Arrow Connector 5">
+            <a:extLst>
+              <a:ext uri="{FF2B5EF4-FFF2-40B4-BE49-F238E27FC236}">
+                <a16:creationId xmlns:a16="http://schemas.microsoft.com/office/drawing/2014/main" id="{26C41068-196F-E2A7-58E1-74D9910FB6E9}"/>
+              </a:ext>
+            </a:extLst>
+          </p:cNvPr>
+          <p:cNvCxnSpPr>
+            <a:cxnSpLocks/>
+            <a:stCxn id="8" idx="1"/>
+          </p:cNvCxnSpPr>
+          <p:nvPr/>
+        </p:nvCxnSpPr>
+        <p:spPr>
+          <a:xfrm flipH="1">
+            <a:off x="5012720" y="3988095"/>
+            <a:ext cx="3936591" cy="1375475"/>
+          </a:xfrm>
+          <a:prstGeom prst="straightConnector1">
+            <a:avLst/>
+          </a:prstGeom>
+          <a:ln>
+            <a:tailEnd type="triangle"/>
+          </a:ln>
+        </p:spPr>
+        <p:style>
+          <a:lnRef idx="1">
+            <a:schemeClr val="dk1"/>
+          </a:lnRef>
+          <a:fillRef idx="0">
+            <a:schemeClr val="dk1"/>
+          </a:fillRef>
+          <a:effectRef idx="0">
+            <a:schemeClr val="dk1"/>
+          </a:effectRef>
+          <a:fontRef idx="minor">
+            <a:schemeClr val="tx1"/>
+          </a:fontRef>
+        </p:style>
+      </p:cxnSp>
+      <p:cxnSp>
+        <p:nvCxnSpPr>
+          <p:cNvPr id="9" name="Straight Arrow Connector 8">
+            <a:extLst>
+              <a:ext uri="{FF2B5EF4-FFF2-40B4-BE49-F238E27FC236}">
+                <a16:creationId xmlns:a16="http://schemas.microsoft.com/office/drawing/2014/main" id="{5B8453B3-C47A-9D31-BBCD-4B4A18852A8D}"/>
+              </a:ext>
+            </a:extLst>
+          </p:cNvPr>
+          <p:cNvCxnSpPr>
+            <a:cxnSpLocks/>
+          </p:cNvCxnSpPr>
+          <p:nvPr/>
+        </p:nvCxnSpPr>
+        <p:spPr>
+          <a:xfrm flipH="1">
+            <a:off x="9376012" y="4295603"/>
+            <a:ext cx="800107" cy="1067967"/>
+          </a:xfrm>
+          <a:prstGeom prst="straightConnector1">
+            <a:avLst/>
+          </a:prstGeom>
+          <a:ln>
+            <a:tailEnd type="triangle"/>
+          </a:ln>
+        </p:spPr>
+        <p:style>
+          <a:lnRef idx="1">
+            <a:schemeClr val="dk1"/>
+          </a:lnRef>
+          <a:fillRef idx="0">
+            <a:schemeClr val="dk1"/>
+          </a:fillRef>
+          <a:effectRef idx="0">
+            <a:schemeClr val="dk1"/>
+          </a:effectRef>
+          <a:fontRef idx="minor">
+            <a:schemeClr val="tx1"/>
+          </a:fontRef>
+        </p:style>
+      </p:cxnSp>
+      <p:cxnSp>
+        <p:nvCxnSpPr>
+          <p:cNvPr id="11" name="Straight Arrow Connector 10">
+            <a:extLst>
+              <a:ext uri="{FF2B5EF4-FFF2-40B4-BE49-F238E27FC236}">
+                <a16:creationId xmlns:a16="http://schemas.microsoft.com/office/drawing/2014/main" id="{B6A693C8-1491-6E31-F3D2-6A43AC7761F9}"/>
+              </a:ext>
+            </a:extLst>
+          </p:cNvPr>
+          <p:cNvCxnSpPr>
+            <a:cxnSpLocks/>
+          </p:cNvCxnSpPr>
+          <p:nvPr/>
+        </p:nvCxnSpPr>
+        <p:spPr>
+          <a:xfrm flipH="1">
+            <a:off x="3234519" y="1494430"/>
+            <a:ext cx="4503762" cy="0"/>
+          </a:xfrm>
+          <a:prstGeom prst="straightConnector1">
+            <a:avLst/>
+          </a:prstGeom>
+          <a:ln>
+            <a:tailEnd type="triangle"/>
+          </a:ln>
+        </p:spPr>
+        <p:style>
+          <a:lnRef idx="1">
+            <a:schemeClr val="dk1"/>
+          </a:lnRef>
+          <a:fillRef idx="0">
+            <a:schemeClr val="dk1"/>
+          </a:fillRef>
+          <a:effectRef idx="0">
+            <a:schemeClr val="dk1"/>
+          </a:effectRef>
+          <a:fontRef idx="minor">
+            <a:schemeClr val="tx1"/>
+          </a:fontRef>
+        </p:style>
+      </p:cxnSp>
+      <p:sp>
+        <p:nvSpPr>
+          <p:cNvPr id="12" name="TextBox 11">
+            <a:extLst>
+              <a:ext uri="{FF2B5EF4-FFF2-40B4-BE49-F238E27FC236}">
+                <a16:creationId xmlns:a16="http://schemas.microsoft.com/office/drawing/2014/main" id="{B6A6C4E3-F854-0D77-AFDA-0D14A38005FB}"/>
+              </a:ext>
+            </a:extLst>
+          </p:cNvPr>
+          <p:cNvSpPr txBox="1"/>
+          <p:nvPr/>
+        </p:nvSpPr>
+        <p:spPr>
+          <a:xfrm>
+            <a:off x="7738281" y="1105469"/>
+            <a:ext cx="4285397" cy="1938992"/>
+          </a:xfrm>
+          <a:prstGeom prst="rect">
+            <a:avLst/>
+          </a:prstGeom>
+          <a:noFill/>
+        </p:spPr>
+        <p:txBody>
+          <a:bodyPr wrap="square" rtlCol="0">
+            <a:spAutoFit/>
+          </a:bodyPr>
+          <a:lstStyle/>
+          <a:p>
+            <a:r>
+              <a:rPr lang="en-GB" sz="2000" dirty="0"/>
+              <a:t>Square brackets [] are the </a:t>
+            </a:r>
+            <a:r>
+              <a:rPr lang="en-GB" sz="2000" i="1" dirty="0"/>
+              <a:t>concatenation operator</a:t>
+            </a:r>
+          </a:p>
+          <a:p>
+            <a:endParaRPr lang="en-GB" sz="2000" i="1" dirty="0"/>
+          </a:p>
+          <a:p>
+            <a:r>
+              <a:rPr lang="en-GB" sz="2000" dirty="0"/>
+              <a:t>Delimiters:</a:t>
+            </a:r>
+          </a:p>
+          <a:p>
+            <a:r>
+              <a:rPr lang="en-GB" sz="2000" dirty="0"/>
+              <a:t>, or space – Arrays go side by side</a:t>
+            </a:r>
+          </a:p>
+          <a:p>
+            <a:r>
+              <a:rPr lang="en-GB" sz="2000" dirty="0"/>
+              <a:t>;  - Arrays go one above the other</a:t>
+            </a:r>
+          </a:p>
+        </p:txBody>
+      </p:sp>
+      <p:sp>
+        <p:nvSpPr>
+          <p:cNvPr id="14" name="TextBox 13">
+            <a:extLst>
+              <a:ext uri="{FF2B5EF4-FFF2-40B4-BE49-F238E27FC236}">
+                <a16:creationId xmlns:a16="http://schemas.microsoft.com/office/drawing/2014/main" id="{66E84BE7-A9CA-56A6-93DC-23BC886EFE4B}"/>
+              </a:ext>
+            </a:extLst>
+          </p:cNvPr>
+          <p:cNvSpPr txBox="1"/>
+          <p:nvPr/>
+        </p:nvSpPr>
+        <p:spPr>
+          <a:xfrm>
+            <a:off x="2705959" y="4507587"/>
+            <a:ext cx="2306761" cy="2031325"/>
+          </a:xfrm>
+          <a:prstGeom prst="rect">
+            <a:avLst/>
+          </a:prstGeom>
+          <a:noFill/>
+        </p:spPr>
+        <p:txBody>
+          <a:bodyPr wrap="square" rtlCol="0">
+            <a:spAutoFit/>
+          </a:bodyPr>
+          <a:lstStyle/>
+          <a:p>
+            <a:r>
+              <a:rPr lang="en-GB" dirty="0">
+                <a:latin typeface="Courier New" pitchFamily="49" charset="0"/>
+                <a:cs typeface="Courier New" pitchFamily="49" charset="0"/>
+              </a:rPr>
+              <a:t>&gt;&gt; D = [A;B]</a:t>
+            </a:r>
+          </a:p>
+          <a:p>
+            <a:r>
+              <a:rPr lang="en-GB" dirty="0">
+                <a:latin typeface="Courier New" pitchFamily="49" charset="0"/>
+                <a:cs typeface="Courier New" pitchFamily="49" charset="0"/>
+              </a:rPr>
+              <a:t>D =</a:t>
+            </a:r>
+          </a:p>
+          <a:p>
+            <a:r>
+              <a:rPr lang="en-GB" dirty="0">
+                <a:latin typeface="Courier New" pitchFamily="49" charset="0"/>
+                <a:cs typeface="Courier New" pitchFamily="49" charset="0"/>
+              </a:rPr>
+              <a:t>     1 2 3 4 5</a:t>
+            </a:r>
+          </a:p>
+          <a:p>
+            <a:r>
+              <a:rPr lang="en-GB" dirty="0">
+                <a:latin typeface="Courier New" pitchFamily="49" charset="0"/>
+                <a:cs typeface="Courier New" pitchFamily="49" charset="0"/>
+              </a:rPr>
+              <a:t>     5 6 7 8 9</a:t>
+            </a:r>
+          </a:p>
+          <a:p>
+            <a:r>
+              <a:rPr lang="en-GB" dirty="0">
+                <a:latin typeface="Courier New" pitchFamily="49" charset="0"/>
+                <a:cs typeface="Courier New" pitchFamily="49" charset="0"/>
+              </a:rPr>
+              <a:t>     1 3 5 7 9</a:t>
+            </a:r>
+          </a:p>
+          <a:p>
+            <a:r>
+              <a:rPr lang="en-GB" dirty="0">
+                <a:latin typeface="Courier New" pitchFamily="49" charset="0"/>
+                <a:cs typeface="Courier New" pitchFamily="49" charset="0"/>
+              </a:rPr>
+              <a:t>     2 4 6 8 10</a:t>
+            </a:r>
+          </a:p>
+          <a:p>
+            <a:endParaRPr lang="en-GB" dirty="0"/>
+          </a:p>
+        </p:txBody>
+      </p:sp>
+      <p:sp>
+        <p:nvSpPr>
+          <p:cNvPr id="15" name="TextBox 14">
+            <a:extLst>
+              <a:ext uri="{FF2B5EF4-FFF2-40B4-BE49-F238E27FC236}">
+                <a16:creationId xmlns:a16="http://schemas.microsoft.com/office/drawing/2014/main" id="{7BCAF8F5-4871-2ED7-6B30-142A76486A64}"/>
+              </a:ext>
+            </a:extLst>
+          </p:cNvPr>
+          <p:cNvSpPr txBox="1"/>
+          <p:nvPr/>
+        </p:nvSpPr>
+        <p:spPr>
+          <a:xfrm>
+            <a:off x="6794353" y="4916203"/>
+            <a:ext cx="3631122" cy="1477328"/>
+          </a:xfrm>
+          <a:prstGeom prst="rect">
+            <a:avLst/>
+          </a:prstGeom>
+          <a:noFill/>
+        </p:spPr>
+        <p:txBody>
+          <a:bodyPr wrap="none" rtlCol="0">
+            <a:spAutoFit/>
+          </a:bodyPr>
+          <a:lstStyle/>
+          <a:p>
+            <a:r>
+              <a:rPr lang="en-GB" dirty="0">
+                <a:latin typeface="Courier New" pitchFamily="49" charset="0"/>
+                <a:cs typeface="Courier New" pitchFamily="49" charset="0"/>
+              </a:rPr>
+              <a:t>&gt;&gt; E = [A, B]</a:t>
+            </a:r>
+          </a:p>
+          <a:p>
+            <a:r>
+              <a:rPr lang="en-GB" dirty="0">
+                <a:latin typeface="Courier New" pitchFamily="49" charset="0"/>
+                <a:cs typeface="Courier New" pitchFamily="49" charset="0"/>
+              </a:rPr>
+              <a:t>E =</a:t>
+            </a:r>
+          </a:p>
+          <a:p>
+            <a:r>
+              <a:rPr lang="en-GB" dirty="0">
+                <a:latin typeface="Courier New" pitchFamily="49" charset="0"/>
+                <a:cs typeface="Courier New" pitchFamily="49" charset="0"/>
+              </a:rPr>
+              <a:t>     1 2 3 4 5 1 3 5 7 9</a:t>
+            </a:r>
+          </a:p>
+          <a:p>
+            <a:r>
+              <a:rPr lang="en-GB" dirty="0">
+                <a:latin typeface="Courier New" pitchFamily="49" charset="0"/>
+                <a:cs typeface="Courier New" pitchFamily="49" charset="0"/>
+              </a:rPr>
+              <a:t>     5 6 7 8 9 2 4 6 8 10</a:t>
+            </a:r>
+          </a:p>
+          <a:p>
+            <a:endParaRPr lang="en-GB" dirty="0"/>
+          </a:p>
+        </p:txBody>
+      </p:sp>
+      <p:sp>
+        <p:nvSpPr>
+          <p:cNvPr id="21" name="TextBox 20">
+            <a:extLst>
+              <a:ext uri="{FF2B5EF4-FFF2-40B4-BE49-F238E27FC236}">
+                <a16:creationId xmlns:a16="http://schemas.microsoft.com/office/drawing/2014/main" id="{D493D652-01BE-B9A3-5C91-9F1BE200EB5C}"/>
+              </a:ext>
+            </a:extLst>
+          </p:cNvPr>
+          <p:cNvSpPr txBox="1"/>
+          <p:nvPr/>
+        </p:nvSpPr>
+        <p:spPr>
+          <a:xfrm>
+            <a:off x="5365326" y="4349356"/>
+            <a:ext cx="1263313" cy="646331"/>
+          </a:xfrm>
+          <a:prstGeom prst="rect">
+            <a:avLst/>
+          </a:prstGeom>
+          <a:noFill/>
+        </p:spPr>
+        <p:txBody>
+          <a:bodyPr wrap="square" rtlCol="0">
+            <a:spAutoFit/>
+          </a:bodyPr>
+          <a:lstStyle/>
+          <a:p>
+            <a:r>
+              <a:rPr lang="en-GB" dirty="0"/>
+              <a:t>5 columns in both</a:t>
+            </a:r>
+          </a:p>
+        </p:txBody>
+      </p:sp>
+      <p:sp>
+        <p:nvSpPr>
+          <p:cNvPr id="22" name="TextBox 21">
+            <a:extLst>
+              <a:ext uri="{FF2B5EF4-FFF2-40B4-BE49-F238E27FC236}">
+                <a16:creationId xmlns:a16="http://schemas.microsoft.com/office/drawing/2014/main" id="{CB090D08-8391-BF9E-9DBE-045200C93C3C}"/>
+              </a:ext>
+            </a:extLst>
+          </p:cNvPr>
+          <p:cNvSpPr txBox="1"/>
+          <p:nvPr/>
+        </p:nvSpPr>
+        <p:spPr>
+          <a:xfrm>
+            <a:off x="9806225" y="4666780"/>
+            <a:ext cx="924719" cy="646331"/>
+          </a:xfrm>
+          <a:prstGeom prst="rect">
+            <a:avLst/>
+          </a:prstGeom>
+          <a:noFill/>
+        </p:spPr>
+        <p:txBody>
+          <a:bodyPr wrap="square" rtlCol="0">
+            <a:spAutoFit/>
+          </a:bodyPr>
+          <a:lstStyle/>
+          <a:p>
+            <a:r>
+              <a:rPr lang="en-GB" dirty="0"/>
+              <a:t>2 rows in both</a:t>
+            </a:r>
+          </a:p>
+        </p:txBody>
+      </p:sp>
+    </p:spTree>
+    <p:extLst>
+      <p:ext uri="{BB962C8B-B14F-4D97-AF65-F5344CB8AC3E}">
+        <p14:creationId xmlns:p14="http://schemas.microsoft.com/office/powerpoint/2010/main" val="2588832124"/>
+      </p:ext>
+    </p:extLst>
+  </p:cSld>
+  <p:clrMapOvr>
+    <a:masterClrMapping/>
+  </p:clrMapOvr>
+</p:sld>
+</file>
+
+<file path=ppt/slides/slide22.xml><?xml version="1.0" encoding="utf-8"?>
+<p:sld xmlns:a="http://schemas.openxmlformats.org/drawingml/2006/main" xmlns:r="http://schemas.openxmlformats.org/officeDocument/2006/relationships" xmlns:p="http://schemas.openxmlformats.org/presentationml/2006/main">
+  <p:cSld>
+    <p:spTree>
+      <p:nvGrpSpPr>
+        <p:cNvPr id="1" name=""/>
+        <p:cNvGrpSpPr/>
+        <p:nvPr/>
+      </p:nvGrpSpPr>
+      <p:grpSpPr>
+        <a:xfrm>
+          <a:off x="0" y="0"/>
+          <a:ext cx="0" cy="0"/>
+          <a:chOff x="0" y="0"/>
+          <a:chExt cx="0" cy="0"/>
+        </a:xfrm>
+      </p:grpSpPr>
+      <p:sp>
+        <p:nvSpPr>
+          <p:cNvPr id="2" name="Title 1"/>
+          <p:cNvSpPr>
+            <a:spLocks noGrp="1"/>
+          </p:cNvSpPr>
+          <p:nvPr>
+            <p:ph type="title"/>
+          </p:nvPr>
+        </p:nvSpPr>
         <p:spPr/>
         <p:txBody>
           <a:bodyPr/>
@@ -15995,8 +16751,8 @@
           </a:p>
         </p:txBody>
       </p:sp>
-      <mc:AlternateContent xmlns:mc="http://schemas.openxmlformats.org/markup-compatibility/2006">
-        <mc:Choice xmlns:a14="http://schemas.microsoft.com/office/drawing/2010/main" Requires="a14">
+      <mc:AlternateContent xmlns:mc="http://schemas.openxmlformats.org/markup-compatibility/2006" xmlns:a14="http://schemas.microsoft.com/office/drawing/2010/main">
+        <mc:Choice Requires="a14">
           <p:sp>
             <p:nvSpPr>
               <p:cNvPr id="4" name="Content Placeholder 3"/>
@@ -16175,7 +16931,7 @@
             </p:txBody>
           </p:sp>
         </mc:Choice>
-        <mc:Fallback>
+        <mc:Fallback xmlns="">
           <p:sp>
             <p:nvSpPr>
               <p:cNvPr id="4" name="Content Placeholder 3"/>
@@ -16226,7 +16982,7 @@
 </p:sld>
 </file>
 
-<file path=ppt/slides/slide22.xml><?xml version="1.0" encoding="utf-8"?>
+<file path=ppt/slides/slide23.xml><?xml version="1.0" encoding="utf-8"?>
 <p:sld xmlns:a="http://schemas.openxmlformats.org/drawingml/2006/main" xmlns:r="http://schemas.openxmlformats.org/officeDocument/2006/relationships" xmlns:p="http://schemas.openxmlformats.org/presentationml/2006/main">
   <p:cSld>
     <p:spTree>
@@ -16266,8 +17022,8 @@
           </a:p>
         </p:txBody>
       </p:sp>
-      <mc:AlternateContent xmlns:mc="http://schemas.openxmlformats.org/markup-compatibility/2006">
-        <mc:Choice xmlns:a14="http://schemas.microsoft.com/office/drawing/2010/main" Requires="a14">
+      <mc:AlternateContent xmlns:mc="http://schemas.openxmlformats.org/markup-compatibility/2006" xmlns:a14="http://schemas.microsoft.com/office/drawing/2010/main">
+        <mc:Choice Requires="a14">
           <p:sp>
             <p:nvSpPr>
               <p:cNvPr id="3" name="Content Placeholder 2"/>
@@ -16711,7 +17467,7 @@
             </p:txBody>
           </p:sp>
         </mc:Choice>
-        <mc:Fallback>
+        <mc:Fallback xmlns="">
           <p:sp>
             <p:nvSpPr>
               <p:cNvPr id="3" name="Content Placeholder 2"/>
@@ -17012,7 +17768,7 @@
 </p:sld>
 </file>
 
-<file path=ppt/slides/slide23.xml><?xml version="1.0" encoding="utf-8"?>
+<file path=ppt/slides/slide24.xml><?xml version="1.0" encoding="utf-8"?>
 <p:sld xmlns:a="http://schemas.openxmlformats.org/drawingml/2006/main" xmlns:r="http://schemas.openxmlformats.org/officeDocument/2006/relationships" xmlns:p="http://schemas.openxmlformats.org/presentationml/2006/main">
   <p:cSld>
     <p:spTree>
@@ -20325,207 +21081,6 @@
 </p:sld>
 </file>
 
-<file path=ppt/slides/slide24.xml><?xml version="1.0" encoding="utf-8"?>
-<p:sld xmlns:a="http://schemas.openxmlformats.org/drawingml/2006/main" xmlns:r="http://schemas.openxmlformats.org/officeDocument/2006/relationships" xmlns:p="http://schemas.openxmlformats.org/presentationml/2006/main">
-  <p:cSld>
-    <p:spTree>
-      <p:nvGrpSpPr>
-        <p:cNvPr id="1" name=""/>
-        <p:cNvGrpSpPr/>
-        <p:nvPr/>
-      </p:nvGrpSpPr>
-      <p:grpSpPr>
-        <a:xfrm>
-          <a:off x="0" y="0"/>
-          <a:ext cx="0" cy="0"/>
-          <a:chOff x="0" y="0"/>
-          <a:chExt cx="0" cy="0"/>
-        </a:xfrm>
-      </p:grpSpPr>
-      <p:sp>
-        <p:nvSpPr>
-          <p:cNvPr id="2" name="Title 1">
-            <a:extLst>
-              <a:ext uri="{FF2B5EF4-FFF2-40B4-BE49-F238E27FC236}">
-                <a16:creationId xmlns:a16="http://schemas.microsoft.com/office/drawing/2014/main" id="{93D04027-176D-7C37-0665-3ED3C4B7E0FD}"/>
-              </a:ext>
-            </a:extLst>
-          </p:cNvPr>
-          <p:cNvSpPr>
-            <a:spLocks noGrp="1"/>
-          </p:cNvSpPr>
-          <p:nvPr>
-            <p:ph type="title"/>
-          </p:nvPr>
-        </p:nvSpPr>
-        <p:spPr/>
-        <p:txBody>
-          <a:bodyPr/>
-          <a:lstStyle/>
-          <a:p>
-            <a:pPr algn="ctr"/>
-            <a:r>
-              <a:rPr lang="en-GB" dirty="0"/>
-              <a:t>Slash and Backslash</a:t>
-            </a:r>
-          </a:p>
-        </p:txBody>
-      </p:sp>
-      <p:sp>
-        <p:nvSpPr>
-          <p:cNvPr id="3" name="Content Placeholder 2">
-            <a:extLst>
-              <a:ext uri="{FF2B5EF4-FFF2-40B4-BE49-F238E27FC236}">
-                <a16:creationId xmlns:a16="http://schemas.microsoft.com/office/drawing/2014/main" id="{144233E6-8DF7-7DE7-7AD6-44903869EAF5}"/>
-              </a:ext>
-            </a:extLst>
-          </p:cNvPr>
-          <p:cNvSpPr>
-            <a:spLocks noGrp="1"/>
-          </p:cNvSpPr>
-          <p:nvPr>
-            <p:ph idx="1"/>
-          </p:nvPr>
-        </p:nvSpPr>
-        <p:spPr>
-          <a:xfrm>
-            <a:off x="1881054" y="1808534"/>
-            <a:ext cx="8573301" cy="4351338"/>
-          </a:xfrm>
-        </p:spPr>
-        <p:txBody>
-          <a:bodyPr>
-            <a:normAutofit fontScale="92500" lnSpcReduction="20000"/>
-          </a:bodyPr>
-          <a:lstStyle/>
-          <a:p>
-            <a:r>
-              <a:rPr lang="en-GB" sz="2400" dirty="0"/>
-              <a:t>Matrix multiplication is not commutative (generally AB ≠ BA) </a:t>
-            </a:r>
-          </a:p>
-          <a:p>
-            <a:endParaRPr lang="en-GB" sz="2400" dirty="0"/>
-          </a:p>
-          <a:p>
-            <a:r>
-              <a:rPr lang="en-GB" sz="2400" dirty="0"/>
-              <a:t>AX = B and XA = B represent different systems of equations for X</a:t>
-            </a:r>
-          </a:p>
-          <a:p>
-            <a:pPr marL="0" indent="0">
-              <a:buNone/>
-            </a:pPr>
-            <a:endParaRPr lang="en-GB" sz="2400" dirty="0"/>
-          </a:p>
-          <a:p>
-            <a:r>
-              <a:rPr lang="en-GB" sz="2400" dirty="0"/>
-              <a:t>MATLAB uses / and \ to distinguish between these:</a:t>
-            </a:r>
-          </a:p>
-          <a:p>
-            <a:endParaRPr lang="en-GB" sz="2400" dirty="0"/>
-          </a:p>
-          <a:p>
-            <a:pPr marL="457200" lvl="1" indent="0">
-              <a:buNone/>
-            </a:pPr>
-            <a:r>
-              <a:rPr lang="en-GB" dirty="0">
-                <a:latin typeface="Courier New" panose="02070309020205020404" pitchFamily="49" charset="0"/>
-                <a:cs typeface="Courier New" panose="02070309020205020404" pitchFamily="49" charset="0"/>
-              </a:rPr>
-              <a:t>&gt;&gt; X = B/A    </a:t>
-            </a:r>
-            <a:r>
-              <a:rPr lang="en-GB" dirty="0">
-                <a:cs typeface="Courier New" panose="02070309020205020404" pitchFamily="49" charset="0"/>
-              </a:rPr>
-              <a:t>represents “solve the system XA = B”, while</a:t>
-            </a:r>
-          </a:p>
-          <a:p>
-            <a:pPr marL="457200" lvl="1" indent="0">
-              <a:buNone/>
-            </a:pPr>
-            <a:endParaRPr lang="en-GB" dirty="0">
-              <a:cs typeface="Courier New" panose="02070309020205020404" pitchFamily="49" charset="0"/>
-            </a:endParaRPr>
-          </a:p>
-          <a:p>
-            <a:pPr marL="457200" lvl="1" indent="0">
-              <a:buNone/>
-            </a:pPr>
-            <a:r>
-              <a:rPr lang="en-GB" dirty="0">
-                <a:latin typeface="Courier New" panose="02070309020205020404" pitchFamily="49" charset="0"/>
-                <a:cs typeface="Courier New" panose="02070309020205020404" pitchFamily="49" charset="0"/>
-              </a:rPr>
-              <a:t>&gt;&gt; X = B\A    </a:t>
-            </a:r>
-            <a:r>
-              <a:rPr lang="en-GB" dirty="0">
-                <a:cs typeface="Courier New" panose="02070309020205020404" pitchFamily="49" charset="0"/>
-              </a:rPr>
-              <a:t>represents “solve the system AX = B”</a:t>
-            </a:r>
-            <a:endParaRPr lang="en-GB" dirty="0">
-              <a:latin typeface="Courier New" panose="02070309020205020404" pitchFamily="49" charset="0"/>
-              <a:cs typeface="Courier New" panose="02070309020205020404" pitchFamily="49" charset="0"/>
-            </a:endParaRPr>
-          </a:p>
-          <a:p>
-            <a:pPr marL="457200" lvl="1" indent="0">
-              <a:buNone/>
-            </a:pPr>
-            <a:endParaRPr lang="en-GB" sz="1600" dirty="0">
-              <a:latin typeface="Courier New" panose="02070309020205020404" pitchFamily="49" charset="0"/>
-              <a:cs typeface="Courier New" panose="02070309020205020404" pitchFamily="49" charset="0"/>
-            </a:endParaRPr>
-          </a:p>
-          <a:p>
-            <a:pPr marL="457200" lvl="1" indent="0">
-              <a:buNone/>
-            </a:pPr>
-            <a:endParaRPr lang="en-GB" sz="1600" dirty="0">
-              <a:latin typeface="Courier New" panose="02070309020205020404" pitchFamily="49" charset="0"/>
-              <a:cs typeface="Courier New" panose="02070309020205020404" pitchFamily="49" charset="0"/>
-            </a:endParaRPr>
-          </a:p>
-          <a:p>
-            <a:pPr marL="457200" lvl="1" indent="0">
-              <a:buNone/>
-            </a:pPr>
-            <a:endParaRPr lang="en-GB" sz="1600" dirty="0">
-              <a:cs typeface="Courier New" panose="02070309020205020404" pitchFamily="49" charset="0"/>
-            </a:endParaRPr>
-          </a:p>
-          <a:p>
-            <a:pPr marL="0" indent="0">
-              <a:buNone/>
-            </a:pPr>
-            <a:r>
-              <a:rPr lang="en-GB" dirty="0"/>
-              <a:t>  </a:t>
-            </a:r>
-          </a:p>
-        </p:txBody>
-      </p:sp>
-    </p:spTree>
-    <p:extLst>
-      <p:ext uri="{BB962C8B-B14F-4D97-AF65-F5344CB8AC3E}">
-        <p14:creationId xmlns:p14="http://schemas.microsoft.com/office/powerpoint/2010/main" val="2718025386"/>
-      </p:ext>
-    </p:extLst>
-  </p:cSld>
-  <p:clrMapOvr>
-    <a:masterClrMapping/>
-  </p:clrMapOvr>
-</p:sld>
-</file>
-
 <file path=ppt/slides/slide25.xml><?xml version="1.0" encoding="utf-8"?>
 <p:sld xmlns:a="http://schemas.openxmlformats.org/drawingml/2006/main" xmlns:r="http://schemas.openxmlformats.org/officeDocument/2006/relationships" xmlns:p="http://schemas.openxmlformats.org/presentationml/2006/main">
   <p:cSld>
@@ -20545,6 +21100,207 @@
       </p:grpSpPr>
       <p:sp>
         <p:nvSpPr>
+          <p:cNvPr id="2" name="Title 1">
+            <a:extLst>
+              <a:ext uri="{FF2B5EF4-FFF2-40B4-BE49-F238E27FC236}">
+                <a16:creationId xmlns:a16="http://schemas.microsoft.com/office/drawing/2014/main" id="{93D04027-176D-7C37-0665-3ED3C4B7E0FD}"/>
+              </a:ext>
+            </a:extLst>
+          </p:cNvPr>
+          <p:cNvSpPr>
+            <a:spLocks noGrp="1"/>
+          </p:cNvSpPr>
+          <p:nvPr>
+            <p:ph type="title"/>
+          </p:nvPr>
+        </p:nvSpPr>
+        <p:spPr/>
+        <p:txBody>
+          <a:bodyPr/>
+          <a:lstStyle/>
+          <a:p>
+            <a:pPr algn="ctr"/>
+            <a:r>
+              <a:rPr lang="en-GB" dirty="0"/>
+              <a:t>Slash and Backslash</a:t>
+            </a:r>
+          </a:p>
+        </p:txBody>
+      </p:sp>
+      <p:sp>
+        <p:nvSpPr>
+          <p:cNvPr id="3" name="Content Placeholder 2">
+            <a:extLst>
+              <a:ext uri="{FF2B5EF4-FFF2-40B4-BE49-F238E27FC236}">
+                <a16:creationId xmlns:a16="http://schemas.microsoft.com/office/drawing/2014/main" id="{144233E6-8DF7-7DE7-7AD6-44903869EAF5}"/>
+              </a:ext>
+            </a:extLst>
+          </p:cNvPr>
+          <p:cNvSpPr>
+            <a:spLocks noGrp="1"/>
+          </p:cNvSpPr>
+          <p:nvPr>
+            <p:ph idx="1"/>
+          </p:nvPr>
+        </p:nvSpPr>
+        <p:spPr>
+          <a:xfrm>
+            <a:off x="1881054" y="1808534"/>
+            <a:ext cx="8573301" cy="4351338"/>
+          </a:xfrm>
+        </p:spPr>
+        <p:txBody>
+          <a:bodyPr>
+            <a:normAutofit fontScale="92500" lnSpcReduction="20000"/>
+          </a:bodyPr>
+          <a:lstStyle/>
+          <a:p>
+            <a:r>
+              <a:rPr lang="en-GB" sz="2400" dirty="0"/>
+              <a:t>Matrix multiplication is not commutative (generally AB ≠ BA) </a:t>
+            </a:r>
+          </a:p>
+          <a:p>
+            <a:endParaRPr lang="en-GB" sz="2400" dirty="0"/>
+          </a:p>
+          <a:p>
+            <a:r>
+              <a:rPr lang="en-GB" sz="2400" dirty="0"/>
+              <a:t>AX = B and XA = B represent different systems of equations for X</a:t>
+            </a:r>
+          </a:p>
+          <a:p>
+            <a:pPr marL="0" indent="0">
+              <a:buNone/>
+            </a:pPr>
+            <a:endParaRPr lang="en-GB" sz="2400" dirty="0"/>
+          </a:p>
+          <a:p>
+            <a:r>
+              <a:rPr lang="en-GB" sz="2400" dirty="0"/>
+              <a:t>MATLAB uses / and \ to distinguish between these:</a:t>
+            </a:r>
+          </a:p>
+          <a:p>
+            <a:endParaRPr lang="en-GB" sz="2400" dirty="0"/>
+          </a:p>
+          <a:p>
+            <a:pPr marL="457200" lvl="1" indent="0">
+              <a:buNone/>
+            </a:pPr>
+            <a:r>
+              <a:rPr lang="en-GB" dirty="0">
+                <a:latin typeface="Courier New" panose="02070309020205020404" pitchFamily="49" charset="0"/>
+                <a:cs typeface="Courier New" panose="02070309020205020404" pitchFamily="49" charset="0"/>
+              </a:rPr>
+              <a:t>&gt;&gt; X = B/A    </a:t>
+            </a:r>
+            <a:r>
+              <a:rPr lang="en-GB" dirty="0">
+                <a:cs typeface="Courier New" panose="02070309020205020404" pitchFamily="49" charset="0"/>
+              </a:rPr>
+              <a:t>represents “solve the system XA = B”, while</a:t>
+            </a:r>
+          </a:p>
+          <a:p>
+            <a:pPr marL="457200" lvl="1" indent="0">
+              <a:buNone/>
+            </a:pPr>
+            <a:endParaRPr lang="en-GB" dirty="0">
+              <a:cs typeface="Courier New" panose="02070309020205020404" pitchFamily="49" charset="0"/>
+            </a:endParaRPr>
+          </a:p>
+          <a:p>
+            <a:pPr marL="457200" lvl="1" indent="0">
+              <a:buNone/>
+            </a:pPr>
+            <a:r>
+              <a:rPr lang="en-GB" dirty="0">
+                <a:latin typeface="Courier New" panose="02070309020205020404" pitchFamily="49" charset="0"/>
+                <a:cs typeface="Courier New" panose="02070309020205020404" pitchFamily="49" charset="0"/>
+              </a:rPr>
+              <a:t>&gt;&gt; X = B\A    </a:t>
+            </a:r>
+            <a:r>
+              <a:rPr lang="en-GB" dirty="0">
+                <a:cs typeface="Courier New" panose="02070309020205020404" pitchFamily="49" charset="0"/>
+              </a:rPr>
+              <a:t>represents “solve the system AX = B”</a:t>
+            </a:r>
+            <a:endParaRPr lang="en-GB" dirty="0">
+              <a:latin typeface="Courier New" panose="02070309020205020404" pitchFamily="49" charset="0"/>
+              <a:cs typeface="Courier New" panose="02070309020205020404" pitchFamily="49" charset="0"/>
+            </a:endParaRPr>
+          </a:p>
+          <a:p>
+            <a:pPr marL="457200" lvl="1" indent="0">
+              <a:buNone/>
+            </a:pPr>
+            <a:endParaRPr lang="en-GB" sz="1600" dirty="0">
+              <a:latin typeface="Courier New" panose="02070309020205020404" pitchFamily="49" charset="0"/>
+              <a:cs typeface="Courier New" panose="02070309020205020404" pitchFamily="49" charset="0"/>
+            </a:endParaRPr>
+          </a:p>
+          <a:p>
+            <a:pPr marL="457200" lvl="1" indent="0">
+              <a:buNone/>
+            </a:pPr>
+            <a:endParaRPr lang="en-GB" sz="1600" dirty="0">
+              <a:latin typeface="Courier New" panose="02070309020205020404" pitchFamily="49" charset="0"/>
+              <a:cs typeface="Courier New" panose="02070309020205020404" pitchFamily="49" charset="0"/>
+            </a:endParaRPr>
+          </a:p>
+          <a:p>
+            <a:pPr marL="457200" lvl="1" indent="0">
+              <a:buNone/>
+            </a:pPr>
+            <a:endParaRPr lang="en-GB" sz="1600" dirty="0">
+              <a:cs typeface="Courier New" panose="02070309020205020404" pitchFamily="49" charset="0"/>
+            </a:endParaRPr>
+          </a:p>
+          <a:p>
+            <a:pPr marL="0" indent="0">
+              <a:buNone/>
+            </a:pPr>
+            <a:r>
+              <a:rPr lang="en-GB" dirty="0"/>
+              <a:t>  </a:t>
+            </a:r>
+          </a:p>
+        </p:txBody>
+      </p:sp>
+    </p:spTree>
+    <p:extLst>
+      <p:ext uri="{BB962C8B-B14F-4D97-AF65-F5344CB8AC3E}">
+        <p14:creationId xmlns:p14="http://schemas.microsoft.com/office/powerpoint/2010/main" val="2718025386"/>
+      </p:ext>
+    </p:extLst>
+  </p:cSld>
+  <p:clrMapOvr>
+    <a:masterClrMapping/>
+  </p:clrMapOvr>
+</p:sld>
+</file>
+
+<file path=ppt/slides/slide26.xml><?xml version="1.0" encoding="utf-8"?>
+<p:sld xmlns:a="http://schemas.openxmlformats.org/drawingml/2006/main" xmlns:r="http://schemas.openxmlformats.org/officeDocument/2006/relationships" xmlns:p="http://schemas.openxmlformats.org/presentationml/2006/main">
+  <p:cSld>
+    <p:spTree>
+      <p:nvGrpSpPr>
+        <p:cNvPr id="1" name=""/>
+        <p:cNvGrpSpPr/>
+        <p:nvPr/>
+      </p:nvGrpSpPr>
+      <p:grpSpPr>
+        <a:xfrm>
+          <a:off x="0" y="0"/>
+          <a:ext cx="0" cy="0"/>
+          <a:chOff x="0" y="0"/>
+          <a:chExt cx="0" cy="0"/>
+        </a:xfrm>
+      </p:grpSpPr>
+      <p:sp>
+        <p:nvSpPr>
           <p:cNvPr id="2" name="Title 1"/>
           <p:cNvSpPr>
             <a:spLocks noGrp="1"/>
@@ -20596,7 +21352,7 @@
                 </a:solidFill>
               </a:rPr>
               <a:pPr/>
-              <a:t>25</a:t>
+              <a:t>26</a:t>
             </a:fld>
             <a:endParaRPr lang="en-GB">
               <a:solidFill>
@@ -21117,7 +21873,7 @@
 </p:sld>
 </file>
 
-<file path=ppt/slides/slide26.xml><?xml version="1.0" encoding="utf-8"?>
+<file path=ppt/slides/slide27.xml><?xml version="1.0" encoding="utf-8"?>
 <p:sld xmlns:a="http://schemas.openxmlformats.org/drawingml/2006/main" xmlns:r="http://schemas.openxmlformats.org/officeDocument/2006/relationships" xmlns:p="http://schemas.openxmlformats.org/presentationml/2006/main">
   <p:cSld>
     <p:spTree>
@@ -21158,7 +21914,7 @@
                 </a:solidFill>
               </a:rPr>
               <a:pPr/>
-              <a:t>26</a:t>
+              <a:t>27</a:t>
             </a:fld>
             <a:endParaRPr lang="en-GB">
               <a:solidFill>
@@ -21338,8 +22094,8 @@
           </a:p>
         </p:txBody>
       </p:sp>
-      <mc:AlternateContent xmlns:mc="http://schemas.openxmlformats.org/markup-compatibility/2006">
-        <mc:Choice xmlns:a14="http://schemas.microsoft.com/office/drawing/2010/main" Requires="a14">
+      <mc:AlternateContent xmlns:mc="http://schemas.openxmlformats.org/markup-compatibility/2006" xmlns:a14="http://schemas.microsoft.com/office/drawing/2010/main">
+        <mc:Choice Requires="a14">
           <p:sp>
             <p:nvSpPr>
               <p:cNvPr id="6" name="TextBox 5">
@@ -21805,7 +22561,7 @@
             </p:txBody>
           </p:sp>
         </mc:Choice>
-        <mc:Fallback>
+        <mc:Fallback xmlns="">
           <p:sp>
             <p:nvSpPr>
               <p:cNvPr id="6" name="TextBox 5">
@@ -21863,7 +22619,7 @@
 </p:sld>
 </file>
 
-<file path=ppt/slides/slide27.xml><?xml version="1.0" encoding="utf-8"?>
+<file path=ppt/slides/slide28.xml><?xml version="1.0" encoding="utf-8"?>
 <p:sld xmlns:a="http://schemas.openxmlformats.org/drawingml/2006/main" xmlns:r="http://schemas.openxmlformats.org/officeDocument/2006/relationships" xmlns:p="http://schemas.openxmlformats.org/presentationml/2006/main">
   <p:cSld>
     <p:spTree>
@@ -22483,7 +23239,7 @@
 </p:sld>
 </file>
 
-<file path=ppt/slides/slide28.xml><?xml version="1.0" encoding="utf-8"?>
+<file path=ppt/slides/slide29.xml><?xml version="1.0" encoding="utf-8"?>
 <p:sld xmlns:a="http://schemas.openxmlformats.org/drawingml/2006/main" xmlns:r="http://schemas.openxmlformats.org/officeDocument/2006/relationships" xmlns:p="http://schemas.openxmlformats.org/presentationml/2006/main">
   <p:cSld>
     <p:spTree>
@@ -22546,7 +23302,7 @@
           <a:p>
             <a:fld id="{83730267-60C2-4514-997F-6A8804439442}" type="slidenum">
               <a:rPr lang="en-GB" smtClean="0"/>
-              <a:t>28</a:t>
+              <a:t>29</a:t>
             </a:fld>
             <a:endParaRPr lang="en-GB"/>
           </a:p>
@@ -22977,149 +23733,6 @@
 </p:sld>
 </file>
 
-<file path=ppt/slides/slide29.xml><?xml version="1.0" encoding="utf-8"?>
-<p:sld xmlns:a="http://schemas.openxmlformats.org/drawingml/2006/main" xmlns:r="http://schemas.openxmlformats.org/officeDocument/2006/relationships" xmlns:p="http://schemas.openxmlformats.org/presentationml/2006/main">
-  <p:cSld>
-    <p:spTree>
-      <p:nvGrpSpPr>
-        <p:cNvPr id="1" name=""/>
-        <p:cNvGrpSpPr/>
-        <p:nvPr/>
-      </p:nvGrpSpPr>
-      <p:grpSpPr>
-        <a:xfrm>
-          <a:off x="0" y="0"/>
-          <a:ext cx="0" cy="0"/>
-          <a:chOff x="0" y="0"/>
-          <a:chExt cx="0" cy="0"/>
-        </a:xfrm>
-      </p:grpSpPr>
-      <p:sp>
-        <p:nvSpPr>
-          <p:cNvPr id="2" name="Title 1">
-            <a:extLst>
-              <a:ext uri="{FF2B5EF4-FFF2-40B4-BE49-F238E27FC236}">
-                <a16:creationId xmlns:a16="http://schemas.microsoft.com/office/drawing/2014/main" id="{6526419F-0E68-9C26-274E-F6801E82F293}"/>
-              </a:ext>
-            </a:extLst>
-          </p:cNvPr>
-          <p:cNvSpPr>
-            <a:spLocks noGrp="1"/>
-          </p:cNvSpPr>
-          <p:nvPr>
-            <p:ph type="title"/>
-          </p:nvPr>
-        </p:nvSpPr>
-        <p:spPr/>
-        <p:txBody>
-          <a:bodyPr/>
-          <a:lstStyle/>
-          <a:p>
-            <a:r>
-              <a:rPr lang="en-GB" dirty="0"/>
-              <a:t>Software Testing</a:t>
-            </a:r>
-          </a:p>
-        </p:txBody>
-      </p:sp>
-      <p:sp>
-        <p:nvSpPr>
-          <p:cNvPr id="3" name="Content Placeholder 2">
-            <a:extLst>
-              <a:ext uri="{FF2B5EF4-FFF2-40B4-BE49-F238E27FC236}">
-                <a16:creationId xmlns:a16="http://schemas.microsoft.com/office/drawing/2014/main" id="{4795FF2B-4679-C340-3F12-BED74CA25425}"/>
-              </a:ext>
-            </a:extLst>
-          </p:cNvPr>
-          <p:cNvSpPr>
-            <a:spLocks noGrp="1"/>
-          </p:cNvSpPr>
-          <p:nvPr>
-            <p:ph idx="1"/>
-          </p:nvPr>
-        </p:nvSpPr>
-        <p:spPr/>
-        <p:txBody>
-          <a:bodyPr/>
-          <a:lstStyle/>
-          <a:p>
-            <a:pPr marL="0" indent="0">
-              <a:buNone/>
-            </a:pPr>
-            <a:r>
-              <a:rPr lang="en-GB" dirty="0"/>
-              <a:t>Please take a look at this blog before the session tomorrow:</a:t>
-            </a:r>
-          </a:p>
-          <a:p>
-            <a:pPr marL="0" indent="0">
-              <a:buNone/>
-            </a:pPr>
-            <a:r>
-              <a:rPr lang="en-GB" dirty="0">
-                <a:hlinkClick r:id="rId2"/>
-              </a:rPr>
-              <a:t>A Brief Introduction to Software Testing</a:t>
-            </a:r>
-            <a:endParaRPr lang="en-GB" dirty="0"/>
-          </a:p>
-        </p:txBody>
-      </p:sp>
-      <p:sp>
-        <p:nvSpPr>
-          <p:cNvPr id="4" name="Slide Number Placeholder 3">
-            <a:extLst>
-              <a:ext uri="{FF2B5EF4-FFF2-40B4-BE49-F238E27FC236}">
-                <a16:creationId xmlns:a16="http://schemas.microsoft.com/office/drawing/2014/main" id="{AF86B5FF-55B2-D4F8-CA74-07D9F383239A}"/>
-              </a:ext>
-            </a:extLst>
-          </p:cNvPr>
-          <p:cNvSpPr>
-            <a:spLocks noGrp="1"/>
-          </p:cNvSpPr>
-          <p:nvPr>
-            <p:ph type="sldNum" sz="quarter" idx="12"/>
-          </p:nvPr>
-        </p:nvSpPr>
-        <p:spPr/>
-        <p:txBody>
-          <a:bodyPr/>
-          <a:lstStyle/>
-          <a:p>
-            <a:fld id="{83730267-60C2-4514-997F-6A8804439442}" type="slidenum">
-              <a:rPr lang="en-GB" smtClean="0">
-                <a:solidFill>
-                  <a:prstClr val="black">
-                    <a:tint val="75000"/>
-                  </a:prstClr>
-                </a:solidFill>
-              </a:rPr>
-              <a:pPr/>
-              <a:t>29</a:t>
-            </a:fld>
-            <a:endParaRPr lang="en-GB">
-              <a:solidFill>
-                <a:prstClr val="black">
-                  <a:tint val="75000"/>
-                </a:prstClr>
-              </a:solidFill>
-            </a:endParaRPr>
-          </a:p>
-        </p:txBody>
-      </p:sp>
-    </p:spTree>
-    <p:extLst>
-      <p:ext uri="{BB962C8B-B14F-4D97-AF65-F5344CB8AC3E}">
-        <p14:creationId xmlns:p14="http://schemas.microsoft.com/office/powerpoint/2010/main" val="2224768003"/>
-      </p:ext>
-    </p:extLst>
-  </p:cSld>
-  <p:clrMapOvr>
-    <a:masterClrMapping/>
-  </p:clrMapOvr>
-</p:sld>
-</file>
-
 <file path=ppt/slides/slide3.xml><?xml version="1.0" encoding="utf-8"?>
 <p:sld xmlns:a="http://schemas.openxmlformats.org/drawingml/2006/main" xmlns:r="http://schemas.openxmlformats.org/officeDocument/2006/relationships" xmlns:p="http://schemas.openxmlformats.org/presentationml/2006/main">
   <p:cSld>
@@ -23462,6 +24075,149 @@
           <p:cNvPr id="2" name="Title 1">
             <a:extLst>
               <a:ext uri="{FF2B5EF4-FFF2-40B4-BE49-F238E27FC236}">
+                <a16:creationId xmlns:a16="http://schemas.microsoft.com/office/drawing/2014/main" id="{6526419F-0E68-9C26-274E-F6801E82F293}"/>
+              </a:ext>
+            </a:extLst>
+          </p:cNvPr>
+          <p:cNvSpPr>
+            <a:spLocks noGrp="1"/>
+          </p:cNvSpPr>
+          <p:nvPr>
+            <p:ph type="title"/>
+          </p:nvPr>
+        </p:nvSpPr>
+        <p:spPr/>
+        <p:txBody>
+          <a:bodyPr/>
+          <a:lstStyle/>
+          <a:p>
+            <a:r>
+              <a:rPr lang="en-GB" dirty="0"/>
+              <a:t>Software Testing</a:t>
+            </a:r>
+          </a:p>
+        </p:txBody>
+      </p:sp>
+      <p:sp>
+        <p:nvSpPr>
+          <p:cNvPr id="3" name="Content Placeholder 2">
+            <a:extLst>
+              <a:ext uri="{FF2B5EF4-FFF2-40B4-BE49-F238E27FC236}">
+                <a16:creationId xmlns:a16="http://schemas.microsoft.com/office/drawing/2014/main" id="{4795FF2B-4679-C340-3F12-BED74CA25425}"/>
+              </a:ext>
+            </a:extLst>
+          </p:cNvPr>
+          <p:cNvSpPr>
+            <a:spLocks noGrp="1"/>
+          </p:cNvSpPr>
+          <p:nvPr>
+            <p:ph idx="1"/>
+          </p:nvPr>
+        </p:nvSpPr>
+        <p:spPr/>
+        <p:txBody>
+          <a:bodyPr/>
+          <a:lstStyle/>
+          <a:p>
+            <a:pPr marL="0" indent="0">
+              <a:buNone/>
+            </a:pPr>
+            <a:r>
+              <a:rPr lang="en-GB" dirty="0"/>
+              <a:t>Please take a look at this blog before the session tomorrow:</a:t>
+            </a:r>
+          </a:p>
+          <a:p>
+            <a:pPr marL="0" indent="0">
+              <a:buNone/>
+            </a:pPr>
+            <a:r>
+              <a:rPr lang="en-GB" dirty="0">
+                <a:hlinkClick r:id="rId2"/>
+              </a:rPr>
+              <a:t>A Brief Introduction to Software Testing</a:t>
+            </a:r>
+            <a:endParaRPr lang="en-GB" dirty="0"/>
+          </a:p>
+        </p:txBody>
+      </p:sp>
+      <p:sp>
+        <p:nvSpPr>
+          <p:cNvPr id="4" name="Slide Number Placeholder 3">
+            <a:extLst>
+              <a:ext uri="{FF2B5EF4-FFF2-40B4-BE49-F238E27FC236}">
+                <a16:creationId xmlns:a16="http://schemas.microsoft.com/office/drawing/2014/main" id="{AF86B5FF-55B2-D4F8-CA74-07D9F383239A}"/>
+              </a:ext>
+            </a:extLst>
+          </p:cNvPr>
+          <p:cNvSpPr>
+            <a:spLocks noGrp="1"/>
+          </p:cNvSpPr>
+          <p:nvPr>
+            <p:ph type="sldNum" sz="quarter" idx="12"/>
+          </p:nvPr>
+        </p:nvSpPr>
+        <p:spPr/>
+        <p:txBody>
+          <a:bodyPr/>
+          <a:lstStyle/>
+          <a:p>
+            <a:fld id="{83730267-60C2-4514-997F-6A8804439442}" type="slidenum">
+              <a:rPr lang="en-GB" smtClean="0">
+                <a:solidFill>
+                  <a:prstClr val="black">
+                    <a:tint val="75000"/>
+                  </a:prstClr>
+                </a:solidFill>
+              </a:rPr>
+              <a:pPr/>
+              <a:t>30</a:t>
+            </a:fld>
+            <a:endParaRPr lang="en-GB">
+              <a:solidFill>
+                <a:prstClr val="black">
+                  <a:tint val="75000"/>
+                </a:prstClr>
+              </a:solidFill>
+            </a:endParaRPr>
+          </a:p>
+        </p:txBody>
+      </p:sp>
+    </p:spTree>
+    <p:extLst>
+      <p:ext uri="{BB962C8B-B14F-4D97-AF65-F5344CB8AC3E}">
+        <p14:creationId xmlns:p14="http://schemas.microsoft.com/office/powerpoint/2010/main" val="2224768003"/>
+      </p:ext>
+    </p:extLst>
+  </p:cSld>
+  <p:clrMapOvr>
+    <a:masterClrMapping/>
+  </p:clrMapOvr>
+</p:sld>
+</file>
+
+<file path=ppt/slides/slide31.xml><?xml version="1.0" encoding="utf-8"?>
+<p:sld xmlns:a="http://schemas.openxmlformats.org/drawingml/2006/main" xmlns:r="http://schemas.openxmlformats.org/officeDocument/2006/relationships" xmlns:p="http://schemas.openxmlformats.org/presentationml/2006/main">
+  <p:cSld>
+    <p:spTree>
+      <p:nvGrpSpPr>
+        <p:cNvPr id="1" name=""/>
+        <p:cNvGrpSpPr/>
+        <p:nvPr/>
+      </p:nvGrpSpPr>
+      <p:grpSpPr>
+        <a:xfrm>
+          <a:off x="0" y="0"/>
+          <a:ext cx="0" cy="0"/>
+          <a:chOff x="0" y="0"/>
+          <a:chExt cx="0" cy="0"/>
+        </a:xfrm>
+      </p:grpSpPr>
+      <p:sp>
+        <p:nvSpPr>
+          <p:cNvPr id="2" name="Title 1">
+            <a:extLst>
+              <a:ext uri="{FF2B5EF4-FFF2-40B4-BE49-F238E27FC236}">
                 <a16:creationId xmlns:a16="http://schemas.microsoft.com/office/drawing/2014/main" id="{31633C75-3577-AFEF-F7BA-3EEBB07F1061}"/>
               </a:ext>
             </a:extLst>
@@ -23748,7 +24504,7 @@
                 </a:solidFill>
               </a:rPr>
               <a:pPr/>
-              <a:t>30</a:t>
+              <a:t>31</a:t>
             </a:fld>
             <a:endParaRPr lang="en-GB">
               <a:solidFill>
@@ -23847,7 +24603,7 @@
 </p:sld>
 </file>
 
-<file path=ppt/slides/slide31.xml><?xml version="1.0" encoding="utf-8"?>
+<file path=ppt/slides/slide32.xml><?xml version="1.0" encoding="utf-8"?>
 <p:sld xmlns:a="http://schemas.openxmlformats.org/drawingml/2006/main" xmlns:r="http://schemas.openxmlformats.org/officeDocument/2006/relationships" xmlns:p="http://schemas.openxmlformats.org/presentationml/2006/main">
   <p:cSld>
     <p:spTree>
@@ -23957,156 +24713,6 @@
                 </a:solidFill>
               </a:rPr>
               <a:pPr/>
-              <a:t>31</a:t>
-            </a:fld>
-            <a:endParaRPr lang="en-GB">
-              <a:solidFill>
-                <a:prstClr val="black">
-                  <a:tint val="75000"/>
-                </a:prstClr>
-              </a:solidFill>
-            </a:endParaRPr>
-          </a:p>
-        </p:txBody>
-      </p:sp>
-    </p:spTree>
-    <p:extLst>
-      <p:ext uri="{BB962C8B-B14F-4D97-AF65-F5344CB8AC3E}">
-        <p14:creationId xmlns:p14="http://schemas.microsoft.com/office/powerpoint/2010/main" val="2564862246"/>
-      </p:ext>
-    </p:extLst>
-  </p:cSld>
-  <p:clrMapOvr>
-    <a:masterClrMapping/>
-  </p:clrMapOvr>
-</p:sld>
-</file>
-
-<file path=ppt/slides/slide32.xml><?xml version="1.0" encoding="utf-8"?>
-<p:sld xmlns:a="http://schemas.openxmlformats.org/drawingml/2006/main" xmlns:r="http://schemas.openxmlformats.org/officeDocument/2006/relationships" xmlns:p="http://schemas.openxmlformats.org/presentationml/2006/main">
-  <p:cSld>
-    <p:spTree>
-      <p:nvGrpSpPr>
-        <p:cNvPr id="1" name=""/>
-        <p:cNvGrpSpPr/>
-        <p:nvPr/>
-      </p:nvGrpSpPr>
-      <p:grpSpPr>
-        <a:xfrm>
-          <a:off x="0" y="0"/>
-          <a:ext cx="0" cy="0"/>
-          <a:chOff x="0" y="0"/>
-          <a:chExt cx="0" cy="0"/>
-        </a:xfrm>
-      </p:grpSpPr>
-      <p:sp>
-        <p:nvSpPr>
-          <p:cNvPr id="2" name="Title 1"/>
-          <p:cNvSpPr>
-            <a:spLocks noGrp="1"/>
-          </p:cNvSpPr>
-          <p:nvPr>
-            <p:ph type="title"/>
-          </p:nvPr>
-        </p:nvSpPr>
-        <p:spPr/>
-        <p:txBody>
-          <a:bodyPr>
-            <a:normAutofit/>
-          </a:bodyPr>
-          <a:lstStyle/>
-          <a:p>
-            <a:r>
-              <a:rPr lang="en-GB" sz="3600" dirty="0"/>
-              <a:t>Debugging and Improving Performance</a:t>
-            </a:r>
-          </a:p>
-        </p:txBody>
-      </p:sp>
-      <p:sp>
-        <p:nvSpPr>
-          <p:cNvPr id="3" name="Content Placeholder 2"/>
-          <p:cNvSpPr>
-            <a:spLocks noGrp="1"/>
-          </p:cNvSpPr>
-          <p:nvPr>
-            <p:ph idx="1"/>
-          </p:nvPr>
-        </p:nvSpPr>
-        <p:spPr/>
-        <p:txBody>
-          <a:bodyPr>
-            <a:normAutofit/>
-          </a:bodyPr>
-          <a:lstStyle/>
-          <a:p>
-            <a:pPr marL="0" indent="0">
-              <a:buNone/>
-            </a:pPr>
-            <a:endParaRPr lang="en-GB" sz="2800" dirty="0"/>
-          </a:p>
-          <a:p>
-            <a:r>
-              <a:rPr lang="en-GB" sz="2800" dirty="0"/>
-              <a:t>Diagnosing problems</a:t>
-            </a:r>
-          </a:p>
-          <a:p>
-            <a:r>
-              <a:rPr lang="en-GB" sz="2800" dirty="0"/>
-              <a:t>Identifying common errors</a:t>
-            </a:r>
-          </a:p>
-          <a:p>
-            <a:r>
-              <a:rPr lang="en-GB" sz="2800" dirty="0"/>
-              <a:t>Evaluation of code performance</a:t>
-            </a:r>
-          </a:p>
-          <a:p>
-            <a:r>
-              <a:rPr lang="en-GB" sz="2800" dirty="0"/>
-              <a:t>Vectorisation techniques</a:t>
-            </a:r>
-          </a:p>
-          <a:p>
-            <a:r>
-              <a:rPr lang="en-GB" sz="2800" dirty="0"/>
-              <a:t>Managing memory effectively</a:t>
-            </a:r>
-          </a:p>
-          <a:p>
-            <a:endParaRPr lang="en-GB" sz="2800" dirty="0"/>
-          </a:p>
-          <a:p>
-            <a:endParaRPr lang="en-GB" sz="2800" dirty="0"/>
-          </a:p>
-        </p:txBody>
-      </p:sp>
-      <p:sp>
-        <p:nvSpPr>
-          <p:cNvPr id="4" name="Slide Number Placeholder 3"/>
-          <p:cNvSpPr>
-            <a:spLocks noGrp="1"/>
-          </p:cNvSpPr>
-          <p:nvPr>
-            <p:ph type="sldNum" sz="quarter" idx="12"/>
-          </p:nvPr>
-        </p:nvSpPr>
-        <p:spPr/>
-        <p:txBody>
-          <a:bodyPr/>
-          <a:lstStyle/>
-          <a:p>
-            <a:fld id="{83730267-60C2-4514-997F-6A8804439442}" type="slidenum">
-              <a:rPr lang="en-GB" smtClean="0">
-                <a:solidFill>
-                  <a:prstClr val="black">
-                    <a:tint val="75000"/>
-                  </a:prstClr>
-                </a:solidFill>
-              </a:rPr>
-              <a:pPr/>
               <a:t>32</a:t>
             </a:fld>
             <a:endParaRPr lang="en-GB">
@@ -24122,7 +24728,7 @@
     </p:spTree>
     <p:extLst>
       <p:ext uri="{BB962C8B-B14F-4D97-AF65-F5344CB8AC3E}">
-        <p14:creationId xmlns:p14="http://schemas.microsoft.com/office/powerpoint/2010/main" val="3630683270"/>
+        <p14:creationId xmlns:p14="http://schemas.microsoft.com/office/powerpoint/2010/main" val="2564862246"/>
       </p:ext>
     </p:extLst>
   </p:cSld>
@@ -24151,6 +24757,30 @@
       </p:grpSpPr>
       <p:sp>
         <p:nvSpPr>
+          <p:cNvPr id="2" name="Title 1"/>
+          <p:cNvSpPr>
+            <a:spLocks noGrp="1"/>
+          </p:cNvSpPr>
+          <p:nvPr>
+            <p:ph type="title"/>
+          </p:nvPr>
+        </p:nvSpPr>
+        <p:spPr/>
+        <p:txBody>
+          <a:bodyPr>
+            <a:normAutofit/>
+          </a:bodyPr>
+          <a:lstStyle/>
+          <a:p>
+            <a:r>
+              <a:rPr lang="en-GB" sz="3600" dirty="0"/>
+              <a:t>Debugging and Improving Performance</a:t>
+            </a:r>
+          </a:p>
+        </p:txBody>
+      </p:sp>
+      <p:sp>
+        <p:nvSpPr>
           <p:cNvPr id="3" name="Content Placeholder 2"/>
           <p:cNvSpPr>
             <a:spLocks noGrp="1"/>
@@ -24159,132 +24789,53 @@
             <p:ph idx="1"/>
           </p:nvPr>
         </p:nvSpPr>
-        <p:spPr>
-          <a:xfrm>
-            <a:off x="1981200" y="1200153"/>
-            <a:ext cx="8382000" cy="4525963"/>
-          </a:xfrm>
-        </p:spPr>
+        <p:spPr/>
         <p:txBody>
           <a:bodyPr>
-            <a:normAutofit fontScale="92500" lnSpcReduction="20000"/>
+            <a:normAutofit/>
           </a:bodyPr>
           <a:lstStyle/>
           <a:p>
             <a:pPr marL="0" indent="0">
               <a:buNone/>
             </a:pPr>
-            <a:r>
-              <a:rPr lang="en-GB" sz="2400" dirty="0"/>
-              <a:t>Efficient matrix and array operations rely on data being located together in a contiguous block of memory addresses</a:t>
-            </a:r>
-          </a:p>
-          <a:p>
-            <a:pPr marL="0" indent="0">
-              <a:buNone/>
-            </a:pPr>
-            <a:endParaRPr lang="en-GB" sz="2400" dirty="0"/>
-          </a:p>
-          <a:p>
-            <a:pPr marL="0" indent="0">
-              <a:buNone/>
-            </a:pPr>
-            <a:r>
-              <a:rPr lang="en-GB" sz="2400" dirty="0"/>
-              <a:t>Create a dummy version of a variable of appropriate size</a:t>
-            </a:r>
-          </a:p>
-          <a:p>
-            <a:pPr marL="0" indent="0">
-              <a:buNone/>
-            </a:pPr>
-            <a:r>
-              <a:rPr lang="en-GB" sz="2400" dirty="0">
-                <a:latin typeface="Courier New" panose="02070309020205020404" pitchFamily="49" charset="0"/>
-                <a:cs typeface="Courier New" panose="02070309020205020404" pitchFamily="49" charset="0"/>
-              </a:rPr>
-              <a:t>&gt;&gt; A = zeros(</a:t>
-            </a:r>
-            <a:r>
-              <a:rPr lang="en-GB" sz="2400" dirty="0" err="1">
-                <a:latin typeface="Courier New" panose="02070309020205020404" pitchFamily="49" charset="0"/>
-                <a:cs typeface="Courier New" panose="02070309020205020404" pitchFamily="49" charset="0"/>
-              </a:rPr>
-              <a:t>m,n</a:t>
-            </a:r>
-            <a:r>
-              <a:rPr lang="en-GB" sz="2400" dirty="0">
-                <a:latin typeface="Courier New" panose="02070309020205020404" pitchFamily="49" charset="0"/>
-                <a:cs typeface="Courier New" panose="02070309020205020404" pitchFamily="49" charset="0"/>
-              </a:rPr>
-              <a:t>)</a:t>
-            </a:r>
-          </a:p>
-          <a:p>
-            <a:pPr marL="0" indent="0">
-              <a:buNone/>
-            </a:pPr>
-            <a:r>
-              <a:rPr lang="en-GB" sz="2400" dirty="0">
-                <a:cs typeface="Courier New" panose="02070309020205020404" pitchFamily="49" charset="0"/>
-              </a:rPr>
-              <a:t>Subsequent operations then overwrite the zeros with the required values</a:t>
-            </a:r>
-          </a:p>
-          <a:p>
-            <a:pPr marL="0" indent="0">
-              <a:buNone/>
-            </a:pPr>
-            <a:endParaRPr lang="en-GB" sz="2400" dirty="0">
-              <a:cs typeface="Courier New" panose="02070309020205020404" pitchFamily="49" charset="0"/>
-            </a:endParaRPr>
-          </a:p>
-          <a:p>
-            <a:pPr marL="0" indent="0">
-              <a:buNone/>
-            </a:pPr>
-            <a:r>
-              <a:rPr lang="en-GB" sz="2400" dirty="0">
-                <a:cs typeface="Courier New" panose="02070309020205020404" pitchFamily="49" charset="0"/>
-              </a:rPr>
-              <a:t>Assigning the last element of an array first creates an array of the appropriate size</a:t>
-            </a:r>
-          </a:p>
-          <a:p>
-            <a:pPr marL="0" indent="0">
-              <a:buNone/>
-            </a:pPr>
-            <a:r>
-              <a:rPr lang="en-GB" sz="2400" dirty="0">
-                <a:latin typeface="Courier New" panose="02070309020205020404" pitchFamily="49" charset="0"/>
-                <a:cs typeface="Courier New" panose="02070309020205020404" pitchFamily="49" charset="0"/>
-              </a:rPr>
-              <a:t>&gt;&gt; x(8) = 3</a:t>
-            </a:r>
-          </a:p>
-          <a:p>
-            <a:pPr marL="0" indent="0">
-              <a:buNone/>
-            </a:pPr>
-            <a:r>
-              <a:rPr lang="en-GB" sz="2400" dirty="0">
-                <a:latin typeface="Courier New" panose="02070309020205020404" pitchFamily="49" charset="0"/>
-                <a:cs typeface="Courier New" panose="02070309020205020404" pitchFamily="49" charset="0"/>
-              </a:rPr>
-              <a:t>x =</a:t>
-            </a:r>
-          </a:p>
-          <a:p>
-            <a:pPr marL="0" indent="0">
-              <a:buNone/>
-            </a:pPr>
-            <a:r>
-              <a:rPr lang="en-GB" sz="2400" dirty="0">
-                <a:latin typeface="Courier New" panose="02070309020205020404" pitchFamily="49" charset="0"/>
-                <a:cs typeface="Courier New" panose="02070309020205020404" pitchFamily="49" charset="0"/>
-              </a:rPr>
-              <a:t>     0     0     0     0     0     0     0     3</a:t>
-            </a:r>
+            <a:endParaRPr lang="en-GB" sz="2800" dirty="0"/>
+          </a:p>
+          <a:p>
+            <a:r>
+              <a:rPr lang="en-GB" sz="2800" dirty="0"/>
+              <a:t>Diagnosing problems</a:t>
+            </a:r>
+          </a:p>
+          <a:p>
+            <a:r>
+              <a:rPr lang="en-GB" sz="2800" dirty="0"/>
+              <a:t>Identifying common errors</a:t>
+            </a:r>
+          </a:p>
+          <a:p>
+            <a:r>
+              <a:rPr lang="en-GB" sz="2800" dirty="0"/>
+              <a:t>Evaluation of code performance</a:t>
+            </a:r>
+          </a:p>
+          <a:p>
+            <a:r>
+              <a:rPr lang="en-GB" sz="2800" dirty="0"/>
+              <a:t>Vectorisation techniques</a:t>
+            </a:r>
+          </a:p>
+          <a:p>
+            <a:r>
+              <a:rPr lang="en-GB" sz="2800" dirty="0"/>
+              <a:t>Managing memory effectively</a:t>
+            </a:r>
+          </a:p>
+          <a:p>
+            <a:endParaRPr lang="en-GB" sz="2800" dirty="0"/>
+          </a:p>
+          <a:p>
+            <a:endParaRPr lang="en-GB" sz="2800" dirty="0"/>
           </a:p>
         </p:txBody>
       </p:sp>
@@ -24324,43 +24875,10 @@
           </a:p>
         </p:txBody>
       </p:sp>
-      <p:sp>
-        <p:nvSpPr>
-          <p:cNvPr id="5" name="Title 1"/>
-          <p:cNvSpPr>
-            <a:spLocks noGrp="1"/>
-          </p:cNvSpPr>
-          <p:nvPr>
-            <p:ph type="title"/>
-          </p:nvPr>
-        </p:nvSpPr>
-        <p:spPr>
-          <a:xfrm>
-            <a:off x="1981200" y="274639"/>
-            <a:ext cx="8229600" cy="744537"/>
-          </a:xfrm>
-        </p:spPr>
-        <p:txBody>
-          <a:bodyPr>
-            <a:normAutofit/>
-          </a:bodyPr>
-          <a:lstStyle/>
-          <a:p>
-            <a:r>
-              <a:rPr lang="en-GB" sz="3600" dirty="0" err="1"/>
-              <a:t>Preallocation</a:t>
-            </a:r>
-            <a:r>
-              <a:rPr lang="en-GB" sz="3600" dirty="0"/>
-              <a:t> of Memory</a:t>
-            </a:r>
-          </a:p>
-        </p:txBody>
-      </p:sp>
     </p:spTree>
     <p:extLst>
       <p:ext uri="{BB962C8B-B14F-4D97-AF65-F5344CB8AC3E}">
-        <p14:creationId xmlns:p14="http://schemas.microsoft.com/office/powerpoint/2010/main" val="1971529063"/>
+        <p14:creationId xmlns:p14="http://schemas.microsoft.com/office/powerpoint/2010/main" val="3630683270"/>
       </p:ext>
     </p:extLst>
   </p:cSld>
@@ -24389,6 +24907,244 @@
       </p:grpSpPr>
       <p:sp>
         <p:nvSpPr>
+          <p:cNvPr id="3" name="Content Placeholder 2"/>
+          <p:cNvSpPr>
+            <a:spLocks noGrp="1"/>
+          </p:cNvSpPr>
+          <p:nvPr>
+            <p:ph idx="1"/>
+          </p:nvPr>
+        </p:nvSpPr>
+        <p:spPr>
+          <a:xfrm>
+            <a:off x="1981200" y="1200153"/>
+            <a:ext cx="8382000" cy="4525963"/>
+          </a:xfrm>
+        </p:spPr>
+        <p:txBody>
+          <a:bodyPr>
+            <a:normAutofit fontScale="92500" lnSpcReduction="20000"/>
+          </a:bodyPr>
+          <a:lstStyle/>
+          <a:p>
+            <a:pPr marL="0" indent="0">
+              <a:buNone/>
+            </a:pPr>
+            <a:r>
+              <a:rPr lang="en-GB" sz="2400" dirty="0"/>
+              <a:t>Efficient matrix and array operations rely on data being located together in a contiguous block of memory addresses</a:t>
+            </a:r>
+          </a:p>
+          <a:p>
+            <a:pPr marL="0" indent="0">
+              <a:buNone/>
+            </a:pPr>
+            <a:endParaRPr lang="en-GB" sz="2400" dirty="0"/>
+          </a:p>
+          <a:p>
+            <a:pPr marL="0" indent="0">
+              <a:buNone/>
+            </a:pPr>
+            <a:r>
+              <a:rPr lang="en-GB" sz="2400" dirty="0"/>
+              <a:t>Create a dummy version of a variable of appropriate size</a:t>
+            </a:r>
+          </a:p>
+          <a:p>
+            <a:pPr marL="0" indent="0">
+              <a:buNone/>
+            </a:pPr>
+            <a:r>
+              <a:rPr lang="en-GB" sz="2400" dirty="0">
+                <a:latin typeface="Courier New" panose="02070309020205020404" pitchFamily="49" charset="0"/>
+                <a:cs typeface="Courier New" panose="02070309020205020404" pitchFamily="49" charset="0"/>
+              </a:rPr>
+              <a:t>&gt;&gt; A = zeros(</a:t>
+            </a:r>
+            <a:r>
+              <a:rPr lang="en-GB" sz="2400" dirty="0" err="1">
+                <a:latin typeface="Courier New" panose="02070309020205020404" pitchFamily="49" charset="0"/>
+                <a:cs typeface="Courier New" panose="02070309020205020404" pitchFamily="49" charset="0"/>
+              </a:rPr>
+              <a:t>m,n</a:t>
+            </a:r>
+            <a:r>
+              <a:rPr lang="en-GB" sz="2400" dirty="0">
+                <a:latin typeface="Courier New" panose="02070309020205020404" pitchFamily="49" charset="0"/>
+                <a:cs typeface="Courier New" panose="02070309020205020404" pitchFamily="49" charset="0"/>
+              </a:rPr>
+              <a:t>)</a:t>
+            </a:r>
+          </a:p>
+          <a:p>
+            <a:pPr marL="0" indent="0">
+              <a:buNone/>
+            </a:pPr>
+            <a:r>
+              <a:rPr lang="en-GB" sz="2400" dirty="0">
+                <a:cs typeface="Courier New" panose="02070309020205020404" pitchFamily="49" charset="0"/>
+              </a:rPr>
+              <a:t>Subsequent operations then overwrite the zeros with the required values</a:t>
+            </a:r>
+          </a:p>
+          <a:p>
+            <a:pPr marL="0" indent="0">
+              <a:buNone/>
+            </a:pPr>
+            <a:endParaRPr lang="en-GB" sz="2400" dirty="0">
+              <a:cs typeface="Courier New" panose="02070309020205020404" pitchFamily="49" charset="0"/>
+            </a:endParaRPr>
+          </a:p>
+          <a:p>
+            <a:pPr marL="0" indent="0">
+              <a:buNone/>
+            </a:pPr>
+            <a:r>
+              <a:rPr lang="en-GB" sz="2400" dirty="0">
+                <a:cs typeface="Courier New" panose="02070309020205020404" pitchFamily="49" charset="0"/>
+              </a:rPr>
+              <a:t>Assigning the last element of an array first creates an array of the appropriate size</a:t>
+            </a:r>
+          </a:p>
+          <a:p>
+            <a:pPr marL="0" indent="0">
+              <a:buNone/>
+            </a:pPr>
+            <a:r>
+              <a:rPr lang="en-GB" sz="2400" dirty="0">
+                <a:latin typeface="Courier New" panose="02070309020205020404" pitchFamily="49" charset="0"/>
+                <a:cs typeface="Courier New" panose="02070309020205020404" pitchFamily="49" charset="0"/>
+              </a:rPr>
+              <a:t>&gt;&gt; x(8) = 3</a:t>
+            </a:r>
+          </a:p>
+          <a:p>
+            <a:pPr marL="0" indent="0">
+              <a:buNone/>
+            </a:pPr>
+            <a:r>
+              <a:rPr lang="en-GB" sz="2400" dirty="0">
+                <a:latin typeface="Courier New" panose="02070309020205020404" pitchFamily="49" charset="0"/>
+                <a:cs typeface="Courier New" panose="02070309020205020404" pitchFamily="49" charset="0"/>
+              </a:rPr>
+              <a:t>x =</a:t>
+            </a:r>
+          </a:p>
+          <a:p>
+            <a:pPr marL="0" indent="0">
+              <a:buNone/>
+            </a:pPr>
+            <a:r>
+              <a:rPr lang="en-GB" sz="2400" dirty="0">
+                <a:latin typeface="Courier New" panose="02070309020205020404" pitchFamily="49" charset="0"/>
+                <a:cs typeface="Courier New" panose="02070309020205020404" pitchFamily="49" charset="0"/>
+              </a:rPr>
+              <a:t>     0     0     0     0     0     0     0     3</a:t>
+            </a:r>
+          </a:p>
+        </p:txBody>
+      </p:sp>
+      <p:sp>
+        <p:nvSpPr>
+          <p:cNvPr id="4" name="Slide Number Placeholder 3"/>
+          <p:cNvSpPr>
+            <a:spLocks noGrp="1"/>
+          </p:cNvSpPr>
+          <p:nvPr>
+            <p:ph type="sldNum" sz="quarter" idx="12"/>
+          </p:nvPr>
+        </p:nvSpPr>
+        <p:spPr/>
+        <p:txBody>
+          <a:bodyPr/>
+          <a:lstStyle/>
+          <a:p>
+            <a:fld id="{83730267-60C2-4514-997F-6A8804439442}" type="slidenum">
+              <a:rPr lang="en-GB" smtClean="0">
+                <a:solidFill>
+                  <a:prstClr val="black">
+                    <a:tint val="75000"/>
+                  </a:prstClr>
+                </a:solidFill>
+              </a:rPr>
+              <a:pPr/>
+              <a:t>34</a:t>
+            </a:fld>
+            <a:endParaRPr lang="en-GB">
+              <a:solidFill>
+                <a:prstClr val="black">
+                  <a:tint val="75000"/>
+                </a:prstClr>
+              </a:solidFill>
+            </a:endParaRPr>
+          </a:p>
+        </p:txBody>
+      </p:sp>
+      <p:sp>
+        <p:nvSpPr>
+          <p:cNvPr id="5" name="Title 1"/>
+          <p:cNvSpPr>
+            <a:spLocks noGrp="1"/>
+          </p:cNvSpPr>
+          <p:nvPr>
+            <p:ph type="title"/>
+          </p:nvPr>
+        </p:nvSpPr>
+        <p:spPr>
+          <a:xfrm>
+            <a:off x="1981200" y="274639"/>
+            <a:ext cx="8229600" cy="744537"/>
+          </a:xfrm>
+        </p:spPr>
+        <p:txBody>
+          <a:bodyPr>
+            <a:normAutofit/>
+          </a:bodyPr>
+          <a:lstStyle/>
+          <a:p>
+            <a:r>
+              <a:rPr lang="en-GB" sz="3600" dirty="0" err="1"/>
+              <a:t>Preallocation</a:t>
+            </a:r>
+            <a:r>
+              <a:rPr lang="en-GB" sz="3600" dirty="0"/>
+              <a:t> of Memory</a:t>
+            </a:r>
+          </a:p>
+        </p:txBody>
+      </p:sp>
+    </p:spTree>
+    <p:extLst>
+      <p:ext uri="{BB962C8B-B14F-4D97-AF65-F5344CB8AC3E}">
+        <p14:creationId xmlns:p14="http://schemas.microsoft.com/office/powerpoint/2010/main" val="1971529063"/>
+      </p:ext>
+    </p:extLst>
+  </p:cSld>
+  <p:clrMapOvr>
+    <a:masterClrMapping/>
+  </p:clrMapOvr>
+</p:sld>
+</file>
+
+<file path=ppt/slides/slide35.xml><?xml version="1.0" encoding="utf-8"?>
+<p:sld xmlns:a="http://schemas.openxmlformats.org/drawingml/2006/main" xmlns:r="http://schemas.openxmlformats.org/officeDocument/2006/relationships" xmlns:p="http://schemas.openxmlformats.org/presentationml/2006/main">
+  <p:cSld>
+    <p:spTree>
+      <p:nvGrpSpPr>
+        <p:cNvPr id="1" name=""/>
+        <p:cNvGrpSpPr/>
+        <p:nvPr/>
+      </p:nvGrpSpPr>
+      <p:grpSpPr>
+        <a:xfrm>
+          <a:off x="0" y="0"/>
+          <a:ext cx="0" cy="0"/>
+          <a:chOff x="0" y="0"/>
+          <a:chExt cx="0" cy="0"/>
+        </a:xfrm>
+      </p:grpSpPr>
+      <p:sp>
+        <p:nvSpPr>
           <p:cNvPr id="2" name="Slide Number Placeholder 1"/>
           <p:cNvSpPr>
             <a:spLocks noGrp="1"/>
@@ -24411,7 +25167,7 @@
                 </a:solidFill>
               </a:rPr>
               <a:pPr/>
-              <a:t>34</a:t>
+              <a:t>35</a:t>
             </a:fld>
             <a:endParaRPr lang="en-GB">
               <a:solidFill>
@@ -25583,7 +26339,7 @@
 </p:sld>
 </file>
 
-<file path=ppt/slides/slide35.xml><?xml version="1.0" encoding="utf-8"?>
+<file path=ppt/slides/slide36.xml><?xml version="1.0" encoding="utf-8"?>
 <p:sld xmlns:a="http://schemas.openxmlformats.org/drawingml/2006/main" xmlns:r="http://schemas.openxmlformats.org/officeDocument/2006/relationships" xmlns:p="http://schemas.openxmlformats.org/presentationml/2006/main">
   <p:cSld>
     <p:spTree>
@@ -25624,7 +26380,7 @@
                 </a:solidFill>
               </a:rPr>
               <a:pPr/>
-              <a:t>35</a:t>
+              <a:t>36</a:t>
             </a:fld>
             <a:endParaRPr lang="en-GB">
               <a:solidFill>
@@ -27067,7 +27823,7 @@
 </p:sld>
 </file>
 
-<file path=ppt/slides/slide36.xml><?xml version="1.0" encoding="utf-8"?>
+<file path=ppt/slides/slide37.xml><?xml version="1.0" encoding="utf-8"?>
 <p:sld xmlns:a="http://schemas.openxmlformats.org/drawingml/2006/main" xmlns:r="http://schemas.openxmlformats.org/officeDocument/2006/relationships" xmlns:p="http://schemas.openxmlformats.org/presentationml/2006/main">
   <p:cSld>
     <p:spTree>
@@ -27114,7 +27870,7 @@
                 </a:solidFill>
               </a:rPr>
               <a:pPr/>
-              <a:t>36</a:t>
+              <a:t>37</a:t>
             </a:fld>
             <a:endParaRPr lang="en-GB">
               <a:solidFill>
@@ -28920,36 +29676,6 @@
           </a:p>
         </p:txBody>
       </p:sp>
-      <p:pic>
-        <p:nvPicPr>
-          <p:cNvPr id="3" name="Picture 2"/>
-          <p:cNvPicPr>
-            <a:picLocks noChangeAspect="1"/>
-          </p:cNvPicPr>
-          <p:nvPr/>
-        </p:nvPicPr>
-        <p:blipFill>
-          <a:blip r:embed="rId2">
-            <a:extLst>
-              <a:ext uri="{28A0092B-C50C-407E-A947-70E740481C1C}">
-                <a14:useLocalDpi xmlns:a14="http://schemas.microsoft.com/office/drawing/2010/main" val="0"/>
-              </a:ext>
-            </a:extLst>
-          </a:blip>
-          <a:stretch>
-            <a:fillRect/>
-          </a:stretch>
-        </p:blipFill>
-        <p:spPr>
-          <a:xfrm>
-            <a:off x="2338857" y="1905191"/>
-            <a:ext cx="7514286" cy="3047619"/>
-          </a:xfrm>
-          <a:prstGeom prst="rect">
-            <a:avLst/>
-          </a:prstGeom>
-        </p:spPr>
-      </p:pic>
       <p:sp>
         <p:nvSpPr>
           <p:cNvPr id="4" name="Title 1"/>
@@ -28997,68 +29723,6 @@
       </p:sp>
       <p:sp>
         <p:nvSpPr>
-          <p:cNvPr id="5" name="TextBox 4"/>
-          <p:cNvSpPr txBox="1"/>
-          <p:nvPr/>
-        </p:nvSpPr>
-        <p:spPr>
-          <a:xfrm>
-            <a:off x="8972551" y="2324100"/>
-            <a:ext cx="1362075" cy="523220"/>
-          </a:xfrm>
-          <a:prstGeom prst="rect">
-            <a:avLst/>
-          </a:prstGeom>
-          <a:noFill/>
-        </p:spPr>
-        <p:txBody>
-          <a:bodyPr wrap="square" rtlCol="0">
-            <a:spAutoFit/>
-          </a:bodyPr>
-          <a:lstStyle/>
-          <a:p>
-            <a:r>
-              <a:rPr lang="en-GB" sz="2800" dirty="0"/>
-              <a:t>GitHub</a:t>
-            </a:r>
-          </a:p>
-        </p:txBody>
-      </p:sp>
-      <p:cxnSp>
-        <p:nvCxnSpPr>
-          <p:cNvPr id="7" name="Straight Arrow Connector 6"/>
-          <p:cNvCxnSpPr/>
-          <p:nvPr/>
-        </p:nvCxnSpPr>
-        <p:spPr>
-          <a:xfrm flipH="1">
-            <a:off x="9372601" y="2724151"/>
-            <a:ext cx="200024" cy="428625"/>
-          </a:xfrm>
-          <a:prstGeom prst="straightConnector1">
-            <a:avLst/>
-          </a:prstGeom>
-          <a:ln>
-            <a:tailEnd type="triangle"/>
-          </a:ln>
-        </p:spPr>
-        <p:style>
-          <a:lnRef idx="1">
-            <a:schemeClr val="accent1"/>
-          </a:lnRef>
-          <a:fillRef idx="0">
-            <a:schemeClr val="accent1"/>
-          </a:fillRef>
-          <a:effectRef idx="0">
-            <a:schemeClr val="accent1"/>
-          </a:effectRef>
-          <a:fontRef idx="minor">
-            <a:schemeClr val="tx1"/>
-          </a:fontRef>
-        </p:style>
-      </p:cxnSp>
-      <p:sp>
-        <p:nvSpPr>
           <p:cNvPr id="6" name="TextBox 5">
             <a:extLst>
               <a:ext uri="{FF2B5EF4-FFF2-40B4-BE49-F238E27FC236}">
@@ -29071,8 +29735,8 @@
         </p:nvSpPr>
         <p:spPr>
           <a:xfrm>
-            <a:off x="1981201" y="5527344"/>
-            <a:ext cx="7871943" cy="1323439"/>
+            <a:off x="1047819" y="5030810"/>
+            <a:ext cx="10252527" cy="1138773"/>
           </a:xfrm>
           <a:prstGeom prst="rect">
             <a:avLst/>
@@ -29086,42 +29750,64 @@
           <a:lstStyle/>
           <a:p>
             <a:r>
-              <a:rPr lang="en-GB" sz="2000" dirty="0"/>
-              <a:t>Use </a:t>
-            </a:r>
-            <a:r>
-              <a:rPr lang="en-GB" sz="2000"/>
-              <a:t>git in MATLAB: </a:t>
-            </a:r>
-            <a:r>
-              <a:rPr lang="en-GB" sz="2000">
-                <a:hlinkClick r:id="rId3"/>
+              <a:rPr lang="en-GB" sz="2400" dirty="0"/>
+              <a:t>Use git in MATLAB: </a:t>
+            </a:r>
+          </a:p>
+          <a:p>
+            <a:r>
+              <a:rPr lang="en-GB" sz="2400" dirty="0">
+                <a:hlinkClick r:id="rId2"/>
               </a:rPr>
               <a:t>https://uk.mathworks.com/help/matlab/matlab_prog/use-git-in-matlab.html</a:t>
             </a:r>
-            <a:endParaRPr lang="en-GB" sz="2000"/>
-          </a:p>
-          <a:p>
-            <a:endParaRPr lang="en-GB" sz="2000"/>
-          </a:p>
-        </p:txBody>
-      </p:sp>
-      <p:sp>
-        <p:nvSpPr>
-          <p:cNvPr id="8" name="TextBox 7">
+            <a:endParaRPr lang="en-GB" sz="2400" dirty="0"/>
+          </a:p>
+          <a:p>
+            <a:endParaRPr lang="en-GB" sz="2000" dirty="0"/>
+          </a:p>
+        </p:txBody>
+      </p:sp>
+      <p:pic>
+        <p:nvPicPr>
+          <p:cNvPr id="11" name="Picture 10">
             <a:extLst>
               <a:ext uri="{FF2B5EF4-FFF2-40B4-BE49-F238E27FC236}">
-                <a16:creationId xmlns:a16="http://schemas.microsoft.com/office/drawing/2014/main" id="{A65A539E-F7D3-3102-CD63-517A938B9E00}"/>
+                <a16:creationId xmlns:a16="http://schemas.microsoft.com/office/drawing/2014/main" id="{B7AF07EB-A8E5-3B3E-B9B9-3A7EBA2FEEB2}"/>
               </a:ext>
             </a:extLst>
           </p:cNvPr>
+          <p:cNvPicPr>
+            <a:picLocks noChangeAspect="1"/>
+          </p:cNvPicPr>
+          <p:nvPr/>
+        </p:nvPicPr>
+        <p:blipFill>
+          <a:blip r:embed="rId3"/>
+          <a:stretch>
+            <a:fillRect/>
+          </a:stretch>
+        </p:blipFill>
+        <p:spPr>
+          <a:xfrm>
+            <a:off x="1047819" y="2397612"/>
+            <a:ext cx="10096362" cy="2204224"/>
+          </a:xfrm>
+          <a:prstGeom prst="rect">
+            <a:avLst/>
+          </a:prstGeom>
+        </p:spPr>
+      </p:pic>
+      <p:sp>
+        <p:nvSpPr>
+          <p:cNvPr id="5" name="TextBox 4"/>
           <p:cNvSpPr txBox="1"/>
           <p:nvPr/>
         </p:nvSpPr>
         <p:spPr>
           <a:xfrm>
-            <a:off x="1674125" y="1623599"/>
-            <a:ext cx="2115403" cy="369332"/>
+            <a:off x="9682234" y="2136002"/>
+            <a:ext cx="2068488" cy="523220"/>
           </a:xfrm>
           <a:prstGeom prst="rect">
             <a:avLst/>
@@ -29135,35 +29821,27 @@
           <a:lstStyle/>
           <a:p>
             <a:r>
-              <a:rPr lang="en-GB" dirty="0"/>
-              <a:t>Or working folder</a:t>
+              <a:rPr lang="en-GB" sz="2800" dirty="0"/>
+              <a:t>e.g. GitHub</a:t>
             </a:r>
           </a:p>
         </p:txBody>
       </p:sp>
       <p:cxnSp>
         <p:nvCxnSpPr>
-          <p:cNvPr id="10" name="Straight Arrow Connector 9">
-            <a:extLst>
-              <a:ext uri="{FF2B5EF4-FFF2-40B4-BE49-F238E27FC236}">
-                <a16:creationId xmlns:a16="http://schemas.microsoft.com/office/drawing/2014/main" id="{C5E4E8BF-8050-637E-43D9-5EBC61C43A12}"/>
-              </a:ext>
-            </a:extLst>
-          </p:cNvPr>
-          <p:cNvCxnSpPr>
-            <a:cxnSpLocks/>
-          </p:cNvCxnSpPr>
+          <p:cNvPr id="7" name="Straight Arrow Connector 6"/>
+          <p:cNvCxnSpPr/>
           <p:nvPr/>
         </p:nvCxnSpPr>
         <p:spPr>
-          <a:xfrm>
-            <a:off x="2506639" y="1915268"/>
-            <a:ext cx="122830" cy="331169"/>
+          <a:xfrm flipH="1">
+            <a:off x="10082284" y="2536053"/>
+            <a:ext cx="200024" cy="428625"/>
           </a:xfrm>
           <a:prstGeom prst="straightConnector1">
             <a:avLst/>
           </a:prstGeom>
-          <a:ln w="28575">
+          <a:ln>
             <a:tailEnd type="triangle"/>
           </a:ln>
         </p:spPr>

</xml_diff>

<commit_message>
Updated Chapters 3 and 4. Reordered sections in Chapter 4
</commit_message>
<xml_diff>
--- a/InstructorMaterials/Best Practices for Software Development using MATLAB.pptx
+++ b/InstructorMaterials/Best Practices for Software Development using MATLAB.pptx
@@ -7,7 +7,7 @@
     <p:sldMasterId id="2147483711" r:id="rId3"/>
   </p:sldMasterIdLst>
   <p:notesMasterIdLst>
-    <p:notesMasterId r:id="rId41"/>
+    <p:notesMasterId r:id="rId42"/>
   </p:notesMasterIdLst>
   <p:sldIdLst>
     <p:sldId id="257" r:id="rId4"/>
@@ -40,13 +40,14 @@
     <p:sldId id="264" r:id="rId31"/>
     <p:sldId id="265" r:id="rId32"/>
     <p:sldId id="282" r:id="rId33"/>
-    <p:sldId id="284" r:id="rId34"/>
-    <p:sldId id="283" r:id="rId35"/>
-    <p:sldId id="266" r:id="rId36"/>
-    <p:sldId id="267" r:id="rId37"/>
-    <p:sldId id="268" r:id="rId38"/>
-    <p:sldId id="270" r:id="rId39"/>
-    <p:sldId id="415" r:id="rId40"/>
+    <p:sldId id="418" r:id="rId34"/>
+    <p:sldId id="284" r:id="rId35"/>
+    <p:sldId id="283" r:id="rId36"/>
+    <p:sldId id="266" r:id="rId37"/>
+    <p:sldId id="267" r:id="rId38"/>
+    <p:sldId id="268" r:id="rId39"/>
+    <p:sldId id="270" r:id="rId40"/>
+    <p:sldId id="415" r:id="rId41"/>
   </p:sldIdLst>
   <p:sldSz cx="12192000" cy="6858000"/>
   <p:notesSz cx="6858000" cy="9144000"/>
@@ -235,7 +236,7 @@
           <a:p>
             <a:fld id="{6C06565E-6C9B-4A06-A09A-D231B01EEF1C}" type="datetimeFigureOut">
               <a:rPr lang="en-GB" smtClean="0"/>
-              <a:t>23/05/2023</a:t>
+              <a:t>25/05/2023</a:t>
             </a:fld>
             <a:endParaRPr lang="en-GB"/>
           </a:p>
@@ -2419,7 +2420,7 @@
                 </a:solidFill>
               </a:rPr>
               <a:pPr/>
-              <a:t>23/05/2023</a:t>
+              <a:t>25/05/2023</a:t>
             </a:fld>
             <a:endParaRPr lang="en-GB">
               <a:solidFill>
@@ -2621,7 +2622,7 @@
                 </a:solidFill>
               </a:rPr>
               <a:pPr/>
-              <a:t>23/05/2023</a:t>
+              <a:t>25/05/2023</a:t>
             </a:fld>
             <a:endParaRPr lang="en-GB">
               <a:solidFill>
@@ -2833,7 +2834,7 @@
                 </a:solidFill>
               </a:rPr>
               <a:pPr/>
-              <a:t>23/05/2023</a:t>
+              <a:t>25/05/2023</a:t>
             </a:fld>
             <a:endParaRPr lang="en-GB">
               <a:solidFill>
@@ -4545,7 +4546,7 @@
                 </a:solidFill>
               </a:rPr>
               <a:pPr/>
-              <a:t>23/05/2023</a:t>
+              <a:t>25/05/2023</a:t>
             </a:fld>
             <a:endParaRPr lang="en-GB">
               <a:solidFill>
@@ -5327,7 +5328,7 @@
           <a:p>
             <a:fld id="{F4D14FF6-3E0D-407D-982E-9B686EE47223}" type="datetimeFigureOut">
               <a:rPr lang="en-GB" smtClean="0"/>
-              <a:t>23/05/2023</a:t>
+              <a:t>25/05/2023</a:t>
             </a:fld>
             <a:endParaRPr lang="en-GB"/>
           </a:p>
@@ -5497,7 +5498,7 @@
           <a:p>
             <a:fld id="{F4D14FF6-3E0D-407D-982E-9B686EE47223}" type="datetimeFigureOut">
               <a:rPr lang="en-GB" smtClean="0"/>
-              <a:t>23/05/2023</a:t>
+              <a:t>25/05/2023</a:t>
             </a:fld>
             <a:endParaRPr lang="en-GB"/>
           </a:p>
@@ -5743,7 +5744,7 @@
           <a:p>
             <a:fld id="{F4D14FF6-3E0D-407D-982E-9B686EE47223}" type="datetimeFigureOut">
               <a:rPr lang="en-GB" smtClean="0"/>
-              <a:t>23/05/2023</a:t>
+              <a:t>25/05/2023</a:t>
             </a:fld>
             <a:endParaRPr lang="en-GB"/>
           </a:p>
@@ -5975,7 +5976,7 @@
           <a:p>
             <a:fld id="{F4D14FF6-3E0D-407D-982E-9B686EE47223}" type="datetimeFigureOut">
               <a:rPr lang="en-GB" smtClean="0"/>
-              <a:t>23/05/2023</a:t>
+              <a:t>25/05/2023</a:t>
             </a:fld>
             <a:endParaRPr lang="en-GB"/>
           </a:p>
@@ -6342,7 +6343,7 @@
           <a:p>
             <a:fld id="{F4D14FF6-3E0D-407D-982E-9B686EE47223}" type="datetimeFigureOut">
               <a:rPr lang="en-GB" smtClean="0"/>
-              <a:t>23/05/2023</a:t>
+              <a:t>25/05/2023</a:t>
             </a:fld>
             <a:endParaRPr lang="en-GB"/>
           </a:p>
@@ -6460,7 +6461,7 @@
           <a:p>
             <a:fld id="{F4D14FF6-3E0D-407D-982E-9B686EE47223}" type="datetimeFigureOut">
               <a:rPr lang="en-GB" smtClean="0"/>
-              <a:t>23/05/2023</a:t>
+              <a:t>25/05/2023</a:t>
             </a:fld>
             <a:endParaRPr lang="en-GB"/>
           </a:p>
@@ -6555,7 +6556,7 @@
           <a:p>
             <a:fld id="{F4D14FF6-3E0D-407D-982E-9B686EE47223}" type="datetimeFigureOut">
               <a:rPr lang="en-GB" smtClean="0"/>
-              <a:t>23/05/2023</a:t>
+              <a:t>25/05/2023</a:t>
             </a:fld>
             <a:endParaRPr lang="en-GB"/>
           </a:p>
@@ -6808,7 +6809,7 @@
                 </a:solidFill>
               </a:rPr>
               <a:pPr/>
-              <a:t>23/05/2023</a:t>
+              <a:t>25/05/2023</a:t>
             </a:fld>
             <a:endParaRPr lang="en-GB">
               <a:solidFill>
@@ -7110,7 +7111,7 @@
           <a:p>
             <a:fld id="{F4D14FF6-3E0D-407D-982E-9B686EE47223}" type="datetimeFigureOut">
               <a:rPr lang="en-GB" smtClean="0"/>
-              <a:t>23/05/2023</a:t>
+              <a:t>25/05/2023</a:t>
             </a:fld>
             <a:endParaRPr lang="en-GB"/>
           </a:p>
@@ -7367,7 +7368,7 @@
           <a:p>
             <a:fld id="{F4D14FF6-3E0D-407D-982E-9B686EE47223}" type="datetimeFigureOut">
               <a:rPr lang="en-GB" smtClean="0"/>
-              <a:t>23/05/2023</a:t>
+              <a:t>25/05/2023</a:t>
             </a:fld>
             <a:endParaRPr lang="en-GB"/>
           </a:p>
@@ -7537,7 +7538,7 @@
           <a:p>
             <a:fld id="{F4D14FF6-3E0D-407D-982E-9B686EE47223}" type="datetimeFigureOut">
               <a:rPr lang="en-GB" smtClean="0"/>
-              <a:t>23/05/2023</a:t>
+              <a:t>25/05/2023</a:t>
             </a:fld>
             <a:endParaRPr lang="en-GB"/>
           </a:p>
@@ -7717,7 +7718,7 @@
           <a:p>
             <a:fld id="{F4D14FF6-3E0D-407D-982E-9B686EE47223}" type="datetimeFigureOut">
               <a:rPr lang="en-GB" smtClean="0"/>
-              <a:t>23/05/2023</a:t>
+              <a:t>25/05/2023</a:t>
             </a:fld>
             <a:endParaRPr lang="en-GB"/>
           </a:p>
@@ -8292,7 +8293,7 @@
                 </a:solidFill>
               </a:rPr>
               <a:pPr/>
-              <a:t>23/05/2023</a:t>
+              <a:t>25/05/2023</a:t>
             </a:fld>
             <a:endParaRPr lang="en-GB">
               <a:solidFill>
@@ -8746,7 +8747,7 @@
                 </a:solidFill>
               </a:rPr>
               <a:pPr/>
-              <a:t>23/05/2023</a:t>
+              <a:t>25/05/2023</a:t>
             </a:fld>
             <a:endParaRPr lang="en-GB">
               <a:solidFill>
@@ -8896,7 +8897,7 @@
                 </a:solidFill>
               </a:rPr>
               <a:pPr/>
-              <a:t>23/05/2023</a:t>
+              <a:t>25/05/2023</a:t>
             </a:fld>
             <a:endParaRPr lang="en-GB">
               <a:solidFill>
@@ -9023,7 +9024,7 @@
                 </a:solidFill>
               </a:rPr>
               <a:pPr/>
-              <a:t>23/05/2023</a:t>
+              <a:t>25/05/2023</a:t>
             </a:fld>
             <a:endParaRPr lang="en-GB">
               <a:solidFill>
@@ -9332,7 +9333,7 @@
                 </a:solidFill>
               </a:rPr>
               <a:pPr/>
-              <a:t>23/05/2023</a:t>
+              <a:t>25/05/2023</a:t>
             </a:fld>
             <a:endParaRPr lang="en-GB">
               <a:solidFill>
@@ -9617,7 +9618,7 @@
                 </a:solidFill>
               </a:rPr>
               <a:pPr/>
-              <a:t>23/05/2023</a:t>
+              <a:t>25/05/2023</a:t>
             </a:fld>
             <a:endParaRPr lang="en-GB">
               <a:solidFill>
@@ -9862,7 +9863,7 @@
                 </a:solidFill>
               </a:rPr>
               <a:pPr/>
-              <a:t>23/05/2023</a:t>
+              <a:t>25/05/2023</a:t>
             </a:fld>
             <a:endParaRPr lang="en-GB">
               <a:solidFill>
@@ -10859,7 +10860,7 @@
           <a:p>
             <a:fld id="{F4D14FF6-3E0D-407D-982E-9B686EE47223}" type="datetimeFigureOut">
               <a:rPr lang="en-GB" smtClean="0"/>
-              <a:t>23/05/2023</a:t>
+              <a:t>25/05/2023</a:t>
             </a:fld>
             <a:endParaRPr lang="en-GB"/>
           </a:p>
@@ -24218,6 +24219,203 @@
           <p:cNvPr id="2" name="Title 1">
             <a:extLst>
               <a:ext uri="{FF2B5EF4-FFF2-40B4-BE49-F238E27FC236}">
+                <a16:creationId xmlns:a16="http://schemas.microsoft.com/office/drawing/2014/main" id="{0205CA92-26BA-C99F-E8BA-840A9551647E}"/>
+              </a:ext>
+            </a:extLst>
+          </p:cNvPr>
+          <p:cNvSpPr>
+            <a:spLocks noGrp="1"/>
+          </p:cNvSpPr>
+          <p:nvPr>
+            <p:ph type="title"/>
+          </p:nvPr>
+        </p:nvSpPr>
+        <p:spPr/>
+        <p:txBody>
+          <a:bodyPr/>
+          <a:lstStyle/>
+          <a:p>
+            <a:r>
+              <a:rPr lang="en-GB" dirty="0"/>
+              <a:t>Software Testing</a:t>
+            </a:r>
+          </a:p>
+        </p:txBody>
+      </p:sp>
+      <p:sp>
+        <p:nvSpPr>
+          <p:cNvPr id="3" name="Slide Number Placeholder 2">
+            <a:extLst>
+              <a:ext uri="{FF2B5EF4-FFF2-40B4-BE49-F238E27FC236}">
+                <a16:creationId xmlns:a16="http://schemas.microsoft.com/office/drawing/2014/main" id="{B6F8BE1A-2466-3F24-2684-11CE2A09FB21}"/>
+              </a:ext>
+            </a:extLst>
+          </p:cNvPr>
+          <p:cNvSpPr>
+            <a:spLocks noGrp="1"/>
+          </p:cNvSpPr>
+          <p:nvPr>
+            <p:ph type="sldNum" sz="quarter" idx="12"/>
+          </p:nvPr>
+        </p:nvSpPr>
+        <p:spPr/>
+        <p:txBody>
+          <a:bodyPr/>
+          <a:lstStyle/>
+          <a:p>
+            <a:fld id="{83730267-60C2-4514-997F-6A8804439442}" type="slidenum">
+              <a:rPr lang="en-GB" smtClean="0">
+                <a:solidFill>
+                  <a:prstClr val="black">
+                    <a:tint val="75000"/>
+                  </a:prstClr>
+                </a:solidFill>
+              </a:rPr>
+              <a:pPr/>
+              <a:t>31</a:t>
+            </a:fld>
+            <a:endParaRPr lang="en-GB">
+              <a:solidFill>
+                <a:prstClr val="black">
+                  <a:tint val="75000"/>
+                </a:prstClr>
+              </a:solidFill>
+            </a:endParaRPr>
+          </a:p>
+        </p:txBody>
+      </p:sp>
+      <p:pic>
+        <p:nvPicPr>
+          <p:cNvPr id="6" name="Picture 5" descr="A qr code with black squares&#10;&#10;Description automatically generated with low confidence">
+            <a:extLst>
+              <a:ext uri="{FF2B5EF4-FFF2-40B4-BE49-F238E27FC236}">
+                <a16:creationId xmlns:a16="http://schemas.microsoft.com/office/drawing/2014/main" id="{3A8A9B7C-999C-A7A8-4CB2-B3C7D2DD3139}"/>
+              </a:ext>
+            </a:extLst>
+          </p:cNvPr>
+          <p:cNvPicPr>
+            <a:picLocks noChangeAspect="1"/>
+          </p:cNvPicPr>
+          <p:nvPr/>
+        </p:nvPicPr>
+        <p:blipFill>
+          <a:blip r:embed="rId2" cstate="print">
+            <a:extLst>
+              <a:ext uri="{28A0092B-C50C-407E-A947-70E740481C1C}">
+                <a14:useLocalDpi xmlns:a14="http://schemas.microsoft.com/office/drawing/2010/main" val="0"/>
+              </a:ext>
+            </a:extLst>
+          </a:blip>
+          <a:stretch>
+            <a:fillRect/>
+          </a:stretch>
+        </p:blipFill>
+        <p:spPr>
+          <a:xfrm>
+            <a:off x="6549452" y="1768839"/>
+            <a:ext cx="3971499" cy="3971499"/>
+          </a:xfrm>
+          <a:prstGeom prst="rect">
+            <a:avLst/>
+          </a:prstGeom>
+        </p:spPr>
+      </p:pic>
+      <p:sp>
+        <p:nvSpPr>
+          <p:cNvPr id="7" name="TextBox 6">
+            <a:extLst>
+              <a:ext uri="{FF2B5EF4-FFF2-40B4-BE49-F238E27FC236}">
+                <a16:creationId xmlns:a16="http://schemas.microsoft.com/office/drawing/2014/main" id="{06D11BCB-D72E-F6D9-DAB5-FF70E2770653}"/>
+              </a:ext>
+            </a:extLst>
+          </p:cNvPr>
+          <p:cNvSpPr txBox="1"/>
+          <p:nvPr/>
+        </p:nvSpPr>
+        <p:spPr>
+          <a:xfrm>
+            <a:off x="609600" y="1768839"/>
+            <a:ext cx="5777552" cy="3416320"/>
+          </a:xfrm>
+          <a:prstGeom prst="rect">
+            <a:avLst/>
+          </a:prstGeom>
+          <a:noFill/>
+        </p:spPr>
+        <p:txBody>
+          <a:bodyPr wrap="square" rtlCol="0">
+            <a:spAutoFit/>
+          </a:bodyPr>
+          <a:lstStyle/>
+          <a:p>
+            <a:r>
+              <a:rPr lang="en-GB" sz="3600" dirty="0"/>
+              <a:t>How do you test your code?</a:t>
+            </a:r>
+          </a:p>
+          <a:p>
+            <a:endParaRPr lang="en-GB" sz="3600" dirty="0"/>
+          </a:p>
+          <a:p>
+            <a:r>
+              <a:rPr lang="en-GB" sz="3600" dirty="0"/>
+              <a:t>How do you know it gives the right answers?</a:t>
+            </a:r>
+          </a:p>
+          <a:p>
+            <a:endParaRPr lang="en-GB" sz="3600" dirty="0"/>
+          </a:p>
+          <a:p>
+            <a:r>
+              <a:rPr lang="en-GB" sz="3600" dirty="0"/>
+              <a:t>Add your ideas to the </a:t>
+            </a:r>
+            <a:r>
+              <a:rPr lang="en-GB" sz="3600" dirty="0" err="1"/>
+              <a:t>padlet</a:t>
+            </a:r>
+            <a:r>
+              <a:rPr lang="en-GB" sz="3600" dirty="0"/>
+              <a:t>:</a:t>
+            </a:r>
+          </a:p>
+        </p:txBody>
+      </p:sp>
+    </p:spTree>
+    <p:extLst>
+      <p:ext uri="{BB962C8B-B14F-4D97-AF65-F5344CB8AC3E}">
+        <p14:creationId xmlns:p14="http://schemas.microsoft.com/office/powerpoint/2010/main" val="441908946"/>
+      </p:ext>
+    </p:extLst>
+  </p:cSld>
+  <p:clrMapOvr>
+    <a:masterClrMapping/>
+  </p:clrMapOvr>
+</p:sld>
+</file>
+
+<file path=ppt/slides/slide32.xml><?xml version="1.0" encoding="utf-8"?>
+<p:sld xmlns:a="http://schemas.openxmlformats.org/drawingml/2006/main" xmlns:r="http://schemas.openxmlformats.org/officeDocument/2006/relationships" xmlns:p="http://schemas.openxmlformats.org/presentationml/2006/main">
+  <p:cSld>
+    <p:spTree>
+      <p:nvGrpSpPr>
+        <p:cNvPr id="1" name=""/>
+        <p:cNvGrpSpPr/>
+        <p:nvPr/>
+      </p:nvGrpSpPr>
+      <p:grpSpPr>
+        <a:xfrm>
+          <a:off x="0" y="0"/>
+          <a:ext cx="0" cy="0"/>
+          <a:chOff x="0" y="0"/>
+          <a:chExt cx="0" cy="0"/>
+        </a:xfrm>
+      </p:grpSpPr>
+      <p:sp>
+        <p:nvSpPr>
+          <p:cNvPr id="2" name="Title 1">
+            <a:extLst>
+              <a:ext uri="{FF2B5EF4-FFF2-40B4-BE49-F238E27FC236}">
                 <a16:creationId xmlns:a16="http://schemas.microsoft.com/office/drawing/2014/main" id="{31633C75-3577-AFEF-F7BA-3EEBB07F1061}"/>
               </a:ext>
             </a:extLst>
@@ -24504,7 +24702,7 @@
                 </a:solidFill>
               </a:rPr>
               <a:pPr/>
-              <a:t>31</a:t>
+              <a:t>32</a:t>
             </a:fld>
             <a:endParaRPr lang="en-GB">
               <a:solidFill>
@@ -24603,7 +24801,7 @@
 </p:sld>
 </file>
 
-<file path=ppt/slides/slide32.xml><?xml version="1.0" encoding="utf-8"?>
+<file path=ppt/slides/slide33.xml><?xml version="1.0" encoding="utf-8"?>
 <p:sld xmlns:a="http://schemas.openxmlformats.org/drawingml/2006/main" xmlns:r="http://schemas.openxmlformats.org/officeDocument/2006/relationships" xmlns:p="http://schemas.openxmlformats.org/presentationml/2006/main">
   <p:cSld>
     <p:spTree>
@@ -24713,156 +24911,6 @@
                 </a:solidFill>
               </a:rPr>
               <a:pPr/>
-              <a:t>32</a:t>
-            </a:fld>
-            <a:endParaRPr lang="en-GB">
-              <a:solidFill>
-                <a:prstClr val="black">
-                  <a:tint val="75000"/>
-                </a:prstClr>
-              </a:solidFill>
-            </a:endParaRPr>
-          </a:p>
-        </p:txBody>
-      </p:sp>
-    </p:spTree>
-    <p:extLst>
-      <p:ext uri="{BB962C8B-B14F-4D97-AF65-F5344CB8AC3E}">
-        <p14:creationId xmlns:p14="http://schemas.microsoft.com/office/powerpoint/2010/main" val="2564862246"/>
-      </p:ext>
-    </p:extLst>
-  </p:cSld>
-  <p:clrMapOvr>
-    <a:masterClrMapping/>
-  </p:clrMapOvr>
-</p:sld>
-</file>
-
-<file path=ppt/slides/slide33.xml><?xml version="1.0" encoding="utf-8"?>
-<p:sld xmlns:a="http://schemas.openxmlformats.org/drawingml/2006/main" xmlns:r="http://schemas.openxmlformats.org/officeDocument/2006/relationships" xmlns:p="http://schemas.openxmlformats.org/presentationml/2006/main">
-  <p:cSld>
-    <p:spTree>
-      <p:nvGrpSpPr>
-        <p:cNvPr id="1" name=""/>
-        <p:cNvGrpSpPr/>
-        <p:nvPr/>
-      </p:nvGrpSpPr>
-      <p:grpSpPr>
-        <a:xfrm>
-          <a:off x="0" y="0"/>
-          <a:ext cx="0" cy="0"/>
-          <a:chOff x="0" y="0"/>
-          <a:chExt cx="0" cy="0"/>
-        </a:xfrm>
-      </p:grpSpPr>
-      <p:sp>
-        <p:nvSpPr>
-          <p:cNvPr id="2" name="Title 1"/>
-          <p:cNvSpPr>
-            <a:spLocks noGrp="1"/>
-          </p:cNvSpPr>
-          <p:nvPr>
-            <p:ph type="title"/>
-          </p:nvPr>
-        </p:nvSpPr>
-        <p:spPr/>
-        <p:txBody>
-          <a:bodyPr>
-            <a:normAutofit/>
-          </a:bodyPr>
-          <a:lstStyle/>
-          <a:p>
-            <a:r>
-              <a:rPr lang="en-GB" sz="3600" dirty="0"/>
-              <a:t>Debugging and Improving Performance</a:t>
-            </a:r>
-          </a:p>
-        </p:txBody>
-      </p:sp>
-      <p:sp>
-        <p:nvSpPr>
-          <p:cNvPr id="3" name="Content Placeholder 2"/>
-          <p:cNvSpPr>
-            <a:spLocks noGrp="1"/>
-          </p:cNvSpPr>
-          <p:nvPr>
-            <p:ph idx="1"/>
-          </p:nvPr>
-        </p:nvSpPr>
-        <p:spPr/>
-        <p:txBody>
-          <a:bodyPr>
-            <a:normAutofit/>
-          </a:bodyPr>
-          <a:lstStyle/>
-          <a:p>
-            <a:pPr marL="0" indent="0">
-              <a:buNone/>
-            </a:pPr>
-            <a:endParaRPr lang="en-GB" sz="2800" dirty="0"/>
-          </a:p>
-          <a:p>
-            <a:r>
-              <a:rPr lang="en-GB" sz="2800" dirty="0"/>
-              <a:t>Diagnosing problems</a:t>
-            </a:r>
-          </a:p>
-          <a:p>
-            <a:r>
-              <a:rPr lang="en-GB" sz="2800" dirty="0"/>
-              <a:t>Identifying common errors</a:t>
-            </a:r>
-          </a:p>
-          <a:p>
-            <a:r>
-              <a:rPr lang="en-GB" sz="2800" dirty="0"/>
-              <a:t>Evaluation of code performance</a:t>
-            </a:r>
-          </a:p>
-          <a:p>
-            <a:r>
-              <a:rPr lang="en-GB" sz="2800" dirty="0"/>
-              <a:t>Vectorisation techniques</a:t>
-            </a:r>
-          </a:p>
-          <a:p>
-            <a:r>
-              <a:rPr lang="en-GB" sz="2800" dirty="0"/>
-              <a:t>Managing memory effectively</a:t>
-            </a:r>
-          </a:p>
-          <a:p>
-            <a:endParaRPr lang="en-GB" sz="2800" dirty="0"/>
-          </a:p>
-          <a:p>
-            <a:endParaRPr lang="en-GB" sz="2800" dirty="0"/>
-          </a:p>
-        </p:txBody>
-      </p:sp>
-      <p:sp>
-        <p:nvSpPr>
-          <p:cNvPr id="4" name="Slide Number Placeholder 3"/>
-          <p:cNvSpPr>
-            <a:spLocks noGrp="1"/>
-          </p:cNvSpPr>
-          <p:nvPr>
-            <p:ph type="sldNum" sz="quarter" idx="12"/>
-          </p:nvPr>
-        </p:nvSpPr>
-        <p:spPr/>
-        <p:txBody>
-          <a:bodyPr/>
-          <a:lstStyle/>
-          <a:p>
-            <a:fld id="{83730267-60C2-4514-997F-6A8804439442}" type="slidenum">
-              <a:rPr lang="en-GB" smtClean="0">
-                <a:solidFill>
-                  <a:prstClr val="black">
-                    <a:tint val="75000"/>
-                  </a:prstClr>
-                </a:solidFill>
-              </a:rPr>
-              <a:pPr/>
               <a:t>33</a:t>
             </a:fld>
             <a:endParaRPr lang="en-GB">
@@ -24878,7 +24926,7 @@
     </p:spTree>
     <p:extLst>
       <p:ext uri="{BB962C8B-B14F-4D97-AF65-F5344CB8AC3E}">
-        <p14:creationId xmlns:p14="http://schemas.microsoft.com/office/powerpoint/2010/main" val="3630683270"/>
+        <p14:creationId xmlns:p14="http://schemas.microsoft.com/office/powerpoint/2010/main" val="2564862246"/>
       </p:ext>
     </p:extLst>
   </p:cSld>
@@ -24907,6 +24955,30 @@
       </p:grpSpPr>
       <p:sp>
         <p:nvSpPr>
+          <p:cNvPr id="2" name="Title 1"/>
+          <p:cNvSpPr>
+            <a:spLocks noGrp="1"/>
+          </p:cNvSpPr>
+          <p:nvPr>
+            <p:ph type="title"/>
+          </p:nvPr>
+        </p:nvSpPr>
+        <p:spPr/>
+        <p:txBody>
+          <a:bodyPr>
+            <a:normAutofit/>
+          </a:bodyPr>
+          <a:lstStyle/>
+          <a:p>
+            <a:r>
+              <a:rPr lang="en-GB" sz="3600" dirty="0"/>
+              <a:t>Debugging and Improving Performance</a:t>
+            </a:r>
+          </a:p>
+        </p:txBody>
+      </p:sp>
+      <p:sp>
+        <p:nvSpPr>
           <p:cNvPr id="3" name="Content Placeholder 2"/>
           <p:cNvSpPr>
             <a:spLocks noGrp="1"/>
@@ -24915,132 +24987,53 @@
             <p:ph idx="1"/>
           </p:nvPr>
         </p:nvSpPr>
-        <p:spPr>
-          <a:xfrm>
-            <a:off x="1981200" y="1200153"/>
-            <a:ext cx="8382000" cy="4525963"/>
-          </a:xfrm>
-        </p:spPr>
+        <p:spPr/>
         <p:txBody>
           <a:bodyPr>
-            <a:normAutofit fontScale="92500" lnSpcReduction="20000"/>
+            <a:normAutofit/>
           </a:bodyPr>
           <a:lstStyle/>
           <a:p>
             <a:pPr marL="0" indent="0">
               <a:buNone/>
             </a:pPr>
-            <a:r>
-              <a:rPr lang="en-GB" sz="2400" dirty="0"/>
-              <a:t>Efficient matrix and array operations rely on data being located together in a contiguous block of memory addresses</a:t>
-            </a:r>
-          </a:p>
-          <a:p>
-            <a:pPr marL="0" indent="0">
-              <a:buNone/>
-            </a:pPr>
-            <a:endParaRPr lang="en-GB" sz="2400" dirty="0"/>
-          </a:p>
-          <a:p>
-            <a:pPr marL="0" indent="0">
-              <a:buNone/>
-            </a:pPr>
-            <a:r>
-              <a:rPr lang="en-GB" sz="2400" dirty="0"/>
-              <a:t>Create a dummy version of a variable of appropriate size</a:t>
-            </a:r>
-          </a:p>
-          <a:p>
-            <a:pPr marL="0" indent="0">
-              <a:buNone/>
-            </a:pPr>
-            <a:r>
-              <a:rPr lang="en-GB" sz="2400" dirty="0">
-                <a:latin typeface="Courier New" panose="02070309020205020404" pitchFamily="49" charset="0"/>
-                <a:cs typeface="Courier New" panose="02070309020205020404" pitchFamily="49" charset="0"/>
-              </a:rPr>
-              <a:t>&gt;&gt; A = zeros(</a:t>
-            </a:r>
-            <a:r>
-              <a:rPr lang="en-GB" sz="2400" dirty="0" err="1">
-                <a:latin typeface="Courier New" panose="02070309020205020404" pitchFamily="49" charset="0"/>
-                <a:cs typeface="Courier New" panose="02070309020205020404" pitchFamily="49" charset="0"/>
-              </a:rPr>
-              <a:t>m,n</a:t>
-            </a:r>
-            <a:r>
-              <a:rPr lang="en-GB" sz="2400" dirty="0">
-                <a:latin typeface="Courier New" panose="02070309020205020404" pitchFamily="49" charset="0"/>
-                <a:cs typeface="Courier New" panose="02070309020205020404" pitchFamily="49" charset="0"/>
-              </a:rPr>
-              <a:t>)</a:t>
-            </a:r>
-          </a:p>
-          <a:p>
-            <a:pPr marL="0" indent="0">
-              <a:buNone/>
-            </a:pPr>
-            <a:r>
-              <a:rPr lang="en-GB" sz="2400" dirty="0">
-                <a:cs typeface="Courier New" panose="02070309020205020404" pitchFamily="49" charset="0"/>
-              </a:rPr>
-              <a:t>Subsequent operations then overwrite the zeros with the required values</a:t>
-            </a:r>
-          </a:p>
-          <a:p>
-            <a:pPr marL="0" indent="0">
-              <a:buNone/>
-            </a:pPr>
-            <a:endParaRPr lang="en-GB" sz="2400" dirty="0">
-              <a:cs typeface="Courier New" panose="02070309020205020404" pitchFamily="49" charset="0"/>
-            </a:endParaRPr>
-          </a:p>
-          <a:p>
-            <a:pPr marL="0" indent="0">
-              <a:buNone/>
-            </a:pPr>
-            <a:r>
-              <a:rPr lang="en-GB" sz="2400" dirty="0">
-                <a:cs typeface="Courier New" panose="02070309020205020404" pitchFamily="49" charset="0"/>
-              </a:rPr>
-              <a:t>Assigning the last element of an array first creates an array of the appropriate size</a:t>
-            </a:r>
-          </a:p>
-          <a:p>
-            <a:pPr marL="0" indent="0">
-              <a:buNone/>
-            </a:pPr>
-            <a:r>
-              <a:rPr lang="en-GB" sz="2400" dirty="0">
-                <a:latin typeface="Courier New" panose="02070309020205020404" pitchFamily="49" charset="0"/>
-                <a:cs typeface="Courier New" panose="02070309020205020404" pitchFamily="49" charset="0"/>
-              </a:rPr>
-              <a:t>&gt;&gt; x(8) = 3</a:t>
-            </a:r>
-          </a:p>
-          <a:p>
-            <a:pPr marL="0" indent="0">
-              <a:buNone/>
-            </a:pPr>
-            <a:r>
-              <a:rPr lang="en-GB" sz="2400" dirty="0">
-                <a:latin typeface="Courier New" panose="02070309020205020404" pitchFamily="49" charset="0"/>
-                <a:cs typeface="Courier New" panose="02070309020205020404" pitchFamily="49" charset="0"/>
-              </a:rPr>
-              <a:t>x =</a:t>
-            </a:r>
-          </a:p>
-          <a:p>
-            <a:pPr marL="0" indent="0">
-              <a:buNone/>
-            </a:pPr>
-            <a:r>
-              <a:rPr lang="en-GB" sz="2400" dirty="0">
-                <a:latin typeface="Courier New" panose="02070309020205020404" pitchFamily="49" charset="0"/>
-                <a:cs typeface="Courier New" panose="02070309020205020404" pitchFamily="49" charset="0"/>
-              </a:rPr>
-              <a:t>     0     0     0     0     0     0     0     3</a:t>
-            </a:r>
+            <a:endParaRPr lang="en-GB" sz="2800" dirty="0"/>
+          </a:p>
+          <a:p>
+            <a:r>
+              <a:rPr lang="en-GB" sz="2800" dirty="0"/>
+              <a:t>Diagnosing problems</a:t>
+            </a:r>
+          </a:p>
+          <a:p>
+            <a:r>
+              <a:rPr lang="en-GB" sz="2800" dirty="0"/>
+              <a:t>Identifying common errors</a:t>
+            </a:r>
+          </a:p>
+          <a:p>
+            <a:r>
+              <a:rPr lang="en-GB" sz="2800" dirty="0"/>
+              <a:t>Evaluation of code performance</a:t>
+            </a:r>
+          </a:p>
+          <a:p>
+            <a:r>
+              <a:rPr lang="en-GB" sz="2800" dirty="0"/>
+              <a:t>Vectorisation techniques</a:t>
+            </a:r>
+          </a:p>
+          <a:p>
+            <a:r>
+              <a:rPr lang="en-GB" sz="2800" dirty="0"/>
+              <a:t>Managing memory effectively</a:t>
+            </a:r>
+          </a:p>
+          <a:p>
+            <a:endParaRPr lang="en-GB" sz="2800" dirty="0"/>
+          </a:p>
+          <a:p>
+            <a:endParaRPr lang="en-GB" sz="2800" dirty="0"/>
           </a:p>
         </p:txBody>
       </p:sp>
@@ -25080,43 +25073,10 @@
           </a:p>
         </p:txBody>
       </p:sp>
-      <p:sp>
-        <p:nvSpPr>
-          <p:cNvPr id="5" name="Title 1"/>
-          <p:cNvSpPr>
-            <a:spLocks noGrp="1"/>
-          </p:cNvSpPr>
-          <p:nvPr>
-            <p:ph type="title"/>
-          </p:nvPr>
-        </p:nvSpPr>
-        <p:spPr>
-          <a:xfrm>
-            <a:off x="1981200" y="274639"/>
-            <a:ext cx="8229600" cy="744537"/>
-          </a:xfrm>
-        </p:spPr>
-        <p:txBody>
-          <a:bodyPr>
-            <a:normAutofit/>
-          </a:bodyPr>
-          <a:lstStyle/>
-          <a:p>
-            <a:r>
-              <a:rPr lang="en-GB" sz="3600" dirty="0" err="1"/>
-              <a:t>Preallocation</a:t>
-            </a:r>
-            <a:r>
-              <a:rPr lang="en-GB" sz="3600" dirty="0"/>
-              <a:t> of Memory</a:t>
-            </a:r>
-          </a:p>
-        </p:txBody>
-      </p:sp>
     </p:spTree>
     <p:extLst>
       <p:ext uri="{BB962C8B-B14F-4D97-AF65-F5344CB8AC3E}">
-        <p14:creationId xmlns:p14="http://schemas.microsoft.com/office/powerpoint/2010/main" val="1971529063"/>
+        <p14:creationId xmlns:p14="http://schemas.microsoft.com/office/powerpoint/2010/main" val="3630683270"/>
       </p:ext>
     </p:extLst>
   </p:cSld>
@@ -25145,6 +25105,244 @@
       </p:grpSpPr>
       <p:sp>
         <p:nvSpPr>
+          <p:cNvPr id="3" name="Content Placeholder 2"/>
+          <p:cNvSpPr>
+            <a:spLocks noGrp="1"/>
+          </p:cNvSpPr>
+          <p:nvPr>
+            <p:ph idx="1"/>
+          </p:nvPr>
+        </p:nvSpPr>
+        <p:spPr>
+          <a:xfrm>
+            <a:off x="1310185" y="1166018"/>
+            <a:ext cx="9298675" cy="4525963"/>
+          </a:xfrm>
+        </p:spPr>
+        <p:txBody>
+          <a:bodyPr>
+            <a:noAutofit/>
+          </a:bodyPr>
+          <a:lstStyle/>
+          <a:p>
+            <a:pPr marL="0" indent="0">
+              <a:buNone/>
+            </a:pPr>
+            <a:r>
+              <a:rPr lang="en-GB" sz="2400" dirty="0"/>
+              <a:t>Efficient matrix and array operations rely on data being located together in a contiguous block of memory addresses</a:t>
+            </a:r>
+          </a:p>
+          <a:p>
+            <a:pPr marL="0" indent="0">
+              <a:buNone/>
+            </a:pPr>
+            <a:endParaRPr lang="en-GB" sz="2400" dirty="0"/>
+          </a:p>
+          <a:p>
+            <a:pPr marL="0" indent="0">
+              <a:buNone/>
+            </a:pPr>
+            <a:r>
+              <a:rPr lang="en-GB" sz="2400" dirty="0"/>
+              <a:t>Create a dummy version of a variable of appropriate size</a:t>
+            </a:r>
+          </a:p>
+          <a:p>
+            <a:pPr marL="0" indent="0">
+              <a:buNone/>
+            </a:pPr>
+            <a:r>
+              <a:rPr lang="en-GB" sz="2400" dirty="0">
+                <a:latin typeface="Courier New" panose="02070309020205020404" pitchFamily="49" charset="0"/>
+                <a:cs typeface="Courier New" panose="02070309020205020404" pitchFamily="49" charset="0"/>
+              </a:rPr>
+              <a:t>&gt;&gt; A = zeros(</a:t>
+            </a:r>
+            <a:r>
+              <a:rPr lang="en-GB" sz="2400" dirty="0" err="1">
+                <a:latin typeface="Courier New" panose="02070309020205020404" pitchFamily="49" charset="0"/>
+                <a:cs typeface="Courier New" panose="02070309020205020404" pitchFamily="49" charset="0"/>
+              </a:rPr>
+              <a:t>m,n</a:t>
+            </a:r>
+            <a:r>
+              <a:rPr lang="en-GB" sz="2400" dirty="0">
+                <a:latin typeface="Courier New" panose="02070309020205020404" pitchFamily="49" charset="0"/>
+                <a:cs typeface="Courier New" panose="02070309020205020404" pitchFamily="49" charset="0"/>
+              </a:rPr>
+              <a:t>)</a:t>
+            </a:r>
+          </a:p>
+          <a:p>
+            <a:pPr marL="0" indent="0">
+              <a:buNone/>
+            </a:pPr>
+            <a:r>
+              <a:rPr lang="en-GB" sz="2400" dirty="0">
+                <a:cs typeface="Courier New" panose="02070309020205020404" pitchFamily="49" charset="0"/>
+              </a:rPr>
+              <a:t>Subsequent operations then overwrite the zeros with the required values</a:t>
+            </a:r>
+          </a:p>
+          <a:p>
+            <a:pPr marL="0" indent="0">
+              <a:buNone/>
+            </a:pPr>
+            <a:endParaRPr lang="en-GB" sz="2400" dirty="0">
+              <a:cs typeface="Courier New" panose="02070309020205020404" pitchFamily="49" charset="0"/>
+            </a:endParaRPr>
+          </a:p>
+          <a:p>
+            <a:pPr marL="0" indent="0">
+              <a:buNone/>
+            </a:pPr>
+            <a:r>
+              <a:rPr lang="en-GB" sz="2400" dirty="0">
+                <a:cs typeface="Courier New" panose="02070309020205020404" pitchFamily="49" charset="0"/>
+              </a:rPr>
+              <a:t>Assigning the last element of an array first creates an array of the appropriate size</a:t>
+            </a:r>
+          </a:p>
+          <a:p>
+            <a:pPr marL="0" indent="0">
+              <a:buNone/>
+            </a:pPr>
+            <a:r>
+              <a:rPr lang="en-GB" sz="2400" dirty="0">
+                <a:latin typeface="Courier New" panose="02070309020205020404" pitchFamily="49" charset="0"/>
+                <a:cs typeface="Courier New" panose="02070309020205020404" pitchFamily="49" charset="0"/>
+              </a:rPr>
+              <a:t>&gt;&gt; x(8) = 3</a:t>
+            </a:r>
+          </a:p>
+          <a:p>
+            <a:pPr marL="0" indent="0">
+              <a:buNone/>
+            </a:pPr>
+            <a:r>
+              <a:rPr lang="en-GB" sz="2400" dirty="0">
+                <a:latin typeface="Courier New" panose="02070309020205020404" pitchFamily="49" charset="0"/>
+                <a:cs typeface="Courier New" panose="02070309020205020404" pitchFamily="49" charset="0"/>
+              </a:rPr>
+              <a:t>x =</a:t>
+            </a:r>
+          </a:p>
+          <a:p>
+            <a:pPr marL="0" indent="0">
+              <a:buNone/>
+            </a:pPr>
+            <a:r>
+              <a:rPr lang="en-GB" sz="2400" dirty="0">
+                <a:latin typeface="Courier New" panose="02070309020205020404" pitchFamily="49" charset="0"/>
+                <a:cs typeface="Courier New" panose="02070309020205020404" pitchFamily="49" charset="0"/>
+              </a:rPr>
+              <a:t>     0     0     0     0     0     0     0     3</a:t>
+            </a:r>
+          </a:p>
+        </p:txBody>
+      </p:sp>
+      <p:sp>
+        <p:nvSpPr>
+          <p:cNvPr id="4" name="Slide Number Placeholder 3"/>
+          <p:cNvSpPr>
+            <a:spLocks noGrp="1"/>
+          </p:cNvSpPr>
+          <p:nvPr>
+            <p:ph type="sldNum" sz="quarter" idx="12"/>
+          </p:nvPr>
+        </p:nvSpPr>
+        <p:spPr/>
+        <p:txBody>
+          <a:bodyPr/>
+          <a:lstStyle/>
+          <a:p>
+            <a:fld id="{83730267-60C2-4514-997F-6A8804439442}" type="slidenum">
+              <a:rPr lang="en-GB" smtClean="0">
+                <a:solidFill>
+                  <a:prstClr val="black">
+                    <a:tint val="75000"/>
+                  </a:prstClr>
+                </a:solidFill>
+              </a:rPr>
+              <a:pPr/>
+              <a:t>35</a:t>
+            </a:fld>
+            <a:endParaRPr lang="en-GB">
+              <a:solidFill>
+                <a:prstClr val="black">
+                  <a:tint val="75000"/>
+                </a:prstClr>
+              </a:solidFill>
+            </a:endParaRPr>
+          </a:p>
+        </p:txBody>
+      </p:sp>
+      <p:sp>
+        <p:nvSpPr>
+          <p:cNvPr id="5" name="Title 1"/>
+          <p:cNvSpPr>
+            <a:spLocks noGrp="1"/>
+          </p:cNvSpPr>
+          <p:nvPr>
+            <p:ph type="title"/>
+          </p:nvPr>
+        </p:nvSpPr>
+        <p:spPr>
+          <a:xfrm>
+            <a:off x="1981199" y="136522"/>
+            <a:ext cx="8229600" cy="744537"/>
+          </a:xfrm>
+        </p:spPr>
+        <p:txBody>
+          <a:bodyPr>
+            <a:normAutofit/>
+          </a:bodyPr>
+          <a:lstStyle/>
+          <a:p>
+            <a:r>
+              <a:rPr lang="en-GB" sz="3600" dirty="0" err="1"/>
+              <a:t>Preallocation</a:t>
+            </a:r>
+            <a:r>
+              <a:rPr lang="en-GB" sz="3600" dirty="0"/>
+              <a:t> of Memory</a:t>
+            </a:r>
+          </a:p>
+        </p:txBody>
+      </p:sp>
+    </p:spTree>
+    <p:extLst>
+      <p:ext uri="{BB962C8B-B14F-4D97-AF65-F5344CB8AC3E}">
+        <p14:creationId xmlns:p14="http://schemas.microsoft.com/office/powerpoint/2010/main" val="1971529063"/>
+      </p:ext>
+    </p:extLst>
+  </p:cSld>
+  <p:clrMapOvr>
+    <a:masterClrMapping/>
+  </p:clrMapOvr>
+</p:sld>
+</file>
+
+<file path=ppt/slides/slide36.xml><?xml version="1.0" encoding="utf-8"?>
+<p:sld xmlns:a="http://schemas.openxmlformats.org/drawingml/2006/main" xmlns:r="http://schemas.openxmlformats.org/officeDocument/2006/relationships" xmlns:p="http://schemas.openxmlformats.org/presentationml/2006/main">
+  <p:cSld>
+    <p:spTree>
+      <p:nvGrpSpPr>
+        <p:cNvPr id="1" name=""/>
+        <p:cNvGrpSpPr/>
+        <p:nvPr/>
+      </p:nvGrpSpPr>
+      <p:grpSpPr>
+        <a:xfrm>
+          <a:off x="0" y="0"/>
+          <a:ext cx="0" cy="0"/>
+          <a:chOff x="0" y="0"/>
+          <a:chExt cx="0" cy="0"/>
+        </a:xfrm>
+      </p:grpSpPr>
+      <p:sp>
+        <p:nvSpPr>
           <p:cNvPr id="2" name="Slide Number Placeholder 1"/>
           <p:cNvSpPr>
             <a:spLocks noGrp="1"/>
@@ -25167,7 +25365,7 @@
                 </a:solidFill>
               </a:rPr>
               <a:pPr/>
-              <a:t>35</a:t>
+              <a:t>36</a:t>
             </a:fld>
             <a:endParaRPr lang="en-GB">
               <a:solidFill>
@@ -26339,7 +26537,7 @@
 </p:sld>
 </file>
 
-<file path=ppt/slides/slide36.xml><?xml version="1.0" encoding="utf-8"?>
+<file path=ppt/slides/slide37.xml><?xml version="1.0" encoding="utf-8"?>
 <p:sld xmlns:a="http://schemas.openxmlformats.org/drawingml/2006/main" xmlns:r="http://schemas.openxmlformats.org/officeDocument/2006/relationships" xmlns:p="http://schemas.openxmlformats.org/presentationml/2006/main">
   <p:cSld>
     <p:spTree>
@@ -26380,7 +26578,7 @@
                 </a:solidFill>
               </a:rPr>
               <a:pPr/>
-              <a:t>36</a:t>
+              <a:t>37</a:t>
             </a:fld>
             <a:endParaRPr lang="en-GB">
               <a:solidFill>
@@ -27823,7 +28021,7 @@
 </p:sld>
 </file>
 
-<file path=ppt/slides/slide37.xml><?xml version="1.0" encoding="utf-8"?>
+<file path=ppt/slides/slide38.xml><?xml version="1.0" encoding="utf-8"?>
 <p:sld xmlns:a="http://schemas.openxmlformats.org/drawingml/2006/main" xmlns:r="http://schemas.openxmlformats.org/officeDocument/2006/relationships" xmlns:p="http://schemas.openxmlformats.org/presentationml/2006/main">
   <p:cSld>
     <p:spTree>
@@ -27870,7 +28068,7 @@
                 </a:solidFill>
               </a:rPr>
               <a:pPr/>
-              <a:t>37</a:t>
+              <a:t>38</a:t>
             </a:fld>
             <a:endParaRPr lang="en-GB">
               <a:solidFill>
@@ -27879,41 +28077,6 @@
                 </a:prstClr>
               </a:solidFill>
             </a:endParaRPr>
-          </a:p>
-        </p:txBody>
-      </p:sp>
-      <p:sp>
-        <p:nvSpPr>
-          <p:cNvPr id="4" name="TextBox 3">
-            <a:extLst>
-              <a:ext uri="{FF2B5EF4-FFF2-40B4-BE49-F238E27FC236}">
-                <a16:creationId xmlns:a16="http://schemas.microsoft.com/office/drawing/2014/main" id="{944B6136-ACFB-C1AF-605D-B07A66F194F5}"/>
-              </a:ext>
-            </a:extLst>
-          </p:cNvPr>
-          <p:cNvSpPr txBox="1"/>
-          <p:nvPr/>
-        </p:nvSpPr>
-        <p:spPr>
-          <a:xfrm>
-            <a:off x="3046863" y="2555249"/>
-            <a:ext cx="6093724" cy="1754326"/>
-          </a:xfrm>
-          <a:prstGeom prst="rect">
-            <a:avLst/>
-          </a:prstGeom>
-          <a:noFill/>
-        </p:spPr>
-        <p:txBody>
-          <a:bodyPr wrap="square">
-            <a:spAutoFit/>
-          </a:bodyPr>
-          <a:lstStyle/>
-          <a:p>
-            <a:r>
-              <a:rPr lang="en-GB" dirty="0"/>
-              <a:t>https://www.google.com/search?client=firefox-b-d&amp;tbm=vid&amp;sxsrf=APwXEdcbi2yxoez4RFb_MTX_XhvW4Kn0ag:1684402733278&amp;q=matlab+profiler+example+and+solution&amp;sa=X&amp;ved=2ahUKEwipms2Uyf7-AhWXWcAKHVLgAJcQ8ccDegQIDRAH&amp;biw=1920&amp;bih=955&amp;dpr=1#fpstate=ive&amp;vld=cid:b2cb0173,vid:uvZcGjNBjWU</a:t>
-            </a:r>
           </a:p>
         </p:txBody>
       </p:sp>

</xml_diff>